<commit_message>
I changed the Pendulum_DD code so that it can take the boundaries of the training domain as input. This will speed up my workflow on Marianas.
</commit_message>
<xml_diff>
--- a/MFFBPINNs.pptx
+++ b/MFFBPINNs.pptx
@@ -5,15 +5,13 @@
     <p:sldMasterId id="2147483660" r:id="rId1"/>
   </p:sldMasterIdLst>
   <p:notesMasterIdLst>
-    <p:notesMasterId r:id="rId8"/>
+    <p:notesMasterId r:id="rId6"/>
   </p:notesMasterIdLst>
   <p:sldIdLst>
     <p:sldId id="256" r:id="rId2"/>
     <p:sldId id="257" r:id="rId3"/>
     <p:sldId id="258" r:id="rId4"/>
     <p:sldId id="261" r:id="rId5"/>
-    <p:sldId id="259" r:id="rId6"/>
-    <p:sldId id="260" r:id="rId7"/>
   </p:sldIdLst>
   <p:sldSz cx="12192000" cy="6858000"/>
   <p:notesSz cx="6858000" cy="9144000"/>
@@ -830,7 +828,7 @@
           <a:noFill/>
           <a:extLst>
             <a:ext uri="{909E8E84-426E-40dd-AFC4-6F175D3DCCD1}">
-              <a14:hiddenFill xmlns="" xmlns:a14="http://schemas.microsoft.com/office/drawing/2010/main">
+              <a14:hiddenFill xmlns:a14="http://schemas.microsoft.com/office/drawing/2010/main" xmlns="">
                 <a:solidFill>
                   <a:srgbClr val="FFFFFF"/>
                 </a:solidFill>
@@ -890,7 +888,7 @@
             </a:ln>
             <a:extLst>
               <a:ext uri="{91240B29-F687-4f45-9708-019B960494DF}">
-                <a14:hiddenLine xmlns="" xmlns:a14="http://schemas.microsoft.com/office/drawing/2010/main" w="9525">
+                <a14:hiddenLine xmlns:a14="http://schemas.microsoft.com/office/drawing/2010/main" xmlns="" w="9525">
                   <a:solidFill>
                     <a:srgbClr val="000000"/>
                   </a:solidFill>
@@ -980,7 +978,7 @@
             </a:ln>
             <a:extLst>
               <a:ext uri="{91240B29-F687-4f45-9708-019B960494DF}">
-                <a14:hiddenLine xmlns="" xmlns:a14="http://schemas.microsoft.com/office/drawing/2010/main" w="9525">
+                <a14:hiddenLine xmlns:a14="http://schemas.microsoft.com/office/drawing/2010/main" xmlns="" w="9525">
                   <a:solidFill>
                     <a:srgbClr val="000000"/>
                   </a:solidFill>
@@ -1070,7 +1068,7 @@
             </a:ln>
             <a:extLst>
               <a:ext uri="{91240B29-F687-4f45-9708-019B960494DF}">
-                <a14:hiddenLine xmlns="" xmlns:a14="http://schemas.microsoft.com/office/drawing/2010/main" w="9525">
+                <a14:hiddenLine xmlns:a14="http://schemas.microsoft.com/office/drawing/2010/main" xmlns="" w="9525">
                   <a:solidFill>
                     <a:srgbClr val="000000"/>
                   </a:solidFill>
@@ -1104,7 +1102,7 @@
             </a:ln>
             <a:extLst>
               <a:ext uri="{91240B29-F687-4f45-9708-019B960494DF}">
-                <a14:hiddenLine xmlns="" xmlns:a14="http://schemas.microsoft.com/office/drawing/2010/main" w="9525">
+                <a14:hiddenLine xmlns:a14="http://schemas.microsoft.com/office/drawing/2010/main" xmlns="" w="9525">
                   <a:solidFill>
                     <a:srgbClr val="000000"/>
                   </a:solidFill>
@@ -1194,7 +1192,7 @@
             </a:ln>
             <a:extLst>
               <a:ext uri="{91240B29-F687-4f45-9708-019B960494DF}">
-                <a14:hiddenLine xmlns="" xmlns:a14="http://schemas.microsoft.com/office/drawing/2010/main" w="9525">
+                <a14:hiddenLine xmlns:a14="http://schemas.microsoft.com/office/drawing/2010/main" xmlns="" w="9525">
                   <a:solidFill>
                     <a:srgbClr val="000000"/>
                   </a:solidFill>
@@ -1256,7 +1254,7 @@
             </a:ln>
             <a:extLst>
               <a:ext uri="{91240B29-F687-4f45-9708-019B960494DF}">
-                <a14:hiddenLine xmlns="" xmlns:a14="http://schemas.microsoft.com/office/drawing/2010/main" w="9525">
+                <a14:hiddenLine xmlns:a14="http://schemas.microsoft.com/office/drawing/2010/main" xmlns="" w="9525">
                   <a:solidFill>
                     <a:srgbClr val="000000"/>
                   </a:solidFill>
@@ -1318,7 +1316,7 @@
             </a:ln>
             <a:extLst>
               <a:ext uri="{91240B29-F687-4f45-9708-019B960494DF}">
-                <a14:hiddenLine xmlns="" xmlns:a14="http://schemas.microsoft.com/office/drawing/2010/main" w="9525">
+                <a14:hiddenLine xmlns:a14="http://schemas.microsoft.com/office/drawing/2010/main" xmlns="" w="9525">
                   <a:solidFill>
                     <a:srgbClr val="000000"/>
                   </a:solidFill>
@@ -1408,7 +1406,7 @@
             </a:ln>
             <a:extLst>
               <a:ext uri="{91240B29-F687-4f45-9708-019B960494DF}">
-                <a14:hiddenLine xmlns="" xmlns:a14="http://schemas.microsoft.com/office/drawing/2010/main" w="9525">
+                <a14:hiddenLine xmlns:a14="http://schemas.microsoft.com/office/drawing/2010/main" xmlns="" w="9525">
                   <a:solidFill>
                     <a:srgbClr val="000000"/>
                   </a:solidFill>
@@ -1470,7 +1468,7 @@
             </a:ln>
             <a:extLst>
               <a:ext uri="{91240B29-F687-4f45-9708-019B960494DF}">
-                <a14:hiddenLine xmlns="" xmlns:a14="http://schemas.microsoft.com/office/drawing/2010/main" w="9525">
+                <a14:hiddenLine xmlns:a14="http://schemas.microsoft.com/office/drawing/2010/main" xmlns="" w="9525">
                   <a:solidFill>
                     <a:srgbClr val="000000"/>
                   </a:solidFill>
@@ -1532,7 +1530,7 @@
             </a:ln>
             <a:extLst>
               <a:ext uri="{91240B29-F687-4f45-9708-019B960494DF}">
-                <a14:hiddenLine xmlns="" xmlns:a14="http://schemas.microsoft.com/office/drawing/2010/main" w="9525">
+                <a14:hiddenLine xmlns:a14="http://schemas.microsoft.com/office/drawing/2010/main" xmlns="" w="9525">
                   <a:solidFill>
                     <a:srgbClr val="000000"/>
                   </a:solidFill>
@@ -1622,7 +1620,7 @@
             </a:ln>
             <a:extLst>
               <a:ext uri="{91240B29-F687-4f45-9708-019B960494DF}">
-                <a14:hiddenLine xmlns="" xmlns:a14="http://schemas.microsoft.com/office/drawing/2010/main" w="9525">
+                <a14:hiddenLine xmlns:a14="http://schemas.microsoft.com/office/drawing/2010/main" xmlns="" w="9525">
                   <a:solidFill>
                     <a:srgbClr val="000000"/>
                   </a:solidFill>
@@ -1712,7 +1710,7 @@
             </a:ln>
             <a:extLst>
               <a:ext uri="{91240B29-F687-4f45-9708-019B960494DF}">
-                <a14:hiddenLine xmlns="" xmlns:a14="http://schemas.microsoft.com/office/drawing/2010/main" w="9525">
+                <a14:hiddenLine xmlns:a14="http://schemas.microsoft.com/office/drawing/2010/main" xmlns="" w="9525">
                   <a:solidFill>
                     <a:srgbClr val="000000"/>
                   </a:solidFill>
@@ -1774,7 +1772,7 @@
             </a:ln>
             <a:extLst>
               <a:ext uri="{91240B29-F687-4f45-9708-019B960494DF}">
-                <a14:hiddenLine xmlns="" xmlns:a14="http://schemas.microsoft.com/office/drawing/2010/main" w="9525">
+                <a14:hiddenLine xmlns:a14="http://schemas.microsoft.com/office/drawing/2010/main" xmlns="" w="9525">
                   <a:solidFill>
                     <a:srgbClr val="000000"/>
                   </a:solidFill>
@@ -1884,7 +1882,7 @@
             </a:ln>
             <a:extLst>
               <a:ext uri="{91240B29-F687-4f45-9708-019B960494DF}">
-                <a14:hiddenLine xmlns="" xmlns:a14="http://schemas.microsoft.com/office/drawing/2010/main" w="9525">
+                <a14:hiddenLine xmlns:a14="http://schemas.microsoft.com/office/drawing/2010/main" xmlns="" w="9525">
                   <a:solidFill>
                     <a:srgbClr val="000000"/>
                   </a:solidFill>
@@ -1946,7 +1944,7 @@
             </a:ln>
             <a:extLst>
               <a:ext uri="{91240B29-F687-4f45-9708-019B960494DF}">
-                <a14:hiddenLine xmlns="" xmlns:a14="http://schemas.microsoft.com/office/drawing/2010/main" w="9525">
+                <a14:hiddenLine xmlns:a14="http://schemas.microsoft.com/office/drawing/2010/main" xmlns="" w="9525">
                   <a:solidFill>
                     <a:srgbClr val="000000"/>
                   </a:solidFill>
@@ -2036,7 +2034,7 @@
             </a:ln>
             <a:extLst>
               <a:ext uri="{91240B29-F687-4f45-9708-019B960494DF}">
-                <a14:hiddenLine xmlns="" xmlns:a14="http://schemas.microsoft.com/office/drawing/2010/main" w="9525">
+                <a14:hiddenLine xmlns:a14="http://schemas.microsoft.com/office/drawing/2010/main" xmlns="" w="9525">
                   <a:solidFill>
                     <a:srgbClr val="000000"/>
                   </a:solidFill>
@@ -2126,7 +2124,7 @@
             </a:ln>
             <a:extLst>
               <a:ext uri="{91240B29-F687-4f45-9708-019B960494DF}">
-                <a14:hiddenLine xmlns="" xmlns:a14="http://schemas.microsoft.com/office/drawing/2010/main" w="9525">
+                <a14:hiddenLine xmlns:a14="http://schemas.microsoft.com/office/drawing/2010/main" xmlns="" w="9525">
                   <a:solidFill>
                     <a:srgbClr val="000000"/>
                   </a:solidFill>
@@ -2188,7 +2186,7 @@
             </a:ln>
             <a:extLst>
               <a:ext uri="{91240B29-F687-4f45-9708-019B960494DF}">
-                <a14:hiddenLine xmlns="" xmlns:a14="http://schemas.microsoft.com/office/drawing/2010/main" w="9525">
+                <a14:hiddenLine xmlns:a14="http://schemas.microsoft.com/office/drawing/2010/main" xmlns="" w="9525">
                   <a:solidFill>
                     <a:srgbClr val="000000"/>
                   </a:solidFill>
@@ -2278,7 +2276,7 @@
             </a:ln>
             <a:extLst>
               <a:ext uri="{91240B29-F687-4f45-9708-019B960494DF}">
-                <a14:hiddenLine xmlns="" xmlns:a14="http://schemas.microsoft.com/office/drawing/2010/main" w="9525">
+                <a14:hiddenLine xmlns:a14="http://schemas.microsoft.com/office/drawing/2010/main" xmlns="" w="9525">
                   <a:solidFill>
                     <a:srgbClr val="000000"/>
                   </a:solidFill>
@@ -2368,7 +2366,7 @@
             </a:ln>
             <a:extLst>
               <a:ext uri="{91240B29-F687-4f45-9708-019B960494DF}">
-                <a14:hiddenLine xmlns="" xmlns:a14="http://schemas.microsoft.com/office/drawing/2010/main" w="9525">
+                <a14:hiddenLine xmlns:a14="http://schemas.microsoft.com/office/drawing/2010/main" xmlns="" w="9525">
                   <a:solidFill>
                     <a:srgbClr val="000000"/>
                   </a:solidFill>
@@ -2424,7 +2422,7 @@
             </a:ln>
             <a:extLst>
               <a:ext uri="{91240B29-F687-4f45-9708-019B960494DF}">
-                <a14:hiddenLine xmlns="" xmlns:a14="http://schemas.microsoft.com/office/drawing/2010/main" w="9525">
+                <a14:hiddenLine xmlns:a14="http://schemas.microsoft.com/office/drawing/2010/main" xmlns="" w="9525">
                   <a:solidFill>
                     <a:srgbClr val="000000"/>
                   </a:solidFill>
@@ -2514,7 +2512,7 @@
             </a:ln>
             <a:extLst>
               <a:ext uri="{91240B29-F687-4f45-9708-019B960494DF}">
-                <a14:hiddenLine xmlns="" xmlns:a14="http://schemas.microsoft.com/office/drawing/2010/main" w="9525">
+                <a14:hiddenLine xmlns:a14="http://schemas.microsoft.com/office/drawing/2010/main" xmlns="" w="9525">
                   <a:solidFill>
                     <a:srgbClr val="000000"/>
                   </a:solidFill>
@@ -2570,7 +2568,7 @@
             </a:ln>
             <a:extLst>
               <a:ext uri="{91240B29-F687-4f45-9708-019B960494DF}">
-                <a14:hiddenLine xmlns="" xmlns:a14="http://schemas.microsoft.com/office/drawing/2010/main" w="9525">
+                <a14:hiddenLine xmlns:a14="http://schemas.microsoft.com/office/drawing/2010/main" xmlns="" w="9525">
                   <a:solidFill>
                     <a:srgbClr val="000000"/>
                   </a:solidFill>
@@ -2660,7 +2658,7 @@
             </a:ln>
             <a:extLst>
               <a:ext uri="{91240B29-F687-4f45-9708-019B960494DF}">
-                <a14:hiddenLine xmlns="" xmlns:a14="http://schemas.microsoft.com/office/drawing/2010/main" w="9525">
+                <a14:hiddenLine xmlns:a14="http://schemas.microsoft.com/office/drawing/2010/main" xmlns="" w="9525">
                   <a:solidFill>
                     <a:srgbClr val="000000"/>
                   </a:solidFill>
@@ -2728,7 +2726,7 @@
             </a:ln>
             <a:extLst>
               <a:ext uri="{91240B29-F687-4f45-9708-019B960494DF}">
-                <a14:hiddenLine xmlns="" xmlns:a14="http://schemas.microsoft.com/office/drawing/2010/main" w="9525">
+                <a14:hiddenLine xmlns:a14="http://schemas.microsoft.com/office/drawing/2010/main" xmlns="" w="9525">
                   <a:solidFill>
                     <a:srgbClr val="000000"/>
                   </a:solidFill>
@@ -2818,7 +2816,7 @@
             </a:ln>
             <a:extLst>
               <a:ext uri="{91240B29-F687-4f45-9708-019B960494DF}">
-                <a14:hiddenLine xmlns="" xmlns:a14="http://schemas.microsoft.com/office/drawing/2010/main" w="9525">
+                <a14:hiddenLine xmlns:a14="http://schemas.microsoft.com/office/drawing/2010/main" xmlns="" w="9525">
                   <a:solidFill>
                     <a:srgbClr val="000000"/>
                   </a:solidFill>
@@ -2886,7 +2884,7 @@
             </a:ln>
             <a:extLst>
               <a:ext uri="{91240B29-F687-4f45-9708-019B960494DF}">
-                <a14:hiddenLine xmlns="" xmlns:a14="http://schemas.microsoft.com/office/drawing/2010/main" w="9525">
+                <a14:hiddenLine xmlns:a14="http://schemas.microsoft.com/office/drawing/2010/main" xmlns="" w="9525">
                   <a:solidFill>
                     <a:srgbClr val="000000"/>
                   </a:solidFill>
@@ -2976,7 +2974,7 @@
             </a:ln>
             <a:extLst>
               <a:ext uri="{91240B29-F687-4f45-9708-019B960494DF}">
-                <a14:hiddenLine xmlns="" xmlns:a14="http://schemas.microsoft.com/office/drawing/2010/main" w="9525">
+                <a14:hiddenLine xmlns:a14="http://schemas.microsoft.com/office/drawing/2010/main" xmlns="" w="9525">
                   <a:solidFill>
                     <a:srgbClr val="000000"/>
                   </a:solidFill>
@@ -3010,7 +3008,7 @@
             </a:ln>
             <a:extLst>
               <a:ext uri="{91240B29-F687-4f45-9708-019B960494DF}">
-                <a14:hiddenLine xmlns="" xmlns:a14="http://schemas.microsoft.com/office/drawing/2010/main" w="9525">
+                <a14:hiddenLine xmlns:a14="http://schemas.microsoft.com/office/drawing/2010/main" xmlns="" w="9525">
                   <a:solidFill>
                     <a:srgbClr val="000000"/>
                   </a:solidFill>
@@ -3100,7 +3098,7 @@
             </a:ln>
             <a:extLst>
               <a:ext uri="{91240B29-F687-4f45-9708-019B960494DF}">
-                <a14:hiddenLine xmlns="" xmlns:a14="http://schemas.microsoft.com/office/drawing/2010/main" w="9525">
+                <a14:hiddenLine xmlns:a14="http://schemas.microsoft.com/office/drawing/2010/main" xmlns="" w="9525">
                   <a:solidFill>
                     <a:srgbClr val="000000"/>
                   </a:solidFill>
@@ -3162,7 +3160,7 @@
             </a:ln>
             <a:extLst>
               <a:ext uri="{91240B29-F687-4f45-9708-019B960494DF}">
-                <a14:hiddenLine xmlns="" xmlns:a14="http://schemas.microsoft.com/office/drawing/2010/main" w="9525">
+                <a14:hiddenLine xmlns:a14="http://schemas.microsoft.com/office/drawing/2010/main" xmlns="" w="9525">
                   <a:solidFill>
                     <a:srgbClr val="000000"/>
                   </a:solidFill>
@@ -3224,7 +3222,7 @@
             </a:ln>
             <a:extLst>
               <a:ext uri="{91240B29-F687-4f45-9708-019B960494DF}">
-                <a14:hiddenLine xmlns="" xmlns:a14="http://schemas.microsoft.com/office/drawing/2010/main" w="9525">
+                <a14:hiddenLine xmlns:a14="http://schemas.microsoft.com/office/drawing/2010/main" xmlns="" w="9525">
                   <a:solidFill>
                     <a:srgbClr val="000000"/>
                   </a:solidFill>
@@ -3314,7 +3312,7 @@
             </a:ln>
             <a:extLst>
               <a:ext uri="{91240B29-F687-4f45-9708-019B960494DF}">
-                <a14:hiddenLine xmlns="" xmlns:a14="http://schemas.microsoft.com/office/drawing/2010/main" w="9525">
+                <a14:hiddenLine xmlns:a14="http://schemas.microsoft.com/office/drawing/2010/main" xmlns="" w="9525">
                   <a:solidFill>
                     <a:srgbClr val="000000"/>
                   </a:solidFill>
@@ -3382,7 +3380,7 @@
             </a:ln>
             <a:extLst>
               <a:ext uri="{91240B29-F687-4f45-9708-019B960494DF}">
-                <a14:hiddenLine xmlns="" xmlns:a14="http://schemas.microsoft.com/office/drawing/2010/main" w="9525">
+                <a14:hiddenLine xmlns:a14="http://schemas.microsoft.com/office/drawing/2010/main" xmlns="" w="9525">
                   <a:solidFill>
                     <a:srgbClr val="000000"/>
                   </a:solidFill>
@@ -3444,7 +3442,7 @@
             </a:ln>
             <a:extLst>
               <a:ext uri="{91240B29-F687-4f45-9708-019B960494DF}">
-                <a14:hiddenLine xmlns="" xmlns:a14="http://schemas.microsoft.com/office/drawing/2010/main" w="9525">
+                <a14:hiddenLine xmlns:a14="http://schemas.microsoft.com/office/drawing/2010/main" xmlns="" w="9525">
                   <a:solidFill>
                     <a:srgbClr val="000000"/>
                   </a:solidFill>
@@ -3534,7 +3532,7 @@
             </a:ln>
             <a:extLst>
               <a:ext uri="{91240B29-F687-4f45-9708-019B960494DF}">
-                <a14:hiddenLine xmlns="" xmlns:a14="http://schemas.microsoft.com/office/drawing/2010/main" w="9525">
+                <a14:hiddenLine xmlns:a14="http://schemas.microsoft.com/office/drawing/2010/main" xmlns="" w="9525">
                   <a:solidFill>
                     <a:srgbClr val="000000"/>
                   </a:solidFill>
@@ -3596,7 +3594,7 @@
             </a:ln>
             <a:extLst>
               <a:ext uri="{91240B29-F687-4f45-9708-019B960494DF}">
-                <a14:hiddenLine xmlns="" xmlns:a14="http://schemas.microsoft.com/office/drawing/2010/main" w="9525">
+                <a14:hiddenLine xmlns:a14="http://schemas.microsoft.com/office/drawing/2010/main" xmlns="" w="9525">
                   <a:solidFill>
                     <a:srgbClr val="000000"/>
                   </a:solidFill>
@@ -3686,7 +3684,7 @@
             </a:ln>
             <a:extLst>
               <a:ext uri="{91240B29-F687-4f45-9708-019B960494DF}">
-                <a14:hiddenLine xmlns="" xmlns:a14="http://schemas.microsoft.com/office/drawing/2010/main" w="9525">
+                <a14:hiddenLine xmlns:a14="http://schemas.microsoft.com/office/drawing/2010/main" xmlns="" w="9525">
                   <a:solidFill>
                     <a:srgbClr val="000000"/>
                   </a:solidFill>
@@ -3748,7 +3746,7 @@
             </a:ln>
             <a:extLst>
               <a:ext uri="{91240B29-F687-4f45-9708-019B960494DF}">
-                <a14:hiddenLine xmlns="" xmlns:a14="http://schemas.microsoft.com/office/drawing/2010/main" w="9525">
+                <a14:hiddenLine xmlns:a14="http://schemas.microsoft.com/office/drawing/2010/main" xmlns="" w="9525">
                   <a:solidFill>
                     <a:srgbClr val="000000"/>
                   </a:solidFill>
@@ -3838,7 +3836,7 @@
             </a:ln>
             <a:extLst>
               <a:ext uri="{91240B29-F687-4f45-9708-019B960494DF}">
-                <a14:hiddenLine xmlns="" xmlns:a14="http://schemas.microsoft.com/office/drawing/2010/main" w="9525">
+                <a14:hiddenLine xmlns:a14="http://schemas.microsoft.com/office/drawing/2010/main" xmlns="" w="9525">
                   <a:solidFill>
                     <a:srgbClr val="000000"/>
                   </a:solidFill>
@@ -3872,7 +3870,7 @@
             </a:ln>
             <a:extLst>
               <a:ext uri="{91240B29-F687-4f45-9708-019B960494DF}">
-                <a14:hiddenLine xmlns="" xmlns:a14="http://schemas.microsoft.com/office/drawing/2010/main" w="9525">
+                <a14:hiddenLine xmlns:a14="http://schemas.microsoft.com/office/drawing/2010/main" xmlns="" w="9525">
                   <a:solidFill>
                     <a:srgbClr val="000000"/>
                   </a:solidFill>
@@ -3937,7 +3935,7 @@
             </a:ln>
             <a:extLst>
               <a:ext uri="{91240B29-F687-4f45-9708-019B960494DF}">
-                <a14:hiddenLine xmlns="" xmlns:a14="http://schemas.microsoft.com/office/drawing/2010/main" w="9525">
+                <a14:hiddenLine xmlns:a14="http://schemas.microsoft.com/office/drawing/2010/main" xmlns="" w="9525">
                   <a:solidFill>
                     <a:srgbClr val="000000"/>
                   </a:solidFill>
@@ -4027,7 +4025,7 @@
             </a:ln>
             <a:extLst>
               <a:ext uri="{91240B29-F687-4f45-9708-019B960494DF}">
-                <a14:hiddenLine xmlns="" xmlns:a14="http://schemas.microsoft.com/office/drawing/2010/main" w="9525">
+                <a14:hiddenLine xmlns:a14="http://schemas.microsoft.com/office/drawing/2010/main" xmlns="" w="9525">
                   <a:solidFill>
                     <a:srgbClr val="000000"/>
                   </a:solidFill>
@@ -4089,7 +4087,7 @@
             </a:ln>
             <a:extLst>
               <a:ext uri="{91240B29-F687-4f45-9708-019B960494DF}">
-                <a14:hiddenLine xmlns="" xmlns:a14="http://schemas.microsoft.com/office/drawing/2010/main" w="9525">
+                <a14:hiddenLine xmlns:a14="http://schemas.microsoft.com/office/drawing/2010/main" xmlns="" w="9525">
                   <a:solidFill>
                     <a:srgbClr val="000000"/>
                   </a:solidFill>
@@ -4179,7 +4177,7 @@
             </a:ln>
             <a:extLst>
               <a:ext uri="{91240B29-F687-4f45-9708-019B960494DF}">
-                <a14:hiddenLine xmlns="" xmlns:a14="http://schemas.microsoft.com/office/drawing/2010/main" w="9525">
+                <a14:hiddenLine xmlns:a14="http://schemas.microsoft.com/office/drawing/2010/main" xmlns="" w="9525">
                   <a:solidFill>
                     <a:srgbClr val="000000"/>
                   </a:solidFill>
@@ -4269,7 +4267,7 @@
             </a:ln>
             <a:extLst>
               <a:ext uri="{91240B29-F687-4f45-9708-019B960494DF}">
-                <a14:hiddenLine xmlns="" xmlns:a14="http://schemas.microsoft.com/office/drawing/2010/main" w="9525">
+                <a14:hiddenLine xmlns:a14="http://schemas.microsoft.com/office/drawing/2010/main" xmlns="" w="9525">
                   <a:solidFill>
                     <a:srgbClr val="000000"/>
                   </a:solidFill>
@@ -4334,7 +4332,7 @@
             </a:ln>
             <a:extLst>
               <a:ext uri="{91240B29-F687-4f45-9708-019B960494DF}">
-                <a14:hiddenLine xmlns="" xmlns:a14="http://schemas.microsoft.com/office/drawing/2010/main" w="9525">
+                <a14:hiddenLine xmlns:a14="http://schemas.microsoft.com/office/drawing/2010/main" xmlns="" w="9525">
                   <a:solidFill>
                     <a:srgbClr val="000000"/>
                   </a:solidFill>
@@ -4396,7 +4394,7 @@
             </a:ln>
             <a:extLst>
               <a:ext uri="{91240B29-F687-4f45-9708-019B960494DF}">
-                <a14:hiddenLine xmlns="" xmlns:a14="http://schemas.microsoft.com/office/drawing/2010/main" w="9525">
+                <a14:hiddenLine xmlns:a14="http://schemas.microsoft.com/office/drawing/2010/main" xmlns="" w="9525">
                   <a:solidFill>
                     <a:srgbClr val="000000"/>
                   </a:solidFill>
@@ -4486,7 +4484,7 @@
             </a:ln>
             <a:extLst>
               <a:ext uri="{91240B29-F687-4f45-9708-019B960494DF}">
-                <a14:hiddenLine xmlns="" xmlns:a14="http://schemas.microsoft.com/office/drawing/2010/main" w="9525">
+                <a14:hiddenLine xmlns:a14="http://schemas.microsoft.com/office/drawing/2010/main" xmlns="" w="9525">
                   <a:solidFill>
                     <a:srgbClr val="000000"/>
                   </a:solidFill>
@@ -4576,7 +4574,7 @@
             </a:ln>
             <a:extLst>
               <a:ext uri="{91240B29-F687-4f45-9708-019B960494DF}">
-                <a14:hiddenLine xmlns="" xmlns:a14="http://schemas.microsoft.com/office/drawing/2010/main" w="9525">
+                <a14:hiddenLine xmlns:a14="http://schemas.microsoft.com/office/drawing/2010/main" xmlns="" w="9525">
                   <a:solidFill>
                     <a:srgbClr val="000000"/>
                   </a:solidFill>
@@ -4638,7 +4636,7 @@
             </a:ln>
             <a:extLst>
               <a:ext uri="{91240B29-F687-4f45-9708-019B960494DF}">
-                <a14:hiddenLine xmlns="" xmlns:a14="http://schemas.microsoft.com/office/drawing/2010/main" w="9525">
+                <a14:hiddenLine xmlns:a14="http://schemas.microsoft.com/office/drawing/2010/main" xmlns="" w="9525">
                   <a:solidFill>
                     <a:srgbClr val="000000"/>
                   </a:solidFill>
@@ -4758,7 +4756,7 @@
             </a:ln>
             <a:extLst>
               <a:ext uri="{91240B29-F687-4f45-9708-019B960494DF}">
-                <a14:hiddenLine xmlns="" xmlns:a14="http://schemas.microsoft.com/office/drawing/2010/main" w="9525">
+                <a14:hiddenLine xmlns:a14="http://schemas.microsoft.com/office/drawing/2010/main" xmlns="" w="9525">
                   <a:solidFill>
                     <a:srgbClr val="000000"/>
                   </a:solidFill>
@@ -4826,7 +4824,7 @@
             </a:ln>
             <a:extLst>
               <a:ext uri="{91240B29-F687-4f45-9708-019B960494DF}">
-                <a14:hiddenLine xmlns="" xmlns:a14="http://schemas.microsoft.com/office/drawing/2010/main" w="9525">
+                <a14:hiddenLine xmlns:a14="http://schemas.microsoft.com/office/drawing/2010/main" xmlns="" w="9525">
                   <a:solidFill>
                     <a:srgbClr val="000000"/>
                   </a:solidFill>
@@ -4916,7 +4914,7 @@
             </a:ln>
             <a:extLst>
               <a:ext uri="{91240B29-F687-4f45-9708-019B960494DF}">
-                <a14:hiddenLine xmlns="" xmlns:a14="http://schemas.microsoft.com/office/drawing/2010/main" w="9525">
+                <a14:hiddenLine xmlns:a14="http://schemas.microsoft.com/office/drawing/2010/main" xmlns="" w="9525">
                   <a:solidFill>
                     <a:srgbClr val="000000"/>
                   </a:solidFill>
@@ -9723,7 +9721,7 @@
           <a:noFill/>
           <a:extLst>
             <a:ext uri="{909E8E84-426E-40dd-AFC4-6F175D3DCCD1}">
-              <a14:hiddenFill xmlns="" xmlns:a14="http://schemas.microsoft.com/office/drawing/2010/main">
+              <a14:hiddenFill xmlns:a14="http://schemas.microsoft.com/office/drawing/2010/main" xmlns="">
                 <a:solidFill>
                   <a:srgbClr val="FFFFFF"/>
                 </a:solidFill>
@@ -9797,7 +9795,7 @@
               </a:ln>
               <a:extLst>
                 <a:ext uri="{91240B29-F687-4f45-9708-019B960494DF}">
-                  <a14:hiddenLine xmlns="" xmlns:a14="http://schemas.microsoft.com/office/drawing/2010/main" w="9525">
+                  <a14:hiddenLine xmlns:a14="http://schemas.microsoft.com/office/drawing/2010/main" xmlns="" w="9525">
                     <a:solidFill>
                       <a:srgbClr val="000000"/>
                     </a:solidFill>
@@ -9887,7 +9885,7 @@
               </a:ln>
               <a:extLst>
                 <a:ext uri="{91240B29-F687-4f45-9708-019B960494DF}">
-                  <a14:hiddenLine xmlns="" xmlns:a14="http://schemas.microsoft.com/office/drawing/2010/main" w="9525">
+                  <a14:hiddenLine xmlns:a14="http://schemas.microsoft.com/office/drawing/2010/main" xmlns="" w="9525">
                     <a:solidFill>
                       <a:srgbClr val="000000"/>
                     </a:solidFill>
@@ -9977,7 +9975,7 @@
               </a:ln>
               <a:extLst>
                 <a:ext uri="{91240B29-F687-4f45-9708-019B960494DF}">
-                  <a14:hiddenLine xmlns="" xmlns:a14="http://schemas.microsoft.com/office/drawing/2010/main" w="9525">
+                  <a14:hiddenLine xmlns:a14="http://schemas.microsoft.com/office/drawing/2010/main" xmlns="" w="9525">
                     <a:solidFill>
                       <a:srgbClr val="000000"/>
                     </a:solidFill>
@@ -10039,7 +10037,7 @@
               </a:ln>
               <a:extLst>
                 <a:ext uri="{91240B29-F687-4f45-9708-019B960494DF}">
-                  <a14:hiddenLine xmlns="" xmlns:a14="http://schemas.microsoft.com/office/drawing/2010/main" w="9525">
+                  <a14:hiddenLine xmlns:a14="http://schemas.microsoft.com/office/drawing/2010/main" xmlns="" w="9525">
                     <a:solidFill>
                       <a:srgbClr val="000000"/>
                     </a:solidFill>
@@ -10129,7 +10127,7 @@
               </a:ln>
               <a:extLst>
                 <a:ext uri="{91240B29-F687-4f45-9708-019B960494DF}">
-                  <a14:hiddenLine xmlns="" xmlns:a14="http://schemas.microsoft.com/office/drawing/2010/main" w="9525">
+                  <a14:hiddenLine xmlns:a14="http://schemas.microsoft.com/office/drawing/2010/main" xmlns="" w="9525">
                     <a:solidFill>
                       <a:srgbClr val="000000"/>
                     </a:solidFill>
@@ -10191,7 +10189,7 @@
               </a:ln>
               <a:extLst>
                 <a:ext uri="{91240B29-F687-4f45-9708-019B960494DF}">
-                  <a14:hiddenLine xmlns="" xmlns:a14="http://schemas.microsoft.com/office/drawing/2010/main" w="9525">
+                  <a14:hiddenLine xmlns:a14="http://schemas.microsoft.com/office/drawing/2010/main" xmlns="" w="9525">
                     <a:solidFill>
                       <a:srgbClr val="000000"/>
                     </a:solidFill>
@@ -10253,7 +10251,7 @@
               </a:ln>
               <a:extLst>
                 <a:ext uri="{91240B29-F687-4f45-9708-019B960494DF}">
-                  <a14:hiddenLine xmlns="" xmlns:a14="http://schemas.microsoft.com/office/drawing/2010/main" w="9525">
+                  <a14:hiddenLine xmlns:a14="http://schemas.microsoft.com/office/drawing/2010/main" xmlns="" w="9525">
                     <a:solidFill>
                       <a:srgbClr val="000000"/>
                     </a:solidFill>
@@ -10343,7 +10341,7 @@
               </a:ln>
               <a:extLst>
                 <a:ext uri="{91240B29-F687-4f45-9708-019B960494DF}">
-                  <a14:hiddenLine xmlns="" xmlns:a14="http://schemas.microsoft.com/office/drawing/2010/main" w="9525">
+                  <a14:hiddenLine xmlns:a14="http://schemas.microsoft.com/office/drawing/2010/main" xmlns="" w="9525">
                     <a:solidFill>
                       <a:srgbClr val="000000"/>
                     </a:solidFill>
@@ -10433,7 +10431,7 @@
               </a:ln>
               <a:extLst>
                 <a:ext uri="{91240B29-F687-4f45-9708-019B960494DF}">
-                  <a14:hiddenLine xmlns="" xmlns:a14="http://schemas.microsoft.com/office/drawing/2010/main" w="9525">
+                  <a14:hiddenLine xmlns:a14="http://schemas.microsoft.com/office/drawing/2010/main" xmlns="" w="9525">
                     <a:solidFill>
                       <a:srgbClr val="000000"/>
                     </a:solidFill>
@@ -10495,7 +10493,7 @@
               </a:ln>
               <a:extLst>
                 <a:ext uri="{91240B29-F687-4f45-9708-019B960494DF}">
-                  <a14:hiddenLine xmlns="" xmlns:a14="http://schemas.microsoft.com/office/drawing/2010/main" w="9525">
+                  <a14:hiddenLine xmlns:a14="http://schemas.microsoft.com/office/drawing/2010/main" xmlns="" w="9525">
                     <a:solidFill>
                       <a:srgbClr val="000000"/>
                     </a:solidFill>
@@ -10605,7 +10603,7 @@
               </a:ln>
               <a:extLst>
                 <a:ext uri="{91240B29-F687-4f45-9708-019B960494DF}">
-                  <a14:hiddenLine xmlns="" xmlns:a14="http://schemas.microsoft.com/office/drawing/2010/main" w="9525">
+                  <a14:hiddenLine xmlns:a14="http://schemas.microsoft.com/office/drawing/2010/main" xmlns="" w="9525">
                     <a:solidFill>
                       <a:srgbClr val="000000"/>
                     </a:solidFill>
@@ -10689,7 +10687,7 @@
               </a:ln>
               <a:extLst>
                 <a:ext uri="{91240B29-F687-4f45-9708-019B960494DF}">
-                  <a14:hiddenLine xmlns="" xmlns:a14="http://schemas.microsoft.com/office/drawing/2010/main" w="9525">
+                  <a14:hiddenLine xmlns:a14="http://schemas.microsoft.com/office/drawing/2010/main" xmlns="" w="9525">
                     <a:solidFill>
                       <a:srgbClr val="000000"/>
                     </a:solidFill>
@@ -10751,7 +10749,7 @@
               </a:ln>
               <a:extLst>
                 <a:ext uri="{91240B29-F687-4f45-9708-019B960494DF}">
-                  <a14:hiddenLine xmlns="" xmlns:a14="http://schemas.microsoft.com/office/drawing/2010/main" w="9525">
+                  <a14:hiddenLine xmlns:a14="http://schemas.microsoft.com/office/drawing/2010/main" xmlns="" w="9525">
                     <a:solidFill>
                       <a:srgbClr val="000000"/>
                     </a:solidFill>
@@ -10813,7 +10811,7 @@
               </a:ln>
               <a:extLst>
                 <a:ext uri="{91240B29-F687-4f45-9708-019B960494DF}">
-                  <a14:hiddenLine xmlns="" xmlns:a14="http://schemas.microsoft.com/office/drawing/2010/main" w="9525">
+                  <a14:hiddenLine xmlns:a14="http://schemas.microsoft.com/office/drawing/2010/main" xmlns="" w="9525">
                     <a:solidFill>
                       <a:srgbClr val="000000"/>
                     </a:solidFill>
@@ -10903,7 +10901,7 @@
               </a:ln>
               <a:extLst>
                 <a:ext uri="{91240B29-F687-4f45-9708-019B960494DF}">
-                  <a14:hiddenLine xmlns="" xmlns:a14="http://schemas.microsoft.com/office/drawing/2010/main" w="9525">
+                  <a14:hiddenLine xmlns:a14="http://schemas.microsoft.com/office/drawing/2010/main" xmlns="" w="9525">
                     <a:solidFill>
                       <a:srgbClr val="000000"/>
                     </a:solidFill>
@@ -10937,7 +10935,7 @@
               </a:ln>
               <a:extLst>
                 <a:ext uri="{91240B29-F687-4f45-9708-019B960494DF}">
-                  <a14:hiddenLine xmlns="" xmlns:a14="http://schemas.microsoft.com/office/drawing/2010/main" w="9525">
+                  <a14:hiddenLine xmlns:a14="http://schemas.microsoft.com/office/drawing/2010/main" xmlns="" w="9525">
                     <a:solidFill>
                       <a:srgbClr val="000000"/>
                     </a:solidFill>
@@ -11002,7 +11000,7 @@
               </a:ln>
               <a:extLst>
                 <a:ext uri="{91240B29-F687-4f45-9708-019B960494DF}">
-                  <a14:hiddenLine xmlns="" xmlns:a14="http://schemas.microsoft.com/office/drawing/2010/main" w="9525">
+                  <a14:hiddenLine xmlns:a14="http://schemas.microsoft.com/office/drawing/2010/main" xmlns="" w="9525">
                     <a:solidFill>
                       <a:srgbClr val="000000"/>
                     </a:solidFill>
@@ -11092,7 +11090,7 @@
               </a:ln>
               <a:extLst>
                 <a:ext uri="{91240B29-F687-4f45-9708-019B960494DF}">
-                  <a14:hiddenLine xmlns="" xmlns:a14="http://schemas.microsoft.com/office/drawing/2010/main" w="9525">
+                  <a14:hiddenLine xmlns:a14="http://schemas.microsoft.com/office/drawing/2010/main" xmlns="" w="9525">
                     <a:solidFill>
                       <a:srgbClr val="000000"/>
                     </a:solidFill>
@@ -11154,7 +11152,7 @@
               </a:ln>
               <a:extLst>
                 <a:ext uri="{91240B29-F687-4f45-9708-019B960494DF}">
-                  <a14:hiddenLine xmlns="" xmlns:a14="http://schemas.microsoft.com/office/drawing/2010/main" w="9525">
+                  <a14:hiddenLine xmlns:a14="http://schemas.microsoft.com/office/drawing/2010/main" xmlns="" w="9525">
                     <a:solidFill>
                       <a:srgbClr val="000000"/>
                     </a:solidFill>
@@ -11244,7 +11242,7 @@
               </a:ln>
               <a:extLst>
                 <a:ext uri="{91240B29-F687-4f45-9708-019B960494DF}">
-                  <a14:hiddenLine xmlns="" xmlns:a14="http://schemas.microsoft.com/office/drawing/2010/main" w="9525">
+                  <a14:hiddenLine xmlns:a14="http://schemas.microsoft.com/office/drawing/2010/main" xmlns="" w="9525">
                     <a:solidFill>
                       <a:srgbClr val="000000"/>
                     </a:solidFill>
@@ -11309,7 +11307,7 @@
               </a:ln>
               <a:extLst>
                 <a:ext uri="{91240B29-F687-4f45-9708-019B960494DF}">
-                  <a14:hiddenLine xmlns="" xmlns:a14="http://schemas.microsoft.com/office/drawing/2010/main" w="9525">
+                  <a14:hiddenLine xmlns:a14="http://schemas.microsoft.com/office/drawing/2010/main" xmlns="" w="9525">
                     <a:solidFill>
                       <a:srgbClr val="000000"/>
                     </a:solidFill>
@@ -11371,7 +11369,7 @@
               </a:ln>
               <a:extLst>
                 <a:ext uri="{91240B29-F687-4f45-9708-019B960494DF}">
-                  <a14:hiddenLine xmlns="" xmlns:a14="http://schemas.microsoft.com/office/drawing/2010/main" w="9525">
+                  <a14:hiddenLine xmlns:a14="http://schemas.microsoft.com/office/drawing/2010/main" xmlns="" w="9525">
                     <a:solidFill>
                       <a:srgbClr val="000000"/>
                     </a:solidFill>
@@ -11461,7 +11459,7 @@
               </a:ln>
               <a:extLst>
                 <a:ext uri="{91240B29-F687-4f45-9708-019B960494DF}">
-                  <a14:hiddenLine xmlns="" xmlns:a14="http://schemas.microsoft.com/office/drawing/2010/main" w="9525">
+                  <a14:hiddenLine xmlns:a14="http://schemas.microsoft.com/office/drawing/2010/main" xmlns="" w="9525">
                     <a:solidFill>
                       <a:srgbClr val="000000"/>
                     </a:solidFill>
@@ -11551,7 +11549,7 @@
               </a:ln>
               <a:extLst>
                 <a:ext uri="{91240B29-F687-4f45-9708-019B960494DF}">
-                  <a14:hiddenLine xmlns="" xmlns:a14="http://schemas.microsoft.com/office/drawing/2010/main" w="9525">
+                  <a14:hiddenLine xmlns:a14="http://schemas.microsoft.com/office/drawing/2010/main" xmlns="" w="9525">
                     <a:solidFill>
                       <a:srgbClr val="000000"/>
                     </a:solidFill>
@@ -11616,7 +11614,7 @@
               </a:ln>
               <a:extLst>
                 <a:ext uri="{91240B29-F687-4f45-9708-019B960494DF}">
-                  <a14:hiddenLine xmlns="" xmlns:a14="http://schemas.microsoft.com/office/drawing/2010/main" w="9525">
+                  <a14:hiddenLine xmlns:a14="http://schemas.microsoft.com/office/drawing/2010/main" xmlns="" w="9525">
                     <a:solidFill>
                       <a:srgbClr val="000000"/>
                     </a:solidFill>
@@ -11736,7 +11734,7 @@
               </a:ln>
               <a:extLst>
                 <a:ext uri="{91240B29-F687-4f45-9708-019B960494DF}">
-                  <a14:hiddenLine xmlns="" xmlns:a14="http://schemas.microsoft.com/office/drawing/2010/main" w="9525">
+                  <a14:hiddenLine xmlns:a14="http://schemas.microsoft.com/office/drawing/2010/main" xmlns="" w="9525">
                     <a:solidFill>
                       <a:srgbClr val="000000"/>
                     </a:solidFill>
@@ -11834,7 +11832,7 @@
               </a:ln>
               <a:extLst>
                 <a:ext uri="{91240B29-F687-4f45-9708-019B960494DF}">
-                  <a14:hiddenLine xmlns="" xmlns:a14="http://schemas.microsoft.com/office/drawing/2010/main" w="9525">
+                  <a14:hiddenLine xmlns:a14="http://schemas.microsoft.com/office/drawing/2010/main" xmlns="" w="9525">
                     <a:solidFill>
                       <a:srgbClr val="000000"/>
                     </a:solidFill>
@@ -11949,7 +11947,7 @@
               </a:ln>
               <a:extLst>
                 <a:ext uri="{91240B29-F687-4f45-9708-019B960494DF}">
-                  <a14:hiddenLine xmlns="" xmlns:a14="http://schemas.microsoft.com/office/drawing/2010/main" w="9525">
+                  <a14:hiddenLine xmlns:a14="http://schemas.microsoft.com/office/drawing/2010/main" xmlns="" w="9525">
                     <a:solidFill>
                       <a:srgbClr val="000000"/>
                     </a:solidFill>
@@ -12039,7 +12037,7 @@
               </a:ln>
               <a:extLst>
                 <a:ext uri="{91240B29-F687-4f45-9708-019B960494DF}">
-                  <a14:hiddenLine xmlns="" xmlns:a14="http://schemas.microsoft.com/office/drawing/2010/main" w="9525">
+                  <a14:hiddenLine xmlns:a14="http://schemas.microsoft.com/office/drawing/2010/main" xmlns="" w="9525">
                     <a:solidFill>
                       <a:srgbClr val="000000"/>
                     </a:solidFill>
@@ -12104,7 +12102,7 @@
               </a:ln>
               <a:extLst>
                 <a:ext uri="{91240B29-F687-4f45-9708-019B960494DF}">
-                  <a14:hiddenLine xmlns="" xmlns:a14="http://schemas.microsoft.com/office/drawing/2010/main" w="9525">
+                  <a14:hiddenLine xmlns:a14="http://schemas.microsoft.com/office/drawing/2010/main" xmlns="" w="9525">
                     <a:solidFill>
                       <a:srgbClr val="000000"/>
                     </a:solidFill>
@@ -12194,7 +12192,7 @@
               </a:ln>
               <a:extLst>
                 <a:ext uri="{91240B29-F687-4f45-9708-019B960494DF}">
-                  <a14:hiddenLine xmlns="" xmlns:a14="http://schemas.microsoft.com/office/drawing/2010/main" w="9525">
+                  <a14:hiddenLine xmlns:a14="http://schemas.microsoft.com/office/drawing/2010/main" xmlns="" w="9525">
                     <a:solidFill>
                       <a:srgbClr val="000000"/>
                     </a:solidFill>
@@ -12262,7 +12260,7 @@
               </a:ln>
               <a:extLst>
                 <a:ext uri="{91240B29-F687-4f45-9708-019B960494DF}">
-                  <a14:hiddenLine xmlns="" xmlns:a14="http://schemas.microsoft.com/office/drawing/2010/main" w="9525">
+                  <a14:hiddenLine xmlns:a14="http://schemas.microsoft.com/office/drawing/2010/main" xmlns="" w="9525">
                     <a:solidFill>
                       <a:srgbClr val="000000"/>
                     </a:solidFill>
@@ -12352,7 +12350,7 @@
               </a:ln>
               <a:extLst>
                 <a:ext uri="{91240B29-F687-4f45-9708-019B960494DF}">
-                  <a14:hiddenLine xmlns="" xmlns:a14="http://schemas.microsoft.com/office/drawing/2010/main" w="9525">
+                  <a14:hiddenLine xmlns:a14="http://schemas.microsoft.com/office/drawing/2010/main" xmlns="" w="9525">
                     <a:solidFill>
                       <a:srgbClr val="000000"/>
                     </a:solidFill>
@@ -12420,7 +12418,7 @@
               </a:ln>
               <a:extLst>
                 <a:ext uri="{91240B29-F687-4f45-9708-019B960494DF}">
-                  <a14:hiddenLine xmlns="" xmlns:a14="http://schemas.microsoft.com/office/drawing/2010/main" w="9525">
+                  <a14:hiddenLine xmlns:a14="http://schemas.microsoft.com/office/drawing/2010/main" xmlns="" w="9525">
                     <a:solidFill>
                       <a:srgbClr val="000000"/>
                     </a:solidFill>
@@ -12510,7 +12508,7 @@
               </a:ln>
               <a:extLst>
                 <a:ext uri="{91240B29-F687-4f45-9708-019B960494DF}">
-                  <a14:hiddenLine xmlns="" xmlns:a14="http://schemas.microsoft.com/office/drawing/2010/main" w="9525">
+                  <a14:hiddenLine xmlns:a14="http://schemas.microsoft.com/office/drawing/2010/main" xmlns="" w="9525">
                     <a:solidFill>
                       <a:srgbClr val="000000"/>
                     </a:solidFill>
@@ -12544,7 +12542,7 @@
               </a:ln>
               <a:extLst>
                 <a:ext uri="{91240B29-F687-4f45-9708-019B960494DF}">
-                  <a14:hiddenLine xmlns="" xmlns:a14="http://schemas.microsoft.com/office/drawing/2010/main" w="9525">
+                  <a14:hiddenLine xmlns:a14="http://schemas.microsoft.com/office/drawing/2010/main" xmlns="" w="9525">
                     <a:solidFill>
                       <a:srgbClr val="000000"/>
                     </a:solidFill>
@@ -13272,7 +13270,7 @@
             <a:noFill/>
             <a:extLst>
               <a:ext uri="{909E8E84-426E-40dd-AFC4-6F175D3DCCD1}">
-                <a14:hiddenFill xmlns:a14="http://schemas.microsoft.com/office/drawing/2010/main" xmlns:p14="http://schemas.microsoft.com/office/powerpoint/2010/main" xmlns:a16="http://schemas.microsoft.com/office/drawing/2014/main" xmlns="">
+                <a14:hiddenFill xmlns="" xmlns:a16="http://schemas.microsoft.com/office/drawing/2014/main" xmlns:p14="http://schemas.microsoft.com/office/powerpoint/2010/main" xmlns:a14="http://schemas.microsoft.com/office/drawing/2010/main">
                   <a:solidFill>
                     <a:srgbClr val="FFFFFF"/>
                   </a:solidFill>
@@ -15660,7 +15658,7 @@
           <a:noFill/>
           <a:extLst>
             <a:ext uri="{909E8E84-426E-40dd-AFC4-6F175D3DCCD1}">
-              <a14:hiddenFill xmlns:a14="http://schemas.microsoft.com/office/drawing/2010/main" xmlns:p14="http://schemas.microsoft.com/office/powerpoint/2010/main" xmlns:a16="http://schemas.microsoft.com/office/drawing/2014/main" xmlns="">
+              <a14:hiddenFill xmlns="" xmlns:a16="http://schemas.microsoft.com/office/drawing/2014/main" xmlns:p14="http://schemas.microsoft.com/office/powerpoint/2010/main" xmlns:a14="http://schemas.microsoft.com/office/drawing/2010/main">
                 <a:solidFill>
                   <a:srgbClr val="FFFFFF"/>
                 </a:solidFill>
@@ -15742,7 +15740,7 @@
             </a:ln>
             <a:extLst>
               <a:ext uri="{91240B29-F687-4f45-9708-019B960494DF}">
-                <a14:hiddenLine xmlns:a14="http://schemas.microsoft.com/office/drawing/2010/main" xmlns:p14="http://schemas.microsoft.com/office/powerpoint/2010/main" xmlns:a16="http://schemas.microsoft.com/office/drawing/2014/main" xmlns="" w="9525">
+                <a14:hiddenLine xmlns="" xmlns:a16="http://schemas.microsoft.com/office/drawing/2014/main" xmlns:p14="http://schemas.microsoft.com/office/powerpoint/2010/main" xmlns:a14="http://schemas.microsoft.com/office/drawing/2010/main" w="9525">
                   <a:solidFill>
                     <a:srgbClr val="000000"/>
                   </a:solidFill>
@@ -15847,7 +15845,7 @@
             </a:ln>
             <a:extLst>
               <a:ext uri="{91240B29-F687-4f45-9708-019B960494DF}">
-                <a14:hiddenLine xmlns:a14="http://schemas.microsoft.com/office/drawing/2010/main" xmlns:p14="http://schemas.microsoft.com/office/powerpoint/2010/main" xmlns:a16="http://schemas.microsoft.com/office/drawing/2014/main" xmlns="" w="9525">
+                <a14:hiddenLine xmlns="" xmlns:a16="http://schemas.microsoft.com/office/drawing/2014/main" xmlns:p14="http://schemas.microsoft.com/office/powerpoint/2010/main" xmlns:a14="http://schemas.microsoft.com/office/drawing/2010/main" w="9525">
                   <a:solidFill>
                     <a:srgbClr val="000000"/>
                   </a:solidFill>
@@ -15952,7 +15950,7 @@
             </a:ln>
             <a:extLst>
               <a:ext uri="{91240B29-F687-4f45-9708-019B960494DF}">
-                <a14:hiddenLine xmlns:a14="http://schemas.microsoft.com/office/drawing/2010/main" xmlns:p14="http://schemas.microsoft.com/office/powerpoint/2010/main" xmlns:a16="http://schemas.microsoft.com/office/drawing/2014/main" xmlns="" w="9525">
+                <a14:hiddenLine xmlns="" xmlns:a16="http://schemas.microsoft.com/office/drawing/2014/main" xmlns:p14="http://schemas.microsoft.com/office/powerpoint/2010/main" xmlns:a14="http://schemas.microsoft.com/office/drawing/2010/main" w="9525">
                   <a:solidFill>
                     <a:srgbClr val="000000"/>
                   </a:solidFill>
@@ -16029,7 +16027,7 @@
             </a:ln>
             <a:extLst>
               <a:ext uri="{91240B29-F687-4f45-9708-019B960494DF}">
-                <a14:hiddenLine xmlns:a14="http://schemas.microsoft.com/office/drawing/2010/main" xmlns:p14="http://schemas.microsoft.com/office/powerpoint/2010/main" xmlns:a16="http://schemas.microsoft.com/office/drawing/2014/main" xmlns="" w="9525">
+                <a14:hiddenLine xmlns="" xmlns:a16="http://schemas.microsoft.com/office/drawing/2014/main" xmlns:p14="http://schemas.microsoft.com/office/powerpoint/2010/main" xmlns:a14="http://schemas.microsoft.com/office/drawing/2010/main" w="9525">
                   <a:solidFill>
                     <a:srgbClr val="000000"/>
                   </a:solidFill>
@@ -16134,7 +16132,7 @@
             </a:ln>
             <a:extLst>
               <a:ext uri="{91240B29-F687-4f45-9708-019B960494DF}">
-                <a14:hiddenLine xmlns:a14="http://schemas.microsoft.com/office/drawing/2010/main" xmlns:p14="http://schemas.microsoft.com/office/powerpoint/2010/main" xmlns:a16="http://schemas.microsoft.com/office/drawing/2014/main" xmlns="" w="9525">
+                <a14:hiddenLine xmlns="" xmlns:a16="http://schemas.microsoft.com/office/drawing/2014/main" xmlns:p14="http://schemas.microsoft.com/office/powerpoint/2010/main" xmlns:a14="http://schemas.microsoft.com/office/drawing/2010/main" w="9525">
                   <a:solidFill>
                     <a:srgbClr val="000000"/>
                   </a:solidFill>
@@ -16211,7 +16209,7 @@
             </a:ln>
             <a:extLst>
               <a:ext uri="{91240B29-F687-4f45-9708-019B960494DF}">
-                <a14:hiddenLine xmlns:a14="http://schemas.microsoft.com/office/drawing/2010/main" xmlns:p14="http://schemas.microsoft.com/office/powerpoint/2010/main" xmlns:a16="http://schemas.microsoft.com/office/drawing/2014/main" xmlns="" w="9525">
+                <a14:hiddenLine xmlns="" xmlns:a16="http://schemas.microsoft.com/office/drawing/2014/main" xmlns:p14="http://schemas.microsoft.com/office/powerpoint/2010/main" xmlns:a14="http://schemas.microsoft.com/office/drawing/2010/main" w="9525">
                   <a:solidFill>
                     <a:srgbClr val="000000"/>
                   </a:solidFill>
@@ -16288,7 +16286,7 @@
             </a:ln>
             <a:extLst>
               <a:ext uri="{91240B29-F687-4f45-9708-019B960494DF}">
-                <a14:hiddenLine xmlns:a14="http://schemas.microsoft.com/office/drawing/2010/main" xmlns:p14="http://schemas.microsoft.com/office/powerpoint/2010/main" xmlns:a16="http://schemas.microsoft.com/office/drawing/2014/main" xmlns="" w="9525">
+                <a14:hiddenLine xmlns="" xmlns:a16="http://schemas.microsoft.com/office/drawing/2014/main" xmlns:p14="http://schemas.microsoft.com/office/powerpoint/2010/main" xmlns:a14="http://schemas.microsoft.com/office/drawing/2010/main" w="9525">
                   <a:solidFill>
                     <a:srgbClr val="000000"/>
                   </a:solidFill>
@@ -16393,7 +16391,7 @@
             </a:ln>
             <a:extLst>
               <a:ext uri="{91240B29-F687-4f45-9708-019B960494DF}">
-                <a14:hiddenLine xmlns:a14="http://schemas.microsoft.com/office/drawing/2010/main" xmlns:p14="http://schemas.microsoft.com/office/powerpoint/2010/main" xmlns:a16="http://schemas.microsoft.com/office/drawing/2014/main" xmlns="" w="9525">
+                <a14:hiddenLine xmlns="" xmlns:a16="http://schemas.microsoft.com/office/drawing/2014/main" xmlns:p14="http://schemas.microsoft.com/office/powerpoint/2010/main" xmlns:a14="http://schemas.microsoft.com/office/drawing/2010/main" w="9525">
                   <a:solidFill>
                     <a:srgbClr val="000000"/>
                   </a:solidFill>
@@ -16498,7 +16496,7 @@
             </a:ln>
             <a:extLst>
               <a:ext uri="{91240B29-F687-4f45-9708-019B960494DF}">
-                <a14:hiddenLine xmlns:a14="http://schemas.microsoft.com/office/drawing/2010/main" xmlns:p14="http://schemas.microsoft.com/office/powerpoint/2010/main" xmlns:a16="http://schemas.microsoft.com/office/drawing/2014/main" xmlns="" w="9525">
+                <a14:hiddenLine xmlns="" xmlns:a16="http://schemas.microsoft.com/office/drawing/2014/main" xmlns:p14="http://schemas.microsoft.com/office/powerpoint/2010/main" xmlns:a14="http://schemas.microsoft.com/office/drawing/2010/main" w="9525">
                   <a:solidFill>
                     <a:srgbClr val="000000"/>
                   </a:solidFill>
@@ -16575,7 +16573,7 @@
             </a:ln>
             <a:extLst>
               <a:ext uri="{91240B29-F687-4f45-9708-019B960494DF}">
-                <a14:hiddenLine xmlns:a14="http://schemas.microsoft.com/office/drawing/2010/main" xmlns:p14="http://schemas.microsoft.com/office/powerpoint/2010/main" xmlns:a16="http://schemas.microsoft.com/office/drawing/2014/main" xmlns="" w="9525">
+                <a14:hiddenLine xmlns="" xmlns:a16="http://schemas.microsoft.com/office/drawing/2014/main" xmlns:p14="http://schemas.microsoft.com/office/powerpoint/2010/main" xmlns:a14="http://schemas.microsoft.com/office/drawing/2010/main" w="9525">
                   <a:solidFill>
                     <a:srgbClr val="000000"/>
                   </a:solidFill>
@@ -16700,7 +16698,7 @@
             </a:ln>
             <a:extLst>
               <a:ext uri="{91240B29-F687-4f45-9708-019B960494DF}">
-                <a14:hiddenLine xmlns:a14="http://schemas.microsoft.com/office/drawing/2010/main" xmlns:p14="http://schemas.microsoft.com/office/powerpoint/2010/main" xmlns:a16="http://schemas.microsoft.com/office/drawing/2014/main" xmlns="" w="9525">
+                <a14:hiddenLine xmlns="" xmlns:a16="http://schemas.microsoft.com/office/drawing/2014/main" xmlns:p14="http://schemas.microsoft.com/office/powerpoint/2010/main" xmlns:a14="http://schemas.microsoft.com/office/drawing/2010/main" w="9525">
                   <a:solidFill>
                     <a:srgbClr val="000000"/>
                   </a:solidFill>
@@ -16814,7 +16812,7 @@
             </a:ln>
             <a:extLst>
               <a:ext uri="{91240B29-F687-4f45-9708-019B960494DF}">
-                <a14:hiddenLine xmlns:a14="http://schemas.microsoft.com/office/drawing/2010/main" xmlns:p14="http://schemas.microsoft.com/office/powerpoint/2010/main" xmlns:a16="http://schemas.microsoft.com/office/drawing/2014/main" xmlns="" w="9525">
+                <a14:hiddenLine xmlns="" xmlns:a16="http://schemas.microsoft.com/office/drawing/2014/main" xmlns:p14="http://schemas.microsoft.com/office/powerpoint/2010/main" xmlns:a14="http://schemas.microsoft.com/office/drawing/2010/main" w="9525">
                   <a:solidFill>
                     <a:srgbClr val="000000"/>
                   </a:solidFill>
@@ -16891,7 +16889,7 @@
             </a:ln>
             <a:extLst>
               <a:ext uri="{91240B29-F687-4f45-9708-019B960494DF}">
-                <a14:hiddenLine xmlns:a14="http://schemas.microsoft.com/office/drawing/2010/main" xmlns:p14="http://schemas.microsoft.com/office/powerpoint/2010/main" xmlns:a16="http://schemas.microsoft.com/office/drawing/2014/main" xmlns="" w="9525">
+                <a14:hiddenLine xmlns="" xmlns:a16="http://schemas.microsoft.com/office/drawing/2014/main" xmlns:p14="http://schemas.microsoft.com/office/powerpoint/2010/main" xmlns:a14="http://schemas.microsoft.com/office/drawing/2010/main" w="9525">
                   <a:solidFill>
                     <a:srgbClr val="000000"/>
                   </a:solidFill>
@@ -16968,7 +16966,7 @@
             </a:ln>
             <a:extLst>
               <a:ext uri="{91240B29-F687-4f45-9708-019B960494DF}">
-                <a14:hiddenLine xmlns:a14="http://schemas.microsoft.com/office/drawing/2010/main" xmlns:p14="http://schemas.microsoft.com/office/powerpoint/2010/main" xmlns:a16="http://schemas.microsoft.com/office/drawing/2014/main" xmlns="" w="9525">
+                <a14:hiddenLine xmlns="" xmlns:a16="http://schemas.microsoft.com/office/drawing/2014/main" xmlns:p14="http://schemas.microsoft.com/office/powerpoint/2010/main" xmlns:a14="http://schemas.microsoft.com/office/drawing/2010/main" w="9525">
                   <a:solidFill>
                     <a:srgbClr val="000000"/>
                   </a:solidFill>
@@ -17073,7 +17071,7 @@
             </a:ln>
             <a:extLst>
               <a:ext uri="{91240B29-F687-4f45-9708-019B960494DF}">
-                <a14:hiddenLine xmlns:a14="http://schemas.microsoft.com/office/drawing/2010/main" xmlns:p14="http://schemas.microsoft.com/office/powerpoint/2010/main" xmlns:a16="http://schemas.microsoft.com/office/drawing/2014/main" xmlns="" w="9525">
+                <a14:hiddenLine xmlns="" xmlns:a16="http://schemas.microsoft.com/office/drawing/2014/main" xmlns:p14="http://schemas.microsoft.com/office/powerpoint/2010/main" xmlns:a14="http://schemas.microsoft.com/office/drawing/2010/main" w="9525">
                   <a:solidFill>
                     <a:srgbClr val="000000"/>
                   </a:solidFill>
@@ -17122,7 +17120,7 @@
             </a:ln>
             <a:extLst>
               <a:ext uri="{91240B29-F687-4f45-9708-019B960494DF}">
-                <a14:hiddenLine xmlns:a14="http://schemas.microsoft.com/office/drawing/2010/main" xmlns:p14="http://schemas.microsoft.com/office/powerpoint/2010/main" xmlns:a16="http://schemas.microsoft.com/office/drawing/2014/main" xmlns="" w="9525">
+                <a14:hiddenLine xmlns="" xmlns:a16="http://schemas.microsoft.com/office/drawing/2014/main" xmlns:p14="http://schemas.microsoft.com/office/powerpoint/2010/main" xmlns:a14="http://schemas.microsoft.com/office/drawing/2010/main" w="9525">
                   <a:solidFill>
                     <a:srgbClr val="000000"/>
                   </a:solidFill>
@@ -17202,7 +17200,7 @@
             </a:ln>
             <a:extLst>
               <a:ext uri="{91240B29-F687-4f45-9708-019B960494DF}">
-                <a14:hiddenLine xmlns:a14="http://schemas.microsoft.com/office/drawing/2010/main" xmlns:p14="http://schemas.microsoft.com/office/powerpoint/2010/main" xmlns:a16="http://schemas.microsoft.com/office/drawing/2014/main" xmlns="" w="9525">
+                <a14:hiddenLine xmlns="" xmlns:a16="http://schemas.microsoft.com/office/drawing/2014/main" xmlns:p14="http://schemas.microsoft.com/office/powerpoint/2010/main" xmlns:a14="http://schemas.microsoft.com/office/drawing/2010/main" w="9525">
                   <a:solidFill>
                     <a:srgbClr val="000000"/>
                   </a:solidFill>
@@ -17307,7 +17305,7 @@
             </a:ln>
             <a:extLst>
               <a:ext uri="{91240B29-F687-4f45-9708-019B960494DF}">
-                <a14:hiddenLine xmlns:a14="http://schemas.microsoft.com/office/drawing/2010/main" xmlns:p14="http://schemas.microsoft.com/office/powerpoint/2010/main" xmlns:a16="http://schemas.microsoft.com/office/drawing/2014/main" xmlns="" w="9525">
+                <a14:hiddenLine xmlns="" xmlns:a16="http://schemas.microsoft.com/office/drawing/2014/main" xmlns:p14="http://schemas.microsoft.com/office/powerpoint/2010/main" xmlns:a14="http://schemas.microsoft.com/office/drawing/2010/main" w="9525">
                   <a:solidFill>
                     <a:srgbClr val="000000"/>
                   </a:solidFill>
@@ -17384,7 +17382,7 @@
             </a:ln>
             <a:extLst>
               <a:ext uri="{91240B29-F687-4f45-9708-019B960494DF}">
-                <a14:hiddenLine xmlns:a14="http://schemas.microsoft.com/office/drawing/2010/main" xmlns:p14="http://schemas.microsoft.com/office/powerpoint/2010/main" xmlns:a16="http://schemas.microsoft.com/office/drawing/2014/main" xmlns="" w="9525">
+                <a14:hiddenLine xmlns="" xmlns:a16="http://schemas.microsoft.com/office/drawing/2014/main" xmlns:p14="http://schemas.microsoft.com/office/powerpoint/2010/main" xmlns:a14="http://schemas.microsoft.com/office/drawing/2010/main" w="9525">
                   <a:solidFill>
                     <a:srgbClr val="000000"/>
                   </a:solidFill>
@@ -17489,7 +17487,7 @@
             </a:ln>
             <a:extLst>
               <a:ext uri="{91240B29-F687-4f45-9708-019B960494DF}">
-                <a14:hiddenLine xmlns:a14="http://schemas.microsoft.com/office/drawing/2010/main" xmlns:p14="http://schemas.microsoft.com/office/powerpoint/2010/main" xmlns:a16="http://schemas.microsoft.com/office/drawing/2014/main" xmlns="" w="9525">
+                <a14:hiddenLine xmlns="" xmlns:a16="http://schemas.microsoft.com/office/drawing/2014/main" xmlns:p14="http://schemas.microsoft.com/office/powerpoint/2010/main" xmlns:a14="http://schemas.microsoft.com/office/drawing/2010/main" w="9525">
                   <a:solidFill>
                     <a:srgbClr val="000000"/>
                   </a:solidFill>
@@ -17569,7 +17567,7 @@
             </a:ln>
             <a:extLst>
               <a:ext uri="{91240B29-F687-4f45-9708-019B960494DF}">
-                <a14:hiddenLine xmlns:a14="http://schemas.microsoft.com/office/drawing/2010/main" xmlns:p14="http://schemas.microsoft.com/office/powerpoint/2010/main" xmlns:a16="http://schemas.microsoft.com/office/drawing/2014/main" xmlns="" w="9525">
+                <a14:hiddenLine xmlns="" xmlns:a16="http://schemas.microsoft.com/office/drawing/2014/main" xmlns:p14="http://schemas.microsoft.com/office/powerpoint/2010/main" xmlns:a14="http://schemas.microsoft.com/office/drawing/2010/main" w="9525">
                   <a:solidFill>
                     <a:srgbClr val="000000"/>
                   </a:solidFill>
@@ -17646,7 +17644,7 @@
             </a:ln>
             <a:extLst>
               <a:ext uri="{91240B29-F687-4f45-9708-019B960494DF}">
-                <a14:hiddenLine xmlns:a14="http://schemas.microsoft.com/office/drawing/2010/main" xmlns:p14="http://schemas.microsoft.com/office/powerpoint/2010/main" xmlns:a16="http://schemas.microsoft.com/office/drawing/2014/main" xmlns="" w="9525">
+                <a14:hiddenLine xmlns="" xmlns:a16="http://schemas.microsoft.com/office/drawing/2014/main" xmlns:p14="http://schemas.microsoft.com/office/powerpoint/2010/main" xmlns:a14="http://schemas.microsoft.com/office/drawing/2010/main" w="9525">
                   <a:solidFill>
                     <a:srgbClr val="000000"/>
                   </a:solidFill>
@@ -17751,7 +17749,7 @@
             </a:ln>
             <a:extLst>
               <a:ext uri="{91240B29-F687-4f45-9708-019B960494DF}">
-                <a14:hiddenLine xmlns:a14="http://schemas.microsoft.com/office/drawing/2010/main" xmlns:p14="http://schemas.microsoft.com/office/powerpoint/2010/main" xmlns:a16="http://schemas.microsoft.com/office/drawing/2014/main" xmlns="" w="9525">
+                <a14:hiddenLine xmlns="" xmlns:a16="http://schemas.microsoft.com/office/drawing/2014/main" xmlns:p14="http://schemas.microsoft.com/office/powerpoint/2010/main" xmlns:a14="http://schemas.microsoft.com/office/drawing/2010/main" w="9525">
                   <a:solidFill>
                     <a:srgbClr val="000000"/>
                   </a:solidFill>
@@ -17856,7 +17854,7 @@
             </a:ln>
             <a:extLst>
               <a:ext uri="{91240B29-F687-4f45-9708-019B960494DF}">
-                <a14:hiddenLine xmlns:a14="http://schemas.microsoft.com/office/drawing/2010/main" xmlns:p14="http://schemas.microsoft.com/office/powerpoint/2010/main" xmlns:a16="http://schemas.microsoft.com/office/drawing/2014/main" xmlns="" w="9525">
+                <a14:hiddenLine xmlns="" xmlns:a16="http://schemas.microsoft.com/office/drawing/2014/main" xmlns:p14="http://schemas.microsoft.com/office/powerpoint/2010/main" xmlns:a14="http://schemas.microsoft.com/office/drawing/2010/main" w="9525">
                   <a:solidFill>
                     <a:srgbClr val="000000"/>
                   </a:solidFill>
@@ -17936,7 +17934,7 @@
             </a:ln>
             <a:extLst>
               <a:ext uri="{91240B29-F687-4f45-9708-019B960494DF}">
-                <a14:hiddenLine xmlns:a14="http://schemas.microsoft.com/office/drawing/2010/main" xmlns:p14="http://schemas.microsoft.com/office/powerpoint/2010/main" xmlns:a16="http://schemas.microsoft.com/office/drawing/2014/main" xmlns="" w="9525">
+                <a14:hiddenLine xmlns="" xmlns:a16="http://schemas.microsoft.com/office/drawing/2014/main" xmlns:p14="http://schemas.microsoft.com/office/powerpoint/2010/main" xmlns:a14="http://schemas.microsoft.com/office/drawing/2010/main" w="9525">
                   <a:solidFill>
                     <a:srgbClr val="000000"/>
                   </a:solidFill>
@@ -18071,7 +18069,7 @@
             </a:ln>
             <a:extLst>
               <a:ext uri="{91240B29-F687-4f45-9708-019B960494DF}">
-                <a14:hiddenLine xmlns:a14="http://schemas.microsoft.com/office/drawing/2010/main" xmlns:p14="http://schemas.microsoft.com/office/powerpoint/2010/main" xmlns:a16="http://schemas.microsoft.com/office/drawing/2014/main" xmlns="" w="9525">
+                <a14:hiddenLine xmlns="" xmlns:a16="http://schemas.microsoft.com/office/drawing/2014/main" xmlns:p14="http://schemas.microsoft.com/office/powerpoint/2010/main" xmlns:a14="http://schemas.microsoft.com/office/drawing/2010/main" w="9525">
                   <a:solidFill>
                     <a:srgbClr val="000000"/>
                   </a:solidFill>
@@ -18792,7 +18790,7 @@
             </a:ln>
             <a:extLst>
               <a:ext uri="{91240B29-F687-4f45-9708-019B960494DF}">
-                <a14:hiddenLine xmlns:a14="http://schemas.microsoft.com/office/drawing/2010/main" xmlns:p14="http://schemas.microsoft.com/office/powerpoint/2010/main" xmlns:a16="http://schemas.microsoft.com/office/drawing/2014/main" xmlns="" w="9525">
+                <a14:hiddenLine xmlns="" xmlns:a16="http://schemas.microsoft.com/office/drawing/2014/main" xmlns:p14="http://schemas.microsoft.com/office/powerpoint/2010/main" xmlns:a14="http://schemas.microsoft.com/office/drawing/2010/main" w="9525">
                   <a:solidFill>
                     <a:srgbClr val="000000"/>
                   </a:solidFill>
@@ -18922,7 +18920,7 @@
             </a:ln>
             <a:extLst>
               <a:ext uri="{91240B29-F687-4f45-9708-019B960494DF}">
-                <a14:hiddenLine xmlns:a14="http://schemas.microsoft.com/office/drawing/2010/main" xmlns:p14="http://schemas.microsoft.com/office/powerpoint/2010/main" xmlns:a16="http://schemas.microsoft.com/office/drawing/2014/main" xmlns="" w="9525">
+                <a14:hiddenLine xmlns="" xmlns:a16="http://schemas.microsoft.com/office/drawing/2014/main" xmlns:p14="http://schemas.microsoft.com/office/powerpoint/2010/main" xmlns:a14="http://schemas.microsoft.com/office/drawing/2010/main" w="9525">
                   <a:solidFill>
                     <a:srgbClr val="000000"/>
                   </a:solidFill>
@@ -19027,7 +19025,7 @@
             </a:ln>
             <a:extLst>
               <a:ext uri="{91240B29-F687-4f45-9708-019B960494DF}">
-                <a14:hiddenLine xmlns:a14="http://schemas.microsoft.com/office/drawing/2010/main" xmlns:p14="http://schemas.microsoft.com/office/powerpoint/2010/main" xmlns:a16="http://schemas.microsoft.com/office/drawing/2014/main" xmlns="" w="9525">
+                <a14:hiddenLine xmlns="" xmlns:a16="http://schemas.microsoft.com/office/drawing/2014/main" xmlns:p14="http://schemas.microsoft.com/office/powerpoint/2010/main" xmlns:a14="http://schemas.microsoft.com/office/drawing/2010/main" w="9525">
                   <a:solidFill>
                     <a:srgbClr val="000000"/>
                   </a:solidFill>
@@ -19107,7 +19105,7 @@
             </a:ln>
             <a:extLst>
               <a:ext uri="{91240B29-F687-4f45-9708-019B960494DF}">
-                <a14:hiddenLine xmlns:a14="http://schemas.microsoft.com/office/drawing/2010/main" xmlns:p14="http://schemas.microsoft.com/office/powerpoint/2010/main" xmlns:a16="http://schemas.microsoft.com/office/drawing/2014/main" xmlns="" w="9525">
+                <a14:hiddenLine xmlns="" xmlns:a16="http://schemas.microsoft.com/office/drawing/2014/main" xmlns:p14="http://schemas.microsoft.com/office/powerpoint/2010/main" xmlns:a14="http://schemas.microsoft.com/office/drawing/2010/main" w="9525">
                   <a:solidFill>
                     <a:srgbClr val="000000"/>
                   </a:solidFill>
@@ -19212,7 +19210,7 @@
             </a:ln>
             <a:extLst>
               <a:ext uri="{91240B29-F687-4f45-9708-019B960494DF}">
-                <a14:hiddenLine xmlns:a14="http://schemas.microsoft.com/office/drawing/2010/main" xmlns:p14="http://schemas.microsoft.com/office/powerpoint/2010/main" xmlns:a16="http://schemas.microsoft.com/office/drawing/2014/main" xmlns="" w="9525">
+                <a14:hiddenLine xmlns="" xmlns:a16="http://schemas.microsoft.com/office/drawing/2014/main" xmlns:p14="http://schemas.microsoft.com/office/powerpoint/2010/main" xmlns:a14="http://schemas.microsoft.com/office/drawing/2010/main" w="9525">
                   <a:solidFill>
                     <a:srgbClr val="000000"/>
                   </a:solidFill>
@@ -19295,7 +19293,7 @@
             </a:ln>
             <a:extLst>
               <a:ext uri="{91240B29-F687-4f45-9708-019B960494DF}">
-                <a14:hiddenLine xmlns:a14="http://schemas.microsoft.com/office/drawing/2010/main" xmlns:p14="http://schemas.microsoft.com/office/powerpoint/2010/main" xmlns:a16="http://schemas.microsoft.com/office/drawing/2014/main" xmlns="" w="9525">
+                <a14:hiddenLine xmlns="" xmlns:a16="http://schemas.microsoft.com/office/drawing/2014/main" xmlns:p14="http://schemas.microsoft.com/office/powerpoint/2010/main" xmlns:a14="http://schemas.microsoft.com/office/drawing/2010/main" w="9525">
                   <a:solidFill>
                     <a:srgbClr val="000000"/>
                   </a:solidFill>
@@ -19400,7 +19398,7 @@
             </a:ln>
             <a:extLst>
               <a:ext uri="{91240B29-F687-4f45-9708-019B960494DF}">
-                <a14:hiddenLine xmlns:a14="http://schemas.microsoft.com/office/drawing/2010/main" xmlns:p14="http://schemas.microsoft.com/office/powerpoint/2010/main" xmlns:a16="http://schemas.microsoft.com/office/drawing/2014/main" xmlns="" w="9525">
+                <a14:hiddenLine xmlns="" xmlns:a16="http://schemas.microsoft.com/office/drawing/2014/main" xmlns:p14="http://schemas.microsoft.com/office/powerpoint/2010/main" xmlns:a14="http://schemas.microsoft.com/office/drawing/2010/main" w="9525">
                   <a:solidFill>
                     <a:srgbClr val="000000"/>
                   </a:solidFill>
@@ -19483,7 +19481,7 @@
             </a:ln>
             <a:extLst>
               <a:ext uri="{91240B29-F687-4f45-9708-019B960494DF}">
-                <a14:hiddenLine xmlns:a14="http://schemas.microsoft.com/office/drawing/2010/main" xmlns:p14="http://schemas.microsoft.com/office/powerpoint/2010/main" xmlns:a16="http://schemas.microsoft.com/office/drawing/2014/main" xmlns="" w="9525">
+                <a14:hiddenLine xmlns="" xmlns:a16="http://schemas.microsoft.com/office/drawing/2014/main" xmlns:p14="http://schemas.microsoft.com/office/powerpoint/2010/main" xmlns:a14="http://schemas.microsoft.com/office/drawing/2010/main" w="9525">
                   <a:solidFill>
                     <a:srgbClr val="000000"/>
                   </a:solidFill>
@@ -19588,7 +19586,7 @@
             </a:ln>
             <a:extLst>
               <a:ext uri="{91240B29-F687-4f45-9708-019B960494DF}">
-                <a14:hiddenLine xmlns:a14="http://schemas.microsoft.com/office/drawing/2010/main" xmlns:p14="http://schemas.microsoft.com/office/powerpoint/2010/main" xmlns:a16="http://schemas.microsoft.com/office/drawing/2014/main" xmlns="" w="9525">
+                <a14:hiddenLine xmlns="" xmlns:a16="http://schemas.microsoft.com/office/drawing/2014/main" xmlns:p14="http://schemas.microsoft.com/office/powerpoint/2010/main" xmlns:a14="http://schemas.microsoft.com/office/drawing/2010/main" w="9525">
                   <a:solidFill>
                     <a:srgbClr val="000000"/>
                   </a:solidFill>
@@ -19637,7 +19635,7 @@
             </a:ln>
             <a:extLst>
               <a:ext uri="{91240B29-F687-4f45-9708-019B960494DF}">
-                <a14:hiddenLine xmlns:a14="http://schemas.microsoft.com/office/drawing/2010/main" xmlns:p14="http://schemas.microsoft.com/office/powerpoint/2010/main" xmlns:a16="http://schemas.microsoft.com/office/drawing/2014/main" xmlns="" w="9525">
+                <a14:hiddenLine xmlns="" xmlns:a16="http://schemas.microsoft.com/office/drawing/2014/main" xmlns:p14="http://schemas.microsoft.com/office/powerpoint/2010/main" xmlns:a14="http://schemas.microsoft.com/office/drawing/2010/main" w="9525">
                   <a:solidFill>
                     <a:srgbClr val="000000"/>
                   </a:solidFill>
@@ -19821,7 +19819,7 @@
           <a:noFill/>
           <a:extLst>
             <a:ext uri="{909E8E84-426E-40dd-AFC4-6F175D3DCCD1}">
-              <a14:hiddenFill xmlns="" xmlns:a16="http://schemas.microsoft.com/office/drawing/2014/main" xmlns:p14="http://schemas.microsoft.com/office/powerpoint/2010/main" xmlns:a14="http://schemas.microsoft.com/office/drawing/2010/main">
+              <a14:hiddenFill xmlns:a14="http://schemas.microsoft.com/office/drawing/2010/main" xmlns:p14="http://schemas.microsoft.com/office/powerpoint/2010/main" xmlns:a16="http://schemas.microsoft.com/office/drawing/2014/main" xmlns="">
                 <a:solidFill>
                   <a:srgbClr val="FFFFFF"/>
                 </a:solidFill>
@@ -19903,7 +19901,7 @@
             </a:ln>
             <a:extLst>
               <a:ext uri="{91240B29-F687-4f45-9708-019B960494DF}">
-                <a14:hiddenLine xmlns="" xmlns:a16="http://schemas.microsoft.com/office/drawing/2014/main" xmlns:p14="http://schemas.microsoft.com/office/powerpoint/2010/main" xmlns:a14="http://schemas.microsoft.com/office/drawing/2010/main" w="9525">
+                <a14:hiddenLine xmlns:a14="http://schemas.microsoft.com/office/drawing/2010/main" xmlns:p14="http://schemas.microsoft.com/office/powerpoint/2010/main" xmlns:a16="http://schemas.microsoft.com/office/drawing/2014/main" xmlns="" w="9525">
                   <a:solidFill>
                     <a:srgbClr val="000000"/>
                   </a:solidFill>
@@ -20008,7 +20006,7 @@
             </a:ln>
             <a:extLst>
               <a:ext uri="{91240B29-F687-4f45-9708-019B960494DF}">
-                <a14:hiddenLine xmlns="" xmlns:a16="http://schemas.microsoft.com/office/drawing/2014/main" xmlns:p14="http://schemas.microsoft.com/office/powerpoint/2010/main" xmlns:a14="http://schemas.microsoft.com/office/drawing/2010/main" w="9525">
+                <a14:hiddenLine xmlns:a14="http://schemas.microsoft.com/office/drawing/2010/main" xmlns:p14="http://schemas.microsoft.com/office/powerpoint/2010/main" xmlns:a16="http://schemas.microsoft.com/office/drawing/2014/main" xmlns="" w="9525">
                   <a:solidFill>
                     <a:srgbClr val="000000"/>
                   </a:solidFill>
@@ -20113,7 +20111,7 @@
             </a:ln>
             <a:extLst>
               <a:ext uri="{91240B29-F687-4f45-9708-019B960494DF}">
-                <a14:hiddenLine xmlns="" xmlns:a16="http://schemas.microsoft.com/office/drawing/2014/main" xmlns:p14="http://schemas.microsoft.com/office/powerpoint/2010/main" xmlns:a14="http://schemas.microsoft.com/office/drawing/2010/main" w="9525">
+                <a14:hiddenLine xmlns:a14="http://schemas.microsoft.com/office/drawing/2010/main" xmlns:p14="http://schemas.microsoft.com/office/powerpoint/2010/main" xmlns:a16="http://schemas.microsoft.com/office/drawing/2014/main" xmlns="" w="9525">
                   <a:solidFill>
                     <a:srgbClr val="000000"/>
                   </a:solidFill>
@@ -20190,7 +20188,7 @@
             </a:ln>
             <a:extLst>
               <a:ext uri="{91240B29-F687-4f45-9708-019B960494DF}">
-                <a14:hiddenLine xmlns="" xmlns:a16="http://schemas.microsoft.com/office/drawing/2014/main" xmlns:p14="http://schemas.microsoft.com/office/powerpoint/2010/main" xmlns:a14="http://schemas.microsoft.com/office/drawing/2010/main" w="9525">
+                <a14:hiddenLine xmlns:a14="http://schemas.microsoft.com/office/drawing/2010/main" xmlns:p14="http://schemas.microsoft.com/office/powerpoint/2010/main" xmlns:a16="http://schemas.microsoft.com/office/drawing/2014/main" xmlns="" w="9525">
                   <a:solidFill>
                     <a:srgbClr val="000000"/>
                   </a:solidFill>
@@ -20295,7 +20293,7 @@
             </a:ln>
             <a:extLst>
               <a:ext uri="{91240B29-F687-4f45-9708-019B960494DF}">
-                <a14:hiddenLine xmlns="" xmlns:a16="http://schemas.microsoft.com/office/drawing/2014/main" xmlns:p14="http://schemas.microsoft.com/office/powerpoint/2010/main" xmlns:a14="http://schemas.microsoft.com/office/drawing/2010/main" w="9525">
+                <a14:hiddenLine xmlns:a14="http://schemas.microsoft.com/office/drawing/2010/main" xmlns:p14="http://schemas.microsoft.com/office/powerpoint/2010/main" xmlns:a16="http://schemas.microsoft.com/office/drawing/2014/main" xmlns="" w="9525">
                   <a:solidFill>
                     <a:srgbClr val="000000"/>
                   </a:solidFill>
@@ -20372,7 +20370,7 @@
             </a:ln>
             <a:extLst>
               <a:ext uri="{91240B29-F687-4f45-9708-019B960494DF}">
-                <a14:hiddenLine xmlns="" xmlns:a16="http://schemas.microsoft.com/office/drawing/2014/main" xmlns:p14="http://schemas.microsoft.com/office/powerpoint/2010/main" xmlns:a14="http://schemas.microsoft.com/office/drawing/2010/main" w="9525">
+                <a14:hiddenLine xmlns:a14="http://schemas.microsoft.com/office/drawing/2010/main" xmlns:p14="http://schemas.microsoft.com/office/powerpoint/2010/main" xmlns:a16="http://schemas.microsoft.com/office/drawing/2014/main" xmlns="" w="9525">
                   <a:solidFill>
                     <a:srgbClr val="000000"/>
                   </a:solidFill>
@@ -20449,7 +20447,7 @@
             </a:ln>
             <a:extLst>
               <a:ext uri="{91240B29-F687-4f45-9708-019B960494DF}">
-                <a14:hiddenLine xmlns="" xmlns:a16="http://schemas.microsoft.com/office/drawing/2014/main" xmlns:p14="http://schemas.microsoft.com/office/powerpoint/2010/main" xmlns:a14="http://schemas.microsoft.com/office/drawing/2010/main" w="9525">
+                <a14:hiddenLine xmlns:a14="http://schemas.microsoft.com/office/drawing/2010/main" xmlns:p14="http://schemas.microsoft.com/office/powerpoint/2010/main" xmlns:a16="http://schemas.microsoft.com/office/drawing/2014/main" xmlns="" w="9525">
                   <a:solidFill>
                     <a:srgbClr val="000000"/>
                   </a:solidFill>
@@ -20554,7 +20552,7 @@
             </a:ln>
             <a:extLst>
               <a:ext uri="{91240B29-F687-4f45-9708-019B960494DF}">
-                <a14:hiddenLine xmlns="" xmlns:a16="http://schemas.microsoft.com/office/drawing/2014/main" xmlns:p14="http://schemas.microsoft.com/office/powerpoint/2010/main" xmlns:a14="http://schemas.microsoft.com/office/drawing/2010/main" w="9525">
+                <a14:hiddenLine xmlns:a14="http://schemas.microsoft.com/office/drawing/2010/main" xmlns:p14="http://schemas.microsoft.com/office/powerpoint/2010/main" xmlns:a16="http://schemas.microsoft.com/office/drawing/2014/main" xmlns="" w="9525">
                   <a:solidFill>
                     <a:srgbClr val="000000"/>
                   </a:solidFill>
@@ -20659,7 +20657,7 @@
             </a:ln>
             <a:extLst>
               <a:ext uri="{91240B29-F687-4f45-9708-019B960494DF}">
-                <a14:hiddenLine xmlns="" xmlns:a16="http://schemas.microsoft.com/office/drawing/2014/main" xmlns:p14="http://schemas.microsoft.com/office/powerpoint/2010/main" xmlns:a14="http://schemas.microsoft.com/office/drawing/2010/main" w="9525">
+                <a14:hiddenLine xmlns:a14="http://schemas.microsoft.com/office/drawing/2010/main" xmlns:p14="http://schemas.microsoft.com/office/powerpoint/2010/main" xmlns:a16="http://schemas.microsoft.com/office/drawing/2014/main" xmlns="" w="9525">
                   <a:solidFill>
                     <a:srgbClr val="000000"/>
                   </a:solidFill>
@@ -20736,7 +20734,7 @@
             </a:ln>
             <a:extLst>
               <a:ext uri="{91240B29-F687-4f45-9708-019B960494DF}">
-                <a14:hiddenLine xmlns="" xmlns:a16="http://schemas.microsoft.com/office/drawing/2014/main" xmlns:p14="http://schemas.microsoft.com/office/powerpoint/2010/main" xmlns:a14="http://schemas.microsoft.com/office/drawing/2010/main" w="9525">
+                <a14:hiddenLine xmlns:a14="http://schemas.microsoft.com/office/drawing/2010/main" xmlns:p14="http://schemas.microsoft.com/office/powerpoint/2010/main" xmlns:a16="http://schemas.microsoft.com/office/drawing/2014/main" xmlns="" w="9525">
                   <a:solidFill>
                     <a:srgbClr val="000000"/>
                   </a:solidFill>
@@ -20861,7 +20859,7 @@
             </a:ln>
             <a:extLst>
               <a:ext uri="{91240B29-F687-4f45-9708-019B960494DF}">
-                <a14:hiddenLine xmlns="" xmlns:a16="http://schemas.microsoft.com/office/drawing/2014/main" xmlns:p14="http://schemas.microsoft.com/office/powerpoint/2010/main" xmlns:a14="http://schemas.microsoft.com/office/drawing/2010/main" w="9525">
+                <a14:hiddenLine xmlns:a14="http://schemas.microsoft.com/office/drawing/2010/main" xmlns:p14="http://schemas.microsoft.com/office/powerpoint/2010/main" xmlns:a16="http://schemas.microsoft.com/office/drawing/2014/main" xmlns="" w="9525">
                   <a:solidFill>
                     <a:srgbClr val="000000"/>
                   </a:solidFill>
@@ -20975,7 +20973,7 @@
             </a:ln>
             <a:extLst>
               <a:ext uri="{91240B29-F687-4f45-9708-019B960494DF}">
-                <a14:hiddenLine xmlns="" xmlns:a16="http://schemas.microsoft.com/office/drawing/2014/main" xmlns:p14="http://schemas.microsoft.com/office/powerpoint/2010/main" xmlns:a14="http://schemas.microsoft.com/office/drawing/2010/main" w="9525">
+                <a14:hiddenLine xmlns:a14="http://schemas.microsoft.com/office/drawing/2010/main" xmlns:p14="http://schemas.microsoft.com/office/powerpoint/2010/main" xmlns:a16="http://schemas.microsoft.com/office/drawing/2014/main" xmlns="" w="9525">
                   <a:solidFill>
                     <a:srgbClr val="000000"/>
                   </a:solidFill>
@@ -21052,7 +21050,7 @@
             </a:ln>
             <a:extLst>
               <a:ext uri="{91240B29-F687-4f45-9708-019B960494DF}">
-                <a14:hiddenLine xmlns="" xmlns:a16="http://schemas.microsoft.com/office/drawing/2014/main" xmlns:p14="http://schemas.microsoft.com/office/powerpoint/2010/main" xmlns:a14="http://schemas.microsoft.com/office/drawing/2010/main" w="9525">
+                <a14:hiddenLine xmlns:a14="http://schemas.microsoft.com/office/drawing/2010/main" xmlns:p14="http://schemas.microsoft.com/office/powerpoint/2010/main" xmlns:a16="http://schemas.microsoft.com/office/drawing/2014/main" xmlns="" w="9525">
                   <a:solidFill>
                     <a:srgbClr val="000000"/>
                   </a:solidFill>
@@ -21129,7 +21127,7 @@
             </a:ln>
             <a:extLst>
               <a:ext uri="{91240B29-F687-4f45-9708-019B960494DF}">
-                <a14:hiddenLine xmlns="" xmlns:a16="http://schemas.microsoft.com/office/drawing/2014/main" xmlns:p14="http://schemas.microsoft.com/office/powerpoint/2010/main" xmlns:a14="http://schemas.microsoft.com/office/drawing/2010/main" w="9525">
+                <a14:hiddenLine xmlns:a14="http://schemas.microsoft.com/office/drawing/2010/main" xmlns:p14="http://schemas.microsoft.com/office/powerpoint/2010/main" xmlns:a16="http://schemas.microsoft.com/office/drawing/2014/main" xmlns="" w="9525">
                   <a:solidFill>
                     <a:srgbClr val="000000"/>
                   </a:solidFill>
@@ -21234,7 +21232,7 @@
             </a:ln>
             <a:extLst>
               <a:ext uri="{91240B29-F687-4f45-9708-019B960494DF}">
-                <a14:hiddenLine xmlns="" xmlns:a16="http://schemas.microsoft.com/office/drawing/2014/main" xmlns:p14="http://schemas.microsoft.com/office/powerpoint/2010/main" xmlns:a14="http://schemas.microsoft.com/office/drawing/2010/main" w="9525">
+                <a14:hiddenLine xmlns:a14="http://schemas.microsoft.com/office/drawing/2010/main" xmlns:p14="http://schemas.microsoft.com/office/powerpoint/2010/main" xmlns:a16="http://schemas.microsoft.com/office/drawing/2014/main" xmlns="" w="9525">
                   <a:solidFill>
                     <a:srgbClr val="000000"/>
                   </a:solidFill>
@@ -21283,7 +21281,7 @@
             </a:ln>
             <a:extLst>
               <a:ext uri="{91240B29-F687-4f45-9708-019B960494DF}">
-                <a14:hiddenLine xmlns="" xmlns:a16="http://schemas.microsoft.com/office/drawing/2014/main" xmlns:p14="http://schemas.microsoft.com/office/powerpoint/2010/main" xmlns:a14="http://schemas.microsoft.com/office/drawing/2010/main" w="9525">
+                <a14:hiddenLine xmlns:a14="http://schemas.microsoft.com/office/drawing/2010/main" xmlns:p14="http://schemas.microsoft.com/office/powerpoint/2010/main" xmlns:a16="http://schemas.microsoft.com/office/drawing/2014/main" xmlns="" w="9525">
                   <a:solidFill>
                     <a:srgbClr val="000000"/>
                   </a:solidFill>
@@ -21363,7 +21361,7 @@
             </a:ln>
             <a:extLst>
               <a:ext uri="{91240B29-F687-4f45-9708-019B960494DF}">
-                <a14:hiddenLine xmlns="" xmlns:a16="http://schemas.microsoft.com/office/drawing/2014/main" xmlns:p14="http://schemas.microsoft.com/office/powerpoint/2010/main" xmlns:a14="http://schemas.microsoft.com/office/drawing/2010/main" w="9525">
+                <a14:hiddenLine xmlns:a14="http://schemas.microsoft.com/office/drawing/2010/main" xmlns:p14="http://schemas.microsoft.com/office/powerpoint/2010/main" xmlns:a16="http://schemas.microsoft.com/office/drawing/2014/main" xmlns="" w="9525">
                   <a:solidFill>
                     <a:srgbClr val="000000"/>
                   </a:solidFill>
@@ -21468,7 +21466,7 @@
             </a:ln>
             <a:extLst>
               <a:ext uri="{91240B29-F687-4f45-9708-019B960494DF}">
-                <a14:hiddenLine xmlns="" xmlns:a16="http://schemas.microsoft.com/office/drawing/2014/main" xmlns:p14="http://schemas.microsoft.com/office/powerpoint/2010/main" xmlns:a14="http://schemas.microsoft.com/office/drawing/2010/main" w="9525">
+                <a14:hiddenLine xmlns:a14="http://schemas.microsoft.com/office/drawing/2010/main" xmlns:p14="http://schemas.microsoft.com/office/powerpoint/2010/main" xmlns:a16="http://schemas.microsoft.com/office/drawing/2014/main" xmlns="" w="9525">
                   <a:solidFill>
                     <a:srgbClr val="000000"/>
                   </a:solidFill>
@@ -21545,7 +21543,7 @@
             </a:ln>
             <a:extLst>
               <a:ext uri="{91240B29-F687-4f45-9708-019B960494DF}">
-                <a14:hiddenLine xmlns="" xmlns:a16="http://schemas.microsoft.com/office/drawing/2014/main" xmlns:p14="http://schemas.microsoft.com/office/powerpoint/2010/main" xmlns:a14="http://schemas.microsoft.com/office/drawing/2010/main" w="9525">
+                <a14:hiddenLine xmlns:a14="http://schemas.microsoft.com/office/drawing/2010/main" xmlns:p14="http://schemas.microsoft.com/office/powerpoint/2010/main" xmlns:a16="http://schemas.microsoft.com/office/drawing/2014/main" xmlns="" w="9525">
                   <a:solidFill>
                     <a:srgbClr val="000000"/>
                   </a:solidFill>
@@ -21650,7 +21648,7 @@
             </a:ln>
             <a:extLst>
               <a:ext uri="{91240B29-F687-4f45-9708-019B960494DF}">
-                <a14:hiddenLine xmlns="" xmlns:a16="http://schemas.microsoft.com/office/drawing/2014/main" xmlns:p14="http://schemas.microsoft.com/office/powerpoint/2010/main" xmlns:a14="http://schemas.microsoft.com/office/drawing/2010/main" w="9525">
+                <a14:hiddenLine xmlns:a14="http://schemas.microsoft.com/office/drawing/2010/main" xmlns:p14="http://schemas.microsoft.com/office/powerpoint/2010/main" xmlns:a16="http://schemas.microsoft.com/office/drawing/2014/main" xmlns="" w="9525">
                   <a:solidFill>
                     <a:srgbClr val="000000"/>
                   </a:solidFill>
@@ -21730,7 +21728,7 @@
             </a:ln>
             <a:extLst>
               <a:ext uri="{91240B29-F687-4f45-9708-019B960494DF}">
-                <a14:hiddenLine xmlns="" xmlns:a16="http://schemas.microsoft.com/office/drawing/2014/main" xmlns:p14="http://schemas.microsoft.com/office/powerpoint/2010/main" xmlns:a14="http://schemas.microsoft.com/office/drawing/2010/main" w="9525">
+                <a14:hiddenLine xmlns:a14="http://schemas.microsoft.com/office/drawing/2010/main" xmlns:p14="http://schemas.microsoft.com/office/powerpoint/2010/main" xmlns:a16="http://schemas.microsoft.com/office/drawing/2014/main" xmlns="" w="9525">
                   <a:solidFill>
                     <a:srgbClr val="000000"/>
                   </a:solidFill>
@@ -21807,7 +21805,7 @@
             </a:ln>
             <a:extLst>
               <a:ext uri="{91240B29-F687-4f45-9708-019B960494DF}">
-                <a14:hiddenLine xmlns="" xmlns:a16="http://schemas.microsoft.com/office/drawing/2014/main" xmlns:p14="http://schemas.microsoft.com/office/powerpoint/2010/main" xmlns:a14="http://schemas.microsoft.com/office/drawing/2010/main" w="9525">
+                <a14:hiddenLine xmlns:a14="http://schemas.microsoft.com/office/drawing/2010/main" xmlns:p14="http://schemas.microsoft.com/office/powerpoint/2010/main" xmlns:a16="http://schemas.microsoft.com/office/drawing/2014/main" xmlns="" w="9525">
                   <a:solidFill>
                     <a:srgbClr val="000000"/>
                   </a:solidFill>
@@ -21912,7 +21910,7 @@
             </a:ln>
             <a:extLst>
               <a:ext uri="{91240B29-F687-4f45-9708-019B960494DF}">
-                <a14:hiddenLine xmlns="" xmlns:a16="http://schemas.microsoft.com/office/drawing/2014/main" xmlns:p14="http://schemas.microsoft.com/office/powerpoint/2010/main" xmlns:a14="http://schemas.microsoft.com/office/drawing/2010/main" w="9525">
+                <a14:hiddenLine xmlns:a14="http://schemas.microsoft.com/office/drawing/2010/main" xmlns:p14="http://schemas.microsoft.com/office/powerpoint/2010/main" xmlns:a16="http://schemas.microsoft.com/office/drawing/2014/main" xmlns="" w="9525">
                   <a:solidFill>
                     <a:srgbClr val="000000"/>
                   </a:solidFill>
@@ -22017,7 +22015,7 @@
             </a:ln>
             <a:extLst>
               <a:ext uri="{91240B29-F687-4f45-9708-019B960494DF}">
-                <a14:hiddenLine xmlns="" xmlns:a16="http://schemas.microsoft.com/office/drawing/2014/main" xmlns:p14="http://schemas.microsoft.com/office/powerpoint/2010/main" xmlns:a14="http://schemas.microsoft.com/office/drawing/2010/main" w="9525">
+                <a14:hiddenLine xmlns:a14="http://schemas.microsoft.com/office/drawing/2010/main" xmlns:p14="http://schemas.microsoft.com/office/powerpoint/2010/main" xmlns:a16="http://schemas.microsoft.com/office/drawing/2014/main" xmlns="" w="9525">
                   <a:solidFill>
                     <a:srgbClr val="000000"/>
                   </a:solidFill>
@@ -22097,7 +22095,7 @@
             </a:ln>
             <a:extLst>
               <a:ext uri="{91240B29-F687-4f45-9708-019B960494DF}">
-                <a14:hiddenLine xmlns="" xmlns:a16="http://schemas.microsoft.com/office/drawing/2014/main" xmlns:p14="http://schemas.microsoft.com/office/powerpoint/2010/main" xmlns:a14="http://schemas.microsoft.com/office/drawing/2010/main" w="9525">
+                <a14:hiddenLine xmlns:a14="http://schemas.microsoft.com/office/drawing/2010/main" xmlns:p14="http://schemas.microsoft.com/office/powerpoint/2010/main" xmlns:a16="http://schemas.microsoft.com/office/drawing/2014/main" xmlns="" w="9525">
                   <a:solidFill>
                     <a:srgbClr val="000000"/>
                   </a:solidFill>
@@ -22232,7 +22230,7 @@
             </a:ln>
             <a:extLst>
               <a:ext uri="{91240B29-F687-4f45-9708-019B960494DF}">
-                <a14:hiddenLine xmlns="" xmlns:a16="http://schemas.microsoft.com/office/drawing/2014/main" xmlns:p14="http://schemas.microsoft.com/office/powerpoint/2010/main" xmlns:a14="http://schemas.microsoft.com/office/drawing/2010/main" w="9525">
+                <a14:hiddenLine xmlns:a14="http://schemas.microsoft.com/office/drawing/2010/main" xmlns:p14="http://schemas.microsoft.com/office/powerpoint/2010/main" xmlns:a16="http://schemas.microsoft.com/office/drawing/2014/main" xmlns="" w="9525">
                   <a:solidFill>
                     <a:srgbClr val="000000"/>
                   </a:solidFill>
@@ -22390,7 +22388,7 @@
             </a:ln>
             <a:extLst>
               <a:ext uri="{91240B29-F687-4f45-9708-019B960494DF}">
-                <a14:hiddenLine xmlns="" xmlns:a16="http://schemas.microsoft.com/office/drawing/2014/main" xmlns:p14="http://schemas.microsoft.com/office/powerpoint/2010/main" xmlns:a14="http://schemas.microsoft.com/office/drawing/2010/main" w="9525">
+                <a14:hiddenLine xmlns:a14="http://schemas.microsoft.com/office/drawing/2010/main" xmlns:p14="http://schemas.microsoft.com/office/powerpoint/2010/main" xmlns:a16="http://schemas.microsoft.com/office/drawing/2014/main" xmlns="" w="9525">
                   <a:solidFill>
                     <a:srgbClr val="000000"/>
                   </a:solidFill>
@@ -22520,7 +22518,7 @@
             </a:ln>
             <a:extLst>
               <a:ext uri="{91240B29-F687-4f45-9708-019B960494DF}">
-                <a14:hiddenLine xmlns="" xmlns:a16="http://schemas.microsoft.com/office/drawing/2014/main" xmlns:p14="http://schemas.microsoft.com/office/powerpoint/2010/main" xmlns:a14="http://schemas.microsoft.com/office/drawing/2010/main" w="9525">
+                <a14:hiddenLine xmlns:a14="http://schemas.microsoft.com/office/drawing/2010/main" xmlns:p14="http://schemas.microsoft.com/office/powerpoint/2010/main" xmlns:a16="http://schemas.microsoft.com/office/drawing/2014/main" xmlns="" w="9525">
                   <a:solidFill>
                     <a:srgbClr val="000000"/>
                   </a:solidFill>
@@ -22625,7 +22623,7 @@
             </a:ln>
             <a:extLst>
               <a:ext uri="{91240B29-F687-4f45-9708-019B960494DF}">
-                <a14:hiddenLine xmlns="" xmlns:a16="http://schemas.microsoft.com/office/drawing/2014/main" xmlns:p14="http://schemas.microsoft.com/office/powerpoint/2010/main" xmlns:a14="http://schemas.microsoft.com/office/drawing/2010/main" w="9525">
+                <a14:hiddenLine xmlns:a14="http://schemas.microsoft.com/office/drawing/2010/main" xmlns:p14="http://schemas.microsoft.com/office/powerpoint/2010/main" xmlns:a16="http://schemas.microsoft.com/office/drawing/2014/main" xmlns="" w="9525">
                   <a:solidFill>
                     <a:srgbClr val="000000"/>
                   </a:solidFill>
@@ -22705,7 +22703,7 @@
             </a:ln>
             <a:extLst>
               <a:ext uri="{91240B29-F687-4f45-9708-019B960494DF}">
-                <a14:hiddenLine xmlns="" xmlns:a16="http://schemas.microsoft.com/office/drawing/2014/main" xmlns:p14="http://schemas.microsoft.com/office/powerpoint/2010/main" xmlns:a14="http://schemas.microsoft.com/office/drawing/2010/main" w="9525">
+                <a14:hiddenLine xmlns:a14="http://schemas.microsoft.com/office/drawing/2010/main" xmlns:p14="http://schemas.microsoft.com/office/powerpoint/2010/main" xmlns:a16="http://schemas.microsoft.com/office/drawing/2014/main" xmlns="" w="9525">
                   <a:solidFill>
                     <a:srgbClr val="000000"/>
                   </a:solidFill>
@@ -22810,7 +22808,7 @@
             </a:ln>
             <a:extLst>
               <a:ext uri="{91240B29-F687-4f45-9708-019B960494DF}">
-                <a14:hiddenLine xmlns="" xmlns:a16="http://schemas.microsoft.com/office/drawing/2014/main" xmlns:p14="http://schemas.microsoft.com/office/powerpoint/2010/main" xmlns:a14="http://schemas.microsoft.com/office/drawing/2010/main" w="9525">
+                <a14:hiddenLine xmlns:a14="http://schemas.microsoft.com/office/drawing/2010/main" xmlns:p14="http://schemas.microsoft.com/office/powerpoint/2010/main" xmlns:a16="http://schemas.microsoft.com/office/drawing/2014/main" xmlns="" w="9525">
                   <a:solidFill>
                     <a:srgbClr val="000000"/>
                   </a:solidFill>
@@ -22893,7 +22891,7 @@
             </a:ln>
             <a:extLst>
               <a:ext uri="{91240B29-F687-4f45-9708-019B960494DF}">
-                <a14:hiddenLine xmlns="" xmlns:a16="http://schemas.microsoft.com/office/drawing/2014/main" xmlns:p14="http://schemas.microsoft.com/office/powerpoint/2010/main" xmlns:a14="http://schemas.microsoft.com/office/drawing/2010/main" w="9525">
+                <a14:hiddenLine xmlns:a14="http://schemas.microsoft.com/office/drawing/2010/main" xmlns:p14="http://schemas.microsoft.com/office/powerpoint/2010/main" xmlns:a16="http://schemas.microsoft.com/office/drawing/2014/main" xmlns="" w="9525">
                   <a:solidFill>
                     <a:srgbClr val="000000"/>
                   </a:solidFill>
@@ -22998,7 +22996,7 @@
             </a:ln>
             <a:extLst>
               <a:ext uri="{91240B29-F687-4f45-9708-019B960494DF}">
-                <a14:hiddenLine xmlns="" xmlns:a16="http://schemas.microsoft.com/office/drawing/2014/main" xmlns:p14="http://schemas.microsoft.com/office/powerpoint/2010/main" xmlns:a14="http://schemas.microsoft.com/office/drawing/2010/main" w="9525">
+                <a14:hiddenLine xmlns:a14="http://schemas.microsoft.com/office/drawing/2010/main" xmlns:p14="http://schemas.microsoft.com/office/powerpoint/2010/main" xmlns:a16="http://schemas.microsoft.com/office/drawing/2014/main" xmlns="" w="9525">
                   <a:solidFill>
                     <a:srgbClr val="000000"/>
                   </a:solidFill>
@@ -23081,7 +23079,7 @@
             </a:ln>
             <a:extLst>
               <a:ext uri="{91240B29-F687-4f45-9708-019B960494DF}">
-                <a14:hiddenLine xmlns="" xmlns:a16="http://schemas.microsoft.com/office/drawing/2014/main" xmlns:p14="http://schemas.microsoft.com/office/powerpoint/2010/main" xmlns:a14="http://schemas.microsoft.com/office/drawing/2010/main" w="9525">
+                <a14:hiddenLine xmlns:a14="http://schemas.microsoft.com/office/drawing/2010/main" xmlns:p14="http://schemas.microsoft.com/office/powerpoint/2010/main" xmlns:a16="http://schemas.microsoft.com/office/drawing/2014/main" xmlns="" w="9525">
                   <a:solidFill>
                     <a:srgbClr val="000000"/>
                   </a:solidFill>
@@ -23186,7 +23184,7 @@
             </a:ln>
             <a:extLst>
               <a:ext uri="{91240B29-F687-4f45-9708-019B960494DF}">
-                <a14:hiddenLine xmlns="" xmlns:a16="http://schemas.microsoft.com/office/drawing/2014/main" xmlns:p14="http://schemas.microsoft.com/office/powerpoint/2010/main" xmlns:a14="http://schemas.microsoft.com/office/drawing/2010/main" w="9525">
+                <a14:hiddenLine xmlns:a14="http://schemas.microsoft.com/office/drawing/2010/main" xmlns:p14="http://schemas.microsoft.com/office/powerpoint/2010/main" xmlns:a16="http://schemas.microsoft.com/office/drawing/2014/main" xmlns="" w="9525">
                   <a:solidFill>
                     <a:srgbClr val="000000"/>
                   </a:solidFill>
@@ -23235,7 +23233,7 @@
             </a:ln>
             <a:extLst>
               <a:ext uri="{91240B29-F687-4f45-9708-019B960494DF}">
-                <a14:hiddenLine xmlns="" xmlns:a16="http://schemas.microsoft.com/office/drawing/2014/main" xmlns:p14="http://schemas.microsoft.com/office/powerpoint/2010/main" xmlns:a14="http://schemas.microsoft.com/office/drawing/2010/main" w="9525">
+                <a14:hiddenLine xmlns:a14="http://schemas.microsoft.com/office/drawing/2010/main" xmlns:p14="http://schemas.microsoft.com/office/powerpoint/2010/main" xmlns:a16="http://schemas.microsoft.com/office/drawing/2014/main" xmlns="" w="9525">
                   <a:solidFill>
                     <a:srgbClr val="000000"/>
                   </a:solidFill>
@@ -23248,8 +23246,8 @@
           </p:spPr>
         </p:sp>
       </p:grpSp>
-      <mc:AlternateContent xmlns:mc="http://schemas.openxmlformats.org/markup-compatibility/2006">
-        <mc:Choice xmlns:p14="http://schemas.microsoft.com/office/powerpoint/2010/main" xmlns:aink="http://schemas.microsoft.com/office/drawing/2016/ink" Requires="p14 aink">
+      <mc:AlternateContent xmlns:mc="http://schemas.openxmlformats.org/markup-compatibility/2006" xmlns:p14="http://schemas.microsoft.com/office/powerpoint/2010/main" xmlns:aink="http://schemas.microsoft.com/office/drawing/2016/ink">
+        <mc:Choice Requires="p14 aink">
           <p:contentPart p14:bwMode="auto" r:id="rId4">
             <p14:nvContentPartPr>
               <p14:cNvPr id="54" name="Ink 53">
@@ -23268,7 +23266,7 @@
             </p14:xfrm>
           </p:contentPart>
         </mc:Choice>
-        <mc:Fallback>
+        <mc:Fallback xmlns="">
           <p:pic>
             <p:nvPicPr>
               <p:cNvPr id="54" name="Ink 53">
@@ -23299,8 +23297,8 @@
           </p:pic>
         </mc:Fallback>
       </mc:AlternateContent>
-      <mc:AlternateContent xmlns:mc="http://schemas.openxmlformats.org/markup-compatibility/2006">
-        <mc:Choice xmlns:p14="http://schemas.microsoft.com/office/powerpoint/2010/main" xmlns:aink="http://schemas.microsoft.com/office/drawing/2016/ink" Requires="p14 aink">
+      <mc:AlternateContent xmlns:mc="http://schemas.openxmlformats.org/markup-compatibility/2006" xmlns:p14="http://schemas.microsoft.com/office/powerpoint/2010/main" xmlns:aink="http://schemas.microsoft.com/office/drawing/2016/ink">
+        <mc:Choice Requires="p14 aink">
           <p:contentPart p14:bwMode="auto" r:id="rId6">
             <p14:nvContentPartPr>
               <p14:cNvPr id="55" name="Ink 54">
@@ -23319,7 +23317,7 @@
             </p14:xfrm>
           </p:contentPart>
         </mc:Choice>
-        <mc:Fallback>
+        <mc:Fallback xmlns="">
           <p:pic>
             <p:nvPicPr>
               <p:cNvPr id="55" name="Ink 54">
@@ -23397,8 +23395,8 @@
           </a:extLst>
         </p:spPr>
       </p:pic>
-      <mc:AlternateContent xmlns:mc="http://schemas.openxmlformats.org/markup-compatibility/2006">
-        <mc:Choice xmlns:a14="http://schemas.microsoft.com/office/drawing/2010/main" Requires="a14">
+      <mc:AlternateContent xmlns:mc="http://schemas.openxmlformats.org/markup-compatibility/2006" xmlns:a14="http://schemas.microsoft.com/office/drawing/2010/main">
+        <mc:Choice Requires="a14">
           <p:sp>
             <p:nvSpPr>
               <p:cNvPr id="57" name="TextBox 56">
@@ -23427,6 +23425,7 @@
               </a:bodyPr>
               <a:lstStyle/>
               <a:p>
+                <a:pPr/>
                 <a14:m>
                   <m:oMathPara xmlns:m="http://schemas.openxmlformats.org/officeDocument/2006/math">
                     <m:oMathParaPr>
@@ -23447,7 +23446,7 @@
             </p:txBody>
           </p:sp>
         </mc:Choice>
-        <mc:Fallback>
+        <mc:Fallback xmlns="">
           <p:sp>
             <p:nvSpPr>
               <p:cNvPr id="57" name="TextBox 56">
@@ -23492,8 +23491,8 @@
           </p:sp>
         </mc:Fallback>
       </mc:AlternateContent>
-      <mc:AlternateContent xmlns:mc="http://schemas.openxmlformats.org/markup-compatibility/2006">
-        <mc:Choice xmlns:a14="http://schemas.microsoft.com/office/drawing/2010/main" Requires="a14">
+      <mc:AlternateContent xmlns:mc="http://schemas.openxmlformats.org/markup-compatibility/2006" xmlns:a14="http://schemas.microsoft.com/office/drawing/2010/main">
+        <mc:Choice Requires="a14">
           <p:sp>
             <p:nvSpPr>
               <p:cNvPr id="58" name="TextBox 57">
@@ -23522,6 +23521,7 @@
               </a:bodyPr>
               <a:lstStyle/>
               <a:p>
+                <a:pPr/>
                 <a14:m>
                   <m:oMathPara xmlns:m="http://schemas.openxmlformats.org/officeDocument/2006/math">
                     <m:oMathParaPr>
@@ -23542,7 +23542,7 @@
             </p:txBody>
           </p:sp>
         </mc:Choice>
-        <mc:Fallback>
+        <mc:Fallback xmlns="">
           <p:sp>
             <p:nvSpPr>
               <p:cNvPr id="58" name="TextBox 57">
@@ -23587,8 +23587,8 @@
           </p:sp>
         </mc:Fallback>
       </mc:AlternateContent>
-      <mc:AlternateContent xmlns:mc="http://schemas.openxmlformats.org/markup-compatibility/2006">
-        <mc:Choice xmlns:a14="http://schemas.microsoft.com/office/drawing/2010/main" Requires="a14">
+      <mc:AlternateContent xmlns:mc="http://schemas.openxmlformats.org/markup-compatibility/2006" xmlns:a14="http://schemas.microsoft.com/office/drawing/2010/main">
+        <mc:Choice Requires="a14">
           <p:sp>
             <p:nvSpPr>
               <p:cNvPr id="59" name="TextBox 58">
@@ -23617,6 +23617,7 @@
               </a:bodyPr>
               <a:lstStyle/>
               <a:p>
+                <a:pPr/>
                 <a14:m>
                   <m:oMathPara xmlns:m="http://schemas.openxmlformats.org/officeDocument/2006/math">
                     <m:oMathParaPr>
@@ -23637,7 +23638,7 @@
             </p:txBody>
           </p:sp>
         </mc:Choice>
-        <mc:Fallback>
+        <mc:Fallback xmlns="">
           <p:sp>
             <p:nvSpPr>
               <p:cNvPr id="59" name="TextBox 58">
@@ -23725,8 +23726,8 @@
           </a:fontRef>
         </p:style>
       </p:cxnSp>
-      <mc:AlternateContent xmlns:mc="http://schemas.openxmlformats.org/markup-compatibility/2006">
-        <mc:Choice xmlns:a14="http://schemas.microsoft.com/office/drawing/2010/main" Requires="a14">
+      <mc:AlternateContent xmlns:mc="http://schemas.openxmlformats.org/markup-compatibility/2006" xmlns:a14="http://schemas.microsoft.com/office/drawing/2010/main">
+        <mc:Choice Requires="a14">
           <p:sp>
             <p:nvSpPr>
               <p:cNvPr id="1025" name="TextBox 1024">
@@ -23755,6 +23756,7 @@
               </a:bodyPr>
               <a:lstStyle/>
               <a:p>
+                <a:pPr/>
                 <a14:m>
                   <m:oMathPara xmlns:m="http://schemas.openxmlformats.org/officeDocument/2006/math">
                     <m:oMathParaPr>
@@ -23835,7 +23837,7 @@
             </p:txBody>
           </p:sp>
         </mc:Choice>
-        <mc:Fallback>
+        <mc:Fallback xmlns="">
           <p:sp>
             <p:nvSpPr>
               <p:cNvPr id="1025" name="TextBox 1024">
@@ -23923,8 +23925,8 @@
           </a:fontRef>
         </p:style>
       </p:cxnSp>
-      <mc:AlternateContent xmlns:mc="http://schemas.openxmlformats.org/markup-compatibility/2006">
-        <mc:Choice xmlns:a14="http://schemas.microsoft.com/office/drawing/2010/main" Requires="a14">
+      <mc:AlternateContent xmlns:mc="http://schemas.openxmlformats.org/markup-compatibility/2006" xmlns:a14="http://schemas.microsoft.com/office/drawing/2010/main">
+        <mc:Choice Requires="a14">
           <p:sp>
             <p:nvSpPr>
               <p:cNvPr id="1034" name="TextBox 1033">
@@ -23953,6 +23955,7 @@
               </a:bodyPr>
               <a:lstStyle/>
               <a:p>
+                <a:pPr/>
                 <a14:m>
                   <m:oMathPara xmlns:m="http://schemas.openxmlformats.org/officeDocument/2006/math">
                     <m:oMathParaPr>
@@ -24092,7 +24095,7 @@
             </p:txBody>
           </p:sp>
         </mc:Choice>
-        <mc:Fallback>
+        <mc:Fallback xmlns="">
           <p:sp>
             <p:nvSpPr>
               <p:cNvPr id="1034" name="TextBox 1033">
@@ -24182,8 +24185,8 @@
           </a:fontRef>
         </p:style>
       </p:cxnSp>
-      <mc:AlternateContent xmlns:mc="http://schemas.openxmlformats.org/markup-compatibility/2006">
-        <mc:Choice xmlns:a14="http://schemas.microsoft.com/office/drawing/2010/main" Requires="a14">
+      <mc:AlternateContent xmlns:mc="http://schemas.openxmlformats.org/markup-compatibility/2006" xmlns:a14="http://schemas.microsoft.com/office/drawing/2010/main">
+        <mc:Choice Requires="a14">
           <p:sp>
             <p:nvSpPr>
               <p:cNvPr id="1049" name="TextBox 1048">
@@ -24212,6 +24215,7 @@
               </a:bodyPr>
               <a:lstStyle/>
               <a:p>
+                <a:pPr/>
                 <a14:m>
                   <m:oMathPara xmlns:m="http://schemas.openxmlformats.org/officeDocument/2006/math">
                     <m:oMathParaPr>
@@ -24304,7 +24308,7 @@
             </p:txBody>
           </p:sp>
         </mc:Choice>
-        <mc:Fallback>
+        <mc:Fallback xmlns="">
           <p:sp>
             <p:nvSpPr>
               <p:cNvPr id="1049" name="TextBox 1048">
@@ -24392,8 +24396,8 @@
           </a:fontRef>
         </p:style>
       </p:cxnSp>
-      <mc:AlternateContent xmlns:mc="http://schemas.openxmlformats.org/markup-compatibility/2006">
-        <mc:Choice xmlns:a14="http://schemas.microsoft.com/office/drawing/2010/main" Requires="a14">
+      <mc:AlternateContent xmlns:mc="http://schemas.openxmlformats.org/markup-compatibility/2006" xmlns:a14="http://schemas.microsoft.com/office/drawing/2010/main">
+        <mc:Choice Requires="a14">
           <p:sp>
             <p:nvSpPr>
               <p:cNvPr id="1055" name="TextBox 1054">
@@ -24443,7 +24447,7 @@
             </p:txBody>
           </p:sp>
         </mc:Choice>
-        <mc:Fallback>
+        <mc:Fallback xmlns="">
           <p:sp>
             <p:nvSpPr>
               <p:cNvPr id="1055" name="TextBox 1054">
@@ -24633,8 +24637,8 @@
           </a:p>
         </p:txBody>
       </p:sp>
-      <mc:AlternateContent xmlns:mc="http://schemas.openxmlformats.org/markup-compatibility/2006">
-        <mc:Choice xmlns:a14="http://schemas.microsoft.com/office/drawing/2010/main" Requires="a14">
+      <mc:AlternateContent xmlns:mc="http://schemas.openxmlformats.org/markup-compatibility/2006" xmlns:a14="http://schemas.microsoft.com/office/drawing/2010/main">
+        <mc:Choice Requires="a14">
           <p:sp>
             <p:nvSpPr>
               <p:cNvPr id="1067" name="TextBox 1066">
@@ -24663,6 +24667,7 @@
               </a:bodyPr>
               <a:lstStyle/>
               <a:p>
+                <a:pPr/>
                 <a14:m>
                   <m:oMathPara xmlns:m="http://schemas.openxmlformats.org/officeDocument/2006/math">
                     <m:oMathParaPr>
@@ -24683,7 +24688,7 @@
             </p:txBody>
           </p:sp>
         </mc:Choice>
-        <mc:Fallback>
+        <mc:Fallback xmlns="">
           <p:sp>
             <p:nvSpPr>
               <p:cNvPr id="1067" name="TextBox 1066">
@@ -24870,8 +24875,8 @@
           </a:fontRef>
         </p:style>
       </p:cxnSp>
-      <mc:AlternateContent xmlns:mc="http://schemas.openxmlformats.org/markup-compatibility/2006">
-        <mc:Choice xmlns:a14="http://schemas.microsoft.com/office/drawing/2010/main" Requires="a14">
+      <mc:AlternateContent xmlns:mc="http://schemas.openxmlformats.org/markup-compatibility/2006" xmlns:a14="http://schemas.microsoft.com/office/drawing/2010/main">
+        <mc:Choice Requires="a14">
           <p:sp>
             <p:nvSpPr>
               <p:cNvPr id="1104" name="TextBox 1103">
@@ -24900,6 +24905,7 @@
               </a:bodyPr>
               <a:lstStyle/>
               <a:p>
+                <a:pPr/>
                 <a14:m>
                   <m:oMathPara xmlns:m="http://schemas.openxmlformats.org/officeDocument/2006/math">
                     <m:oMathParaPr>
@@ -24965,7 +24971,7 @@
             </p:txBody>
           </p:sp>
         </mc:Choice>
-        <mc:Fallback>
+        <mc:Fallback xmlns="">
           <p:sp>
             <p:nvSpPr>
               <p:cNvPr id="1104" name="TextBox 1103">
@@ -25281,7 +25287,7 @@
           <a:noFill/>
           <a:extLst>
             <a:ext uri="{909E8E84-426E-40dd-AFC4-6F175D3DCCD1}">
-              <a14:hiddenFill xmlns="" xmlns:a16="http://schemas.microsoft.com/office/drawing/2014/main" xmlns:p14="http://schemas.microsoft.com/office/powerpoint/2010/main" xmlns:a14="http://schemas.microsoft.com/office/drawing/2010/main">
+              <a14:hiddenFill xmlns:a14="http://schemas.microsoft.com/office/drawing/2010/main" xmlns:p14="http://schemas.microsoft.com/office/powerpoint/2010/main" xmlns:a16="http://schemas.microsoft.com/office/drawing/2014/main" xmlns="">
                 <a:solidFill>
                   <a:srgbClr val="FFFFFF"/>
                 </a:solidFill>
@@ -25363,7 +25369,7 @@
             </a:ln>
             <a:extLst>
               <a:ext uri="{91240B29-F687-4f45-9708-019B960494DF}">
-                <a14:hiddenLine xmlns="" xmlns:a16="http://schemas.microsoft.com/office/drawing/2014/main" xmlns:p14="http://schemas.microsoft.com/office/powerpoint/2010/main" xmlns:a14="http://schemas.microsoft.com/office/drawing/2010/main" w="9525">
+                <a14:hiddenLine xmlns:a14="http://schemas.microsoft.com/office/drawing/2010/main" xmlns:p14="http://schemas.microsoft.com/office/powerpoint/2010/main" xmlns:a16="http://schemas.microsoft.com/office/drawing/2014/main" xmlns="" w="9525">
                   <a:solidFill>
                     <a:srgbClr val="000000"/>
                   </a:solidFill>
@@ -25468,7 +25474,7 @@
             </a:ln>
             <a:extLst>
               <a:ext uri="{91240B29-F687-4f45-9708-019B960494DF}">
-                <a14:hiddenLine xmlns="" xmlns:a16="http://schemas.microsoft.com/office/drawing/2014/main" xmlns:p14="http://schemas.microsoft.com/office/powerpoint/2010/main" xmlns:a14="http://schemas.microsoft.com/office/drawing/2010/main" w="9525">
+                <a14:hiddenLine xmlns:a14="http://schemas.microsoft.com/office/drawing/2010/main" xmlns:p14="http://schemas.microsoft.com/office/powerpoint/2010/main" xmlns:a16="http://schemas.microsoft.com/office/drawing/2014/main" xmlns="" w="9525">
                   <a:solidFill>
                     <a:srgbClr val="000000"/>
                   </a:solidFill>
@@ -25573,7 +25579,7 @@
             </a:ln>
             <a:extLst>
               <a:ext uri="{91240B29-F687-4f45-9708-019B960494DF}">
-                <a14:hiddenLine xmlns="" xmlns:a16="http://schemas.microsoft.com/office/drawing/2014/main" xmlns:p14="http://schemas.microsoft.com/office/powerpoint/2010/main" xmlns:a14="http://schemas.microsoft.com/office/drawing/2010/main" w="9525">
+                <a14:hiddenLine xmlns:a14="http://schemas.microsoft.com/office/drawing/2010/main" xmlns:p14="http://schemas.microsoft.com/office/powerpoint/2010/main" xmlns:a16="http://schemas.microsoft.com/office/drawing/2014/main" xmlns="" w="9525">
                   <a:solidFill>
                     <a:srgbClr val="000000"/>
                   </a:solidFill>
@@ -25650,7 +25656,7 @@
             </a:ln>
             <a:extLst>
               <a:ext uri="{91240B29-F687-4f45-9708-019B960494DF}">
-                <a14:hiddenLine xmlns="" xmlns:a16="http://schemas.microsoft.com/office/drawing/2014/main" xmlns:p14="http://schemas.microsoft.com/office/powerpoint/2010/main" xmlns:a14="http://schemas.microsoft.com/office/drawing/2010/main" w="9525">
+                <a14:hiddenLine xmlns:a14="http://schemas.microsoft.com/office/drawing/2010/main" xmlns:p14="http://schemas.microsoft.com/office/powerpoint/2010/main" xmlns:a16="http://schemas.microsoft.com/office/drawing/2014/main" xmlns="" w="9525">
                   <a:solidFill>
                     <a:srgbClr val="000000"/>
                   </a:solidFill>
@@ -25755,7 +25761,7 @@
             </a:ln>
             <a:extLst>
               <a:ext uri="{91240B29-F687-4f45-9708-019B960494DF}">
-                <a14:hiddenLine xmlns="" xmlns:a16="http://schemas.microsoft.com/office/drawing/2014/main" xmlns:p14="http://schemas.microsoft.com/office/powerpoint/2010/main" xmlns:a14="http://schemas.microsoft.com/office/drawing/2010/main" w="9525">
+                <a14:hiddenLine xmlns:a14="http://schemas.microsoft.com/office/drawing/2010/main" xmlns:p14="http://schemas.microsoft.com/office/powerpoint/2010/main" xmlns:a16="http://schemas.microsoft.com/office/drawing/2014/main" xmlns="" w="9525">
                   <a:solidFill>
                     <a:srgbClr val="000000"/>
                   </a:solidFill>
@@ -25832,7 +25838,7 @@
             </a:ln>
             <a:extLst>
               <a:ext uri="{91240B29-F687-4f45-9708-019B960494DF}">
-                <a14:hiddenLine xmlns="" xmlns:a16="http://schemas.microsoft.com/office/drawing/2014/main" xmlns:p14="http://schemas.microsoft.com/office/powerpoint/2010/main" xmlns:a14="http://schemas.microsoft.com/office/drawing/2010/main" w="9525">
+                <a14:hiddenLine xmlns:a14="http://schemas.microsoft.com/office/drawing/2010/main" xmlns:p14="http://schemas.microsoft.com/office/powerpoint/2010/main" xmlns:a16="http://schemas.microsoft.com/office/drawing/2014/main" xmlns="" w="9525">
                   <a:solidFill>
                     <a:srgbClr val="000000"/>
                   </a:solidFill>
@@ -25909,7 +25915,7 @@
             </a:ln>
             <a:extLst>
               <a:ext uri="{91240B29-F687-4f45-9708-019B960494DF}">
-                <a14:hiddenLine xmlns="" xmlns:a16="http://schemas.microsoft.com/office/drawing/2014/main" xmlns:p14="http://schemas.microsoft.com/office/powerpoint/2010/main" xmlns:a14="http://schemas.microsoft.com/office/drawing/2010/main" w="9525">
+                <a14:hiddenLine xmlns:a14="http://schemas.microsoft.com/office/drawing/2010/main" xmlns:p14="http://schemas.microsoft.com/office/powerpoint/2010/main" xmlns:a16="http://schemas.microsoft.com/office/drawing/2014/main" xmlns="" w="9525">
                   <a:solidFill>
                     <a:srgbClr val="000000"/>
                   </a:solidFill>
@@ -26014,7 +26020,7 @@
             </a:ln>
             <a:extLst>
               <a:ext uri="{91240B29-F687-4f45-9708-019B960494DF}">
-                <a14:hiddenLine xmlns="" xmlns:a16="http://schemas.microsoft.com/office/drawing/2014/main" xmlns:p14="http://schemas.microsoft.com/office/powerpoint/2010/main" xmlns:a14="http://schemas.microsoft.com/office/drawing/2010/main" w="9525">
+                <a14:hiddenLine xmlns:a14="http://schemas.microsoft.com/office/drawing/2010/main" xmlns:p14="http://schemas.microsoft.com/office/powerpoint/2010/main" xmlns:a16="http://schemas.microsoft.com/office/drawing/2014/main" xmlns="" w="9525">
                   <a:solidFill>
                     <a:srgbClr val="000000"/>
                   </a:solidFill>
@@ -26119,7 +26125,7 @@
             </a:ln>
             <a:extLst>
               <a:ext uri="{91240B29-F687-4f45-9708-019B960494DF}">
-                <a14:hiddenLine xmlns="" xmlns:a16="http://schemas.microsoft.com/office/drawing/2014/main" xmlns:p14="http://schemas.microsoft.com/office/powerpoint/2010/main" xmlns:a14="http://schemas.microsoft.com/office/drawing/2010/main" w="9525">
+                <a14:hiddenLine xmlns:a14="http://schemas.microsoft.com/office/drawing/2010/main" xmlns:p14="http://schemas.microsoft.com/office/powerpoint/2010/main" xmlns:a16="http://schemas.microsoft.com/office/drawing/2014/main" xmlns="" w="9525">
                   <a:solidFill>
                     <a:srgbClr val="000000"/>
                   </a:solidFill>
@@ -26196,7 +26202,7 @@
             </a:ln>
             <a:extLst>
               <a:ext uri="{91240B29-F687-4f45-9708-019B960494DF}">
-                <a14:hiddenLine xmlns="" xmlns:a16="http://schemas.microsoft.com/office/drawing/2014/main" xmlns:p14="http://schemas.microsoft.com/office/powerpoint/2010/main" xmlns:a14="http://schemas.microsoft.com/office/drawing/2010/main" w="9525">
+                <a14:hiddenLine xmlns:a14="http://schemas.microsoft.com/office/drawing/2010/main" xmlns:p14="http://schemas.microsoft.com/office/powerpoint/2010/main" xmlns:a16="http://schemas.microsoft.com/office/drawing/2014/main" xmlns="" w="9525">
                   <a:solidFill>
                     <a:srgbClr val="000000"/>
                   </a:solidFill>
@@ -26321,7 +26327,7 @@
             </a:ln>
             <a:extLst>
               <a:ext uri="{91240B29-F687-4f45-9708-019B960494DF}">
-                <a14:hiddenLine xmlns="" xmlns:a16="http://schemas.microsoft.com/office/drawing/2014/main" xmlns:p14="http://schemas.microsoft.com/office/powerpoint/2010/main" xmlns:a14="http://schemas.microsoft.com/office/drawing/2010/main" w="9525">
+                <a14:hiddenLine xmlns:a14="http://schemas.microsoft.com/office/drawing/2010/main" xmlns:p14="http://schemas.microsoft.com/office/powerpoint/2010/main" xmlns:a16="http://schemas.microsoft.com/office/drawing/2014/main" xmlns="" w="9525">
                   <a:solidFill>
                     <a:srgbClr val="000000"/>
                   </a:solidFill>
@@ -26435,7 +26441,7 @@
             </a:ln>
             <a:extLst>
               <a:ext uri="{91240B29-F687-4f45-9708-019B960494DF}">
-                <a14:hiddenLine xmlns="" xmlns:a16="http://schemas.microsoft.com/office/drawing/2014/main" xmlns:p14="http://schemas.microsoft.com/office/powerpoint/2010/main" xmlns:a14="http://schemas.microsoft.com/office/drawing/2010/main" w="9525">
+                <a14:hiddenLine xmlns:a14="http://schemas.microsoft.com/office/drawing/2010/main" xmlns:p14="http://schemas.microsoft.com/office/powerpoint/2010/main" xmlns:a16="http://schemas.microsoft.com/office/drawing/2014/main" xmlns="" w="9525">
                   <a:solidFill>
                     <a:srgbClr val="000000"/>
                   </a:solidFill>
@@ -26512,7 +26518,7 @@
             </a:ln>
             <a:extLst>
               <a:ext uri="{91240B29-F687-4f45-9708-019B960494DF}">
-                <a14:hiddenLine xmlns="" xmlns:a16="http://schemas.microsoft.com/office/drawing/2014/main" xmlns:p14="http://schemas.microsoft.com/office/powerpoint/2010/main" xmlns:a14="http://schemas.microsoft.com/office/drawing/2010/main" w="9525">
+                <a14:hiddenLine xmlns:a14="http://schemas.microsoft.com/office/drawing/2010/main" xmlns:p14="http://schemas.microsoft.com/office/powerpoint/2010/main" xmlns:a16="http://schemas.microsoft.com/office/drawing/2014/main" xmlns="" w="9525">
                   <a:solidFill>
                     <a:srgbClr val="000000"/>
                   </a:solidFill>
@@ -26589,7 +26595,7 @@
             </a:ln>
             <a:extLst>
               <a:ext uri="{91240B29-F687-4f45-9708-019B960494DF}">
-                <a14:hiddenLine xmlns="" xmlns:a16="http://schemas.microsoft.com/office/drawing/2014/main" xmlns:p14="http://schemas.microsoft.com/office/powerpoint/2010/main" xmlns:a14="http://schemas.microsoft.com/office/drawing/2010/main" w="9525">
+                <a14:hiddenLine xmlns:a14="http://schemas.microsoft.com/office/drawing/2010/main" xmlns:p14="http://schemas.microsoft.com/office/powerpoint/2010/main" xmlns:a16="http://schemas.microsoft.com/office/drawing/2014/main" xmlns="" w="9525">
                   <a:solidFill>
                     <a:srgbClr val="000000"/>
                   </a:solidFill>
@@ -26694,7 +26700,7 @@
             </a:ln>
             <a:extLst>
               <a:ext uri="{91240B29-F687-4f45-9708-019B960494DF}">
-                <a14:hiddenLine xmlns="" xmlns:a16="http://schemas.microsoft.com/office/drawing/2014/main" xmlns:p14="http://schemas.microsoft.com/office/powerpoint/2010/main" xmlns:a14="http://schemas.microsoft.com/office/drawing/2010/main" w="9525">
+                <a14:hiddenLine xmlns:a14="http://schemas.microsoft.com/office/drawing/2010/main" xmlns:p14="http://schemas.microsoft.com/office/powerpoint/2010/main" xmlns:a16="http://schemas.microsoft.com/office/drawing/2014/main" xmlns="" w="9525">
                   <a:solidFill>
                     <a:srgbClr val="000000"/>
                   </a:solidFill>
@@ -26743,7 +26749,7 @@
             </a:ln>
             <a:extLst>
               <a:ext uri="{91240B29-F687-4f45-9708-019B960494DF}">
-                <a14:hiddenLine xmlns="" xmlns:a16="http://schemas.microsoft.com/office/drawing/2014/main" xmlns:p14="http://schemas.microsoft.com/office/powerpoint/2010/main" xmlns:a14="http://schemas.microsoft.com/office/drawing/2010/main" w="9525">
+                <a14:hiddenLine xmlns:a14="http://schemas.microsoft.com/office/drawing/2010/main" xmlns:p14="http://schemas.microsoft.com/office/powerpoint/2010/main" xmlns:a16="http://schemas.microsoft.com/office/drawing/2014/main" xmlns="" w="9525">
                   <a:solidFill>
                     <a:srgbClr val="000000"/>
                   </a:solidFill>
@@ -26823,7 +26829,7 @@
             </a:ln>
             <a:extLst>
               <a:ext uri="{91240B29-F687-4f45-9708-019B960494DF}">
-                <a14:hiddenLine xmlns="" xmlns:a16="http://schemas.microsoft.com/office/drawing/2014/main" xmlns:p14="http://schemas.microsoft.com/office/powerpoint/2010/main" xmlns:a14="http://schemas.microsoft.com/office/drawing/2010/main" w="9525">
+                <a14:hiddenLine xmlns:a14="http://schemas.microsoft.com/office/drawing/2010/main" xmlns:p14="http://schemas.microsoft.com/office/powerpoint/2010/main" xmlns:a16="http://schemas.microsoft.com/office/drawing/2014/main" xmlns="" w="9525">
                   <a:solidFill>
                     <a:srgbClr val="000000"/>
                   </a:solidFill>
@@ -26928,7 +26934,7 @@
             </a:ln>
             <a:extLst>
               <a:ext uri="{91240B29-F687-4f45-9708-019B960494DF}">
-                <a14:hiddenLine xmlns="" xmlns:a16="http://schemas.microsoft.com/office/drawing/2014/main" xmlns:p14="http://schemas.microsoft.com/office/powerpoint/2010/main" xmlns:a14="http://schemas.microsoft.com/office/drawing/2010/main" w="9525">
+                <a14:hiddenLine xmlns:a14="http://schemas.microsoft.com/office/drawing/2010/main" xmlns:p14="http://schemas.microsoft.com/office/powerpoint/2010/main" xmlns:a16="http://schemas.microsoft.com/office/drawing/2014/main" xmlns="" w="9525">
                   <a:solidFill>
                     <a:srgbClr val="000000"/>
                   </a:solidFill>
@@ -27005,7 +27011,7 @@
             </a:ln>
             <a:extLst>
               <a:ext uri="{91240B29-F687-4f45-9708-019B960494DF}">
-                <a14:hiddenLine xmlns="" xmlns:a16="http://schemas.microsoft.com/office/drawing/2014/main" xmlns:p14="http://schemas.microsoft.com/office/powerpoint/2010/main" xmlns:a14="http://schemas.microsoft.com/office/drawing/2010/main" w="9525">
+                <a14:hiddenLine xmlns:a14="http://schemas.microsoft.com/office/drawing/2010/main" xmlns:p14="http://schemas.microsoft.com/office/powerpoint/2010/main" xmlns:a16="http://schemas.microsoft.com/office/drawing/2014/main" xmlns="" w="9525">
                   <a:solidFill>
                     <a:srgbClr val="000000"/>
                   </a:solidFill>
@@ -27110,7 +27116,7 @@
             </a:ln>
             <a:extLst>
               <a:ext uri="{91240B29-F687-4f45-9708-019B960494DF}">
-                <a14:hiddenLine xmlns="" xmlns:a16="http://schemas.microsoft.com/office/drawing/2014/main" xmlns:p14="http://schemas.microsoft.com/office/powerpoint/2010/main" xmlns:a14="http://schemas.microsoft.com/office/drawing/2010/main" w="9525">
+                <a14:hiddenLine xmlns:a14="http://schemas.microsoft.com/office/drawing/2010/main" xmlns:p14="http://schemas.microsoft.com/office/powerpoint/2010/main" xmlns:a16="http://schemas.microsoft.com/office/drawing/2014/main" xmlns="" w="9525">
                   <a:solidFill>
                     <a:srgbClr val="000000"/>
                   </a:solidFill>
@@ -27190,7 +27196,7 @@
             </a:ln>
             <a:extLst>
               <a:ext uri="{91240B29-F687-4f45-9708-019B960494DF}">
-                <a14:hiddenLine xmlns="" xmlns:a16="http://schemas.microsoft.com/office/drawing/2014/main" xmlns:p14="http://schemas.microsoft.com/office/powerpoint/2010/main" xmlns:a14="http://schemas.microsoft.com/office/drawing/2010/main" w="9525">
+                <a14:hiddenLine xmlns:a14="http://schemas.microsoft.com/office/drawing/2010/main" xmlns:p14="http://schemas.microsoft.com/office/powerpoint/2010/main" xmlns:a16="http://schemas.microsoft.com/office/drawing/2014/main" xmlns="" w="9525">
                   <a:solidFill>
                     <a:srgbClr val="000000"/>
                   </a:solidFill>
@@ -27267,7 +27273,7 @@
             </a:ln>
             <a:extLst>
               <a:ext uri="{91240B29-F687-4f45-9708-019B960494DF}">
-                <a14:hiddenLine xmlns="" xmlns:a16="http://schemas.microsoft.com/office/drawing/2014/main" xmlns:p14="http://schemas.microsoft.com/office/powerpoint/2010/main" xmlns:a14="http://schemas.microsoft.com/office/drawing/2010/main" w="9525">
+                <a14:hiddenLine xmlns:a14="http://schemas.microsoft.com/office/drawing/2010/main" xmlns:p14="http://schemas.microsoft.com/office/powerpoint/2010/main" xmlns:a16="http://schemas.microsoft.com/office/drawing/2014/main" xmlns="" w="9525">
                   <a:solidFill>
                     <a:srgbClr val="000000"/>
                   </a:solidFill>
@@ -27372,7 +27378,7 @@
             </a:ln>
             <a:extLst>
               <a:ext uri="{91240B29-F687-4f45-9708-019B960494DF}">
-                <a14:hiddenLine xmlns="" xmlns:a16="http://schemas.microsoft.com/office/drawing/2014/main" xmlns:p14="http://schemas.microsoft.com/office/powerpoint/2010/main" xmlns:a14="http://schemas.microsoft.com/office/drawing/2010/main" w="9525">
+                <a14:hiddenLine xmlns:a14="http://schemas.microsoft.com/office/drawing/2010/main" xmlns:p14="http://schemas.microsoft.com/office/powerpoint/2010/main" xmlns:a16="http://schemas.microsoft.com/office/drawing/2014/main" xmlns="" w="9525">
                   <a:solidFill>
                     <a:srgbClr val="000000"/>
                   </a:solidFill>
@@ -27477,7 +27483,7 @@
             </a:ln>
             <a:extLst>
               <a:ext uri="{91240B29-F687-4f45-9708-019B960494DF}">
-                <a14:hiddenLine xmlns="" xmlns:a16="http://schemas.microsoft.com/office/drawing/2014/main" xmlns:p14="http://schemas.microsoft.com/office/powerpoint/2010/main" xmlns:a14="http://schemas.microsoft.com/office/drawing/2010/main" w="9525">
+                <a14:hiddenLine xmlns:a14="http://schemas.microsoft.com/office/drawing/2010/main" xmlns:p14="http://schemas.microsoft.com/office/powerpoint/2010/main" xmlns:a16="http://schemas.microsoft.com/office/drawing/2014/main" xmlns="" w="9525">
                   <a:solidFill>
                     <a:srgbClr val="000000"/>
                   </a:solidFill>
@@ -27557,7 +27563,7 @@
             </a:ln>
             <a:extLst>
               <a:ext uri="{91240B29-F687-4f45-9708-019B960494DF}">
-                <a14:hiddenLine xmlns="" xmlns:a16="http://schemas.microsoft.com/office/drawing/2014/main" xmlns:p14="http://schemas.microsoft.com/office/powerpoint/2010/main" xmlns:a14="http://schemas.microsoft.com/office/drawing/2010/main" w="9525">
+                <a14:hiddenLine xmlns:a14="http://schemas.microsoft.com/office/drawing/2010/main" xmlns:p14="http://schemas.microsoft.com/office/powerpoint/2010/main" xmlns:a16="http://schemas.microsoft.com/office/drawing/2014/main" xmlns="" w="9525">
                   <a:solidFill>
                     <a:srgbClr val="000000"/>
                   </a:solidFill>
@@ -27692,7 +27698,7 @@
             </a:ln>
             <a:extLst>
               <a:ext uri="{91240B29-F687-4f45-9708-019B960494DF}">
-                <a14:hiddenLine xmlns="" xmlns:a16="http://schemas.microsoft.com/office/drawing/2014/main" xmlns:p14="http://schemas.microsoft.com/office/powerpoint/2010/main" xmlns:a14="http://schemas.microsoft.com/office/drawing/2010/main" w="9525">
+                <a14:hiddenLine xmlns:a14="http://schemas.microsoft.com/office/drawing/2010/main" xmlns:p14="http://schemas.microsoft.com/office/powerpoint/2010/main" xmlns:a16="http://schemas.microsoft.com/office/drawing/2014/main" xmlns="" w="9525">
                   <a:solidFill>
                     <a:srgbClr val="000000"/>
                   </a:solidFill>
@@ -27736,7 +27742,7 @@
             <a:pPr algn="ctr"/>
             <a:r>
               <a:rPr lang="en-US" sz="4000" dirty="0"/>
-              <a:t>Difficulties with </a:t>
+              <a:t>Challenges in training </a:t>
             </a:r>
             <a:r>
               <a:rPr lang="en-US" sz="4000" dirty="0" err="1"/>
@@ -27888,7 +27894,7 @@
             </a:ln>
             <a:extLst>
               <a:ext uri="{91240B29-F687-4f45-9708-019B960494DF}">
-                <a14:hiddenLine xmlns="" xmlns:a16="http://schemas.microsoft.com/office/drawing/2014/main" xmlns:p14="http://schemas.microsoft.com/office/powerpoint/2010/main" xmlns:a14="http://schemas.microsoft.com/office/drawing/2010/main" w="9525">
+                <a14:hiddenLine xmlns:a14="http://schemas.microsoft.com/office/drawing/2010/main" xmlns:p14="http://schemas.microsoft.com/office/powerpoint/2010/main" xmlns:a16="http://schemas.microsoft.com/office/drawing/2014/main" xmlns="" w="9525">
                   <a:solidFill>
                     <a:srgbClr val="000000"/>
                   </a:solidFill>
@@ -28018,7 +28024,7 @@
             </a:ln>
             <a:extLst>
               <a:ext uri="{91240B29-F687-4f45-9708-019B960494DF}">
-                <a14:hiddenLine xmlns="" xmlns:a16="http://schemas.microsoft.com/office/drawing/2014/main" xmlns:p14="http://schemas.microsoft.com/office/powerpoint/2010/main" xmlns:a14="http://schemas.microsoft.com/office/drawing/2010/main" w="9525">
+                <a14:hiddenLine xmlns:a14="http://schemas.microsoft.com/office/drawing/2010/main" xmlns:p14="http://schemas.microsoft.com/office/powerpoint/2010/main" xmlns:a16="http://schemas.microsoft.com/office/drawing/2014/main" xmlns="" w="9525">
                   <a:solidFill>
                     <a:srgbClr val="000000"/>
                   </a:solidFill>
@@ -28123,7 +28129,7 @@
             </a:ln>
             <a:extLst>
               <a:ext uri="{91240B29-F687-4f45-9708-019B960494DF}">
-                <a14:hiddenLine xmlns="" xmlns:a16="http://schemas.microsoft.com/office/drawing/2014/main" xmlns:p14="http://schemas.microsoft.com/office/powerpoint/2010/main" xmlns:a14="http://schemas.microsoft.com/office/drawing/2010/main" w="9525">
+                <a14:hiddenLine xmlns:a14="http://schemas.microsoft.com/office/drawing/2010/main" xmlns:p14="http://schemas.microsoft.com/office/powerpoint/2010/main" xmlns:a16="http://schemas.microsoft.com/office/drawing/2014/main" xmlns="" w="9525">
                   <a:solidFill>
                     <a:srgbClr val="000000"/>
                   </a:solidFill>
@@ -28203,7 +28209,7 @@
             </a:ln>
             <a:extLst>
               <a:ext uri="{91240B29-F687-4f45-9708-019B960494DF}">
-                <a14:hiddenLine xmlns="" xmlns:a16="http://schemas.microsoft.com/office/drawing/2014/main" xmlns:p14="http://schemas.microsoft.com/office/powerpoint/2010/main" xmlns:a14="http://schemas.microsoft.com/office/drawing/2010/main" w="9525">
+                <a14:hiddenLine xmlns:a14="http://schemas.microsoft.com/office/drawing/2010/main" xmlns:p14="http://schemas.microsoft.com/office/powerpoint/2010/main" xmlns:a16="http://schemas.microsoft.com/office/drawing/2014/main" xmlns="" w="9525">
                   <a:solidFill>
                     <a:srgbClr val="000000"/>
                   </a:solidFill>
@@ -28308,7 +28314,7 @@
             </a:ln>
             <a:extLst>
               <a:ext uri="{91240B29-F687-4f45-9708-019B960494DF}">
-                <a14:hiddenLine xmlns="" xmlns:a16="http://schemas.microsoft.com/office/drawing/2014/main" xmlns:p14="http://schemas.microsoft.com/office/powerpoint/2010/main" xmlns:a14="http://schemas.microsoft.com/office/drawing/2010/main" w="9525">
+                <a14:hiddenLine xmlns:a14="http://schemas.microsoft.com/office/drawing/2010/main" xmlns:p14="http://schemas.microsoft.com/office/powerpoint/2010/main" xmlns:a16="http://schemas.microsoft.com/office/drawing/2014/main" xmlns="" w="9525">
                   <a:solidFill>
                     <a:srgbClr val="000000"/>
                   </a:solidFill>
@@ -28391,7 +28397,7 @@
             </a:ln>
             <a:extLst>
               <a:ext uri="{91240B29-F687-4f45-9708-019B960494DF}">
-                <a14:hiddenLine xmlns="" xmlns:a16="http://schemas.microsoft.com/office/drawing/2014/main" xmlns:p14="http://schemas.microsoft.com/office/powerpoint/2010/main" xmlns:a14="http://schemas.microsoft.com/office/drawing/2010/main" w="9525">
+                <a14:hiddenLine xmlns:a14="http://schemas.microsoft.com/office/drawing/2010/main" xmlns:p14="http://schemas.microsoft.com/office/powerpoint/2010/main" xmlns:a16="http://schemas.microsoft.com/office/drawing/2014/main" xmlns="" w="9525">
                   <a:solidFill>
                     <a:srgbClr val="000000"/>
                   </a:solidFill>
@@ -28496,7 +28502,7 @@
             </a:ln>
             <a:extLst>
               <a:ext uri="{91240B29-F687-4f45-9708-019B960494DF}">
-                <a14:hiddenLine xmlns="" xmlns:a16="http://schemas.microsoft.com/office/drawing/2014/main" xmlns:p14="http://schemas.microsoft.com/office/powerpoint/2010/main" xmlns:a14="http://schemas.microsoft.com/office/drawing/2010/main" w="9525">
+                <a14:hiddenLine xmlns:a14="http://schemas.microsoft.com/office/drawing/2010/main" xmlns:p14="http://schemas.microsoft.com/office/powerpoint/2010/main" xmlns:a16="http://schemas.microsoft.com/office/drawing/2014/main" xmlns="" w="9525">
                   <a:solidFill>
                     <a:srgbClr val="000000"/>
                   </a:solidFill>
@@ -28579,7 +28585,7 @@
             </a:ln>
             <a:extLst>
               <a:ext uri="{91240B29-F687-4f45-9708-019B960494DF}">
-                <a14:hiddenLine xmlns="" xmlns:a16="http://schemas.microsoft.com/office/drawing/2014/main" xmlns:p14="http://schemas.microsoft.com/office/powerpoint/2010/main" xmlns:a14="http://schemas.microsoft.com/office/drawing/2010/main" w="9525">
+                <a14:hiddenLine xmlns:a14="http://schemas.microsoft.com/office/drawing/2010/main" xmlns:p14="http://schemas.microsoft.com/office/powerpoint/2010/main" xmlns:a16="http://schemas.microsoft.com/office/drawing/2014/main" xmlns="" w="9525">
                   <a:solidFill>
                     <a:srgbClr val="000000"/>
                   </a:solidFill>
@@ -28684,7 +28690,7 @@
             </a:ln>
             <a:extLst>
               <a:ext uri="{91240B29-F687-4f45-9708-019B960494DF}">
-                <a14:hiddenLine xmlns="" xmlns:a16="http://schemas.microsoft.com/office/drawing/2014/main" xmlns:p14="http://schemas.microsoft.com/office/powerpoint/2010/main" xmlns:a14="http://schemas.microsoft.com/office/drawing/2010/main" w="9525">
+                <a14:hiddenLine xmlns:a14="http://schemas.microsoft.com/office/drawing/2010/main" xmlns:p14="http://schemas.microsoft.com/office/powerpoint/2010/main" xmlns:a16="http://schemas.microsoft.com/office/drawing/2014/main" xmlns="" w="9525">
                   <a:solidFill>
                     <a:srgbClr val="000000"/>
                   </a:solidFill>
@@ -28733,7 +28739,7 @@
             </a:ln>
             <a:extLst>
               <a:ext uri="{91240B29-F687-4f45-9708-019B960494DF}">
-                <a14:hiddenLine xmlns="" xmlns:a16="http://schemas.microsoft.com/office/drawing/2014/main" xmlns:p14="http://schemas.microsoft.com/office/powerpoint/2010/main" xmlns:a14="http://schemas.microsoft.com/office/drawing/2010/main" w="9525">
+                <a14:hiddenLine xmlns:a14="http://schemas.microsoft.com/office/drawing/2010/main" xmlns:p14="http://schemas.microsoft.com/office/powerpoint/2010/main" xmlns:a16="http://schemas.microsoft.com/office/drawing/2014/main" xmlns="" w="9525">
                   <a:solidFill>
                     <a:srgbClr val="000000"/>
                   </a:solidFill>
@@ -28755,166 +28761,6 @@
   </p:cSld>
   <p:clrMapOvr>
     <a:overrideClrMapping bg1="lt1" tx1="dk1" bg2="lt2" tx2="dk2" accent1="accent1" accent2="accent2" accent3="accent3" accent4="accent4" accent5="accent5" accent6="accent6" hlink="hlink" folHlink="folHlink"/>
-  </p:clrMapOvr>
-</p:sld>
-</file>
-
-<file path=ppt/slides/slide5.xml><?xml version="1.0" encoding="utf-8"?>
-<p:sld xmlns:a="http://schemas.openxmlformats.org/drawingml/2006/main" xmlns:r="http://schemas.openxmlformats.org/officeDocument/2006/relationships" xmlns:p="http://schemas.openxmlformats.org/presentationml/2006/main">
-  <p:cSld>
-    <p:spTree>
-      <p:nvGrpSpPr>
-        <p:cNvPr id="1" name=""/>
-        <p:cNvGrpSpPr/>
-        <p:nvPr/>
-      </p:nvGrpSpPr>
-      <p:grpSpPr>
-        <a:xfrm>
-          <a:off x="0" y="0"/>
-          <a:ext cx="0" cy="0"/>
-          <a:chOff x="0" y="0"/>
-          <a:chExt cx="0" cy="0"/>
-        </a:xfrm>
-      </p:grpSpPr>
-      <p:sp>
-        <p:nvSpPr>
-          <p:cNvPr id="2" name="Title 1">
-            <a:extLst>
-              <a:ext uri="{FF2B5EF4-FFF2-40B4-BE49-F238E27FC236}">
-                <a16:creationId xmlns:a16="http://schemas.microsoft.com/office/drawing/2014/main" id="{A5686777-5E49-CD0F-B2ED-136CAF7D653A}"/>
-              </a:ext>
-            </a:extLst>
-          </p:cNvPr>
-          <p:cNvSpPr>
-            <a:spLocks noGrp="1"/>
-          </p:cNvSpPr>
-          <p:nvPr>
-            <p:ph type="title"/>
-          </p:nvPr>
-        </p:nvSpPr>
-        <p:spPr/>
-        <p:txBody>
-          <a:bodyPr/>
-          <a:lstStyle/>
-          <a:p>
-            <a:endParaRPr lang="en-US"/>
-          </a:p>
-        </p:txBody>
-      </p:sp>
-      <p:sp>
-        <p:nvSpPr>
-          <p:cNvPr id="3" name="Content Placeholder 2">
-            <a:extLst>
-              <a:ext uri="{FF2B5EF4-FFF2-40B4-BE49-F238E27FC236}">
-                <a16:creationId xmlns:a16="http://schemas.microsoft.com/office/drawing/2014/main" id="{47ED7BF8-6E60-C8C8-FA60-F91C11A5FC99}"/>
-              </a:ext>
-            </a:extLst>
-          </p:cNvPr>
-          <p:cNvSpPr>
-            <a:spLocks noGrp="1"/>
-          </p:cNvSpPr>
-          <p:nvPr>
-            <p:ph idx="1"/>
-          </p:nvPr>
-        </p:nvSpPr>
-        <p:spPr/>
-        <p:txBody>
-          <a:bodyPr/>
-          <a:lstStyle/>
-          <a:p>
-            <a:endParaRPr lang="en-US"/>
-          </a:p>
-        </p:txBody>
-      </p:sp>
-    </p:spTree>
-    <p:extLst>
-      <p:ext uri="{BB962C8B-B14F-4D97-AF65-F5344CB8AC3E}">
-        <p14:creationId xmlns:p14="http://schemas.microsoft.com/office/powerpoint/2010/main" val="197012099"/>
-      </p:ext>
-    </p:extLst>
-  </p:cSld>
-  <p:clrMapOvr>
-    <a:masterClrMapping/>
-  </p:clrMapOvr>
-</p:sld>
-</file>
-
-<file path=ppt/slides/slide6.xml><?xml version="1.0" encoding="utf-8"?>
-<p:sld xmlns:a="http://schemas.openxmlformats.org/drawingml/2006/main" xmlns:r="http://schemas.openxmlformats.org/officeDocument/2006/relationships" xmlns:p="http://schemas.openxmlformats.org/presentationml/2006/main">
-  <p:cSld>
-    <p:spTree>
-      <p:nvGrpSpPr>
-        <p:cNvPr id="1" name=""/>
-        <p:cNvGrpSpPr/>
-        <p:nvPr/>
-      </p:nvGrpSpPr>
-      <p:grpSpPr>
-        <a:xfrm>
-          <a:off x="0" y="0"/>
-          <a:ext cx="0" cy="0"/>
-          <a:chOff x="0" y="0"/>
-          <a:chExt cx="0" cy="0"/>
-        </a:xfrm>
-      </p:grpSpPr>
-      <p:sp>
-        <p:nvSpPr>
-          <p:cNvPr id="2" name="Title 1">
-            <a:extLst>
-              <a:ext uri="{FF2B5EF4-FFF2-40B4-BE49-F238E27FC236}">
-                <a16:creationId xmlns:a16="http://schemas.microsoft.com/office/drawing/2014/main" id="{A5686777-5E49-CD0F-B2ED-136CAF7D653A}"/>
-              </a:ext>
-            </a:extLst>
-          </p:cNvPr>
-          <p:cNvSpPr>
-            <a:spLocks noGrp="1"/>
-          </p:cNvSpPr>
-          <p:nvPr>
-            <p:ph type="title"/>
-          </p:nvPr>
-        </p:nvSpPr>
-        <p:spPr/>
-        <p:txBody>
-          <a:bodyPr/>
-          <a:lstStyle/>
-          <a:p>
-            <a:endParaRPr lang="en-US"/>
-          </a:p>
-        </p:txBody>
-      </p:sp>
-      <p:sp>
-        <p:nvSpPr>
-          <p:cNvPr id="3" name="Content Placeholder 2">
-            <a:extLst>
-              <a:ext uri="{FF2B5EF4-FFF2-40B4-BE49-F238E27FC236}">
-                <a16:creationId xmlns:a16="http://schemas.microsoft.com/office/drawing/2014/main" id="{47ED7BF8-6E60-C8C8-FA60-F91C11A5FC99}"/>
-              </a:ext>
-            </a:extLst>
-          </p:cNvPr>
-          <p:cNvSpPr>
-            <a:spLocks noGrp="1"/>
-          </p:cNvSpPr>
-          <p:nvPr>
-            <p:ph idx="1"/>
-          </p:nvPr>
-        </p:nvSpPr>
-        <p:spPr/>
-        <p:txBody>
-          <a:bodyPr/>
-          <a:lstStyle/>
-          <a:p>
-            <a:endParaRPr lang="en-US"/>
-          </a:p>
-        </p:txBody>
-      </p:sp>
-    </p:spTree>
-    <p:extLst>
-      <p:ext uri="{BB962C8B-B14F-4D97-AF65-F5344CB8AC3E}">
-        <p14:creationId xmlns:p14="http://schemas.microsoft.com/office/powerpoint/2010/main" val="947358780"/>
-      </p:ext>
-    </p:extLst>
-  </p:cSld>
-  <p:clrMapOvr>
-    <a:masterClrMapping/>
   </p:clrMapOvr>
 </p:sld>
 </file>

</xml_diff>

<commit_message>
Working on making the code in mffbpinns efficient. It is not done yet. I am currently working on the batching.
</commit_message>
<xml_diff>
--- a/MFFBPINNs.pptx
+++ b/MFFBPINNs.pptx
@@ -5,13 +5,15 @@
     <p:sldMasterId id="2147483660" r:id="rId1"/>
   </p:sldMasterIdLst>
   <p:notesMasterIdLst>
-    <p:notesMasterId r:id="rId6"/>
+    <p:notesMasterId r:id="rId8"/>
   </p:notesMasterIdLst>
   <p:sldIdLst>
     <p:sldId id="256" r:id="rId2"/>
     <p:sldId id="257" r:id="rId3"/>
     <p:sldId id="258" r:id="rId4"/>
     <p:sldId id="261" r:id="rId5"/>
+    <p:sldId id="263" r:id="rId6"/>
+    <p:sldId id="262" r:id="rId7"/>
   </p:sldIdLst>
   <p:sldSz cx="12192000" cy="6858000"/>
   <p:notesSz cx="6858000" cy="9144000"/>
@@ -256,7 +258,7 @@
           <a:p>
             <a:fld id="{D4584F4C-CD75-4847-BAA4-FEBF19C9D936}" type="datetimeFigureOut">
               <a:rPr lang="en-US" smtClean="0"/>
-              <a:t>7/24/2023</a:t>
+              <a:t>7/26/2023</a:t>
             </a:fld>
             <a:endParaRPr lang="en-US"/>
           </a:p>
@@ -738,6 +740,76 @@
           <a:bodyPr/>
           <a:lstStyle/>
           <a:p>
+            <a:pPr marL="0" indent="0">
+              <a:buFontTx/>
+              <a:buNone/>
+            </a:pPr>
+            <a:r>
+              <a:rPr lang="en-US" dirty="0"/>
+              <a:t>May want to find a prettier example</a:t>
+            </a:r>
+          </a:p>
+          <a:p>
+            <a:pPr marL="171450" indent="-171450">
+              <a:buFontTx/>
+              <a:buChar char="-"/>
+            </a:pPr>
+            <a:endParaRPr lang="en-US" dirty="0"/>
+          </a:p>
+          <a:p>
+            <a:pPr marL="171450" indent="-171450">
+              <a:buFontTx/>
+              <a:buChar char="-"/>
+            </a:pPr>
+            <a:r>
+              <a:rPr lang="en-US" dirty="0"/>
+              <a:t>High frequency problems (cite spectral bias)</a:t>
+            </a:r>
+          </a:p>
+          <a:p>
+            <a:pPr marL="171450" indent="-171450">
+              <a:buFontTx/>
+              <a:buChar char="-"/>
+            </a:pPr>
+            <a:r>
+              <a:rPr lang="en-US" dirty="0"/>
+              <a:t>Converging to erroneous fixed points (cite fixed point paper)</a:t>
+            </a:r>
+          </a:p>
+          <a:p>
+            <a:pPr marL="0" indent="0">
+              <a:buFontTx/>
+              <a:buNone/>
+            </a:pPr>
+            <a:endParaRPr lang="en-US" dirty="0"/>
+          </a:p>
+          <a:p>
+            <a:pPr marL="0" indent="0">
+              <a:buFontTx/>
+              <a:buNone/>
+            </a:pPr>
+            <a:r>
+              <a:rPr lang="en-US" dirty="0"/>
+              <a:t>PINNs have trouble converging to both high frequency solutions. What is more, they have a strong bias towards converging to non-physical fixed point solutions. These problems are related. The weights and biases of the network need to change significantly in order to capture the behavior of highly oscillatory solutions. Erroneous fixed point solutions are attractive because, despite violating the initial and boundary conditions, they inherently satisfy all other </a:t>
+            </a:r>
+            <a:r>
+              <a:rPr lang="en-US"/>
+              <a:t>physical constraints.</a:t>
+            </a:r>
+            <a:endParaRPr lang="en-US" dirty="0"/>
+          </a:p>
+          <a:p>
+            <a:pPr marL="0" indent="0">
+              <a:buFontTx/>
+              <a:buNone/>
+            </a:pPr>
+            <a:endParaRPr lang="en-US" dirty="0"/>
+          </a:p>
+          <a:p>
+            <a:pPr marL="171450" indent="-171450">
+              <a:buFontTx/>
+              <a:buChar char="-"/>
+            </a:pPr>
             <a:endParaRPr lang="en-US" dirty="0"/>
           </a:p>
         </p:txBody>
@@ -769,6 +841,318 @@
     <p:extLst>
       <p:ext uri="{BB962C8B-B14F-4D97-AF65-F5344CB8AC3E}">
         <p14:creationId xmlns:p14="http://schemas.microsoft.com/office/powerpoint/2010/main" val="680268896"/>
+      </p:ext>
+    </p:extLst>
+  </p:cSld>
+  <p:clrMapOvr>
+    <a:masterClrMapping/>
+  </p:clrMapOvr>
+</p:notes>
+</file>
+
+<file path=ppt/notesSlides/notesSlide4.xml><?xml version="1.0" encoding="utf-8"?>
+<p:notes xmlns:a="http://schemas.openxmlformats.org/drawingml/2006/main" xmlns:r="http://schemas.openxmlformats.org/officeDocument/2006/relationships" xmlns:p="http://schemas.openxmlformats.org/presentationml/2006/main">
+  <p:cSld>
+    <p:spTree>
+      <p:nvGrpSpPr>
+        <p:cNvPr id="1" name=""/>
+        <p:cNvGrpSpPr/>
+        <p:nvPr/>
+      </p:nvGrpSpPr>
+      <p:grpSpPr>
+        <a:xfrm>
+          <a:off x="0" y="0"/>
+          <a:ext cx="0" cy="0"/>
+          <a:chOff x="0" y="0"/>
+          <a:chExt cx="0" cy="0"/>
+        </a:xfrm>
+      </p:grpSpPr>
+      <p:sp>
+        <p:nvSpPr>
+          <p:cNvPr id="2" name="Slide Image Placeholder 1"/>
+          <p:cNvSpPr>
+            <a:spLocks noGrp="1" noRot="1" noChangeAspect="1"/>
+          </p:cNvSpPr>
+          <p:nvPr>
+            <p:ph type="sldImg"/>
+          </p:nvPr>
+        </p:nvSpPr>
+        <p:spPr/>
+      </p:sp>
+      <p:sp>
+        <p:nvSpPr>
+          <p:cNvPr id="3" name="Notes Placeholder 2"/>
+          <p:cNvSpPr>
+            <a:spLocks noGrp="1"/>
+          </p:cNvSpPr>
+          <p:nvPr>
+            <p:ph type="body" idx="1"/>
+          </p:nvPr>
+        </p:nvSpPr>
+        <p:spPr/>
+        <p:txBody>
+          <a:bodyPr/>
+          <a:lstStyle/>
+          <a:p>
+            <a:pPr marL="0" indent="0">
+              <a:buFontTx/>
+              <a:buNone/>
+            </a:pPr>
+            <a:r>
+              <a:rPr lang="en-US" dirty="0"/>
+              <a:t>May want to find a prettier example</a:t>
+            </a:r>
+          </a:p>
+          <a:p>
+            <a:pPr marL="171450" indent="-171450">
+              <a:buFontTx/>
+              <a:buChar char="-"/>
+            </a:pPr>
+            <a:endParaRPr lang="en-US" dirty="0"/>
+          </a:p>
+          <a:p>
+            <a:pPr marL="171450" indent="-171450">
+              <a:buFontTx/>
+              <a:buChar char="-"/>
+            </a:pPr>
+            <a:r>
+              <a:rPr lang="en-US" dirty="0"/>
+              <a:t>High frequency problems (cite spectral bias)</a:t>
+            </a:r>
+          </a:p>
+          <a:p>
+            <a:pPr marL="171450" indent="-171450">
+              <a:buFontTx/>
+              <a:buChar char="-"/>
+            </a:pPr>
+            <a:r>
+              <a:rPr lang="en-US" dirty="0"/>
+              <a:t>Converging to erroneous fixed points (cite fixed point paper)</a:t>
+            </a:r>
+          </a:p>
+          <a:p>
+            <a:pPr marL="0" indent="0">
+              <a:buFontTx/>
+              <a:buNone/>
+            </a:pPr>
+            <a:endParaRPr lang="en-US" dirty="0"/>
+          </a:p>
+          <a:p>
+            <a:pPr marL="0" indent="0">
+              <a:buFontTx/>
+              <a:buNone/>
+            </a:pPr>
+            <a:r>
+              <a:rPr lang="en-US" dirty="0"/>
+              <a:t>Training </a:t>
+            </a:r>
+          </a:p>
+          <a:p>
+            <a:pPr marL="171450" indent="-171450">
+              <a:buFontTx/>
+              <a:buChar char="-"/>
+            </a:pPr>
+            <a:endParaRPr lang="en-US" dirty="0"/>
+          </a:p>
+          <a:p>
+            <a:pPr marL="0" indent="0">
+              <a:buFontTx/>
+              <a:buNone/>
+            </a:pPr>
+            <a:endParaRPr lang="en-US" dirty="0"/>
+          </a:p>
+          <a:p>
+            <a:pPr marL="171450" indent="-171450">
+              <a:buFontTx/>
+              <a:buChar char="-"/>
+            </a:pPr>
+            <a:endParaRPr lang="en-US" dirty="0"/>
+          </a:p>
+        </p:txBody>
+      </p:sp>
+      <p:sp>
+        <p:nvSpPr>
+          <p:cNvPr id="4" name="Slide Number Placeholder 3"/>
+          <p:cNvSpPr>
+            <a:spLocks noGrp="1"/>
+          </p:cNvSpPr>
+          <p:nvPr>
+            <p:ph type="sldNum" sz="quarter" idx="5"/>
+          </p:nvPr>
+        </p:nvSpPr>
+        <p:spPr/>
+        <p:txBody>
+          <a:bodyPr/>
+          <a:lstStyle/>
+          <a:p>
+            <a:fld id="{4FFB5539-238E-464D-9A8D-E4AB4B4F3E88}" type="slidenum">
+              <a:rPr lang="en-US" smtClean="0"/>
+              <a:t>5</a:t>
+            </a:fld>
+            <a:endParaRPr lang="en-US"/>
+          </a:p>
+        </p:txBody>
+      </p:sp>
+    </p:spTree>
+    <p:extLst>
+      <p:ext uri="{BB962C8B-B14F-4D97-AF65-F5344CB8AC3E}">
+        <p14:creationId xmlns:p14="http://schemas.microsoft.com/office/powerpoint/2010/main" val="2465399454"/>
+      </p:ext>
+    </p:extLst>
+  </p:cSld>
+  <p:clrMapOvr>
+    <a:masterClrMapping/>
+  </p:clrMapOvr>
+</p:notes>
+</file>
+
+<file path=ppt/notesSlides/notesSlide5.xml><?xml version="1.0" encoding="utf-8"?>
+<p:notes xmlns:a="http://schemas.openxmlformats.org/drawingml/2006/main" xmlns:r="http://schemas.openxmlformats.org/officeDocument/2006/relationships" xmlns:p="http://schemas.openxmlformats.org/presentationml/2006/main">
+  <p:cSld>
+    <p:spTree>
+      <p:nvGrpSpPr>
+        <p:cNvPr id="1" name=""/>
+        <p:cNvGrpSpPr/>
+        <p:nvPr/>
+      </p:nvGrpSpPr>
+      <p:grpSpPr>
+        <a:xfrm>
+          <a:off x="0" y="0"/>
+          <a:ext cx="0" cy="0"/>
+          <a:chOff x="0" y="0"/>
+          <a:chExt cx="0" cy="0"/>
+        </a:xfrm>
+      </p:grpSpPr>
+      <p:sp>
+        <p:nvSpPr>
+          <p:cNvPr id="2" name="Slide Image Placeholder 1"/>
+          <p:cNvSpPr>
+            <a:spLocks noGrp="1" noRot="1" noChangeAspect="1"/>
+          </p:cNvSpPr>
+          <p:nvPr>
+            <p:ph type="sldImg"/>
+          </p:nvPr>
+        </p:nvSpPr>
+        <p:spPr/>
+      </p:sp>
+      <p:sp>
+        <p:nvSpPr>
+          <p:cNvPr id="3" name="Notes Placeholder 2"/>
+          <p:cNvSpPr>
+            <a:spLocks noGrp="1"/>
+          </p:cNvSpPr>
+          <p:nvPr>
+            <p:ph type="body" idx="1"/>
+          </p:nvPr>
+        </p:nvSpPr>
+        <p:spPr/>
+        <p:txBody>
+          <a:bodyPr/>
+          <a:lstStyle/>
+          <a:p>
+            <a:pPr marL="0" indent="0">
+              <a:buFontTx/>
+              <a:buNone/>
+            </a:pPr>
+            <a:r>
+              <a:rPr lang="en-US" dirty="0"/>
+              <a:t>May want to find a prettier example</a:t>
+            </a:r>
+          </a:p>
+          <a:p>
+            <a:pPr marL="171450" indent="-171450">
+              <a:buFontTx/>
+              <a:buChar char="-"/>
+            </a:pPr>
+            <a:endParaRPr lang="en-US" dirty="0"/>
+          </a:p>
+          <a:p>
+            <a:pPr marL="171450" indent="-171450">
+              <a:buFontTx/>
+              <a:buChar char="-"/>
+            </a:pPr>
+            <a:r>
+              <a:rPr lang="en-US" dirty="0"/>
+              <a:t>High frequency problems (cite spectral bias)</a:t>
+            </a:r>
+          </a:p>
+          <a:p>
+            <a:pPr marL="171450" indent="-171450">
+              <a:buFontTx/>
+              <a:buChar char="-"/>
+            </a:pPr>
+            <a:r>
+              <a:rPr lang="en-US" dirty="0"/>
+              <a:t>Converging to erroneous fixed points (cite fixed point paper)</a:t>
+            </a:r>
+          </a:p>
+          <a:p>
+            <a:pPr marL="0" indent="0">
+              <a:buFontTx/>
+              <a:buNone/>
+            </a:pPr>
+            <a:endParaRPr lang="en-US" dirty="0"/>
+          </a:p>
+          <a:p>
+            <a:pPr marL="0" indent="0">
+              <a:buFontTx/>
+              <a:buNone/>
+            </a:pPr>
+            <a:r>
+              <a:rPr lang="en-US" dirty="0"/>
+              <a:t>Training </a:t>
+            </a:r>
+          </a:p>
+          <a:p>
+            <a:pPr marL="171450" indent="-171450">
+              <a:buFontTx/>
+              <a:buChar char="-"/>
+            </a:pPr>
+            <a:endParaRPr lang="en-US" dirty="0"/>
+          </a:p>
+          <a:p>
+            <a:pPr marL="0" indent="0">
+              <a:buFontTx/>
+              <a:buNone/>
+            </a:pPr>
+            <a:endParaRPr lang="en-US" dirty="0"/>
+          </a:p>
+          <a:p>
+            <a:pPr marL="171450" indent="-171450">
+              <a:buFontTx/>
+              <a:buChar char="-"/>
+            </a:pPr>
+            <a:endParaRPr lang="en-US" dirty="0"/>
+          </a:p>
+        </p:txBody>
+      </p:sp>
+      <p:sp>
+        <p:nvSpPr>
+          <p:cNvPr id="4" name="Slide Number Placeholder 3"/>
+          <p:cNvSpPr>
+            <a:spLocks noGrp="1"/>
+          </p:cNvSpPr>
+          <p:nvPr>
+            <p:ph type="sldNum" sz="quarter" idx="5"/>
+          </p:nvPr>
+        </p:nvSpPr>
+        <p:spPr/>
+        <p:txBody>
+          <a:bodyPr/>
+          <a:lstStyle/>
+          <a:p>
+            <a:fld id="{4FFB5539-238E-464D-9A8D-E4AB4B4F3E88}" type="slidenum">
+              <a:rPr lang="en-US" smtClean="0"/>
+              <a:t>6</a:t>
+            </a:fld>
+            <a:endParaRPr lang="en-US"/>
+          </a:p>
+        </p:txBody>
+      </p:sp>
+    </p:spTree>
+    <p:extLst>
+      <p:ext uri="{BB962C8B-B14F-4D97-AF65-F5344CB8AC3E}">
+        <p14:creationId xmlns:p14="http://schemas.microsoft.com/office/powerpoint/2010/main" val="437354053"/>
       </p:ext>
     </p:extLst>
   </p:cSld>
@@ -5054,7 +5438,7 @@
           <a:p>
             <a:fld id="{FBE4F224-7315-44B6-BB36-41F6486955CF}" type="datetimeFigureOut">
               <a:rPr lang="en-US" smtClean="0"/>
-              <a:t>7/24/2023</a:t>
+              <a:t>7/26/2023</a:t>
             </a:fld>
             <a:endParaRPr lang="en-US"/>
           </a:p>
@@ -5321,7 +5705,7 @@
           <a:p>
             <a:fld id="{FBE4F224-7315-44B6-BB36-41F6486955CF}" type="datetimeFigureOut">
               <a:rPr lang="en-US" smtClean="0"/>
-              <a:t>7/24/2023</a:t>
+              <a:t>7/26/2023</a:t>
             </a:fld>
             <a:endParaRPr lang="en-US"/>
           </a:p>
@@ -5517,7 +5901,7 @@
           <a:p>
             <a:fld id="{FBE4F224-7315-44B6-BB36-41F6486955CF}" type="datetimeFigureOut">
               <a:rPr lang="en-US" smtClean="0"/>
-              <a:t>7/24/2023</a:t>
+              <a:t>7/26/2023</a:t>
             </a:fld>
             <a:endParaRPr lang="en-US"/>
           </a:p>
@@ -5780,7 +6164,7 @@
           <a:p>
             <a:fld id="{FBE4F224-7315-44B6-BB36-41F6486955CF}" type="datetimeFigureOut">
               <a:rPr lang="en-US" smtClean="0"/>
-              <a:t>7/24/2023</a:t>
+              <a:t>7/26/2023</a:t>
             </a:fld>
             <a:endParaRPr lang="en-US"/>
           </a:p>
@@ -6214,7 +6598,7 @@
           <a:p>
             <a:fld id="{FBE4F224-7315-44B6-BB36-41F6486955CF}" type="datetimeFigureOut">
               <a:rPr lang="en-US" smtClean="0"/>
-              <a:t>7/24/2023</a:t>
+              <a:t>7/26/2023</a:t>
             </a:fld>
             <a:endParaRPr lang="en-US"/>
           </a:p>
@@ -6760,7 +7144,7 @@
           <a:p>
             <a:fld id="{FBE4F224-7315-44B6-BB36-41F6486955CF}" type="datetimeFigureOut">
               <a:rPr lang="en-US" smtClean="0"/>
-              <a:t>7/24/2023</a:t>
+              <a:t>7/26/2023</a:t>
             </a:fld>
             <a:endParaRPr lang="en-US"/>
           </a:p>
@@ -7480,7 +7864,7 @@
           <a:p>
             <a:fld id="{FBE4F224-7315-44B6-BB36-41F6486955CF}" type="datetimeFigureOut">
               <a:rPr lang="en-US" smtClean="0"/>
-              <a:t>7/24/2023</a:t>
+              <a:t>7/26/2023</a:t>
             </a:fld>
             <a:endParaRPr lang="en-US"/>
           </a:p>
@@ -7650,7 +8034,7 @@
           <a:p>
             <a:fld id="{FBE4F224-7315-44B6-BB36-41F6486955CF}" type="datetimeFigureOut">
               <a:rPr lang="en-US" smtClean="0"/>
-              <a:t>7/24/2023</a:t>
+              <a:t>7/26/2023</a:t>
             </a:fld>
             <a:endParaRPr lang="en-US"/>
           </a:p>
@@ -7830,7 +8214,7 @@
           <a:p>
             <a:fld id="{FBE4F224-7315-44B6-BB36-41F6486955CF}" type="datetimeFigureOut">
               <a:rPr lang="en-US" smtClean="0"/>
-              <a:t>7/24/2023</a:t>
+              <a:t>7/26/2023</a:t>
             </a:fld>
             <a:endParaRPr lang="en-US"/>
           </a:p>
@@ -8000,7 +8384,7 @@
           <a:p>
             <a:fld id="{FBE4F224-7315-44B6-BB36-41F6486955CF}" type="datetimeFigureOut">
               <a:rPr lang="en-US" smtClean="0"/>
-              <a:t>7/24/2023</a:t>
+              <a:t>7/26/2023</a:t>
             </a:fld>
             <a:endParaRPr lang="en-US"/>
           </a:p>
@@ -8250,7 +8634,7 @@
           <a:p>
             <a:fld id="{FBE4F224-7315-44B6-BB36-41F6486955CF}" type="datetimeFigureOut">
               <a:rPr lang="en-US" smtClean="0"/>
-              <a:t>7/24/2023</a:t>
+              <a:t>7/26/2023</a:t>
             </a:fld>
             <a:endParaRPr lang="en-US"/>
           </a:p>
@@ -8482,7 +8866,7 @@
           <a:p>
             <a:fld id="{FBE4F224-7315-44B6-BB36-41F6486955CF}" type="datetimeFigureOut">
               <a:rPr lang="en-US" smtClean="0"/>
-              <a:t>7/24/2023</a:t>
+              <a:t>7/26/2023</a:t>
             </a:fld>
             <a:endParaRPr lang="en-US"/>
           </a:p>
@@ -8863,7 +9247,7 @@
           <a:p>
             <a:fld id="{FBE4F224-7315-44B6-BB36-41F6486955CF}" type="datetimeFigureOut">
               <a:rPr lang="en-US" smtClean="0"/>
-              <a:t>7/24/2023</a:t>
+              <a:t>7/26/2023</a:t>
             </a:fld>
             <a:endParaRPr lang="en-US"/>
           </a:p>
@@ -8981,7 +9365,7 @@
           <a:p>
             <a:fld id="{FBE4F224-7315-44B6-BB36-41F6486955CF}" type="datetimeFigureOut">
               <a:rPr lang="en-US" smtClean="0"/>
-              <a:t>7/24/2023</a:t>
+              <a:t>7/26/2023</a:t>
             </a:fld>
             <a:endParaRPr lang="en-US"/>
           </a:p>
@@ -9076,7 +9460,7 @@
           <a:p>
             <a:fld id="{FBE4F224-7315-44B6-BB36-41F6486955CF}" type="datetimeFigureOut">
               <a:rPr lang="en-US" smtClean="0"/>
-              <a:t>7/24/2023</a:t>
+              <a:t>7/26/2023</a:t>
             </a:fld>
             <a:endParaRPr lang="en-US"/>
           </a:p>
@@ -9325,7 +9709,7 @@
           <a:p>
             <a:fld id="{FBE4F224-7315-44B6-BB36-41F6486955CF}" type="datetimeFigureOut">
               <a:rPr lang="en-US" smtClean="0"/>
-              <a:t>7/24/2023</a:t>
+              <a:t>7/26/2023</a:t>
             </a:fld>
             <a:endParaRPr lang="en-US"/>
           </a:p>
@@ -9605,7 +9989,7 @@
           <a:p>
             <a:fld id="{FBE4F224-7315-44B6-BB36-41F6486955CF}" type="datetimeFigureOut">
               <a:rPr lang="en-US" smtClean="0"/>
-              <a:t>7/24/2023</a:t>
+              <a:t>7/26/2023</a:t>
             </a:fld>
             <a:endParaRPr lang="en-US"/>
           </a:p>
@@ -12682,7 +13066,7 @@
           <a:p>
             <a:fld id="{FBE4F224-7315-44B6-BB36-41F6486955CF}" type="datetimeFigureOut">
               <a:rPr lang="en-US" smtClean="0"/>
-              <a:t>7/24/2023</a:t>
+              <a:t>7/26/2023</a:t>
             </a:fld>
             <a:endParaRPr lang="en-US"/>
           </a:p>
@@ -18113,18 +18497,13 @@
             <a:pPr algn="ctr"/>
             <a:r>
               <a:rPr lang="en-US" sz="4000" dirty="0"/>
-              <a:t>Introduction to </a:t>
+              <a:t>Introduction to Pinns</a:t>
             </a:r>
-            <a:r>
-              <a:rPr lang="en-US" sz="4000" dirty="0" err="1"/>
-              <a:t>Pinns</a:t>
-            </a:r>
-            <a:endParaRPr lang="en-US" sz="4000" dirty="0"/>
           </a:p>
         </p:txBody>
       </p:sp>
-      <mc:AlternateContent xmlns:mc="http://schemas.openxmlformats.org/markup-compatibility/2006">
-        <mc:Choice xmlns:a14="http://schemas.microsoft.com/office/drawing/2010/main" Requires="a14">
+      <mc:AlternateContent xmlns:mc="http://schemas.openxmlformats.org/markup-compatibility/2006" xmlns:a14="http://schemas.microsoft.com/office/drawing/2010/main">
+        <mc:Choice Requires="a14">
           <p:sp>
             <p:nvSpPr>
               <p:cNvPr id="3" name="Content Placeholder 2">
@@ -18642,7 +19021,7 @@
             </p:txBody>
           </p:sp>
         </mc:Choice>
-        <mc:Fallback>
+        <mc:Fallback xmlns="">
           <p:sp>
             <p:nvSpPr>
               <p:cNvPr id="3" name="Content Placeholder 2">
@@ -22274,13 +22653,8 @@
             <a:pPr algn="ctr"/>
             <a:r>
               <a:rPr lang="en-US" sz="4000" dirty="0"/>
-              <a:t>Introduction to </a:t>
+              <a:t>Introduction to Pinns</a:t>
             </a:r>
-            <a:r>
-              <a:rPr lang="en-US" sz="4000" dirty="0" err="1"/>
-              <a:t>Pinns</a:t>
-            </a:r>
-            <a:endParaRPr lang="en-US" sz="4000" dirty="0"/>
           </a:p>
         </p:txBody>
       </p:sp>
@@ -23701,8 +24075,8 @@
         </p:nvCxnSpPr>
         <p:spPr>
           <a:xfrm rot="5400000" flipH="1" flipV="1">
-            <a:off x="5788011" y="2744668"/>
-            <a:ext cx="672731" cy="921607"/>
+            <a:off x="5864975" y="2833938"/>
+            <a:ext cx="506497" cy="909300"/>
           </a:xfrm>
           <a:prstGeom prst="curvedConnector2">
             <a:avLst/>
@@ -24201,7 +24575,7 @@
             </p:nvSpPr>
             <p:spPr>
               <a:xfrm>
-                <a:off x="6585180" y="2592106"/>
+                <a:off x="6572873" y="2758340"/>
                 <a:ext cx="2681134" cy="553998"/>
               </a:xfrm>
               <a:prstGeom prst="rect">
@@ -24325,7 +24699,7 @@
             </p:nvSpPr>
             <p:spPr>
               <a:xfrm>
-                <a:off x="6585180" y="2592106"/>
+                <a:off x="6572873" y="2758340"/>
                 <a:ext cx="2681134" cy="553998"/>
               </a:xfrm>
               <a:prstGeom prst="rect">
@@ -24371,8 +24745,8 @@
         </p:nvCxnSpPr>
         <p:spPr>
           <a:xfrm>
-            <a:off x="9266314" y="2869105"/>
-            <a:ext cx="881561" cy="810331"/>
+            <a:off x="9254007" y="3035339"/>
+            <a:ext cx="893868" cy="644097"/>
           </a:xfrm>
           <a:prstGeom prst="curvedConnector2">
             <a:avLst/>
@@ -24845,13 +25219,14 @@
           <p:cNvCxnSpPr>
             <a:cxnSpLocks/>
             <a:stCxn id="1055" idx="2"/>
+            <a:endCxn id="1104" idx="3"/>
           </p:cNvCxnSpPr>
           <p:nvPr/>
         </p:nvCxnSpPr>
         <p:spPr>
           <a:xfrm rot="5400000">
-            <a:off x="9261348" y="3750818"/>
-            <a:ext cx="1814125" cy="2561070"/>
+            <a:off x="9190856" y="3700612"/>
+            <a:ext cx="1834410" cy="2681769"/>
           </a:xfrm>
           <a:prstGeom prst="curvedConnector2">
             <a:avLst/>
@@ -25116,6 +25491,202 @@
           </a:p>
         </p:txBody>
       </p:sp>
+      <p:cxnSp>
+        <p:nvCxnSpPr>
+          <p:cNvPr id="9" name="Connector: Curved 8">
+            <a:extLst>
+              <a:ext uri="{FF2B5EF4-FFF2-40B4-BE49-F238E27FC236}">
+                <a16:creationId xmlns:a16="http://schemas.microsoft.com/office/drawing/2014/main" id="{CDBE8D40-9DEA-F154-7E42-FAD45CE99BA5}"/>
+              </a:ext>
+            </a:extLst>
+          </p:cNvPr>
+          <p:cNvCxnSpPr>
+            <a:cxnSpLocks/>
+            <a:stCxn id="1067" idx="3"/>
+            <a:endCxn id="40" idx="1"/>
+          </p:cNvCxnSpPr>
+          <p:nvPr/>
+        </p:nvCxnSpPr>
+        <p:spPr>
+          <a:xfrm>
+            <a:off x="3663578" y="1955984"/>
+            <a:ext cx="3732389" cy="367078"/>
+          </a:xfrm>
+          <a:prstGeom prst="curvedConnector3">
+            <a:avLst>
+              <a:gd name="adj1" fmla="val 50000"/>
+            </a:avLst>
+          </a:prstGeom>
+          <a:ln w="25400">
+            <a:tailEnd type="stealth" w="lg" len="lg"/>
+          </a:ln>
+        </p:spPr>
+        <p:style>
+          <a:lnRef idx="3">
+            <a:schemeClr val="dk1"/>
+          </a:lnRef>
+          <a:fillRef idx="0">
+            <a:schemeClr val="dk1"/>
+          </a:fillRef>
+          <a:effectRef idx="2">
+            <a:schemeClr val="dk1"/>
+          </a:effectRef>
+          <a:fontRef idx="minor">
+            <a:schemeClr val="tx1"/>
+          </a:fontRef>
+        </p:style>
+      </p:cxnSp>
+      <mc:AlternateContent xmlns:mc="http://schemas.openxmlformats.org/markup-compatibility/2006" xmlns:a14="http://schemas.microsoft.com/office/drawing/2010/main">
+        <mc:Choice Requires="a14">
+          <p:sp>
+            <p:nvSpPr>
+              <p:cNvPr id="40" name="TextBox 39">
+                <a:extLst>
+                  <a:ext uri="{FF2B5EF4-FFF2-40B4-BE49-F238E27FC236}">
+                    <a16:creationId xmlns:a16="http://schemas.microsoft.com/office/drawing/2014/main" id="{DF186FD0-F3B2-CE98-92F0-80E3DB13E3C8}"/>
+                  </a:ext>
+                </a:extLst>
+              </p:cNvPr>
+              <p:cNvSpPr txBox="1"/>
+              <p:nvPr/>
+            </p:nvSpPr>
+            <p:spPr>
+              <a:xfrm>
+                <a:off x="7395967" y="2046063"/>
+                <a:ext cx="661752" cy="553998"/>
+              </a:xfrm>
+              <a:prstGeom prst="rect">
+                <a:avLst/>
+              </a:prstGeom>
+              <a:noFill/>
+            </p:spPr>
+            <p:txBody>
+              <a:bodyPr wrap="square" rtlCol="0">
+                <a:spAutoFit/>
+              </a:bodyPr>
+              <a:lstStyle/>
+              <a:p>
+                <a:pPr/>
+                <a14:m>
+                  <m:oMathPara xmlns:m="http://schemas.openxmlformats.org/officeDocument/2006/math">
+                    <m:oMathParaPr>
+                      <m:jc m:val="centerGroup"/>
+                    </m:oMathParaPr>
+                    <m:oMath xmlns:m="http://schemas.openxmlformats.org/officeDocument/2006/math">
+                      <m:r>
+                        <a:rPr lang="en-US" sz="3000" b="0" i="1" smtClean="0">
+                          <a:latin typeface="Cambria Math" panose="02040503050406030204" pitchFamily="18" charset="0"/>
+                        </a:rPr>
+                        <m:t>|</m:t>
+                      </m:r>
+                      <m:r>
+                        <a:rPr lang="en-US" sz="3000" b="0" i="1" smtClean="0">
+                          <a:latin typeface="Cambria Math" panose="02040503050406030204" pitchFamily="18" charset="0"/>
+                        </a:rPr>
+                        <m:t>h</m:t>
+                      </m:r>
+                      <m:r>
+                        <a:rPr lang="en-US" sz="3000" b="0" i="1" smtClean="0">
+                          <a:latin typeface="Cambria Math" panose="02040503050406030204" pitchFamily="18" charset="0"/>
+                        </a:rPr>
+                        <m:t>|</m:t>
+                      </m:r>
+                    </m:oMath>
+                  </m:oMathPara>
+                </a14:m>
+                <a:endParaRPr lang="en-US" sz="3000" dirty="0"/>
+              </a:p>
+            </p:txBody>
+          </p:sp>
+        </mc:Choice>
+        <mc:Fallback xmlns="">
+          <p:sp>
+            <p:nvSpPr>
+              <p:cNvPr id="40" name="TextBox 39">
+                <a:extLst>
+                  <a:ext uri="{FF2B5EF4-FFF2-40B4-BE49-F238E27FC236}">
+                    <a16:creationId xmlns:a16="http://schemas.microsoft.com/office/drawing/2014/main" id="{DF186FD0-F3B2-CE98-92F0-80E3DB13E3C8}"/>
+                  </a:ext>
+                </a:extLst>
+              </p:cNvPr>
+              <p:cNvSpPr txBox="1">
+                <a:spLocks noRot="1" noChangeAspect="1" noMove="1" noResize="1" noEditPoints="1" noAdjustHandles="1" noChangeArrowheads="1" noChangeShapeType="1" noTextEdit="1"/>
+              </p:cNvSpPr>
+              <p:nvPr/>
+            </p:nvSpPr>
+            <p:spPr>
+              <a:xfrm>
+                <a:off x="7395967" y="2046063"/>
+                <a:ext cx="661752" cy="553998"/>
+              </a:xfrm>
+              <a:prstGeom prst="rect">
+                <a:avLst/>
+              </a:prstGeom>
+              <a:blipFill>
+                <a:blip r:embed="rId18"/>
+                <a:stretch>
+                  <a:fillRect/>
+                </a:stretch>
+              </a:blipFill>
+            </p:spPr>
+            <p:txBody>
+              <a:bodyPr/>
+              <a:lstStyle/>
+              <a:p>
+                <a:r>
+                  <a:rPr lang="en-US">
+                    <a:noFill/>
+                  </a:rPr>
+                  <a:t> </a:t>
+                </a:r>
+              </a:p>
+            </p:txBody>
+          </p:sp>
+        </mc:Fallback>
+      </mc:AlternateContent>
+      <p:cxnSp>
+        <p:nvCxnSpPr>
+          <p:cNvPr id="60" name="Connector: Curved 59">
+            <a:extLst>
+              <a:ext uri="{FF2B5EF4-FFF2-40B4-BE49-F238E27FC236}">
+                <a16:creationId xmlns:a16="http://schemas.microsoft.com/office/drawing/2014/main" id="{5F123E13-2DF7-D448-E563-813772C4797C}"/>
+              </a:ext>
+            </a:extLst>
+          </p:cNvPr>
+          <p:cNvCxnSpPr>
+            <a:cxnSpLocks/>
+            <a:stCxn id="40" idx="3"/>
+            <a:endCxn id="1070" idx="0"/>
+          </p:cNvCxnSpPr>
+          <p:nvPr/>
+        </p:nvCxnSpPr>
+        <p:spPr>
+          <a:xfrm>
+            <a:off x="8057719" y="2323062"/>
+            <a:ext cx="2090156" cy="1356374"/>
+          </a:xfrm>
+          <a:prstGeom prst="curvedConnector2">
+            <a:avLst/>
+          </a:prstGeom>
+          <a:ln w="25400">
+            <a:tailEnd type="stealth" w="lg" len="lg"/>
+          </a:ln>
+        </p:spPr>
+        <p:style>
+          <a:lnRef idx="3">
+            <a:schemeClr val="dk1"/>
+          </a:lnRef>
+          <a:fillRef idx="0">
+            <a:schemeClr val="dk1"/>
+          </a:fillRef>
+          <a:effectRef idx="2">
+            <a:schemeClr val="dk1"/>
+          </a:effectRef>
+          <a:fontRef idx="minor">
+            <a:schemeClr val="tx1"/>
+          </a:fontRef>
+        </p:style>
+      </p:cxnSp>
     </p:spTree>
     <p:extLst>
       <p:ext uri="{BB962C8B-B14F-4D97-AF65-F5344CB8AC3E}">
@@ -27742,22 +28313,3658 @@
             <a:pPr algn="ctr"/>
             <a:r>
               <a:rPr lang="en-US" sz="4000" dirty="0"/>
-              <a:t>Challenges in training </a:t>
+              <a:t>Challenges in training PInns</a:t>
             </a:r>
-            <a:r>
-              <a:rPr lang="en-US" sz="4000" dirty="0" err="1"/>
-              <a:t>PInns</a:t>
-            </a:r>
-            <a:endParaRPr lang="en-US" sz="4000" dirty="0"/>
           </a:p>
         </p:txBody>
       </p:sp>
+      <p:pic>
+        <p:nvPicPr>
+          <p:cNvPr id="5" name="Content Placeholder 4" descr="Chart, line chart&#10;&#10;Description automatically generated">
+            <a:extLst>
+              <a:ext uri="{FF2B5EF4-FFF2-40B4-BE49-F238E27FC236}">
+                <a16:creationId xmlns:a16="http://schemas.microsoft.com/office/drawing/2014/main" id="{2DF8B08F-39FC-2662-FB6F-C656746E5153}"/>
+              </a:ext>
+            </a:extLst>
+          </p:cNvPr>
+          <p:cNvPicPr>
+            <a:picLocks noGrp="1" noChangeAspect="1"/>
+          </p:cNvPicPr>
+          <p:nvPr>
+            <p:ph idx="1"/>
+          </p:nvPr>
+        </p:nvPicPr>
+        <p:blipFill>
+          <a:blip r:embed="rId4">
+            <a:extLst>
+              <a:ext uri="{28A0092B-C50C-407E-A947-70E740481C1C}">
+                <a14:useLocalDpi xmlns:a14="http://schemas.microsoft.com/office/drawing/2010/main" val="0"/>
+              </a:ext>
+            </a:extLst>
+          </a:blip>
+          <a:stretch>
+            <a:fillRect/>
+          </a:stretch>
+        </p:blipFill>
+        <p:spPr>
+          <a:xfrm>
+            <a:off x="2173025" y="1963051"/>
+            <a:ext cx="8017401" cy="3006525"/>
+          </a:xfrm>
+        </p:spPr>
+      </p:pic>
+      <p:grpSp>
+        <p:nvGrpSpPr>
+          <p:cNvPr id="41" name="Group 40">
+            <a:extLst>
+              <a:ext uri="{FF2B5EF4-FFF2-40B4-BE49-F238E27FC236}">
+                <a16:creationId xmlns:a16="http://schemas.microsoft.com/office/drawing/2014/main" id="{8DB4BB99-C854-45F9-BED1-63D15E3A2411}"/>
+              </a:ext>
+              <a:ext uri="{C183D7F6-B498-43B3-948B-1728B52AA6E4}">
+                <adec:decorative xmlns:adec="http://schemas.microsoft.com/office/drawing/2017/decorative" val="1"/>
+              </a:ext>
+            </a:extLst>
+          </p:cNvPr>
+          <p:cNvGrpSpPr>
+            <a:grpSpLocks noGrp="1" noUngrp="1" noRot="1" noChangeAspect="1" noMove="1" noResize="1"/>
+          </p:cNvGrpSpPr>
+          <p:nvPr>
+            <p:extLst>
+              <p:ext uri="{386F3935-93C4-4BCD-93E2-E3B085C9AB24}">
+                <p16:designElem xmlns:p16="http://schemas.microsoft.com/office/powerpoint/2015/main" val="1"/>
+              </p:ext>
+            </p:extLst>
+          </p:nvPr>
+        </p:nvGrpSpPr>
+        <p:grpSpPr>
+          <a:xfrm>
+            <a:off x="11364912" y="0"/>
+            <a:ext cx="674688" cy="6848476"/>
+            <a:chOff x="11364912" y="0"/>
+            <a:chExt cx="674688" cy="6848476"/>
+          </a:xfrm>
+          <a:solidFill>
+            <a:schemeClr val="tx2">
+              <a:alpha val="45000"/>
+            </a:schemeClr>
+          </a:solidFill>
+        </p:grpSpPr>
+        <p:sp>
+          <p:nvSpPr>
+            <p:cNvPr id="42" name="Freeform 32">
+              <a:extLst>
+                <a:ext uri="{FF2B5EF4-FFF2-40B4-BE49-F238E27FC236}">
+                  <a16:creationId xmlns:a16="http://schemas.microsoft.com/office/drawing/2014/main" id="{5D1CCC4C-284C-4BF6-97D9-D9746746348F}"/>
+                </a:ext>
+                <a:ext uri="{C183D7F6-B498-43B3-948B-1728B52AA6E4}">
+                  <adec:decorative xmlns:adec="http://schemas.microsoft.com/office/drawing/2017/decorative" val="1"/>
+                </a:ext>
+              </a:extLst>
+            </p:cNvPr>
+            <p:cNvSpPr/>
+            <p:nvPr>
+              <p:extLst>
+                <p:ext uri="{386F3935-93C4-4BCD-93E2-E3B085C9AB24}">
+                  <p16:designElem xmlns:p16="http://schemas.microsoft.com/office/powerpoint/2015/main" val="1"/>
+                </p:ext>
+              </p:extLst>
+            </p:nvPr>
+          </p:nvSpPr>
+          <p:spPr bwMode="auto">
+            <a:xfrm>
+              <a:off x="11483975" y="0"/>
+              <a:ext cx="417513" cy="512763"/>
+            </a:xfrm>
+            <a:custGeom>
+              <a:avLst/>
+              <a:gdLst/>
+              <a:ahLst/>
+              <a:cxnLst/>
+              <a:rect l="0" t="0" r="r" b="b"/>
+              <a:pathLst>
+                <a:path w="263" h="323">
+                  <a:moveTo>
+                    <a:pt x="12" y="323"/>
+                  </a:moveTo>
+                  <a:lnTo>
+                    <a:pt x="0" y="314"/>
+                  </a:lnTo>
+                  <a:lnTo>
+                    <a:pt x="203" y="108"/>
+                  </a:lnTo>
+                  <a:lnTo>
+                    <a:pt x="248" y="0"/>
+                  </a:lnTo>
+                  <a:lnTo>
+                    <a:pt x="263" y="6"/>
+                  </a:lnTo>
+                  <a:lnTo>
+                    <a:pt x="218" y="117"/>
+                  </a:lnTo>
+                  <a:lnTo>
+                    <a:pt x="218" y="117"/>
+                  </a:lnTo>
+                  <a:lnTo>
+                    <a:pt x="12" y="323"/>
+                  </a:lnTo>
+                  <a:close/>
+                </a:path>
+              </a:pathLst>
+            </a:custGeom>
+            <a:grpFill/>
+            <a:ln>
+              <a:noFill/>
+            </a:ln>
+            <a:extLst>
+              <a:ext uri="{91240B29-F687-4f45-9708-019B960494DF}">
+                <a14:hiddenLine xmlns:a14="http://schemas.microsoft.com/office/drawing/2010/main" xmlns:p14="http://schemas.microsoft.com/office/powerpoint/2010/main" xmlns:a16="http://schemas.microsoft.com/office/drawing/2014/main" xmlns="" w="9525">
+                  <a:solidFill>
+                    <a:srgbClr val="000000"/>
+                  </a:solidFill>
+                  <a:round/>
+                  <a:headEnd/>
+                  <a:tailEnd/>
+                </a14:hiddenLine>
+              </a:ext>
+            </a:extLst>
+          </p:spPr>
+        </p:sp>
+        <p:sp>
+          <p:nvSpPr>
+            <p:cNvPr id="43" name="Freeform 33">
+              <a:extLst>
+                <a:ext uri="{FF2B5EF4-FFF2-40B4-BE49-F238E27FC236}">
+                  <a16:creationId xmlns:a16="http://schemas.microsoft.com/office/drawing/2014/main" id="{35D82D1B-EB09-4028-9107-D60B547C7B42}"/>
+                </a:ext>
+                <a:ext uri="{C183D7F6-B498-43B3-948B-1728B52AA6E4}">
+                  <adec:decorative xmlns:adec="http://schemas.microsoft.com/office/drawing/2017/decorative" val="1"/>
+                </a:ext>
+              </a:extLst>
+            </p:cNvPr>
+            <p:cNvSpPr>
+              <a:spLocks noEditPoints="1"/>
+            </p:cNvSpPr>
+            <p:nvPr>
+              <p:extLst>
+                <p:ext uri="{386F3935-93C4-4BCD-93E2-E3B085C9AB24}">
+                  <p16:designElem xmlns:p16="http://schemas.microsoft.com/office/powerpoint/2015/main" val="1"/>
+                </p:ext>
+              </p:extLst>
+            </p:nvPr>
+          </p:nvSpPr>
+          <p:spPr bwMode="auto">
+            <a:xfrm>
+              <a:off x="11364912" y="474663"/>
+              <a:ext cx="157163" cy="152400"/>
+            </a:xfrm>
+            <a:custGeom>
+              <a:avLst/>
+              <a:gdLst/>
+              <a:ahLst/>
+              <a:cxnLst/>
+              <a:rect l="0" t="0" r="r" b="b"/>
+              <a:pathLst>
+                <a:path w="33" h="32">
+                  <a:moveTo>
+                    <a:pt x="17" y="32"/>
+                  </a:moveTo>
+                  <a:cubicBezTo>
+                    <a:pt x="13" y="32"/>
+                    <a:pt x="9" y="30"/>
+                    <a:pt x="6" y="27"/>
+                  </a:cubicBezTo>
+                  <a:cubicBezTo>
+                    <a:pt x="0" y="21"/>
+                    <a:pt x="0" y="11"/>
+                    <a:pt x="6" y="5"/>
+                  </a:cubicBezTo>
+                  <a:cubicBezTo>
+                    <a:pt x="9" y="2"/>
+                    <a:pt x="13" y="0"/>
+                    <a:pt x="17" y="0"/>
+                  </a:cubicBezTo>
+                  <a:cubicBezTo>
+                    <a:pt x="21" y="0"/>
+                    <a:pt x="25" y="2"/>
+                    <a:pt x="28" y="5"/>
+                  </a:cubicBezTo>
+                  <a:cubicBezTo>
+                    <a:pt x="31" y="8"/>
+                    <a:pt x="33" y="12"/>
+                    <a:pt x="33" y="16"/>
+                  </a:cubicBezTo>
+                  <a:cubicBezTo>
+                    <a:pt x="33" y="20"/>
+                    <a:pt x="31" y="24"/>
+                    <a:pt x="28" y="27"/>
+                  </a:cubicBezTo>
+                  <a:cubicBezTo>
+                    <a:pt x="25" y="30"/>
+                    <a:pt x="21" y="32"/>
+                    <a:pt x="17" y="32"/>
+                  </a:cubicBezTo>
+                  <a:close/>
+                  <a:moveTo>
+                    <a:pt x="17" y="4"/>
+                  </a:moveTo>
+                  <a:cubicBezTo>
+                    <a:pt x="14" y="4"/>
+                    <a:pt x="11" y="6"/>
+                    <a:pt x="9" y="8"/>
+                  </a:cubicBezTo>
+                  <a:cubicBezTo>
+                    <a:pt x="4" y="12"/>
+                    <a:pt x="4" y="20"/>
+                    <a:pt x="9" y="24"/>
+                  </a:cubicBezTo>
+                  <a:cubicBezTo>
+                    <a:pt x="11" y="27"/>
+                    <a:pt x="14" y="28"/>
+                    <a:pt x="17" y="28"/>
+                  </a:cubicBezTo>
+                  <a:cubicBezTo>
+                    <a:pt x="20" y="28"/>
+                    <a:pt x="23" y="27"/>
+                    <a:pt x="26" y="24"/>
+                  </a:cubicBezTo>
+                  <a:cubicBezTo>
+                    <a:pt x="30" y="20"/>
+                    <a:pt x="30" y="12"/>
+                    <a:pt x="26" y="8"/>
+                  </a:cubicBezTo>
+                  <a:cubicBezTo>
+                    <a:pt x="23" y="6"/>
+                    <a:pt x="20" y="4"/>
+                    <a:pt x="17" y="4"/>
+                  </a:cubicBezTo>
+                  <a:close/>
+                </a:path>
+              </a:pathLst>
+            </a:custGeom>
+            <a:grpFill/>
+            <a:ln>
+              <a:noFill/>
+            </a:ln>
+            <a:extLst>
+              <a:ext uri="{91240B29-F687-4f45-9708-019B960494DF}">
+                <a14:hiddenLine xmlns:a14="http://schemas.microsoft.com/office/drawing/2010/main" xmlns:p14="http://schemas.microsoft.com/office/powerpoint/2010/main" xmlns:a16="http://schemas.microsoft.com/office/drawing/2014/main" xmlns="" w="9525">
+                  <a:solidFill>
+                    <a:srgbClr val="000000"/>
+                  </a:solidFill>
+                  <a:round/>
+                  <a:headEnd/>
+                  <a:tailEnd/>
+                </a14:hiddenLine>
+              </a:ext>
+            </a:extLst>
+          </p:spPr>
+        </p:sp>
+        <p:sp>
+          <p:nvSpPr>
+            <p:cNvPr id="44" name="Freeform 34">
+              <a:extLst>
+                <a:ext uri="{FF2B5EF4-FFF2-40B4-BE49-F238E27FC236}">
+                  <a16:creationId xmlns:a16="http://schemas.microsoft.com/office/drawing/2014/main" id="{1389EE93-8059-437E-8507-7557AD68FB1D}"/>
+                </a:ext>
+                <a:ext uri="{C183D7F6-B498-43B3-948B-1728B52AA6E4}">
+                  <adec:decorative xmlns:adec="http://schemas.microsoft.com/office/drawing/2017/decorative" val="1"/>
+                </a:ext>
+              </a:extLst>
+            </p:cNvPr>
+            <p:cNvSpPr>
+              <a:spLocks noEditPoints="1"/>
+            </p:cNvSpPr>
+            <p:nvPr>
+              <p:extLst>
+                <p:ext uri="{386F3935-93C4-4BCD-93E2-E3B085C9AB24}">
+                  <p16:designElem xmlns:p16="http://schemas.microsoft.com/office/powerpoint/2015/main" val="1"/>
+                </p:ext>
+              </p:extLst>
+            </p:nvPr>
+          </p:nvSpPr>
+          <p:spPr bwMode="auto">
+            <a:xfrm>
+              <a:off x="11631612" y="1539875"/>
+              <a:ext cx="188913" cy="190500"/>
+            </a:xfrm>
+            <a:custGeom>
+              <a:avLst/>
+              <a:gdLst/>
+              <a:ahLst/>
+              <a:cxnLst/>
+              <a:rect l="0" t="0" r="r" b="b"/>
+              <a:pathLst>
+                <a:path w="40" h="40">
+                  <a:moveTo>
+                    <a:pt x="20" y="40"/>
+                  </a:moveTo>
+                  <a:cubicBezTo>
+                    <a:pt x="9" y="40"/>
+                    <a:pt x="0" y="31"/>
+                    <a:pt x="0" y="20"/>
+                  </a:cubicBezTo>
+                  <a:cubicBezTo>
+                    <a:pt x="0" y="9"/>
+                    <a:pt x="9" y="0"/>
+                    <a:pt x="20" y="0"/>
+                  </a:cubicBezTo>
+                  <a:cubicBezTo>
+                    <a:pt x="31" y="0"/>
+                    <a:pt x="40" y="9"/>
+                    <a:pt x="40" y="20"/>
+                  </a:cubicBezTo>
+                  <a:cubicBezTo>
+                    <a:pt x="40" y="31"/>
+                    <a:pt x="31" y="40"/>
+                    <a:pt x="20" y="40"/>
+                  </a:cubicBezTo>
+                  <a:close/>
+                  <a:moveTo>
+                    <a:pt x="20" y="4"/>
+                  </a:moveTo>
+                  <a:cubicBezTo>
+                    <a:pt x="11" y="4"/>
+                    <a:pt x="4" y="11"/>
+                    <a:pt x="4" y="20"/>
+                  </a:cubicBezTo>
+                  <a:cubicBezTo>
+                    <a:pt x="4" y="29"/>
+                    <a:pt x="11" y="36"/>
+                    <a:pt x="20" y="36"/>
+                  </a:cubicBezTo>
+                  <a:cubicBezTo>
+                    <a:pt x="29" y="36"/>
+                    <a:pt x="36" y="29"/>
+                    <a:pt x="36" y="20"/>
+                  </a:cubicBezTo>
+                  <a:cubicBezTo>
+                    <a:pt x="36" y="11"/>
+                    <a:pt x="29" y="4"/>
+                    <a:pt x="20" y="4"/>
+                  </a:cubicBezTo>
+                  <a:close/>
+                </a:path>
+              </a:pathLst>
+            </a:custGeom>
+            <a:grpFill/>
+            <a:ln>
+              <a:noFill/>
+            </a:ln>
+            <a:extLst>
+              <a:ext uri="{91240B29-F687-4f45-9708-019B960494DF}">
+                <a14:hiddenLine xmlns:a14="http://schemas.microsoft.com/office/drawing/2010/main" xmlns:p14="http://schemas.microsoft.com/office/powerpoint/2010/main" xmlns:a16="http://schemas.microsoft.com/office/drawing/2014/main" xmlns="" w="9525">
+                  <a:solidFill>
+                    <a:srgbClr val="000000"/>
+                  </a:solidFill>
+                  <a:round/>
+                  <a:headEnd/>
+                  <a:tailEnd/>
+                </a14:hiddenLine>
+              </a:ext>
+            </a:extLst>
+          </p:spPr>
+        </p:sp>
+        <p:sp>
+          <p:nvSpPr>
+            <p:cNvPr id="45" name="Freeform 35">
+              <a:extLst>
+                <a:ext uri="{FF2B5EF4-FFF2-40B4-BE49-F238E27FC236}">
+                  <a16:creationId xmlns:a16="http://schemas.microsoft.com/office/drawing/2014/main" id="{377C05DC-75FF-4426-A34F-DBF0C7E7BEF4}"/>
+                </a:ext>
+                <a:ext uri="{C183D7F6-B498-43B3-948B-1728B52AA6E4}">
+                  <adec:decorative xmlns:adec="http://schemas.microsoft.com/office/drawing/2017/decorative" val="1"/>
+                </a:ext>
+              </a:extLst>
+            </p:cNvPr>
+            <p:cNvSpPr/>
+            <p:nvPr>
+              <p:extLst>
+                <p:ext uri="{386F3935-93C4-4BCD-93E2-E3B085C9AB24}">
+                  <p16:designElem xmlns:p16="http://schemas.microsoft.com/office/powerpoint/2015/main" val="1"/>
+                </p:ext>
+              </p:extLst>
+            </p:nvPr>
+          </p:nvSpPr>
+          <p:spPr bwMode="auto">
+            <a:xfrm>
+              <a:off x="11531600" y="5694363"/>
+              <a:ext cx="298450" cy="1154113"/>
+            </a:xfrm>
+            <a:custGeom>
+              <a:avLst/>
+              <a:gdLst/>
+              <a:ahLst/>
+              <a:cxnLst/>
+              <a:rect l="0" t="0" r="r" b="b"/>
+              <a:pathLst>
+                <a:path w="188" h="727">
+                  <a:moveTo>
+                    <a:pt x="15" y="727"/>
+                  </a:moveTo>
+                  <a:lnTo>
+                    <a:pt x="0" y="727"/>
+                  </a:lnTo>
+                  <a:lnTo>
+                    <a:pt x="0" y="407"/>
+                  </a:lnTo>
+                  <a:lnTo>
+                    <a:pt x="0" y="407"/>
+                  </a:lnTo>
+                  <a:lnTo>
+                    <a:pt x="176" y="0"/>
+                  </a:lnTo>
+                  <a:lnTo>
+                    <a:pt x="188" y="6"/>
+                  </a:lnTo>
+                  <a:lnTo>
+                    <a:pt x="15" y="410"/>
+                  </a:lnTo>
+                  <a:lnTo>
+                    <a:pt x="15" y="727"/>
+                  </a:lnTo>
+                  <a:close/>
+                </a:path>
+              </a:pathLst>
+            </a:custGeom>
+            <a:grpFill/>
+            <a:ln>
+              <a:noFill/>
+            </a:ln>
+            <a:extLst>
+              <a:ext uri="{91240B29-F687-4f45-9708-019B960494DF}">
+                <a14:hiddenLine xmlns:a14="http://schemas.microsoft.com/office/drawing/2010/main" xmlns:p14="http://schemas.microsoft.com/office/powerpoint/2010/main" xmlns:a16="http://schemas.microsoft.com/office/drawing/2014/main" xmlns="" w="9525">
+                  <a:solidFill>
+                    <a:srgbClr val="000000"/>
+                  </a:solidFill>
+                  <a:round/>
+                  <a:headEnd/>
+                  <a:tailEnd/>
+                </a14:hiddenLine>
+              </a:ext>
+            </a:extLst>
+          </p:spPr>
+        </p:sp>
+        <p:sp>
+          <p:nvSpPr>
+            <p:cNvPr id="46" name="Freeform 36">
+              <a:extLst>
+                <a:ext uri="{FF2B5EF4-FFF2-40B4-BE49-F238E27FC236}">
+                  <a16:creationId xmlns:a16="http://schemas.microsoft.com/office/drawing/2014/main" id="{03D385C8-866D-437D-91B1-2E3ECDD88E59}"/>
+                </a:ext>
+                <a:ext uri="{C183D7F6-B498-43B3-948B-1728B52AA6E4}">
+                  <adec:decorative xmlns:adec="http://schemas.microsoft.com/office/drawing/2017/decorative" val="1"/>
+                </a:ext>
+              </a:extLst>
+            </p:cNvPr>
+            <p:cNvSpPr>
+              <a:spLocks noEditPoints="1"/>
+            </p:cNvSpPr>
+            <p:nvPr>
+              <p:extLst>
+                <p:ext uri="{386F3935-93C4-4BCD-93E2-E3B085C9AB24}">
+                  <p16:designElem xmlns:p16="http://schemas.microsoft.com/office/powerpoint/2015/main" val="1"/>
+                </p:ext>
+              </p:extLst>
+            </p:nvPr>
+          </p:nvSpPr>
+          <p:spPr bwMode="auto">
+            <a:xfrm>
+              <a:off x="11772900" y="5551488"/>
+              <a:ext cx="157163" cy="155575"/>
+            </a:xfrm>
+            <a:custGeom>
+              <a:avLst/>
+              <a:gdLst/>
+              <a:ahLst/>
+              <a:cxnLst/>
+              <a:rect l="0" t="0" r="r" b="b"/>
+              <a:pathLst>
+                <a:path w="33" h="33">
+                  <a:moveTo>
+                    <a:pt x="17" y="33"/>
+                  </a:moveTo>
+                  <a:cubicBezTo>
+                    <a:pt x="8" y="33"/>
+                    <a:pt x="0" y="25"/>
+                    <a:pt x="0" y="16"/>
+                  </a:cubicBezTo>
+                  <a:cubicBezTo>
+                    <a:pt x="0" y="7"/>
+                    <a:pt x="8" y="0"/>
+                    <a:pt x="17" y="0"/>
+                  </a:cubicBezTo>
+                  <a:cubicBezTo>
+                    <a:pt x="26" y="0"/>
+                    <a:pt x="33" y="7"/>
+                    <a:pt x="33" y="16"/>
+                  </a:cubicBezTo>
+                  <a:cubicBezTo>
+                    <a:pt x="33" y="25"/>
+                    <a:pt x="26" y="33"/>
+                    <a:pt x="17" y="33"/>
+                  </a:cubicBezTo>
+                  <a:close/>
+                  <a:moveTo>
+                    <a:pt x="17" y="4"/>
+                  </a:moveTo>
+                  <a:cubicBezTo>
+                    <a:pt x="10" y="4"/>
+                    <a:pt x="4" y="9"/>
+                    <a:pt x="4" y="16"/>
+                  </a:cubicBezTo>
+                  <a:cubicBezTo>
+                    <a:pt x="4" y="23"/>
+                    <a:pt x="10" y="29"/>
+                    <a:pt x="17" y="29"/>
+                  </a:cubicBezTo>
+                  <a:cubicBezTo>
+                    <a:pt x="23" y="29"/>
+                    <a:pt x="29" y="23"/>
+                    <a:pt x="29" y="16"/>
+                  </a:cubicBezTo>
+                  <a:cubicBezTo>
+                    <a:pt x="29" y="9"/>
+                    <a:pt x="23" y="4"/>
+                    <a:pt x="17" y="4"/>
+                  </a:cubicBezTo>
+                  <a:close/>
+                </a:path>
+              </a:pathLst>
+            </a:custGeom>
+            <a:grpFill/>
+            <a:ln>
+              <a:noFill/>
+            </a:ln>
+            <a:extLst>
+              <a:ext uri="{91240B29-F687-4f45-9708-019B960494DF}">
+                <a14:hiddenLine xmlns:a14="http://schemas.microsoft.com/office/drawing/2010/main" xmlns:p14="http://schemas.microsoft.com/office/powerpoint/2010/main" xmlns:a16="http://schemas.microsoft.com/office/drawing/2014/main" xmlns="" w="9525">
+                  <a:solidFill>
+                    <a:srgbClr val="000000"/>
+                  </a:solidFill>
+                  <a:round/>
+                  <a:headEnd/>
+                  <a:tailEnd/>
+                </a14:hiddenLine>
+              </a:ext>
+            </a:extLst>
+          </p:spPr>
+        </p:sp>
+        <p:sp>
+          <p:nvSpPr>
+            <p:cNvPr id="47" name="Freeform 37">
+              <a:extLst>
+                <a:ext uri="{FF2B5EF4-FFF2-40B4-BE49-F238E27FC236}">
+                  <a16:creationId xmlns:a16="http://schemas.microsoft.com/office/drawing/2014/main" id="{3F649CBB-748F-4C79-A14F-C531C40B08BB}"/>
+                </a:ext>
+                <a:ext uri="{C183D7F6-B498-43B3-948B-1728B52AA6E4}">
+                  <adec:decorative xmlns:adec="http://schemas.microsoft.com/office/drawing/2017/decorative" val="1"/>
+                </a:ext>
+              </a:extLst>
+            </p:cNvPr>
+            <p:cNvSpPr/>
+            <p:nvPr>
+              <p:extLst>
+                <p:ext uri="{386F3935-93C4-4BCD-93E2-E3B085C9AB24}">
+                  <p16:designElem xmlns:p16="http://schemas.microsoft.com/office/powerpoint/2015/main" val="1"/>
+                </p:ext>
+              </p:extLst>
+            </p:nvPr>
+          </p:nvSpPr>
+          <p:spPr bwMode="auto">
+            <a:xfrm>
+              <a:off x="11710987" y="4763"/>
+              <a:ext cx="304800" cy="1544638"/>
+            </a:xfrm>
+            <a:custGeom>
+              <a:avLst/>
+              <a:gdLst/>
+              <a:ahLst/>
+              <a:cxnLst/>
+              <a:rect l="0" t="0" r="r" b="b"/>
+              <a:pathLst>
+                <a:path w="192" h="973">
+                  <a:moveTo>
+                    <a:pt x="15" y="973"/>
+                  </a:moveTo>
+                  <a:lnTo>
+                    <a:pt x="0" y="973"/>
+                  </a:lnTo>
+                  <a:lnTo>
+                    <a:pt x="0" y="790"/>
+                  </a:lnTo>
+                  <a:lnTo>
+                    <a:pt x="174" y="614"/>
+                  </a:lnTo>
+                  <a:lnTo>
+                    <a:pt x="174" y="0"/>
+                  </a:lnTo>
+                  <a:lnTo>
+                    <a:pt x="192" y="0"/>
+                  </a:lnTo>
+                  <a:lnTo>
+                    <a:pt x="192" y="620"/>
+                  </a:lnTo>
+                  <a:lnTo>
+                    <a:pt x="15" y="796"/>
+                  </a:lnTo>
+                  <a:lnTo>
+                    <a:pt x="15" y="973"/>
+                  </a:lnTo>
+                  <a:close/>
+                </a:path>
+              </a:pathLst>
+            </a:custGeom>
+            <a:grpFill/>
+            <a:ln>
+              <a:noFill/>
+            </a:ln>
+            <a:extLst>
+              <a:ext uri="{91240B29-F687-4f45-9708-019B960494DF}">
+                <a14:hiddenLine xmlns:a14="http://schemas.microsoft.com/office/drawing/2010/main" xmlns:p14="http://schemas.microsoft.com/office/powerpoint/2010/main" xmlns:a16="http://schemas.microsoft.com/office/drawing/2014/main" xmlns="" w="9525">
+                  <a:solidFill>
+                    <a:srgbClr val="000000"/>
+                  </a:solidFill>
+                  <a:round/>
+                  <a:headEnd/>
+                  <a:tailEnd/>
+                </a14:hiddenLine>
+              </a:ext>
+            </a:extLst>
+          </p:spPr>
+        </p:sp>
+        <p:sp>
+          <p:nvSpPr>
+            <p:cNvPr id="48" name="Freeform 38">
+              <a:extLst>
+                <a:ext uri="{FF2B5EF4-FFF2-40B4-BE49-F238E27FC236}">
+                  <a16:creationId xmlns:a16="http://schemas.microsoft.com/office/drawing/2014/main" id="{7F4622C0-84AF-41F1-9128-FE73CADD36F2}"/>
+                </a:ext>
+                <a:ext uri="{C183D7F6-B498-43B3-948B-1728B52AA6E4}">
+                  <adec:decorative xmlns:adec="http://schemas.microsoft.com/office/drawing/2017/decorative" val="1"/>
+                </a:ext>
+              </a:extLst>
+            </p:cNvPr>
+            <p:cNvSpPr>
+              <a:spLocks noEditPoints="1"/>
+            </p:cNvSpPr>
+            <p:nvPr>
+              <p:extLst>
+                <p:ext uri="{386F3935-93C4-4BCD-93E2-E3B085C9AB24}">
+                  <p16:designElem xmlns:p16="http://schemas.microsoft.com/office/powerpoint/2015/main" val="1"/>
+                </p:ext>
+              </p:extLst>
+            </p:nvPr>
+          </p:nvSpPr>
+          <p:spPr bwMode="auto">
+            <a:xfrm>
+              <a:off x="11636375" y="4867275"/>
+              <a:ext cx="188913" cy="188913"/>
+            </a:xfrm>
+            <a:custGeom>
+              <a:avLst/>
+              <a:gdLst/>
+              <a:ahLst/>
+              <a:cxnLst/>
+              <a:rect l="0" t="0" r="r" b="b"/>
+              <a:pathLst>
+                <a:path w="40" h="40">
+                  <a:moveTo>
+                    <a:pt x="20" y="40"/>
+                  </a:moveTo>
+                  <a:cubicBezTo>
+                    <a:pt x="9" y="40"/>
+                    <a:pt x="0" y="31"/>
+                    <a:pt x="0" y="20"/>
+                  </a:cubicBezTo>
+                  <a:cubicBezTo>
+                    <a:pt x="0" y="9"/>
+                    <a:pt x="9" y="0"/>
+                    <a:pt x="20" y="0"/>
+                  </a:cubicBezTo>
+                  <a:cubicBezTo>
+                    <a:pt x="31" y="0"/>
+                    <a:pt x="40" y="9"/>
+                    <a:pt x="40" y="20"/>
+                  </a:cubicBezTo>
+                  <a:cubicBezTo>
+                    <a:pt x="40" y="31"/>
+                    <a:pt x="31" y="40"/>
+                    <a:pt x="20" y="40"/>
+                  </a:cubicBezTo>
+                  <a:close/>
+                  <a:moveTo>
+                    <a:pt x="20" y="4"/>
+                  </a:moveTo>
+                  <a:cubicBezTo>
+                    <a:pt x="11" y="4"/>
+                    <a:pt x="4" y="11"/>
+                    <a:pt x="4" y="20"/>
+                  </a:cubicBezTo>
+                  <a:cubicBezTo>
+                    <a:pt x="4" y="29"/>
+                    <a:pt x="11" y="36"/>
+                    <a:pt x="20" y="36"/>
+                  </a:cubicBezTo>
+                  <a:cubicBezTo>
+                    <a:pt x="29" y="36"/>
+                    <a:pt x="36" y="29"/>
+                    <a:pt x="36" y="20"/>
+                  </a:cubicBezTo>
+                  <a:cubicBezTo>
+                    <a:pt x="36" y="11"/>
+                    <a:pt x="29" y="4"/>
+                    <a:pt x="20" y="4"/>
+                  </a:cubicBezTo>
+                  <a:close/>
+                </a:path>
+              </a:pathLst>
+            </a:custGeom>
+            <a:grpFill/>
+            <a:ln>
+              <a:noFill/>
+            </a:ln>
+            <a:extLst>
+              <a:ext uri="{91240B29-F687-4f45-9708-019B960494DF}">
+                <a14:hiddenLine xmlns:a14="http://schemas.microsoft.com/office/drawing/2010/main" xmlns:p14="http://schemas.microsoft.com/office/powerpoint/2010/main" xmlns:a16="http://schemas.microsoft.com/office/drawing/2014/main" xmlns="" w="9525">
+                  <a:solidFill>
+                    <a:srgbClr val="000000"/>
+                  </a:solidFill>
+                  <a:round/>
+                  <a:headEnd/>
+                  <a:tailEnd/>
+                </a14:hiddenLine>
+              </a:ext>
+            </a:extLst>
+          </p:spPr>
+        </p:sp>
+        <p:sp>
+          <p:nvSpPr>
+            <p:cNvPr id="49" name="Freeform 39">
+              <a:extLst>
+                <a:ext uri="{FF2B5EF4-FFF2-40B4-BE49-F238E27FC236}">
+                  <a16:creationId xmlns:a16="http://schemas.microsoft.com/office/drawing/2014/main" id="{CC6F29C1-A471-4CDE-8C21-E4B15C5EF47A}"/>
+                </a:ext>
+                <a:ext uri="{C183D7F6-B498-43B3-948B-1728B52AA6E4}">
+                  <adec:decorative xmlns:adec="http://schemas.microsoft.com/office/drawing/2017/decorative" val="1"/>
+                </a:ext>
+              </a:extLst>
+            </p:cNvPr>
+            <p:cNvSpPr/>
+            <p:nvPr>
+              <p:extLst>
+                <p:ext uri="{386F3935-93C4-4BCD-93E2-E3B085C9AB24}">
+                  <p16:designElem xmlns:p16="http://schemas.microsoft.com/office/powerpoint/2015/main" val="1"/>
+                </p:ext>
+              </p:extLst>
+            </p:nvPr>
+          </p:nvSpPr>
+          <p:spPr bwMode="auto">
+            <a:xfrm>
+              <a:off x="11441112" y="5046663"/>
+              <a:ext cx="307975" cy="1801813"/>
+            </a:xfrm>
+            <a:custGeom>
+              <a:avLst/>
+              <a:gdLst/>
+              <a:ahLst/>
+              <a:cxnLst/>
+              <a:rect l="0" t="0" r="r" b="b"/>
+              <a:pathLst>
+                <a:path w="194" h="1135">
+                  <a:moveTo>
+                    <a:pt x="18" y="1135"/>
+                  </a:moveTo>
+                  <a:lnTo>
+                    <a:pt x="0" y="1135"/>
+                  </a:lnTo>
+                  <a:lnTo>
+                    <a:pt x="0" y="354"/>
+                  </a:lnTo>
+                  <a:lnTo>
+                    <a:pt x="176" y="177"/>
+                  </a:lnTo>
+                  <a:lnTo>
+                    <a:pt x="176" y="0"/>
+                  </a:lnTo>
+                  <a:lnTo>
+                    <a:pt x="194" y="0"/>
+                  </a:lnTo>
+                  <a:lnTo>
+                    <a:pt x="194" y="183"/>
+                  </a:lnTo>
+                  <a:lnTo>
+                    <a:pt x="18" y="360"/>
+                  </a:lnTo>
+                  <a:lnTo>
+                    <a:pt x="18" y="1135"/>
+                  </a:lnTo>
+                  <a:close/>
+                </a:path>
+              </a:pathLst>
+            </a:custGeom>
+            <a:grpFill/>
+            <a:ln>
+              <a:noFill/>
+            </a:ln>
+            <a:extLst>
+              <a:ext uri="{91240B29-F687-4f45-9708-019B960494DF}">
+                <a14:hiddenLine xmlns:a14="http://schemas.microsoft.com/office/drawing/2010/main" xmlns:p14="http://schemas.microsoft.com/office/powerpoint/2010/main" xmlns:a16="http://schemas.microsoft.com/office/drawing/2014/main" xmlns="" w="9525">
+                  <a:solidFill>
+                    <a:srgbClr val="000000"/>
+                  </a:solidFill>
+                  <a:round/>
+                  <a:headEnd/>
+                  <a:tailEnd/>
+                </a14:hiddenLine>
+              </a:ext>
+            </a:extLst>
+          </p:spPr>
+        </p:sp>
+        <p:sp>
+          <p:nvSpPr>
+            <p:cNvPr id="50" name="Freeform 40">
+              <a:extLst>
+                <a:ext uri="{FF2B5EF4-FFF2-40B4-BE49-F238E27FC236}">
+                  <a16:creationId xmlns:a16="http://schemas.microsoft.com/office/drawing/2014/main" id="{67F5B7DA-86C7-4AE0-96B6-D7F5AA51E21C}"/>
+                </a:ext>
+                <a:ext uri="{C183D7F6-B498-43B3-948B-1728B52AA6E4}">
+                  <adec:decorative xmlns:adec="http://schemas.microsoft.com/office/drawing/2017/decorative" val="1"/>
+                </a:ext>
+              </a:extLst>
+            </p:cNvPr>
+            <p:cNvSpPr>
+              <a:spLocks noEditPoints="1"/>
+            </p:cNvSpPr>
+            <p:nvPr>
+              <p:extLst>
+                <p:ext uri="{386F3935-93C4-4BCD-93E2-E3B085C9AB24}">
+                  <p16:designElem xmlns:p16="http://schemas.microsoft.com/office/powerpoint/2015/main" val="1"/>
+                </p:ext>
+              </p:extLst>
+            </p:nvPr>
+          </p:nvSpPr>
+          <p:spPr bwMode="auto">
+            <a:xfrm>
+              <a:off x="11849100" y="6416675"/>
+              <a:ext cx="190500" cy="188913"/>
+            </a:xfrm>
+            <a:custGeom>
+              <a:avLst/>
+              <a:gdLst/>
+              <a:ahLst/>
+              <a:cxnLst/>
+              <a:rect l="0" t="0" r="r" b="b"/>
+              <a:pathLst>
+                <a:path w="40" h="40">
+                  <a:moveTo>
+                    <a:pt x="20" y="40"/>
+                  </a:moveTo>
+                  <a:cubicBezTo>
+                    <a:pt x="9" y="40"/>
+                    <a:pt x="0" y="31"/>
+                    <a:pt x="0" y="20"/>
+                  </a:cubicBezTo>
+                  <a:cubicBezTo>
+                    <a:pt x="0" y="9"/>
+                    <a:pt x="9" y="0"/>
+                    <a:pt x="20" y="0"/>
+                  </a:cubicBezTo>
+                  <a:cubicBezTo>
+                    <a:pt x="31" y="0"/>
+                    <a:pt x="40" y="9"/>
+                    <a:pt x="40" y="20"/>
+                  </a:cubicBezTo>
+                  <a:cubicBezTo>
+                    <a:pt x="40" y="31"/>
+                    <a:pt x="31" y="40"/>
+                    <a:pt x="20" y="40"/>
+                  </a:cubicBezTo>
+                  <a:close/>
+                  <a:moveTo>
+                    <a:pt x="20" y="4"/>
+                  </a:moveTo>
+                  <a:cubicBezTo>
+                    <a:pt x="12" y="4"/>
+                    <a:pt x="4" y="11"/>
+                    <a:pt x="4" y="20"/>
+                  </a:cubicBezTo>
+                  <a:cubicBezTo>
+                    <a:pt x="4" y="29"/>
+                    <a:pt x="12" y="36"/>
+                    <a:pt x="20" y="36"/>
+                  </a:cubicBezTo>
+                  <a:cubicBezTo>
+                    <a:pt x="29" y="36"/>
+                    <a:pt x="36" y="29"/>
+                    <a:pt x="36" y="20"/>
+                  </a:cubicBezTo>
+                  <a:cubicBezTo>
+                    <a:pt x="36" y="11"/>
+                    <a:pt x="29" y="4"/>
+                    <a:pt x="20" y="4"/>
+                  </a:cubicBezTo>
+                  <a:close/>
+                </a:path>
+              </a:pathLst>
+            </a:custGeom>
+            <a:grpFill/>
+            <a:ln>
+              <a:noFill/>
+            </a:ln>
+            <a:extLst>
+              <a:ext uri="{91240B29-F687-4f45-9708-019B960494DF}">
+                <a14:hiddenLine xmlns:a14="http://schemas.microsoft.com/office/drawing/2010/main" xmlns:p14="http://schemas.microsoft.com/office/powerpoint/2010/main" xmlns:a16="http://schemas.microsoft.com/office/drawing/2014/main" xmlns="" w="9525">
+                  <a:solidFill>
+                    <a:srgbClr val="000000"/>
+                  </a:solidFill>
+                  <a:round/>
+                  <a:headEnd/>
+                  <a:tailEnd/>
+                </a14:hiddenLine>
+              </a:ext>
+            </a:extLst>
+          </p:spPr>
+        </p:sp>
+        <p:sp>
+          <p:nvSpPr>
+            <p:cNvPr id="51" name="Rectangle 41">
+              <a:extLst>
+                <a:ext uri="{FF2B5EF4-FFF2-40B4-BE49-F238E27FC236}">
+                  <a16:creationId xmlns:a16="http://schemas.microsoft.com/office/drawing/2014/main" id="{0FA481E3-0439-484A-AC9B-19D58B98E49F}"/>
+                </a:ext>
+                <a:ext uri="{C183D7F6-B498-43B3-948B-1728B52AA6E4}">
+                  <adec:decorative xmlns:adec="http://schemas.microsoft.com/office/drawing/2017/decorative" val="1"/>
+                </a:ext>
+              </a:extLst>
+            </p:cNvPr>
+            <p:cNvSpPr>
+              <a:spLocks noChangeArrowheads="1"/>
+            </p:cNvSpPr>
+            <p:nvPr>
+              <p:extLst>
+                <p:ext uri="{386F3935-93C4-4BCD-93E2-E3B085C9AB24}">
+                  <p16:designElem xmlns:p16="http://schemas.microsoft.com/office/powerpoint/2015/main" val="1"/>
+                </p:ext>
+              </p:extLst>
+            </p:nvPr>
+          </p:nvSpPr>
+          <p:spPr bwMode="auto">
+            <a:xfrm>
+              <a:off x="11939587" y="6596063"/>
+              <a:ext cx="23813" cy="252413"/>
+            </a:xfrm>
+            <a:prstGeom prst="rect">
+              <a:avLst/>
+            </a:prstGeom>
+            <a:grpFill/>
+            <a:ln>
+              <a:noFill/>
+            </a:ln>
+            <a:extLst>
+              <a:ext uri="{91240B29-F687-4f45-9708-019B960494DF}">
+                <a14:hiddenLine xmlns:a14="http://schemas.microsoft.com/office/drawing/2010/main" xmlns:p14="http://schemas.microsoft.com/office/powerpoint/2010/main" xmlns:a16="http://schemas.microsoft.com/office/drawing/2014/main" xmlns="" w="9525">
+                  <a:solidFill>
+                    <a:srgbClr val="000000"/>
+                  </a:solidFill>
+                  <a:miter lim="800000"/>
+                  <a:headEnd/>
+                  <a:tailEnd/>
+                </a14:hiddenLine>
+              </a:ext>
+            </a:extLst>
+          </p:spPr>
+        </p:sp>
+      </p:grpSp>
       <p:sp>
         <p:nvSpPr>
-          <p:cNvPr id="3" name="Content Placeholder 2">
+          <p:cNvPr id="6" name="TextBox 5">
             <a:extLst>
               <a:ext uri="{FF2B5EF4-FFF2-40B4-BE49-F238E27FC236}">
-                <a16:creationId xmlns:a16="http://schemas.microsoft.com/office/drawing/2014/main" id="{87E2A805-A87E-8A44-1794-1E173C663651}"/>
+                <a16:creationId xmlns:a16="http://schemas.microsoft.com/office/drawing/2014/main" id="{12FCD387-5CBC-EB21-57DD-D67034C626CE}"/>
+              </a:ext>
+            </a:extLst>
+          </p:cNvPr>
+          <p:cNvSpPr txBox="1"/>
+          <p:nvPr/>
+        </p:nvSpPr>
+        <p:spPr>
+          <a:xfrm>
+            <a:off x="1921945" y="5401012"/>
+            <a:ext cx="8017401" cy="1015663"/>
+          </a:xfrm>
+          <a:prstGeom prst="rect">
+            <a:avLst/>
+          </a:prstGeom>
+          <a:noFill/>
+        </p:spPr>
+        <p:txBody>
+          <a:bodyPr wrap="square" rtlCol="0">
+            <a:spAutoFit/>
+          </a:bodyPr>
+          <a:lstStyle/>
+          <a:p>
+            <a:pPr marL="285750" indent="-285750" algn="ctr">
+              <a:buFont typeface="Arial" panose="020B0604020202020204" pitchFamily="34" charset="0"/>
+              <a:buChar char="•"/>
+            </a:pPr>
+            <a:r>
+              <a:rPr lang="en-US" sz="3000" dirty="0"/>
+              <a:t>High frequency solutions</a:t>
+            </a:r>
+          </a:p>
+          <a:p>
+            <a:pPr marL="285750" indent="-285750" algn="ctr">
+              <a:buFont typeface="Arial" panose="020B0604020202020204" pitchFamily="34" charset="0"/>
+              <a:buChar char="•"/>
+            </a:pPr>
+            <a:r>
+              <a:rPr lang="en-US" sz="3000" dirty="0"/>
+              <a:t>Fixed point solutions</a:t>
+            </a:r>
+          </a:p>
+        </p:txBody>
+      </p:sp>
+    </p:spTree>
+    <p:extLst>
+      <p:ext uri="{BB962C8B-B14F-4D97-AF65-F5344CB8AC3E}">
+        <p14:creationId xmlns:p14="http://schemas.microsoft.com/office/powerpoint/2010/main" val="728638742"/>
+      </p:ext>
+    </p:extLst>
+  </p:cSld>
+  <p:clrMapOvr>
+    <a:overrideClrMapping bg1="lt1" tx1="dk1" bg2="lt2" tx2="dk2" accent1="accent1" accent2="accent2" accent3="accent3" accent4="accent4" accent5="accent5" accent6="accent6" hlink="hlink" folHlink="folHlink"/>
+  </p:clrMapOvr>
+</p:sld>
+</file>
+
+<file path=ppt/slides/slide5.xml><?xml version="1.0" encoding="utf-8"?>
+<p:sld xmlns:a="http://schemas.openxmlformats.org/drawingml/2006/main" xmlns:r="http://schemas.openxmlformats.org/officeDocument/2006/relationships" xmlns:p="http://schemas.openxmlformats.org/presentationml/2006/main">
+  <p:cSld>
+    <p:bg>
+      <p:bgPr>
+        <a:gradFill rotWithShape="1">
+          <a:gsLst>
+            <a:gs pos="0">
+              <a:schemeClr val="bg1">
+                <a:tint val="98000"/>
+                <a:hueMod val="94000"/>
+                <a:satMod val="148000"/>
+                <a:lumMod val="150000"/>
+              </a:schemeClr>
+            </a:gs>
+            <a:gs pos="100000">
+              <a:schemeClr val="bg1">
+                <a:shade val="92000"/>
+                <a:hueMod val="104000"/>
+                <a:satMod val="140000"/>
+                <a:lumMod val="68000"/>
+              </a:schemeClr>
+            </a:gs>
+          </a:gsLst>
+          <a:lin ang="5040000" scaled="0"/>
+        </a:gradFill>
+        <a:effectLst/>
+      </p:bgPr>
+    </p:bg>
+    <p:spTree>
+      <p:nvGrpSpPr>
+        <p:cNvPr id="1" name=""/>
+        <p:cNvGrpSpPr/>
+        <p:nvPr/>
+      </p:nvGrpSpPr>
+      <p:grpSpPr>
+        <a:xfrm>
+          <a:off x="0" y="0"/>
+          <a:ext cx="0" cy="0"/>
+          <a:chOff x="0" y="0"/>
+          <a:chExt cx="0" cy="0"/>
+        </a:xfrm>
+      </p:grpSpPr>
+      <p:sp useBgFill="1">
+        <p:nvSpPr>
+          <p:cNvPr id="8" name="Rectangle 7">
+            <a:extLst>
+              <a:ext uri="{FF2B5EF4-FFF2-40B4-BE49-F238E27FC236}">
+                <a16:creationId xmlns:a16="http://schemas.microsoft.com/office/drawing/2014/main" id="{E9B448F0-DA06-4165-AB5F-4330A20E06D0}"/>
+              </a:ext>
+              <a:ext uri="{C183D7F6-B498-43B3-948B-1728B52AA6E4}">
+                <adec:decorative xmlns:adec="http://schemas.microsoft.com/office/drawing/2017/decorative" val="1"/>
+              </a:ext>
+            </a:extLst>
+          </p:cNvPr>
+          <p:cNvSpPr>
+            <a:spLocks noGrp="1" noRot="1" noChangeAspect="1" noMove="1" noResize="1" noEditPoints="1" noAdjustHandles="1" noChangeArrowheads="1" noChangeShapeType="1" noTextEdit="1"/>
+          </p:cNvSpPr>
+          <p:nvPr>
+            <p:extLst>
+              <p:ext uri="{386F3935-93C4-4BCD-93E2-E3B085C9AB24}">
+                <p16:designElem xmlns:p16="http://schemas.microsoft.com/office/powerpoint/2015/main" val="1"/>
+              </p:ext>
+            </p:extLst>
+          </p:nvPr>
+        </p:nvSpPr>
+        <p:spPr>
+          <a:xfrm>
+            <a:off x="1" y="-1"/>
+            <a:ext cx="12192000" cy="6858000"/>
+          </a:xfrm>
+          <a:prstGeom prst="rect">
+            <a:avLst/>
+          </a:prstGeom>
+          <a:ln>
+            <a:noFill/>
+          </a:ln>
+        </p:spPr>
+        <p:style>
+          <a:lnRef idx="2">
+            <a:schemeClr val="accent1">
+              <a:shade val="50000"/>
+            </a:schemeClr>
+          </a:lnRef>
+          <a:fillRef idx="1">
+            <a:schemeClr val="accent1"/>
+          </a:fillRef>
+          <a:effectRef idx="0">
+            <a:schemeClr val="accent1"/>
+          </a:effectRef>
+          <a:fontRef idx="minor">
+            <a:schemeClr val="lt1"/>
+          </a:fontRef>
+        </p:style>
+        <p:txBody>
+          <a:bodyPr rtlCol="0" anchor="ctr"/>
+          <a:lstStyle/>
+          <a:p>
+            <a:pPr algn="ctr"/>
+            <a:endParaRPr lang="en-US"/>
+          </a:p>
+        </p:txBody>
+      </p:sp>
+      <p:pic>
+        <p:nvPicPr>
+          <p:cNvPr id="10" name="Picture 2">
+            <a:extLst>
+              <a:ext uri="{FF2B5EF4-FFF2-40B4-BE49-F238E27FC236}">
+                <a16:creationId xmlns:a16="http://schemas.microsoft.com/office/drawing/2014/main" id="{92D83638-A467-411A-9C31-FE9A111CD885}"/>
+              </a:ext>
+              <a:ext uri="{C183D7F6-B498-43B3-948B-1728B52AA6E4}">
+                <adec:decorative xmlns:adec="http://schemas.microsoft.com/office/drawing/2017/decorative" val="1"/>
+              </a:ext>
+            </a:extLst>
+          </p:cNvPr>
+          <p:cNvPicPr>
+            <a:picLocks noGrp="1" noRot="1" noChangeAspect="1" noMove="1" noResize="1" noEditPoints="1" noAdjustHandles="1" noChangeArrowheads="1" noChangeShapeType="1" noCrop="1"/>
+          </p:cNvPicPr>
+          <p:nvPr>
+            <p:extLst>
+              <p:ext uri="{386F3935-93C4-4BCD-93E2-E3B085C9AB24}">
+                <p16:designElem xmlns:p16="http://schemas.microsoft.com/office/powerpoint/2015/main" val="1"/>
+              </p:ext>
+            </p:extLst>
+          </p:nvPr>
+        </p:nvPicPr>
+        <p:blipFill>
+          <a:blip r:embed="rId3">
+            <a:alphaModFix amt="30000"/>
+            <a:duotone>
+              <a:prstClr val="black"/>
+              <a:schemeClr val="tx2">
+                <a:tint val="45000"/>
+                <a:satMod val="400000"/>
+              </a:schemeClr>
+            </a:duotone>
+            <a:extLst>
+              <a:ext uri="{28A0092B-C50C-407E-A947-70E740481C1C}">
+                <a14:useLocalDpi xmlns:a14="http://schemas.microsoft.com/office/drawing/2010/main" val="0"/>
+              </a:ext>
+            </a:extLst>
+          </a:blip>
+          <a:srcRect/>
+          <a:stretch>
+            <a:fillRect/>
+          </a:stretch>
+        </p:blipFill>
+        <p:spPr bwMode="auto">
+          <a:xfrm>
+            <a:off x="0" y="0"/>
+            <a:ext cx="12192003" cy="6858001"/>
+          </a:xfrm>
+          <a:prstGeom prst="rect">
+            <a:avLst/>
+          </a:prstGeom>
+          <a:noFill/>
+          <a:extLst>
+            <a:ext uri="{909E8E84-426E-40dd-AFC4-6F175D3DCCD1}">
+              <a14:hiddenFill xmlns="" xmlns:a16="http://schemas.microsoft.com/office/drawing/2014/main" xmlns:p14="http://schemas.microsoft.com/office/powerpoint/2010/main" xmlns:a14="http://schemas.microsoft.com/office/drawing/2010/main">
+                <a:solidFill>
+                  <a:srgbClr val="FFFFFF"/>
+                </a:solidFill>
+              </a14:hiddenFill>
+            </a:ext>
+          </a:extLst>
+        </p:spPr>
+      </p:pic>
+      <p:grpSp>
+        <p:nvGrpSpPr>
+          <p:cNvPr id="12" name="Group 11">
+            <a:extLst>
+              <a:ext uri="{FF2B5EF4-FFF2-40B4-BE49-F238E27FC236}">
+                <a16:creationId xmlns:a16="http://schemas.microsoft.com/office/drawing/2014/main" id="{2576BCDF-119F-4EB5-83D7-ED823C93EBBD}"/>
+              </a:ext>
+              <a:ext uri="{C183D7F6-B498-43B3-948B-1728B52AA6E4}">
+                <adec:decorative xmlns:adec="http://schemas.microsoft.com/office/drawing/2017/decorative" val="1"/>
+              </a:ext>
+            </a:extLst>
+          </p:cNvPr>
+          <p:cNvGrpSpPr>
+            <a:grpSpLocks noGrp="1" noUngrp="1" noRot="1" noChangeAspect="1" noMove="1" noResize="1"/>
+          </p:cNvGrpSpPr>
+          <p:nvPr>
+            <p:extLst>
+              <p:ext uri="{386F3935-93C4-4BCD-93E2-E3B085C9AB24}">
+                <p16:designElem xmlns:p16="http://schemas.microsoft.com/office/powerpoint/2015/main" val="1"/>
+              </p:ext>
+            </p:extLst>
+          </p:nvPr>
+        </p:nvGrpSpPr>
+        <p:grpSpPr>
+          <a:xfrm>
+            <a:off x="0" y="0"/>
+            <a:ext cx="1220788" cy="6858001"/>
+            <a:chOff x="-14288" y="0"/>
+            <a:chExt cx="1220788" cy="6858001"/>
+          </a:xfrm>
+          <a:solidFill>
+            <a:schemeClr val="tx2">
+              <a:alpha val="45000"/>
+            </a:schemeClr>
+          </a:solidFill>
+        </p:grpSpPr>
+        <p:sp>
+          <p:nvSpPr>
+            <p:cNvPr id="13" name="Rectangle 5">
+              <a:extLst>
+                <a:ext uri="{FF2B5EF4-FFF2-40B4-BE49-F238E27FC236}">
+                  <a16:creationId xmlns:a16="http://schemas.microsoft.com/office/drawing/2014/main" id="{43D63E8F-FD8A-4CE3-B7C9-3E9E2B66B5FD}"/>
+                </a:ext>
+                <a:ext uri="{C183D7F6-B498-43B3-948B-1728B52AA6E4}">
+                  <adec:decorative xmlns:adec="http://schemas.microsoft.com/office/drawing/2017/decorative" val="1"/>
+                </a:ext>
+              </a:extLst>
+            </p:cNvPr>
+            <p:cNvSpPr>
+              <a:spLocks noChangeArrowheads="1"/>
+            </p:cNvSpPr>
+            <p:nvPr>
+              <p:extLst>
+                <p:ext uri="{386F3935-93C4-4BCD-93E2-E3B085C9AB24}">
+                  <p16:designElem xmlns:p16="http://schemas.microsoft.com/office/powerpoint/2015/main" val="1"/>
+                </p:ext>
+              </p:extLst>
+            </p:nvPr>
+          </p:nvSpPr>
+          <p:spPr bwMode="auto">
+            <a:xfrm>
+              <a:off x="114300" y="4763"/>
+              <a:ext cx="23813" cy="2181225"/>
+            </a:xfrm>
+            <a:prstGeom prst="rect">
+              <a:avLst/>
+            </a:prstGeom>
+            <a:grpFill/>
+            <a:ln>
+              <a:noFill/>
+            </a:ln>
+            <a:extLst>
+              <a:ext uri="{91240B29-F687-4f45-9708-019B960494DF}">
+                <a14:hiddenLine xmlns="" xmlns:a16="http://schemas.microsoft.com/office/drawing/2014/main" xmlns:p14="http://schemas.microsoft.com/office/powerpoint/2010/main" xmlns:a14="http://schemas.microsoft.com/office/drawing/2010/main" w="9525">
+                  <a:solidFill>
+                    <a:srgbClr val="000000"/>
+                  </a:solidFill>
+                  <a:miter lim="800000"/>
+                  <a:headEnd/>
+                  <a:tailEnd/>
+                </a14:hiddenLine>
+              </a:ext>
+            </a:extLst>
+          </p:spPr>
+        </p:sp>
+        <p:sp>
+          <p:nvSpPr>
+            <p:cNvPr id="14" name="Freeform 6">
+              <a:extLst>
+                <a:ext uri="{FF2B5EF4-FFF2-40B4-BE49-F238E27FC236}">
+                  <a16:creationId xmlns:a16="http://schemas.microsoft.com/office/drawing/2014/main" id="{D107D890-1831-46D8-90FB-F2FC0B28841D}"/>
+                </a:ext>
+                <a:ext uri="{C183D7F6-B498-43B3-948B-1728B52AA6E4}">
+                  <adec:decorative xmlns:adec="http://schemas.microsoft.com/office/drawing/2017/decorative" val="1"/>
+                </a:ext>
+              </a:extLst>
+            </p:cNvPr>
+            <p:cNvSpPr>
+              <a:spLocks noEditPoints="1"/>
+            </p:cNvSpPr>
+            <p:nvPr>
+              <p:extLst>
+                <p:ext uri="{386F3935-93C4-4BCD-93E2-E3B085C9AB24}">
+                  <p16:designElem xmlns:p16="http://schemas.microsoft.com/office/powerpoint/2015/main" val="1"/>
+                </p:ext>
+              </p:extLst>
+            </p:nvPr>
+          </p:nvSpPr>
+          <p:spPr bwMode="auto">
+            <a:xfrm>
+              <a:off x="33337" y="2176463"/>
+              <a:ext cx="190500" cy="190500"/>
+            </a:xfrm>
+            <a:custGeom>
+              <a:avLst/>
+              <a:gdLst/>
+              <a:ahLst/>
+              <a:cxnLst/>
+              <a:rect l="0" t="0" r="r" b="b"/>
+              <a:pathLst>
+                <a:path w="40" h="40">
+                  <a:moveTo>
+                    <a:pt x="20" y="40"/>
+                  </a:moveTo>
+                  <a:cubicBezTo>
+                    <a:pt x="9" y="40"/>
+                    <a:pt x="0" y="31"/>
+                    <a:pt x="0" y="20"/>
+                  </a:cubicBezTo>
+                  <a:cubicBezTo>
+                    <a:pt x="0" y="9"/>
+                    <a:pt x="9" y="0"/>
+                    <a:pt x="20" y="0"/>
+                  </a:cubicBezTo>
+                  <a:cubicBezTo>
+                    <a:pt x="31" y="0"/>
+                    <a:pt x="40" y="9"/>
+                    <a:pt x="40" y="20"/>
+                  </a:cubicBezTo>
+                  <a:cubicBezTo>
+                    <a:pt x="40" y="31"/>
+                    <a:pt x="31" y="40"/>
+                    <a:pt x="20" y="40"/>
+                  </a:cubicBezTo>
+                  <a:close/>
+                  <a:moveTo>
+                    <a:pt x="20" y="4"/>
+                  </a:moveTo>
+                  <a:cubicBezTo>
+                    <a:pt x="11" y="4"/>
+                    <a:pt x="4" y="11"/>
+                    <a:pt x="4" y="20"/>
+                  </a:cubicBezTo>
+                  <a:cubicBezTo>
+                    <a:pt x="4" y="29"/>
+                    <a:pt x="11" y="36"/>
+                    <a:pt x="20" y="36"/>
+                  </a:cubicBezTo>
+                  <a:cubicBezTo>
+                    <a:pt x="28" y="36"/>
+                    <a:pt x="36" y="29"/>
+                    <a:pt x="36" y="20"/>
+                  </a:cubicBezTo>
+                  <a:cubicBezTo>
+                    <a:pt x="36" y="11"/>
+                    <a:pt x="28" y="4"/>
+                    <a:pt x="20" y="4"/>
+                  </a:cubicBezTo>
+                  <a:close/>
+                </a:path>
+              </a:pathLst>
+            </a:custGeom>
+            <a:grpFill/>
+            <a:ln>
+              <a:noFill/>
+            </a:ln>
+            <a:extLst>
+              <a:ext uri="{91240B29-F687-4f45-9708-019B960494DF}">
+                <a14:hiddenLine xmlns="" xmlns:a16="http://schemas.microsoft.com/office/drawing/2014/main" xmlns:p14="http://schemas.microsoft.com/office/powerpoint/2010/main" xmlns:a14="http://schemas.microsoft.com/office/drawing/2010/main" w="9525">
+                  <a:solidFill>
+                    <a:srgbClr val="000000"/>
+                  </a:solidFill>
+                  <a:round/>
+                  <a:headEnd/>
+                  <a:tailEnd/>
+                </a14:hiddenLine>
+              </a:ext>
+            </a:extLst>
+          </p:spPr>
+        </p:sp>
+        <p:sp>
+          <p:nvSpPr>
+            <p:cNvPr id="15" name="Freeform 7">
+              <a:extLst>
+                <a:ext uri="{FF2B5EF4-FFF2-40B4-BE49-F238E27FC236}">
+                  <a16:creationId xmlns:a16="http://schemas.microsoft.com/office/drawing/2014/main" id="{02440904-A4EC-4F72-8E22-AAF4D9DB5C1B}"/>
+                </a:ext>
+                <a:ext uri="{C183D7F6-B498-43B3-948B-1728B52AA6E4}">
+                  <adec:decorative xmlns:adec="http://schemas.microsoft.com/office/drawing/2017/decorative" val="1"/>
+                </a:ext>
+              </a:extLst>
+            </p:cNvPr>
+            <p:cNvSpPr>
+              <a:spLocks noEditPoints="1"/>
+            </p:cNvSpPr>
+            <p:nvPr>
+              <p:extLst>
+                <p:ext uri="{386F3935-93C4-4BCD-93E2-E3B085C9AB24}">
+                  <p16:designElem xmlns:p16="http://schemas.microsoft.com/office/powerpoint/2015/main" val="1"/>
+                </p:ext>
+              </p:extLst>
+            </p:nvPr>
+          </p:nvSpPr>
+          <p:spPr bwMode="auto">
+            <a:xfrm>
+              <a:off x="28575" y="4021138"/>
+              <a:ext cx="190500" cy="188913"/>
+            </a:xfrm>
+            <a:custGeom>
+              <a:avLst/>
+              <a:gdLst/>
+              <a:ahLst/>
+              <a:cxnLst/>
+              <a:rect l="0" t="0" r="r" b="b"/>
+              <a:pathLst>
+                <a:path w="40" h="40">
+                  <a:moveTo>
+                    <a:pt x="20" y="40"/>
+                  </a:moveTo>
+                  <a:cubicBezTo>
+                    <a:pt x="9" y="40"/>
+                    <a:pt x="0" y="31"/>
+                    <a:pt x="0" y="20"/>
+                  </a:cubicBezTo>
+                  <a:cubicBezTo>
+                    <a:pt x="0" y="9"/>
+                    <a:pt x="9" y="0"/>
+                    <a:pt x="20" y="0"/>
+                  </a:cubicBezTo>
+                  <a:cubicBezTo>
+                    <a:pt x="31" y="0"/>
+                    <a:pt x="40" y="9"/>
+                    <a:pt x="40" y="20"/>
+                  </a:cubicBezTo>
+                  <a:cubicBezTo>
+                    <a:pt x="40" y="31"/>
+                    <a:pt x="31" y="40"/>
+                    <a:pt x="20" y="40"/>
+                  </a:cubicBezTo>
+                  <a:close/>
+                  <a:moveTo>
+                    <a:pt x="20" y="4"/>
+                  </a:moveTo>
+                  <a:cubicBezTo>
+                    <a:pt x="12" y="4"/>
+                    <a:pt x="4" y="11"/>
+                    <a:pt x="4" y="20"/>
+                  </a:cubicBezTo>
+                  <a:cubicBezTo>
+                    <a:pt x="4" y="29"/>
+                    <a:pt x="12" y="36"/>
+                    <a:pt x="20" y="36"/>
+                  </a:cubicBezTo>
+                  <a:cubicBezTo>
+                    <a:pt x="29" y="36"/>
+                    <a:pt x="36" y="29"/>
+                    <a:pt x="36" y="20"/>
+                  </a:cubicBezTo>
+                  <a:cubicBezTo>
+                    <a:pt x="36" y="11"/>
+                    <a:pt x="29" y="4"/>
+                    <a:pt x="20" y="4"/>
+                  </a:cubicBezTo>
+                  <a:close/>
+                </a:path>
+              </a:pathLst>
+            </a:custGeom>
+            <a:grpFill/>
+            <a:ln>
+              <a:noFill/>
+            </a:ln>
+            <a:extLst>
+              <a:ext uri="{91240B29-F687-4f45-9708-019B960494DF}">
+                <a14:hiddenLine xmlns="" xmlns:a16="http://schemas.microsoft.com/office/drawing/2014/main" xmlns:p14="http://schemas.microsoft.com/office/powerpoint/2010/main" xmlns:a14="http://schemas.microsoft.com/office/drawing/2010/main" w="9525">
+                  <a:solidFill>
+                    <a:srgbClr val="000000"/>
+                  </a:solidFill>
+                  <a:round/>
+                  <a:headEnd/>
+                  <a:tailEnd/>
+                </a14:hiddenLine>
+              </a:ext>
+            </a:extLst>
+          </p:spPr>
+        </p:sp>
+        <p:sp>
+          <p:nvSpPr>
+            <p:cNvPr id="16" name="Freeform 8">
+              <a:extLst>
+                <a:ext uri="{FF2B5EF4-FFF2-40B4-BE49-F238E27FC236}">
+                  <a16:creationId xmlns:a16="http://schemas.microsoft.com/office/drawing/2014/main" id="{625E9C1F-1569-416B-A85C-FA143487225D}"/>
+                </a:ext>
+                <a:ext uri="{C183D7F6-B498-43B3-948B-1728B52AA6E4}">
+                  <adec:decorative xmlns:adec="http://schemas.microsoft.com/office/drawing/2017/decorative" val="1"/>
+                </a:ext>
+              </a:extLst>
+            </p:cNvPr>
+            <p:cNvSpPr/>
+            <p:nvPr>
+              <p:extLst>
+                <p:ext uri="{386F3935-93C4-4BCD-93E2-E3B085C9AB24}">
+                  <p16:designElem xmlns:p16="http://schemas.microsoft.com/office/powerpoint/2015/main" val="1"/>
+                </p:ext>
+              </p:extLst>
+            </p:nvPr>
+          </p:nvSpPr>
+          <p:spPr bwMode="auto">
+            <a:xfrm>
+              <a:off x="200025" y="4763"/>
+              <a:ext cx="369888" cy="1811338"/>
+            </a:xfrm>
+            <a:custGeom>
+              <a:avLst/>
+              <a:gdLst/>
+              <a:ahLst/>
+              <a:cxnLst/>
+              <a:rect l="0" t="0" r="r" b="b"/>
+              <a:pathLst>
+                <a:path w="233" h="1141">
+                  <a:moveTo>
+                    <a:pt x="218" y="1141"/>
+                  </a:moveTo>
+                  <a:lnTo>
+                    <a:pt x="0" y="626"/>
+                  </a:lnTo>
+                  <a:lnTo>
+                    <a:pt x="0" y="0"/>
+                  </a:lnTo>
+                  <a:lnTo>
+                    <a:pt x="15" y="0"/>
+                  </a:lnTo>
+                  <a:lnTo>
+                    <a:pt x="15" y="623"/>
+                  </a:lnTo>
+                  <a:lnTo>
+                    <a:pt x="233" y="1135"/>
+                  </a:lnTo>
+                  <a:lnTo>
+                    <a:pt x="218" y="1141"/>
+                  </a:lnTo>
+                  <a:close/>
+                </a:path>
+              </a:pathLst>
+            </a:custGeom>
+            <a:grpFill/>
+            <a:ln>
+              <a:noFill/>
+            </a:ln>
+            <a:extLst>
+              <a:ext uri="{91240B29-F687-4f45-9708-019B960494DF}">
+                <a14:hiddenLine xmlns="" xmlns:a16="http://schemas.microsoft.com/office/drawing/2014/main" xmlns:p14="http://schemas.microsoft.com/office/powerpoint/2010/main" xmlns:a14="http://schemas.microsoft.com/office/drawing/2010/main" w="9525">
+                  <a:solidFill>
+                    <a:srgbClr val="000000"/>
+                  </a:solidFill>
+                  <a:round/>
+                  <a:headEnd/>
+                  <a:tailEnd/>
+                </a14:hiddenLine>
+              </a:ext>
+            </a:extLst>
+          </p:spPr>
+        </p:sp>
+        <p:sp>
+          <p:nvSpPr>
+            <p:cNvPr id="17" name="Freeform 9">
+              <a:extLst>
+                <a:ext uri="{FF2B5EF4-FFF2-40B4-BE49-F238E27FC236}">
+                  <a16:creationId xmlns:a16="http://schemas.microsoft.com/office/drawing/2014/main" id="{3A186C77-43BF-4B1B-8170-48944F305750}"/>
+                </a:ext>
+                <a:ext uri="{C183D7F6-B498-43B3-948B-1728B52AA6E4}">
+                  <adec:decorative xmlns:adec="http://schemas.microsoft.com/office/drawing/2017/decorative" val="1"/>
+                </a:ext>
+              </a:extLst>
+            </p:cNvPr>
+            <p:cNvSpPr>
+              <a:spLocks noEditPoints="1"/>
+            </p:cNvSpPr>
+            <p:nvPr>
+              <p:extLst>
+                <p:ext uri="{386F3935-93C4-4BCD-93E2-E3B085C9AB24}">
+                  <p16:designElem xmlns:p16="http://schemas.microsoft.com/office/powerpoint/2015/main" val="1"/>
+                </p:ext>
+              </p:extLst>
+            </p:nvPr>
+          </p:nvSpPr>
+          <p:spPr bwMode="auto">
+            <a:xfrm>
+              <a:off x="503237" y="1801813"/>
+              <a:ext cx="190500" cy="188913"/>
+            </a:xfrm>
+            <a:custGeom>
+              <a:avLst/>
+              <a:gdLst/>
+              <a:ahLst/>
+              <a:cxnLst/>
+              <a:rect l="0" t="0" r="r" b="b"/>
+              <a:pathLst>
+                <a:path w="40" h="40">
+                  <a:moveTo>
+                    <a:pt x="20" y="40"/>
+                  </a:moveTo>
+                  <a:cubicBezTo>
+                    <a:pt x="9" y="40"/>
+                    <a:pt x="0" y="31"/>
+                    <a:pt x="0" y="20"/>
+                  </a:cubicBezTo>
+                  <a:cubicBezTo>
+                    <a:pt x="0" y="9"/>
+                    <a:pt x="9" y="0"/>
+                    <a:pt x="20" y="0"/>
+                  </a:cubicBezTo>
+                  <a:cubicBezTo>
+                    <a:pt x="33" y="0"/>
+                    <a:pt x="40" y="6"/>
+                    <a:pt x="40" y="20"/>
+                  </a:cubicBezTo>
+                  <a:cubicBezTo>
+                    <a:pt x="40" y="31"/>
+                    <a:pt x="31" y="40"/>
+                    <a:pt x="20" y="40"/>
+                  </a:cubicBezTo>
+                  <a:close/>
+                  <a:moveTo>
+                    <a:pt x="20" y="4"/>
+                  </a:moveTo>
+                  <a:cubicBezTo>
+                    <a:pt x="11" y="4"/>
+                    <a:pt x="4" y="11"/>
+                    <a:pt x="4" y="20"/>
+                  </a:cubicBezTo>
+                  <a:cubicBezTo>
+                    <a:pt x="4" y="29"/>
+                    <a:pt x="11" y="36"/>
+                    <a:pt x="20" y="36"/>
+                  </a:cubicBezTo>
+                  <a:cubicBezTo>
+                    <a:pt x="28" y="36"/>
+                    <a:pt x="36" y="29"/>
+                    <a:pt x="36" y="20"/>
+                  </a:cubicBezTo>
+                  <a:cubicBezTo>
+                    <a:pt x="36" y="9"/>
+                    <a:pt x="31" y="4"/>
+                    <a:pt x="20" y="4"/>
+                  </a:cubicBezTo>
+                  <a:close/>
+                </a:path>
+              </a:pathLst>
+            </a:custGeom>
+            <a:grpFill/>
+            <a:ln>
+              <a:noFill/>
+            </a:ln>
+            <a:extLst>
+              <a:ext uri="{91240B29-F687-4f45-9708-019B960494DF}">
+                <a14:hiddenLine xmlns="" xmlns:a16="http://schemas.microsoft.com/office/drawing/2014/main" xmlns:p14="http://schemas.microsoft.com/office/powerpoint/2010/main" xmlns:a14="http://schemas.microsoft.com/office/drawing/2010/main" w="9525">
+                  <a:solidFill>
+                    <a:srgbClr val="000000"/>
+                  </a:solidFill>
+                  <a:round/>
+                  <a:headEnd/>
+                  <a:tailEnd/>
+                </a14:hiddenLine>
+              </a:ext>
+            </a:extLst>
+          </p:spPr>
+        </p:sp>
+        <p:sp>
+          <p:nvSpPr>
+            <p:cNvPr id="18" name="Freeform 10">
+              <a:extLst>
+                <a:ext uri="{FF2B5EF4-FFF2-40B4-BE49-F238E27FC236}">
+                  <a16:creationId xmlns:a16="http://schemas.microsoft.com/office/drawing/2014/main" id="{FA8D72C1-8526-44B4-9333-5E0057ECCA29}"/>
+                </a:ext>
+                <a:ext uri="{C183D7F6-B498-43B3-948B-1728B52AA6E4}">
+                  <adec:decorative xmlns:adec="http://schemas.microsoft.com/office/drawing/2017/decorative" val="1"/>
+                </a:ext>
+              </a:extLst>
+            </p:cNvPr>
+            <p:cNvSpPr/>
+            <p:nvPr>
+              <p:extLst>
+                <p:ext uri="{386F3935-93C4-4BCD-93E2-E3B085C9AB24}">
+                  <p16:designElem xmlns:p16="http://schemas.microsoft.com/office/powerpoint/2015/main" val="1"/>
+                </p:ext>
+              </p:extLst>
+            </p:nvPr>
+          </p:nvSpPr>
+          <p:spPr bwMode="auto">
+            <a:xfrm>
+              <a:off x="285750" y="4763"/>
+              <a:ext cx="369888" cy="1430338"/>
+            </a:xfrm>
+            <a:custGeom>
+              <a:avLst/>
+              <a:gdLst/>
+              <a:ahLst/>
+              <a:cxnLst/>
+              <a:rect l="0" t="0" r="r" b="b"/>
+              <a:pathLst>
+                <a:path w="233" h="901">
+                  <a:moveTo>
+                    <a:pt x="221" y="901"/>
+                  </a:moveTo>
+                  <a:lnTo>
+                    <a:pt x="0" y="383"/>
+                  </a:lnTo>
+                  <a:lnTo>
+                    <a:pt x="0" y="0"/>
+                  </a:lnTo>
+                  <a:lnTo>
+                    <a:pt x="18" y="0"/>
+                  </a:lnTo>
+                  <a:lnTo>
+                    <a:pt x="18" y="380"/>
+                  </a:lnTo>
+                  <a:lnTo>
+                    <a:pt x="233" y="895"/>
+                  </a:lnTo>
+                  <a:lnTo>
+                    <a:pt x="221" y="901"/>
+                  </a:lnTo>
+                  <a:close/>
+                </a:path>
+              </a:pathLst>
+            </a:custGeom>
+            <a:grpFill/>
+            <a:ln>
+              <a:noFill/>
+            </a:ln>
+            <a:extLst>
+              <a:ext uri="{91240B29-F687-4f45-9708-019B960494DF}">
+                <a14:hiddenLine xmlns="" xmlns:a16="http://schemas.microsoft.com/office/drawing/2014/main" xmlns:p14="http://schemas.microsoft.com/office/powerpoint/2010/main" xmlns:a14="http://schemas.microsoft.com/office/drawing/2010/main" w="9525">
+                  <a:solidFill>
+                    <a:srgbClr val="000000"/>
+                  </a:solidFill>
+                  <a:round/>
+                  <a:headEnd/>
+                  <a:tailEnd/>
+                </a14:hiddenLine>
+              </a:ext>
+            </a:extLst>
+          </p:spPr>
+        </p:sp>
+        <p:sp>
+          <p:nvSpPr>
+            <p:cNvPr id="19" name="Freeform 11">
+              <a:extLst>
+                <a:ext uri="{FF2B5EF4-FFF2-40B4-BE49-F238E27FC236}">
+                  <a16:creationId xmlns:a16="http://schemas.microsoft.com/office/drawing/2014/main" id="{790E4BA0-9C47-48B6-AA4A-8FC22DA9541E}"/>
+                </a:ext>
+                <a:ext uri="{C183D7F6-B498-43B3-948B-1728B52AA6E4}">
+                  <adec:decorative xmlns:adec="http://schemas.microsoft.com/office/drawing/2017/decorative" val="1"/>
+                </a:ext>
+              </a:extLst>
+            </p:cNvPr>
+            <p:cNvSpPr/>
+            <p:nvPr>
+              <p:extLst>
+                <p:ext uri="{386F3935-93C4-4BCD-93E2-E3B085C9AB24}">
+                  <p16:designElem xmlns:p16="http://schemas.microsoft.com/office/powerpoint/2015/main" val="1"/>
+                </p:ext>
+              </p:extLst>
+            </p:nvPr>
+          </p:nvSpPr>
+          <p:spPr bwMode="auto">
+            <a:xfrm>
+              <a:off x="546100" y="0"/>
+              <a:ext cx="152400" cy="912813"/>
+            </a:xfrm>
+            <a:custGeom>
+              <a:avLst/>
+              <a:gdLst/>
+              <a:ahLst/>
+              <a:cxnLst/>
+              <a:rect l="0" t="0" r="r" b="b"/>
+              <a:pathLst>
+                <a:path w="96" h="575">
+                  <a:moveTo>
+                    <a:pt x="96" y="575"/>
+                  </a:moveTo>
+                  <a:lnTo>
+                    <a:pt x="78" y="575"/>
+                  </a:lnTo>
+                  <a:lnTo>
+                    <a:pt x="78" y="192"/>
+                  </a:lnTo>
+                  <a:lnTo>
+                    <a:pt x="0" y="6"/>
+                  </a:lnTo>
+                  <a:lnTo>
+                    <a:pt x="15" y="0"/>
+                  </a:lnTo>
+                  <a:lnTo>
+                    <a:pt x="96" y="189"/>
+                  </a:lnTo>
+                  <a:lnTo>
+                    <a:pt x="96" y="575"/>
+                  </a:lnTo>
+                  <a:close/>
+                </a:path>
+              </a:pathLst>
+            </a:custGeom>
+            <a:grpFill/>
+            <a:ln>
+              <a:noFill/>
+            </a:ln>
+            <a:extLst>
+              <a:ext uri="{91240B29-F687-4f45-9708-019B960494DF}">
+                <a14:hiddenLine xmlns="" xmlns:a16="http://schemas.microsoft.com/office/drawing/2014/main" xmlns:p14="http://schemas.microsoft.com/office/powerpoint/2010/main" xmlns:a14="http://schemas.microsoft.com/office/drawing/2010/main" w="9525">
+                  <a:solidFill>
+                    <a:srgbClr val="000000"/>
+                  </a:solidFill>
+                  <a:round/>
+                  <a:headEnd/>
+                  <a:tailEnd/>
+                </a14:hiddenLine>
+              </a:ext>
+            </a:extLst>
+          </p:spPr>
+        </p:sp>
+        <p:sp>
+          <p:nvSpPr>
+            <p:cNvPr id="20" name="Freeform 12">
+              <a:extLst>
+                <a:ext uri="{FF2B5EF4-FFF2-40B4-BE49-F238E27FC236}">
+                  <a16:creationId xmlns:a16="http://schemas.microsoft.com/office/drawing/2014/main" id="{FD051475-431F-4B9D-94C6-7B49A69582F2}"/>
+                </a:ext>
+                <a:ext uri="{C183D7F6-B498-43B3-948B-1728B52AA6E4}">
+                  <adec:decorative xmlns:adec="http://schemas.microsoft.com/office/drawing/2017/decorative" val="1"/>
+                </a:ext>
+              </a:extLst>
+            </p:cNvPr>
+            <p:cNvSpPr>
+              <a:spLocks noEditPoints="1"/>
+            </p:cNvSpPr>
+            <p:nvPr>
+              <p:extLst>
+                <p:ext uri="{386F3935-93C4-4BCD-93E2-E3B085C9AB24}">
+                  <p16:designElem xmlns:p16="http://schemas.microsoft.com/office/powerpoint/2015/main" val="1"/>
+                </p:ext>
+              </p:extLst>
+            </p:nvPr>
+          </p:nvSpPr>
+          <p:spPr bwMode="auto">
+            <a:xfrm>
+              <a:off x="588962" y="1420813"/>
+              <a:ext cx="190500" cy="190500"/>
+            </a:xfrm>
+            <a:custGeom>
+              <a:avLst/>
+              <a:gdLst/>
+              <a:ahLst/>
+              <a:cxnLst/>
+              <a:rect l="0" t="0" r="r" b="b"/>
+              <a:pathLst>
+                <a:path w="40" h="40">
+                  <a:moveTo>
+                    <a:pt x="20" y="40"/>
+                  </a:moveTo>
+                  <a:cubicBezTo>
+                    <a:pt x="9" y="40"/>
+                    <a:pt x="0" y="31"/>
+                    <a:pt x="0" y="20"/>
+                  </a:cubicBezTo>
+                  <a:cubicBezTo>
+                    <a:pt x="0" y="9"/>
+                    <a:pt x="9" y="0"/>
+                    <a:pt x="20" y="0"/>
+                  </a:cubicBezTo>
+                  <a:cubicBezTo>
+                    <a:pt x="33" y="0"/>
+                    <a:pt x="40" y="7"/>
+                    <a:pt x="40" y="20"/>
+                  </a:cubicBezTo>
+                  <a:cubicBezTo>
+                    <a:pt x="40" y="31"/>
+                    <a:pt x="31" y="40"/>
+                    <a:pt x="20" y="40"/>
+                  </a:cubicBezTo>
+                  <a:close/>
+                  <a:moveTo>
+                    <a:pt x="20" y="4"/>
+                  </a:moveTo>
+                  <a:cubicBezTo>
+                    <a:pt x="11" y="4"/>
+                    <a:pt x="4" y="11"/>
+                    <a:pt x="4" y="20"/>
+                  </a:cubicBezTo>
+                  <a:cubicBezTo>
+                    <a:pt x="4" y="29"/>
+                    <a:pt x="11" y="36"/>
+                    <a:pt x="20" y="36"/>
+                  </a:cubicBezTo>
+                  <a:cubicBezTo>
+                    <a:pt x="29" y="36"/>
+                    <a:pt x="36" y="29"/>
+                    <a:pt x="36" y="20"/>
+                  </a:cubicBezTo>
+                  <a:cubicBezTo>
+                    <a:pt x="36" y="9"/>
+                    <a:pt x="31" y="4"/>
+                    <a:pt x="20" y="4"/>
+                  </a:cubicBezTo>
+                  <a:close/>
+                </a:path>
+              </a:pathLst>
+            </a:custGeom>
+            <a:grpFill/>
+            <a:ln>
+              <a:noFill/>
+            </a:ln>
+            <a:extLst>
+              <a:ext uri="{91240B29-F687-4f45-9708-019B960494DF}">
+                <a14:hiddenLine xmlns="" xmlns:a16="http://schemas.microsoft.com/office/drawing/2014/main" xmlns:p14="http://schemas.microsoft.com/office/powerpoint/2010/main" xmlns:a14="http://schemas.microsoft.com/office/drawing/2010/main" w="9525">
+                  <a:solidFill>
+                    <a:srgbClr val="000000"/>
+                  </a:solidFill>
+                  <a:round/>
+                  <a:headEnd/>
+                  <a:tailEnd/>
+                </a14:hiddenLine>
+              </a:ext>
+            </a:extLst>
+          </p:spPr>
+        </p:sp>
+        <p:sp>
+          <p:nvSpPr>
+            <p:cNvPr id="21" name="Freeform 13">
+              <a:extLst>
+                <a:ext uri="{FF2B5EF4-FFF2-40B4-BE49-F238E27FC236}">
+                  <a16:creationId xmlns:a16="http://schemas.microsoft.com/office/drawing/2014/main" id="{82255D2F-85A1-4A19-8BC4-EB2715F36CCE}"/>
+                </a:ext>
+                <a:ext uri="{C183D7F6-B498-43B3-948B-1728B52AA6E4}">
+                  <adec:decorative xmlns:adec="http://schemas.microsoft.com/office/drawing/2017/decorative" val="1"/>
+                </a:ext>
+              </a:extLst>
+            </p:cNvPr>
+            <p:cNvSpPr>
+              <a:spLocks noEditPoints="1"/>
+            </p:cNvSpPr>
+            <p:nvPr>
+              <p:extLst>
+                <p:ext uri="{386F3935-93C4-4BCD-93E2-E3B085C9AB24}">
+                  <p16:designElem xmlns:p16="http://schemas.microsoft.com/office/powerpoint/2015/main" val="1"/>
+                </p:ext>
+              </p:extLst>
+            </p:nvPr>
+          </p:nvSpPr>
+          <p:spPr bwMode="auto">
+            <a:xfrm>
+              <a:off x="588962" y="903288"/>
+              <a:ext cx="190500" cy="190500"/>
+            </a:xfrm>
+            <a:custGeom>
+              <a:avLst/>
+              <a:gdLst/>
+              <a:ahLst/>
+              <a:cxnLst/>
+              <a:rect l="0" t="0" r="r" b="b"/>
+              <a:pathLst>
+                <a:path w="40" h="40">
+                  <a:moveTo>
+                    <a:pt x="20" y="40"/>
+                  </a:moveTo>
+                  <a:cubicBezTo>
+                    <a:pt x="9" y="40"/>
+                    <a:pt x="0" y="31"/>
+                    <a:pt x="0" y="20"/>
+                  </a:cubicBezTo>
+                  <a:cubicBezTo>
+                    <a:pt x="0" y="9"/>
+                    <a:pt x="9" y="0"/>
+                    <a:pt x="20" y="0"/>
+                  </a:cubicBezTo>
+                  <a:cubicBezTo>
+                    <a:pt x="31" y="0"/>
+                    <a:pt x="40" y="9"/>
+                    <a:pt x="40" y="20"/>
+                  </a:cubicBezTo>
+                  <a:cubicBezTo>
+                    <a:pt x="40" y="31"/>
+                    <a:pt x="31" y="40"/>
+                    <a:pt x="20" y="40"/>
+                  </a:cubicBezTo>
+                  <a:close/>
+                  <a:moveTo>
+                    <a:pt x="20" y="4"/>
+                  </a:moveTo>
+                  <a:cubicBezTo>
+                    <a:pt x="11" y="4"/>
+                    <a:pt x="4" y="11"/>
+                    <a:pt x="4" y="20"/>
+                  </a:cubicBezTo>
+                  <a:cubicBezTo>
+                    <a:pt x="4" y="29"/>
+                    <a:pt x="11" y="36"/>
+                    <a:pt x="20" y="36"/>
+                  </a:cubicBezTo>
+                  <a:cubicBezTo>
+                    <a:pt x="29" y="36"/>
+                    <a:pt x="36" y="29"/>
+                    <a:pt x="36" y="20"/>
+                  </a:cubicBezTo>
+                  <a:cubicBezTo>
+                    <a:pt x="36" y="11"/>
+                    <a:pt x="29" y="4"/>
+                    <a:pt x="20" y="4"/>
+                  </a:cubicBezTo>
+                  <a:close/>
+                </a:path>
+              </a:pathLst>
+            </a:custGeom>
+            <a:grpFill/>
+            <a:ln>
+              <a:noFill/>
+            </a:ln>
+            <a:extLst>
+              <a:ext uri="{91240B29-F687-4f45-9708-019B960494DF}">
+                <a14:hiddenLine xmlns="" xmlns:a16="http://schemas.microsoft.com/office/drawing/2014/main" xmlns:p14="http://schemas.microsoft.com/office/powerpoint/2010/main" xmlns:a14="http://schemas.microsoft.com/office/drawing/2010/main" w="9525">
+                  <a:solidFill>
+                    <a:srgbClr val="000000"/>
+                  </a:solidFill>
+                  <a:round/>
+                  <a:headEnd/>
+                  <a:tailEnd/>
+                </a14:hiddenLine>
+              </a:ext>
+            </a:extLst>
+          </p:spPr>
+        </p:sp>
+        <p:sp>
+          <p:nvSpPr>
+            <p:cNvPr id="22" name="Freeform 14">
+              <a:extLst>
+                <a:ext uri="{FF2B5EF4-FFF2-40B4-BE49-F238E27FC236}">
+                  <a16:creationId xmlns:a16="http://schemas.microsoft.com/office/drawing/2014/main" id="{EBC3A004-9794-4EFA-83F0-989248797CD9}"/>
+                </a:ext>
+                <a:ext uri="{C183D7F6-B498-43B3-948B-1728B52AA6E4}">
+                  <adec:decorative xmlns:adec="http://schemas.microsoft.com/office/drawing/2017/decorative" val="1"/>
+                </a:ext>
+              </a:extLst>
+            </p:cNvPr>
+            <p:cNvSpPr/>
+            <p:nvPr>
+              <p:extLst>
+                <p:ext uri="{386F3935-93C4-4BCD-93E2-E3B085C9AB24}">
+                  <p16:designElem xmlns:p16="http://schemas.microsoft.com/office/powerpoint/2015/main" val="1"/>
+                </p:ext>
+              </p:extLst>
+            </p:nvPr>
+          </p:nvSpPr>
+          <p:spPr bwMode="auto">
+            <a:xfrm>
+              <a:off x="641350" y="0"/>
+              <a:ext cx="422275" cy="527050"/>
+            </a:xfrm>
+            <a:custGeom>
+              <a:avLst/>
+              <a:gdLst/>
+              <a:ahLst/>
+              <a:cxnLst/>
+              <a:rect l="0" t="0" r="r" b="b"/>
+              <a:pathLst>
+                <a:path w="266" h="332">
+                  <a:moveTo>
+                    <a:pt x="257" y="332"/>
+                  </a:moveTo>
+                  <a:lnTo>
+                    <a:pt x="48" y="123"/>
+                  </a:lnTo>
+                  <a:lnTo>
+                    <a:pt x="0" y="6"/>
+                  </a:lnTo>
+                  <a:lnTo>
+                    <a:pt x="15" y="0"/>
+                  </a:lnTo>
+                  <a:lnTo>
+                    <a:pt x="63" y="114"/>
+                  </a:lnTo>
+                  <a:lnTo>
+                    <a:pt x="266" y="320"/>
+                  </a:lnTo>
+                  <a:lnTo>
+                    <a:pt x="257" y="332"/>
+                  </a:lnTo>
+                  <a:close/>
+                </a:path>
+              </a:pathLst>
+            </a:custGeom>
+            <a:grpFill/>
+            <a:ln>
+              <a:noFill/>
+            </a:ln>
+            <a:extLst>
+              <a:ext uri="{91240B29-F687-4f45-9708-019B960494DF}">
+                <a14:hiddenLine xmlns="" xmlns:a16="http://schemas.microsoft.com/office/drawing/2014/main" xmlns:p14="http://schemas.microsoft.com/office/powerpoint/2010/main" xmlns:a14="http://schemas.microsoft.com/office/drawing/2010/main" w="9525">
+                  <a:solidFill>
+                    <a:srgbClr val="000000"/>
+                  </a:solidFill>
+                  <a:round/>
+                  <a:headEnd/>
+                  <a:tailEnd/>
+                </a14:hiddenLine>
+              </a:ext>
+            </a:extLst>
+          </p:spPr>
+        </p:sp>
+        <p:sp>
+          <p:nvSpPr>
+            <p:cNvPr id="23" name="Freeform 15">
+              <a:extLst>
+                <a:ext uri="{FF2B5EF4-FFF2-40B4-BE49-F238E27FC236}">
+                  <a16:creationId xmlns:a16="http://schemas.microsoft.com/office/drawing/2014/main" id="{6EFD9FC3-E11A-44E3-BCAC-A07F3C601F22}"/>
+                </a:ext>
+                <a:ext uri="{C183D7F6-B498-43B3-948B-1728B52AA6E4}">
+                  <adec:decorative xmlns:adec="http://schemas.microsoft.com/office/drawing/2017/decorative" val="1"/>
+                </a:ext>
+              </a:extLst>
+            </p:cNvPr>
+            <p:cNvSpPr>
+              <a:spLocks noEditPoints="1"/>
+            </p:cNvSpPr>
+            <p:nvPr>
+              <p:extLst>
+                <p:ext uri="{386F3935-93C4-4BCD-93E2-E3B085C9AB24}">
+                  <p16:designElem xmlns:p16="http://schemas.microsoft.com/office/powerpoint/2015/main" val="1"/>
+                </p:ext>
+              </p:extLst>
+            </p:nvPr>
+          </p:nvSpPr>
+          <p:spPr bwMode="auto">
+            <a:xfrm>
+              <a:off x="1020762" y="488950"/>
+              <a:ext cx="161925" cy="147638"/>
+            </a:xfrm>
+            <a:custGeom>
+              <a:avLst/>
+              <a:gdLst/>
+              <a:ahLst/>
+              <a:cxnLst/>
+              <a:rect l="0" t="0" r="r" b="b"/>
+              <a:pathLst>
+                <a:path w="34" h="31">
+                  <a:moveTo>
+                    <a:pt x="17" y="31"/>
+                  </a:moveTo>
+                  <a:cubicBezTo>
+                    <a:pt x="13" y="31"/>
+                    <a:pt x="9" y="30"/>
+                    <a:pt x="6" y="27"/>
+                  </a:cubicBezTo>
+                  <a:cubicBezTo>
+                    <a:pt x="0" y="20"/>
+                    <a:pt x="0" y="10"/>
+                    <a:pt x="6" y="4"/>
+                  </a:cubicBezTo>
+                  <a:cubicBezTo>
+                    <a:pt x="9" y="1"/>
+                    <a:pt x="13" y="0"/>
+                    <a:pt x="17" y="0"/>
+                  </a:cubicBezTo>
+                  <a:cubicBezTo>
+                    <a:pt x="21" y="0"/>
+                    <a:pt x="25" y="1"/>
+                    <a:pt x="28" y="4"/>
+                  </a:cubicBezTo>
+                  <a:cubicBezTo>
+                    <a:pt x="34" y="10"/>
+                    <a:pt x="34" y="20"/>
+                    <a:pt x="28" y="27"/>
+                  </a:cubicBezTo>
+                  <a:cubicBezTo>
+                    <a:pt x="25" y="30"/>
+                    <a:pt x="21" y="31"/>
+                    <a:pt x="17" y="31"/>
+                  </a:cubicBezTo>
+                  <a:close/>
+                  <a:moveTo>
+                    <a:pt x="17" y="4"/>
+                  </a:moveTo>
+                  <a:cubicBezTo>
+                    <a:pt x="14" y="4"/>
+                    <a:pt x="11" y="5"/>
+                    <a:pt x="9" y="7"/>
+                  </a:cubicBezTo>
+                  <a:cubicBezTo>
+                    <a:pt x="4" y="12"/>
+                    <a:pt x="4" y="19"/>
+                    <a:pt x="9" y="24"/>
+                  </a:cubicBezTo>
+                  <a:cubicBezTo>
+                    <a:pt x="11" y="26"/>
+                    <a:pt x="14" y="27"/>
+                    <a:pt x="17" y="27"/>
+                  </a:cubicBezTo>
+                  <a:cubicBezTo>
+                    <a:pt x="20" y="27"/>
+                    <a:pt x="23" y="26"/>
+                    <a:pt x="25" y="24"/>
+                  </a:cubicBezTo>
+                  <a:cubicBezTo>
+                    <a:pt x="30" y="19"/>
+                    <a:pt x="30" y="12"/>
+                    <a:pt x="25" y="7"/>
+                  </a:cubicBezTo>
+                  <a:cubicBezTo>
+                    <a:pt x="23" y="5"/>
+                    <a:pt x="20" y="4"/>
+                    <a:pt x="17" y="4"/>
+                  </a:cubicBezTo>
+                  <a:close/>
+                </a:path>
+              </a:pathLst>
+            </a:custGeom>
+            <a:grpFill/>
+            <a:ln>
+              <a:noFill/>
+            </a:ln>
+            <a:extLst>
+              <a:ext uri="{91240B29-F687-4f45-9708-019B960494DF}">
+                <a14:hiddenLine xmlns="" xmlns:a16="http://schemas.microsoft.com/office/drawing/2014/main" xmlns:p14="http://schemas.microsoft.com/office/powerpoint/2010/main" xmlns:a14="http://schemas.microsoft.com/office/drawing/2010/main" w="9525">
+                  <a:solidFill>
+                    <a:srgbClr val="000000"/>
+                  </a:solidFill>
+                  <a:round/>
+                  <a:headEnd/>
+                  <a:tailEnd/>
+                </a14:hiddenLine>
+              </a:ext>
+            </a:extLst>
+          </p:spPr>
+        </p:sp>
+        <p:sp>
+          <p:nvSpPr>
+            <p:cNvPr id="24" name="Line 16">
+              <a:extLst>
+                <a:ext uri="{FF2B5EF4-FFF2-40B4-BE49-F238E27FC236}">
+                  <a16:creationId xmlns:a16="http://schemas.microsoft.com/office/drawing/2014/main" id="{AB6AB6F7-6592-4028-B349-1C0E53A29CDC}"/>
+                </a:ext>
+                <a:ext uri="{C183D7F6-B498-43B3-948B-1728B52AA6E4}">
+                  <adec:decorative xmlns:adec="http://schemas.microsoft.com/office/drawing/2017/decorative" val="1"/>
+                </a:ext>
+              </a:extLst>
+            </p:cNvPr>
+            <p:cNvSpPr>
+              <a:spLocks noChangeShapeType="1"/>
+            </p:cNvSpPr>
+            <p:nvPr>
+              <p:extLst>
+                <p:ext uri="{386F3935-93C4-4BCD-93E2-E3B085C9AB24}">
+                  <p16:designElem xmlns:p16="http://schemas.microsoft.com/office/powerpoint/2015/main" val="1"/>
+                </p:ext>
+              </p:extLst>
+            </p:nvPr>
+          </p:nvSpPr>
+          <p:spPr bwMode="auto">
+            <a:xfrm>
+              <a:off x="-4763" y="9525"/>
+              <a:ext cx="0" cy="0"/>
+            </a:xfrm>
+            <a:prstGeom prst="line">
+              <a:avLst/>
+            </a:prstGeom>
+            <a:grpFill/>
+            <a:ln w="15" cap="flat">
+              <a:solidFill>
+                <a:srgbClr val="FFFFFF"/>
+              </a:solidFill>
+              <a:prstDash val="solid"/>
+              <a:miter lim="800000"/>
+              <a:headEnd/>
+              <a:tailEnd/>
+            </a:ln>
+          </p:spPr>
+        </p:sp>
+        <p:sp>
+          <p:nvSpPr>
+            <p:cNvPr id="25" name="Freeform 17">
+              <a:extLst>
+                <a:ext uri="{FF2B5EF4-FFF2-40B4-BE49-F238E27FC236}">
+                  <a16:creationId xmlns:a16="http://schemas.microsoft.com/office/drawing/2014/main" id="{6C2415E6-F914-4C11-B48B-4910AA6CA6BD}"/>
+                </a:ext>
+                <a:ext uri="{C183D7F6-B498-43B3-948B-1728B52AA6E4}">
+                  <adec:decorative xmlns:adec="http://schemas.microsoft.com/office/drawing/2017/decorative" val="1"/>
+                </a:ext>
+              </a:extLst>
+            </p:cNvPr>
+            <p:cNvSpPr/>
+            <p:nvPr>
+              <p:extLst>
+                <p:ext uri="{386F3935-93C4-4BCD-93E2-E3B085C9AB24}">
+                  <p16:designElem xmlns:p16="http://schemas.microsoft.com/office/powerpoint/2015/main" val="1"/>
+                </p:ext>
+              </p:extLst>
+            </p:nvPr>
+          </p:nvSpPr>
+          <p:spPr bwMode="auto">
+            <a:xfrm>
+              <a:off x="9525" y="1801813"/>
+              <a:ext cx="123825" cy="127000"/>
+            </a:xfrm>
+            <a:custGeom>
+              <a:avLst/>
+              <a:gdLst/>
+              <a:ahLst/>
+              <a:cxnLst/>
+              <a:rect l="0" t="0" r="r" b="b"/>
+              <a:pathLst>
+                <a:path w="78" h="80">
+                  <a:moveTo>
+                    <a:pt x="6" y="80"/>
+                  </a:moveTo>
+                  <a:lnTo>
+                    <a:pt x="0" y="71"/>
+                  </a:lnTo>
+                  <a:lnTo>
+                    <a:pt x="69" y="0"/>
+                  </a:lnTo>
+                  <a:lnTo>
+                    <a:pt x="78" y="9"/>
+                  </a:lnTo>
+                  <a:lnTo>
+                    <a:pt x="6" y="80"/>
+                  </a:lnTo>
+                  <a:close/>
+                </a:path>
+              </a:pathLst>
+            </a:custGeom>
+            <a:grpFill/>
+            <a:ln>
+              <a:noFill/>
+            </a:ln>
+            <a:extLst>
+              <a:ext uri="{91240B29-F687-4f45-9708-019B960494DF}">
+                <a14:hiddenLine xmlns="" xmlns:a16="http://schemas.microsoft.com/office/drawing/2014/main" xmlns:p14="http://schemas.microsoft.com/office/powerpoint/2010/main" xmlns:a14="http://schemas.microsoft.com/office/drawing/2010/main" w="9525">
+                  <a:solidFill>
+                    <a:srgbClr val="000000"/>
+                  </a:solidFill>
+                  <a:round/>
+                  <a:headEnd/>
+                  <a:tailEnd/>
+                </a14:hiddenLine>
+              </a:ext>
+            </a:extLst>
+          </p:spPr>
+        </p:sp>
+        <p:sp>
+          <p:nvSpPr>
+            <p:cNvPr id="26" name="Freeform 18">
+              <a:extLst>
+                <a:ext uri="{FF2B5EF4-FFF2-40B4-BE49-F238E27FC236}">
+                  <a16:creationId xmlns:a16="http://schemas.microsoft.com/office/drawing/2014/main" id="{2412013C-072A-489E-851A-CFEF91A9A6A9}"/>
+                </a:ext>
+                <a:ext uri="{C183D7F6-B498-43B3-948B-1728B52AA6E4}">
+                  <adec:decorative xmlns:adec="http://schemas.microsoft.com/office/drawing/2017/decorative" val="1"/>
+                </a:ext>
+              </a:extLst>
+            </p:cNvPr>
+            <p:cNvSpPr/>
+            <p:nvPr>
+              <p:extLst>
+                <p:ext uri="{386F3935-93C4-4BCD-93E2-E3B085C9AB24}">
+                  <p16:designElem xmlns:p16="http://schemas.microsoft.com/office/powerpoint/2015/main" val="1"/>
+                </p:ext>
+              </p:extLst>
+            </p:nvPr>
+          </p:nvSpPr>
+          <p:spPr bwMode="auto">
+            <a:xfrm>
+              <a:off x="-9525" y="3549650"/>
+              <a:ext cx="147638" cy="481013"/>
+            </a:xfrm>
+            <a:custGeom>
+              <a:avLst/>
+              <a:gdLst/>
+              <a:ahLst/>
+              <a:cxnLst/>
+              <a:rect l="0" t="0" r="r" b="b"/>
+              <a:pathLst>
+                <a:path w="93" h="303">
+                  <a:moveTo>
+                    <a:pt x="93" y="303"/>
+                  </a:moveTo>
+                  <a:lnTo>
+                    <a:pt x="78" y="303"/>
+                  </a:lnTo>
+                  <a:lnTo>
+                    <a:pt x="78" y="78"/>
+                  </a:lnTo>
+                  <a:lnTo>
+                    <a:pt x="0" y="12"/>
+                  </a:lnTo>
+                  <a:lnTo>
+                    <a:pt x="12" y="0"/>
+                  </a:lnTo>
+                  <a:lnTo>
+                    <a:pt x="93" y="69"/>
+                  </a:lnTo>
+                  <a:lnTo>
+                    <a:pt x="93" y="303"/>
+                  </a:lnTo>
+                  <a:close/>
+                </a:path>
+              </a:pathLst>
+            </a:custGeom>
+            <a:grpFill/>
+            <a:ln>
+              <a:noFill/>
+            </a:ln>
+            <a:extLst>
+              <a:ext uri="{91240B29-F687-4f45-9708-019B960494DF}">
+                <a14:hiddenLine xmlns="" xmlns:a16="http://schemas.microsoft.com/office/drawing/2014/main" xmlns:p14="http://schemas.microsoft.com/office/powerpoint/2010/main" xmlns:a14="http://schemas.microsoft.com/office/drawing/2010/main" w="9525">
+                  <a:solidFill>
+                    <a:srgbClr val="000000"/>
+                  </a:solidFill>
+                  <a:round/>
+                  <a:headEnd/>
+                  <a:tailEnd/>
+                </a14:hiddenLine>
+              </a:ext>
+            </a:extLst>
+          </p:spPr>
+        </p:sp>
+        <p:sp>
+          <p:nvSpPr>
+            <p:cNvPr id="27" name="Freeform 19">
+              <a:extLst>
+                <a:ext uri="{FF2B5EF4-FFF2-40B4-BE49-F238E27FC236}">
+                  <a16:creationId xmlns:a16="http://schemas.microsoft.com/office/drawing/2014/main" id="{DE93DF9F-296F-4DE4-8813-D8C04DE4CFC5}"/>
+                </a:ext>
+                <a:ext uri="{C183D7F6-B498-43B3-948B-1728B52AA6E4}">
+                  <adec:decorative xmlns:adec="http://schemas.microsoft.com/office/drawing/2017/decorative" val="1"/>
+                </a:ext>
+              </a:extLst>
+            </p:cNvPr>
+            <p:cNvSpPr/>
+            <p:nvPr>
+              <p:extLst>
+                <p:ext uri="{386F3935-93C4-4BCD-93E2-E3B085C9AB24}">
+                  <p16:designElem xmlns:p16="http://schemas.microsoft.com/office/powerpoint/2015/main" val="1"/>
+                </p:ext>
+              </p:extLst>
+            </p:nvPr>
+          </p:nvSpPr>
+          <p:spPr bwMode="auto">
+            <a:xfrm>
+              <a:off x="128587" y="1382713"/>
+              <a:ext cx="142875" cy="476250"/>
+            </a:xfrm>
+            <a:custGeom>
+              <a:avLst/>
+              <a:gdLst/>
+              <a:ahLst/>
+              <a:cxnLst/>
+              <a:rect l="0" t="0" r="r" b="b"/>
+              <a:pathLst>
+                <a:path w="90" h="300">
+                  <a:moveTo>
+                    <a:pt x="90" y="300"/>
+                  </a:moveTo>
+                  <a:lnTo>
+                    <a:pt x="78" y="300"/>
+                  </a:lnTo>
+                  <a:lnTo>
+                    <a:pt x="78" y="84"/>
+                  </a:lnTo>
+                  <a:lnTo>
+                    <a:pt x="0" y="9"/>
+                  </a:lnTo>
+                  <a:lnTo>
+                    <a:pt x="9" y="0"/>
+                  </a:lnTo>
+                  <a:lnTo>
+                    <a:pt x="90" y="81"/>
+                  </a:lnTo>
+                  <a:lnTo>
+                    <a:pt x="90" y="300"/>
+                  </a:lnTo>
+                  <a:close/>
+                </a:path>
+              </a:pathLst>
+            </a:custGeom>
+            <a:grpFill/>
+            <a:ln>
+              <a:noFill/>
+            </a:ln>
+            <a:extLst>
+              <a:ext uri="{91240B29-F687-4f45-9708-019B960494DF}">
+                <a14:hiddenLine xmlns="" xmlns:a16="http://schemas.microsoft.com/office/drawing/2014/main" xmlns:p14="http://schemas.microsoft.com/office/powerpoint/2010/main" xmlns:a14="http://schemas.microsoft.com/office/drawing/2010/main" w="9525">
+                  <a:solidFill>
+                    <a:srgbClr val="000000"/>
+                  </a:solidFill>
+                  <a:round/>
+                  <a:headEnd/>
+                  <a:tailEnd/>
+                </a14:hiddenLine>
+              </a:ext>
+            </a:extLst>
+          </p:spPr>
+        </p:sp>
+        <p:sp>
+          <p:nvSpPr>
+            <p:cNvPr id="28" name="Freeform 20">
+              <a:extLst>
+                <a:ext uri="{FF2B5EF4-FFF2-40B4-BE49-F238E27FC236}">
+                  <a16:creationId xmlns:a16="http://schemas.microsoft.com/office/drawing/2014/main" id="{F440D966-5030-460C-9916-BF9B91542185}"/>
+                </a:ext>
+                <a:ext uri="{C183D7F6-B498-43B3-948B-1728B52AA6E4}">
+                  <adec:decorative xmlns:adec="http://schemas.microsoft.com/office/drawing/2017/decorative" val="1"/>
+                </a:ext>
+              </a:extLst>
+            </p:cNvPr>
+            <p:cNvSpPr>
+              <a:spLocks noEditPoints="1"/>
+            </p:cNvSpPr>
+            <p:nvPr>
+              <p:extLst>
+                <p:ext uri="{386F3935-93C4-4BCD-93E2-E3B085C9AB24}">
+                  <p16:designElem xmlns:p16="http://schemas.microsoft.com/office/powerpoint/2015/main" val="1"/>
+                </p:ext>
+              </p:extLst>
+            </p:nvPr>
+          </p:nvSpPr>
+          <p:spPr bwMode="auto">
+            <a:xfrm>
+              <a:off x="204787" y="1849438"/>
+              <a:ext cx="114300" cy="107950"/>
+            </a:xfrm>
+            <a:custGeom>
+              <a:avLst/>
+              <a:gdLst/>
+              <a:ahLst/>
+              <a:cxnLst/>
+              <a:rect l="0" t="0" r="r" b="b"/>
+              <a:pathLst>
+                <a:path w="24" h="23">
+                  <a:moveTo>
+                    <a:pt x="12" y="23"/>
+                  </a:moveTo>
+                  <a:cubicBezTo>
+                    <a:pt x="6" y="23"/>
+                    <a:pt x="0" y="18"/>
+                    <a:pt x="0" y="12"/>
+                  </a:cubicBezTo>
+                  <a:cubicBezTo>
+                    <a:pt x="0" y="5"/>
+                    <a:pt x="6" y="0"/>
+                    <a:pt x="12" y="0"/>
+                  </a:cubicBezTo>
+                  <a:cubicBezTo>
+                    <a:pt x="18" y="0"/>
+                    <a:pt x="24" y="5"/>
+                    <a:pt x="24" y="12"/>
+                  </a:cubicBezTo>
+                  <a:cubicBezTo>
+                    <a:pt x="24" y="18"/>
+                    <a:pt x="18" y="23"/>
+                    <a:pt x="12" y="23"/>
+                  </a:cubicBezTo>
+                  <a:close/>
+                  <a:moveTo>
+                    <a:pt x="12" y="4"/>
+                  </a:moveTo>
+                  <a:cubicBezTo>
+                    <a:pt x="8" y="4"/>
+                    <a:pt x="4" y="8"/>
+                    <a:pt x="4" y="12"/>
+                  </a:cubicBezTo>
+                  <a:cubicBezTo>
+                    <a:pt x="4" y="16"/>
+                    <a:pt x="8" y="19"/>
+                    <a:pt x="12" y="19"/>
+                  </a:cubicBezTo>
+                  <a:cubicBezTo>
+                    <a:pt x="16" y="19"/>
+                    <a:pt x="20" y="16"/>
+                    <a:pt x="20" y="12"/>
+                  </a:cubicBezTo>
+                  <a:cubicBezTo>
+                    <a:pt x="20" y="8"/>
+                    <a:pt x="16" y="4"/>
+                    <a:pt x="12" y="4"/>
+                  </a:cubicBezTo>
+                  <a:close/>
+                </a:path>
+              </a:pathLst>
+            </a:custGeom>
+            <a:grpFill/>
+            <a:ln>
+              <a:noFill/>
+            </a:ln>
+            <a:extLst>
+              <a:ext uri="{91240B29-F687-4f45-9708-019B960494DF}">
+                <a14:hiddenLine xmlns="" xmlns:a16="http://schemas.microsoft.com/office/drawing/2014/main" xmlns:p14="http://schemas.microsoft.com/office/powerpoint/2010/main" xmlns:a14="http://schemas.microsoft.com/office/drawing/2010/main" w="9525">
+                  <a:solidFill>
+                    <a:srgbClr val="000000"/>
+                  </a:solidFill>
+                  <a:round/>
+                  <a:headEnd/>
+                  <a:tailEnd/>
+                </a14:hiddenLine>
+              </a:ext>
+            </a:extLst>
+          </p:spPr>
+        </p:sp>
+        <p:sp>
+          <p:nvSpPr>
+            <p:cNvPr id="29" name="Rectangle 21">
+              <a:extLst>
+                <a:ext uri="{FF2B5EF4-FFF2-40B4-BE49-F238E27FC236}">
+                  <a16:creationId xmlns:a16="http://schemas.microsoft.com/office/drawing/2014/main" id="{1EFE245D-BA05-4F4D-A6E8-40739F48E769}"/>
+                </a:ext>
+                <a:ext uri="{C183D7F6-B498-43B3-948B-1728B52AA6E4}">
+                  <adec:decorative xmlns:adec="http://schemas.microsoft.com/office/drawing/2017/decorative" val="1"/>
+                </a:ext>
+              </a:extLst>
+            </p:cNvPr>
+            <p:cNvSpPr>
+              <a:spLocks noChangeArrowheads="1"/>
+            </p:cNvSpPr>
+            <p:nvPr>
+              <p:extLst>
+                <p:ext uri="{386F3935-93C4-4BCD-93E2-E3B085C9AB24}">
+                  <p16:designElem xmlns:p16="http://schemas.microsoft.com/office/powerpoint/2015/main" val="1"/>
+                </p:ext>
+              </p:extLst>
+            </p:nvPr>
+          </p:nvSpPr>
+          <p:spPr bwMode="auto">
+            <a:xfrm>
+              <a:off x="133350" y="4662488"/>
+              <a:ext cx="23813" cy="2181225"/>
+            </a:xfrm>
+            <a:prstGeom prst="rect">
+              <a:avLst/>
+            </a:prstGeom>
+            <a:grpFill/>
+            <a:ln>
+              <a:noFill/>
+            </a:ln>
+            <a:extLst>
+              <a:ext uri="{91240B29-F687-4f45-9708-019B960494DF}">
+                <a14:hiddenLine xmlns="" xmlns:a16="http://schemas.microsoft.com/office/drawing/2014/main" xmlns:p14="http://schemas.microsoft.com/office/powerpoint/2010/main" xmlns:a14="http://schemas.microsoft.com/office/drawing/2010/main" w="9525">
+                  <a:solidFill>
+                    <a:srgbClr val="000000"/>
+                  </a:solidFill>
+                  <a:miter lim="800000"/>
+                  <a:headEnd/>
+                  <a:tailEnd/>
+                </a14:hiddenLine>
+              </a:ext>
+            </a:extLst>
+          </p:spPr>
+        </p:sp>
+        <p:sp>
+          <p:nvSpPr>
+            <p:cNvPr id="30" name="Freeform 22">
+              <a:extLst>
+                <a:ext uri="{FF2B5EF4-FFF2-40B4-BE49-F238E27FC236}">
+                  <a16:creationId xmlns:a16="http://schemas.microsoft.com/office/drawing/2014/main" id="{ED67811C-F735-441C-98A6-2517EC099AFD}"/>
+                </a:ext>
+                <a:ext uri="{C183D7F6-B498-43B3-948B-1728B52AA6E4}">
+                  <adec:decorative xmlns:adec="http://schemas.microsoft.com/office/drawing/2017/decorative" val="1"/>
+                </a:ext>
+              </a:extLst>
+            </p:cNvPr>
+            <p:cNvSpPr/>
+            <p:nvPr>
+              <p:extLst>
+                <p:ext uri="{386F3935-93C4-4BCD-93E2-E3B085C9AB24}">
+                  <p16:designElem xmlns:p16="http://schemas.microsoft.com/office/powerpoint/2015/main" val="1"/>
+                </p:ext>
+              </p:extLst>
+            </p:nvPr>
+          </p:nvSpPr>
+          <p:spPr bwMode="auto">
+            <a:xfrm>
+              <a:off x="223837" y="5041900"/>
+              <a:ext cx="369888" cy="1801813"/>
+            </a:xfrm>
+            <a:custGeom>
+              <a:avLst/>
+              <a:gdLst/>
+              <a:ahLst/>
+              <a:cxnLst/>
+              <a:rect l="0" t="0" r="r" b="b"/>
+              <a:pathLst>
+                <a:path w="233" h="1135">
+                  <a:moveTo>
+                    <a:pt x="15" y="1135"/>
+                  </a:moveTo>
+                  <a:lnTo>
+                    <a:pt x="0" y="1135"/>
+                  </a:lnTo>
+                  <a:lnTo>
+                    <a:pt x="0" y="515"/>
+                  </a:lnTo>
+                  <a:lnTo>
+                    <a:pt x="0" y="512"/>
+                  </a:lnTo>
+                  <a:lnTo>
+                    <a:pt x="218" y="0"/>
+                  </a:lnTo>
+                  <a:lnTo>
+                    <a:pt x="233" y="6"/>
+                  </a:lnTo>
+                  <a:lnTo>
+                    <a:pt x="15" y="518"/>
+                  </a:lnTo>
+                  <a:lnTo>
+                    <a:pt x="15" y="1135"/>
+                  </a:lnTo>
+                  <a:close/>
+                </a:path>
+              </a:pathLst>
+            </a:custGeom>
+            <a:grpFill/>
+            <a:ln>
+              <a:noFill/>
+            </a:ln>
+            <a:extLst>
+              <a:ext uri="{91240B29-F687-4f45-9708-019B960494DF}">
+                <a14:hiddenLine xmlns="" xmlns:a16="http://schemas.microsoft.com/office/drawing/2014/main" xmlns:p14="http://schemas.microsoft.com/office/powerpoint/2010/main" xmlns:a14="http://schemas.microsoft.com/office/drawing/2010/main" w="9525">
+                  <a:solidFill>
+                    <a:srgbClr val="000000"/>
+                  </a:solidFill>
+                  <a:round/>
+                  <a:headEnd/>
+                  <a:tailEnd/>
+                </a14:hiddenLine>
+              </a:ext>
+            </a:extLst>
+          </p:spPr>
+        </p:sp>
+        <p:sp>
+          <p:nvSpPr>
+            <p:cNvPr id="31" name="Freeform 23">
+              <a:extLst>
+                <a:ext uri="{FF2B5EF4-FFF2-40B4-BE49-F238E27FC236}">
+                  <a16:creationId xmlns:a16="http://schemas.microsoft.com/office/drawing/2014/main" id="{3070FC44-32F9-470F-A131-868F3F1DB72F}"/>
+                </a:ext>
+                <a:ext uri="{C183D7F6-B498-43B3-948B-1728B52AA6E4}">
+                  <adec:decorative xmlns:adec="http://schemas.microsoft.com/office/drawing/2017/decorative" val="1"/>
+                </a:ext>
+              </a:extLst>
+            </p:cNvPr>
+            <p:cNvSpPr>
+              <a:spLocks noEditPoints="1"/>
+            </p:cNvSpPr>
+            <p:nvPr>
+              <p:extLst>
+                <p:ext uri="{386F3935-93C4-4BCD-93E2-E3B085C9AB24}">
+                  <p16:designElem xmlns:p16="http://schemas.microsoft.com/office/powerpoint/2015/main" val="1"/>
+                </p:ext>
+              </p:extLst>
+            </p:nvPr>
+          </p:nvSpPr>
+          <p:spPr bwMode="auto">
+            <a:xfrm>
+              <a:off x="52387" y="4481513"/>
+              <a:ext cx="190500" cy="190500"/>
+            </a:xfrm>
+            <a:custGeom>
+              <a:avLst/>
+              <a:gdLst/>
+              <a:ahLst/>
+              <a:cxnLst/>
+              <a:rect l="0" t="0" r="r" b="b"/>
+              <a:pathLst>
+                <a:path w="40" h="40">
+                  <a:moveTo>
+                    <a:pt x="20" y="40"/>
+                  </a:moveTo>
+                  <a:cubicBezTo>
+                    <a:pt x="9" y="40"/>
+                    <a:pt x="0" y="31"/>
+                    <a:pt x="0" y="20"/>
+                  </a:cubicBezTo>
+                  <a:cubicBezTo>
+                    <a:pt x="0" y="9"/>
+                    <a:pt x="9" y="0"/>
+                    <a:pt x="20" y="0"/>
+                  </a:cubicBezTo>
+                  <a:cubicBezTo>
+                    <a:pt x="31" y="0"/>
+                    <a:pt x="40" y="9"/>
+                    <a:pt x="40" y="20"/>
+                  </a:cubicBezTo>
+                  <a:cubicBezTo>
+                    <a:pt x="40" y="31"/>
+                    <a:pt x="31" y="40"/>
+                    <a:pt x="20" y="40"/>
+                  </a:cubicBezTo>
+                  <a:close/>
+                  <a:moveTo>
+                    <a:pt x="20" y="4"/>
+                  </a:moveTo>
+                  <a:cubicBezTo>
+                    <a:pt x="11" y="4"/>
+                    <a:pt x="4" y="11"/>
+                    <a:pt x="4" y="20"/>
+                  </a:cubicBezTo>
+                  <a:cubicBezTo>
+                    <a:pt x="4" y="29"/>
+                    <a:pt x="11" y="36"/>
+                    <a:pt x="20" y="36"/>
+                  </a:cubicBezTo>
+                  <a:cubicBezTo>
+                    <a:pt x="28" y="36"/>
+                    <a:pt x="36" y="29"/>
+                    <a:pt x="36" y="20"/>
+                  </a:cubicBezTo>
+                  <a:cubicBezTo>
+                    <a:pt x="36" y="11"/>
+                    <a:pt x="28" y="4"/>
+                    <a:pt x="20" y="4"/>
+                  </a:cubicBezTo>
+                  <a:close/>
+                </a:path>
+              </a:pathLst>
+            </a:custGeom>
+            <a:grpFill/>
+            <a:ln>
+              <a:noFill/>
+            </a:ln>
+            <a:extLst>
+              <a:ext uri="{91240B29-F687-4f45-9708-019B960494DF}">
+                <a14:hiddenLine xmlns="" xmlns:a16="http://schemas.microsoft.com/office/drawing/2014/main" xmlns:p14="http://schemas.microsoft.com/office/powerpoint/2010/main" xmlns:a14="http://schemas.microsoft.com/office/drawing/2010/main" w="9525">
+                  <a:solidFill>
+                    <a:srgbClr val="000000"/>
+                  </a:solidFill>
+                  <a:round/>
+                  <a:headEnd/>
+                  <a:tailEnd/>
+                </a14:hiddenLine>
+              </a:ext>
+            </a:extLst>
+          </p:spPr>
+        </p:sp>
+        <p:sp>
+          <p:nvSpPr>
+            <p:cNvPr id="32" name="Freeform 24">
+              <a:extLst>
+                <a:ext uri="{FF2B5EF4-FFF2-40B4-BE49-F238E27FC236}">
+                  <a16:creationId xmlns:a16="http://schemas.microsoft.com/office/drawing/2014/main" id="{95FB52C7-C779-4E3F-978C-4595FEF868F5}"/>
+                </a:ext>
+                <a:ext uri="{C183D7F6-B498-43B3-948B-1728B52AA6E4}">
+                  <adec:decorative xmlns:adec="http://schemas.microsoft.com/office/drawing/2017/decorative" val="1"/>
+                </a:ext>
+              </a:extLst>
+            </p:cNvPr>
+            <p:cNvSpPr/>
+            <p:nvPr>
+              <p:extLst>
+                <p:ext uri="{386F3935-93C4-4BCD-93E2-E3B085C9AB24}">
+                  <p16:designElem xmlns:p16="http://schemas.microsoft.com/office/powerpoint/2015/main" val="1"/>
+                </p:ext>
+              </p:extLst>
+            </p:nvPr>
+          </p:nvSpPr>
+          <p:spPr bwMode="auto">
+            <a:xfrm>
+              <a:off x="-14288" y="5627688"/>
+              <a:ext cx="85725" cy="1216025"/>
+            </a:xfrm>
+            <a:custGeom>
+              <a:avLst/>
+              <a:gdLst/>
+              <a:ahLst/>
+              <a:cxnLst/>
+              <a:rect l="0" t="0" r="r" b="b"/>
+              <a:pathLst>
+                <a:path w="54" h="766">
+                  <a:moveTo>
+                    <a:pt x="54" y="766"/>
+                  </a:moveTo>
+                  <a:lnTo>
+                    <a:pt x="36" y="766"/>
+                  </a:lnTo>
+                  <a:lnTo>
+                    <a:pt x="36" y="149"/>
+                  </a:lnTo>
+                  <a:lnTo>
+                    <a:pt x="0" y="3"/>
+                  </a:lnTo>
+                  <a:lnTo>
+                    <a:pt x="18" y="0"/>
+                  </a:lnTo>
+                  <a:lnTo>
+                    <a:pt x="54" y="146"/>
+                  </a:lnTo>
+                  <a:lnTo>
+                    <a:pt x="54" y="766"/>
+                  </a:lnTo>
+                  <a:close/>
+                </a:path>
+              </a:pathLst>
+            </a:custGeom>
+            <a:grpFill/>
+            <a:ln>
+              <a:noFill/>
+            </a:ln>
+            <a:extLst>
+              <a:ext uri="{91240B29-F687-4f45-9708-019B960494DF}">
+                <a14:hiddenLine xmlns="" xmlns:a16="http://schemas.microsoft.com/office/drawing/2014/main" xmlns:p14="http://schemas.microsoft.com/office/powerpoint/2010/main" xmlns:a14="http://schemas.microsoft.com/office/drawing/2010/main" w="9525">
+                  <a:solidFill>
+                    <a:srgbClr val="000000"/>
+                  </a:solidFill>
+                  <a:round/>
+                  <a:headEnd/>
+                  <a:tailEnd/>
+                </a14:hiddenLine>
+              </a:ext>
+            </a:extLst>
+          </p:spPr>
+        </p:sp>
+        <p:sp>
+          <p:nvSpPr>
+            <p:cNvPr id="33" name="Freeform 25">
+              <a:extLst>
+                <a:ext uri="{FF2B5EF4-FFF2-40B4-BE49-F238E27FC236}">
+                  <a16:creationId xmlns:a16="http://schemas.microsoft.com/office/drawing/2014/main" id="{D4EB1759-62AC-4B24-9DC6-E4F8737E8984}"/>
+                </a:ext>
+                <a:ext uri="{C183D7F6-B498-43B3-948B-1728B52AA6E4}">
+                  <adec:decorative xmlns:adec="http://schemas.microsoft.com/office/drawing/2017/decorative" val="1"/>
+                </a:ext>
+              </a:extLst>
+            </p:cNvPr>
+            <p:cNvSpPr>
+              <a:spLocks noEditPoints="1"/>
+            </p:cNvSpPr>
+            <p:nvPr>
+              <p:extLst>
+                <p:ext uri="{386F3935-93C4-4BCD-93E2-E3B085C9AB24}">
+                  <p16:designElem xmlns:p16="http://schemas.microsoft.com/office/powerpoint/2015/main" val="1"/>
+                </p:ext>
+              </p:extLst>
+            </p:nvPr>
+          </p:nvSpPr>
+          <p:spPr bwMode="auto">
+            <a:xfrm>
+              <a:off x="527050" y="4867275"/>
+              <a:ext cx="190500" cy="188913"/>
+            </a:xfrm>
+            <a:custGeom>
+              <a:avLst/>
+              <a:gdLst/>
+              <a:ahLst/>
+              <a:cxnLst/>
+              <a:rect l="0" t="0" r="r" b="b"/>
+              <a:pathLst>
+                <a:path w="40" h="40">
+                  <a:moveTo>
+                    <a:pt x="20" y="40"/>
+                  </a:moveTo>
+                  <a:cubicBezTo>
+                    <a:pt x="9" y="40"/>
+                    <a:pt x="0" y="31"/>
+                    <a:pt x="0" y="20"/>
+                  </a:cubicBezTo>
+                  <a:cubicBezTo>
+                    <a:pt x="0" y="9"/>
+                    <a:pt x="9" y="0"/>
+                    <a:pt x="20" y="0"/>
+                  </a:cubicBezTo>
+                  <a:cubicBezTo>
+                    <a:pt x="31" y="0"/>
+                    <a:pt x="40" y="9"/>
+                    <a:pt x="40" y="20"/>
+                  </a:cubicBezTo>
+                  <a:cubicBezTo>
+                    <a:pt x="40" y="31"/>
+                    <a:pt x="31" y="40"/>
+                    <a:pt x="20" y="40"/>
+                  </a:cubicBezTo>
+                  <a:close/>
+                  <a:moveTo>
+                    <a:pt x="20" y="4"/>
+                  </a:moveTo>
+                  <a:cubicBezTo>
+                    <a:pt x="11" y="4"/>
+                    <a:pt x="4" y="11"/>
+                    <a:pt x="4" y="20"/>
+                  </a:cubicBezTo>
+                  <a:cubicBezTo>
+                    <a:pt x="4" y="29"/>
+                    <a:pt x="11" y="36"/>
+                    <a:pt x="20" y="36"/>
+                  </a:cubicBezTo>
+                  <a:cubicBezTo>
+                    <a:pt x="29" y="36"/>
+                    <a:pt x="36" y="29"/>
+                    <a:pt x="36" y="20"/>
+                  </a:cubicBezTo>
+                  <a:cubicBezTo>
+                    <a:pt x="36" y="11"/>
+                    <a:pt x="29" y="4"/>
+                    <a:pt x="20" y="4"/>
+                  </a:cubicBezTo>
+                  <a:close/>
+                </a:path>
+              </a:pathLst>
+            </a:custGeom>
+            <a:grpFill/>
+            <a:ln>
+              <a:noFill/>
+            </a:ln>
+            <a:extLst>
+              <a:ext uri="{91240B29-F687-4f45-9708-019B960494DF}">
+                <a14:hiddenLine xmlns="" xmlns:a16="http://schemas.microsoft.com/office/drawing/2014/main" xmlns:p14="http://schemas.microsoft.com/office/powerpoint/2010/main" xmlns:a14="http://schemas.microsoft.com/office/drawing/2010/main" w="9525">
+                  <a:solidFill>
+                    <a:srgbClr val="000000"/>
+                  </a:solidFill>
+                  <a:round/>
+                  <a:headEnd/>
+                  <a:tailEnd/>
+                </a14:hiddenLine>
+              </a:ext>
+            </a:extLst>
+          </p:spPr>
+        </p:sp>
+        <p:sp>
+          <p:nvSpPr>
+            <p:cNvPr id="34" name="Freeform 26">
+              <a:extLst>
+                <a:ext uri="{FF2B5EF4-FFF2-40B4-BE49-F238E27FC236}">
+                  <a16:creationId xmlns:a16="http://schemas.microsoft.com/office/drawing/2014/main" id="{7BF6FB39-864B-4F58-86E8-790E16FB3CD7}"/>
+                </a:ext>
+                <a:ext uri="{C183D7F6-B498-43B3-948B-1728B52AA6E4}">
+                  <adec:decorative xmlns:adec="http://schemas.microsoft.com/office/drawing/2017/decorative" val="1"/>
+                </a:ext>
+              </a:extLst>
+            </p:cNvPr>
+            <p:cNvSpPr/>
+            <p:nvPr>
+              <p:extLst>
+                <p:ext uri="{386F3935-93C4-4BCD-93E2-E3B085C9AB24}">
+                  <p16:designElem xmlns:p16="http://schemas.microsoft.com/office/powerpoint/2015/main" val="1"/>
+                </p:ext>
+              </p:extLst>
+            </p:nvPr>
+          </p:nvSpPr>
+          <p:spPr bwMode="auto">
+            <a:xfrm>
+              <a:off x="309562" y="5422900"/>
+              <a:ext cx="374650" cy="1425575"/>
+            </a:xfrm>
+            <a:custGeom>
+              <a:avLst/>
+              <a:gdLst/>
+              <a:ahLst/>
+              <a:cxnLst/>
+              <a:rect l="0" t="0" r="r" b="b"/>
+              <a:pathLst>
+                <a:path w="236" h="898">
+                  <a:moveTo>
+                    <a:pt x="18" y="898"/>
+                  </a:moveTo>
+                  <a:lnTo>
+                    <a:pt x="0" y="898"/>
+                  </a:lnTo>
+                  <a:lnTo>
+                    <a:pt x="0" y="515"/>
+                  </a:lnTo>
+                  <a:lnTo>
+                    <a:pt x="3" y="512"/>
+                  </a:lnTo>
+                  <a:lnTo>
+                    <a:pt x="221" y="0"/>
+                  </a:lnTo>
+                  <a:lnTo>
+                    <a:pt x="236" y="6"/>
+                  </a:lnTo>
+                  <a:lnTo>
+                    <a:pt x="18" y="518"/>
+                  </a:lnTo>
+                  <a:lnTo>
+                    <a:pt x="18" y="898"/>
+                  </a:lnTo>
+                  <a:close/>
+                </a:path>
+              </a:pathLst>
+            </a:custGeom>
+            <a:grpFill/>
+            <a:ln>
+              <a:noFill/>
+            </a:ln>
+            <a:extLst>
+              <a:ext uri="{91240B29-F687-4f45-9708-019B960494DF}">
+                <a14:hiddenLine xmlns="" xmlns:a16="http://schemas.microsoft.com/office/drawing/2014/main" xmlns:p14="http://schemas.microsoft.com/office/powerpoint/2010/main" xmlns:a14="http://schemas.microsoft.com/office/drawing/2010/main" w="9525">
+                  <a:solidFill>
+                    <a:srgbClr val="000000"/>
+                  </a:solidFill>
+                  <a:round/>
+                  <a:headEnd/>
+                  <a:tailEnd/>
+                </a14:hiddenLine>
+              </a:ext>
+            </a:extLst>
+          </p:spPr>
+        </p:sp>
+        <p:sp>
+          <p:nvSpPr>
+            <p:cNvPr id="35" name="Freeform 27">
+              <a:extLst>
+                <a:ext uri="{FF2B5EF4-FFF2-40B4-BE49-F238E27FC236}">
+                  <a16:creationId xmlns:a16="http://schemas.microsoft.com/office/drawing/2014/main" id="{5FE4FA46-B51C-43DA-87FC-2644ED117A01}"/>
+                </a:ext>
+                <a:ext uri="{C183D7F6-B498-43B3-948B-1728B52AA6E4}">
+                  <adec:decorative xmlns:adec="http://schemas.microsoft.com/office/drawing/2017/decorative" val="1"/>
+                </a:ext>
+              </a:extLst>
+            </p:cNvPr>
+            <p:cNvSpPr/>
+            <p:nvPr>
+              <p:extLst>
+                <p:ext uri="{386F3935-93C4-4BCD-93E2-E3B085C9AB24}">
+                  <p16:designElem xmlns:p16="http://schemas.microsoft.com/office/powerpoint/2015/main" val="1"/>
+                </p:ext>
+              </p:extLst>
+            </p:nvPr>
+          </p:nvSpPr>
+          <p:spPr bwMode="auto">
+            <a:xfrm>
+              <a:off x="569912" y="5945188"/>
+              <a:ext cx="152400" cy="912813"/>
+            </a:xfrm>
+            <a:custGeom>
+              <a:avLst/>
+              <a:gdLst/>
+              <a:ahLst/>
+              <a:cxnLst/>
+              <a:rect l="0" t="0" r="r" b="b"/>
+              <a:pathLst>
+                <a:path w="96" h="575">
+                  <a:moveTo>
+                    <a:pt x="15" y="575"/>
+                  </a:moveTo>
+                  <a:lnTo>
+                    <a:pt x="0" y="569"/>
+                  </a:lnTo>
+                  <a:lnTo>
+                    <a:pt x="81" y="383"/>
+                  </a:lnTo>
+                  <a:lnTo>
+                    <a:pt x="81" y="0"/>
+                  </a:lnTo>
+                  <a:lnTo>
+                    <a:pt x="96" y="0"/>
+                  </a:lnTo>
+                  <a:lnTo>
+                    <a:pt x="96" y="386"/>
+                  </a:lnTo>
+                  <a:lnTo>
+                    <a:pt x="15" y="575"/>
+                  </a:lnTo>
+                  <a:close/>
+                </a:path>
+              </a:pathLst>
+            </a:custGeom>
+            <a:grpFill/>
+            <a:ln>
+              <a:noFill/>
+            </a:ln>
+            <a:extLst>
+              <a:ext uri="{91240B29-F687-4f45-9708-019B960494DF}">
+                <a14:hiddenLine xmlns="" xmlns:a16="http://schemas.microsoft.com/office/drawing/2014/main" xmlns:p14="http://schemas.microsoft.com/office/powerpoint/2010/main" xmlns:a14="http://schemas.microsoft.com/office/drawing/2010/main" w="9525">
+                  <a:solidFill>
+                    <a:srgbClr val="000000"/>
+                  </a:solidFill>
+                  <a:round/>
+                  <a:headEnd/>
+                  <a:tailEnd/>
+                </a14:hiddenLine>
+              </a:ext>
+            </a:extLst>
+          </p:spPr>
+        </p:sp>
+        <p:sp>
+          <p:nvSpPr>
+            <p:cNvPr id="36" name="Freeform 28">
+              <a:extLst>
+                <a:ext uri="{FF2B5EF4-FFF2-40B4-BE49-F238E27FC236}">
+                  <a16:creationId xmlns:a16="http://schemas.microsoft.com/office/drawing/2014/main" id="{25DD1322-2D3A-4E7B-B23B-B4F96E02C29F}"/>
+                </a:ext>
+                <a:ext uri="{C183D7F6-B498-43B3-948B-1728B52AA6E4}">
+                  <adec:decorative xmlns:adec="http://schemas.microsoft.com/office/drawing/2017/decorative" val="1"/>
+                </a:ext>
+              </a:extLst>
+            </p:cNvPr>
+            <p:cNvSpPr>
+              <a:spLocks noEditPoints="1"/>
+            </p:cNvSpPr>
+            <p:nvPr>
+              <p:extLst>
+                <p:ext uri="{386F3935-93C4-4BCD-93E2-E3B085C9AB24}">
+                  <p16:designElem xmlns:p16="http://schemas.microsoft.com/office/powerpoint/2015/main" val="1"/>
+                </p:ext>
+              </p:extLst>
+            </p:nvPr>
+          </p:nvSpPr>
+          <p:spPr bwMode="auto">
+            <a:xfrm>
+              <a:off x="612775" y="5246688"/>
+              <a:ext cx="190500" cy="190500"/>
+            </a:xfrm>
+            <a:custGeom>
+              <a:avLst/>
+              <a:gdLst/>
+              <a:ahLst/>
+              <a:cxnLst/>
+              <a:rect l="0" t="0" r="r" b="b"/>
+              <a:pathLst>
+                <a:path w="40" h="40">
+                  <a:moveTo>
+                    <a:pt x="20" y="40"/>
+                  </a:moveTo>
+                  <a:cubicBezTo>
+                    <a:pt x="9" y="40"/>
+                    <a:pt x="0" y="31"/>
+                    <a:pt x="0" y="20"/>
+                  </a:cubicBezTo>
+                  <a:cubicBezTo>
+                    <a:pt x="0" y="9"/>
+                    <a:pt x="9" y="0"/>
+                    <a:pt x="20" y="0"/>
+                  </a:cubicBezTo>
+                  <a:cubicBezTo>
+                    <a:pt x="31" y="0"/>
+                    <a:pt x="40" y="9"/>
+                    <a:pt x="40" y="20"/>
+                  </a:cubicBezTo>
+                  <a:cubicBezTo>
+                    <a:pt x="40" y="31"/>
+                    <a:pt x="31" y="40"/>
+                    <a:pt x="20" y="40"/>
+                  </a:cubicBezTo>
+                  <a:close/>
+                  <a:moveTo>
+                    <a:pt x="20" y="4"/>
+                  </a:moveTo>
+                  <a:cubicBezTo>
+                    <a:pt x="12" y="4"/>
+                    <a:pt x="4" y="11"/>
+                    <a:pt x="4" y="20"/>
+                  </a:cubicBezTo>
+                  <a:cubicBezTo>
+                    <a:pt x="4" y="29"/>
+                    <a:pt x="12" y="36"/>
+                    <a:pt x="20" y="36"/>
+                  </a:cubicBezTo>
+                  <a:cubicBezTo>
+                    <a:pt x="29" y="36"/>
+                    <a:pt x="36" y="29"/>
+                    <a:pt x="36" y="20"/>
+                  </a:cubicBezTo>
+                  <a:cubicBezTo>
+                    <a:pt x="36" y="11"/>
+                    <a:pt x="29" y="4"/>
+                    <a:pt x="20" y="4"/>
+                  </a:cubicBezTo>
+                  <a:close/>
+                </a:path>
+              </a:pathLst>
+            </a:custGeom>
+            <a:grpFill/>
+            <a:ln>
+              <a:noFill/>
+            </a:ln>
+            <a:extLst>
+              <a:ext uri="{91240B29-F687-4f45-9708-019B960494DF}">
+                <a14:hiddenLine xmlns="" xmlns:a16="http://schemas.microsoft.com/office/drawing/2014/main" xmlns:p14="http://schemas.microsoft.com/office/powerpoint/2010/main" xmlns:a14="http://schemas.microsoft.com/office/drawing/2010/main" w="9525">
+                  <a:solidFill>
+                    <a:srgbClr val="000000"/>
+                  </a:solidFill>
+                  <a:round/>
+                  <a:headEnd/>
+                  <a:tailEnd/>
+                </a14:hiddenLine>
+              </a:ext>
+            </a:extLst>
+          </p:spPr>
+        </p:sp>
+        <p:sp>
+          <p:nvSpPr>
+            <p:cNvPr id="37" name="Freeform 29">
+              <a:extLst>
+                <a:ext uri="{FF2B5EF4-FFF2-40B4-BE49-F238E27FC236}">
+                  <a16:creationId xmlns:a16="http://schemas.microsoft.com/office/drawing/2014/main" id="{6E4FFBEB-52BB-494D-AD99-A0F072AB6F35}"/>
+                </a:ext>
+                <a:ext uri="{C183D7F6-B498-43B3-948B-1728B52AA6E4}">
+                  <adec:decorative xmlns:adec="http://schemas.microsoft.com/office/drawing/2017/decorative" val="1"/>
+                </a:ext>
+              </a:extLst>
+            </p:cNvPr>
+            <p:cNvSpPr>
+              <a:spLocks noEditPoints="1"/>
+            </p:cNvSpPr>
+            <p:nvPr>
+              <p:extLst>
+                <p:ext uri="{386F3935-93C4-4BCD-93E2-E3B085C9AB24}">
+                  <p16:designElem xmlns:p16="http://schemas.microsoft.com/office/powerpoint/2015/main" val="1"/>
+                </p:ext>
+              </p:extLst>
+            </p:nvPr>
+          </p:nvSpPr>
+          <p:spPr bwMode="auto">
+            <a:xfrm>
+              <a:off x="612775" y="5764213"/>
+              <a:ext cx="190500" cy="190500"/>
+            </a:xfrm>
+            <a:custGeom>
+              <a:avLst/>
+              <a:gdLst/>
+              <a:ahLst/>
+              <a:cxnLst/>
+              <a:rect l="0" t="0" r="r" b="b"/>
+              <a:pathLst>
+                <a:path w="40" h="40">
+                  <a:moveTo>
+                    <a:pt x="20" y="40"/>
+                  </a:moveTo>
+                  <a:cubicBezTo>
+                    <a:pt x="9" y="40"/>
+                    <a:pt x="0" y="31"/>
+                    <a:pt x="0" y="20"/>
+                  </a:cubicBezTo>
+                  <a:cubicBezTo>
+                    <a:pt x="0" y="9"/>
+                    <a:pt x="9" y="0"/>
+                    <a:pt x="20" y="0"/>
+                  </a:cubicBezTo>
+                  <a:cubicBezTo>
+                    <a:pt x="31" y="0"/>
+                    <a:pt x="40" y="9"/>
+                    <a:pt x="40" y="20"/>
+                  </a:cubicBezTo>
+                  <a:cubicBezTo>
+                    <a:pt x="40" y="31"/>
+                    <a:pt x="31" y="40"/>
+                    <a:pt x="20" y="40"/>
+                  </a:cubicBezTo>
+                  <a:close/>
+                  <a:moveTo>
+                    <a:pt x="20" y="4"/>
+                  </a:moveTo>
+                  <a:cubicBezTo>
+                    <a:pt x="12" y="4"/>
+                    <a:pt x="4" y="11"/>
+                    <a:pt x="4" y="20"/>
+                  </a:cubicBezTo>
+                  <a:cubicBezTo>
+                    <a:pt x="4" y="29"/>
+                    <a:pt x="12" y="36"/>
+                    <a:pt x="20" y="36"/>
+                  </a:cubicBezTo>
+                  <a:cubicBezTo>
+                    <a:pt x="29" y="36"/>
+                    <a:pt x="36" y="29"/>
+                    <a:pt x="36" y="20"/>
+                  </a:cubicBezTo>
+                  <a:cubicBezTo>
+                    <a:pt x="36" y="11"/>
+                    <a:pt x="29" y="4"/>
+                    <a:pt x="20" y="4"/>
+                  </a:cubicBezTo>
+                  <a:close/>
+                </a:path>
+              </a:pathLst>
+            </a:custGeom>
+            <a:grpFill/>
+            <a:ln>
+              <a:noFill/>
+            </a:ln>
+            <a:extLst>
+              <a:ext uri="{91240B29-F687-4f45-9708-019B960494DF}">
+                <a14:hiddenLine xmlns="" xmlns:a16="http://schemas.microsoft.com/office/drawing/2014/main" xmlns:p14="http://schemas.microsoft.com/office/powerpoint/2010/main" xmlns:a14="http://schemas.microsoft.com/office/drawing/2010/main" w="9525">
+                  <a:solidFill>
+                    <a:srgbClr val="000000"/>
+                  </a:solidFill>
+                  <a:round/>
+                  <a:headEnd/>
+                  <a:tailEnd/>
+                </a14:hiddenLine>
+              </a:ext>
+            </a:extLst>
+          </p:spPr>
+        </p:sp>
+        <p:sp>
+          <p:nvSpPr>
+            <p:cNvPr id="38" name="Freeform 30">
+              <a:extLst>
+                <a:ext uri="{FF2B5EF4-FFF2-40B4-BE49-F238E27FC236}">
+                  <a16:creationId xmlns:a16="http://schemas.microsoft.com/office/drawing/2014/main" id="{7DE92406-3F65-4333-BAAA-A9A7B5AEE911}"/>
+                </a:ext>
+                <a:ext uri="{C183D7F6-B498-43B3-948B-1728B52AA6E4}">
+                  <adec:decorative xmlns:adec="http://schemas.microsoft.com/office/drawing/2017/decorative" val="1"/>
+                </a:ext>
+              </a:extLst>
+            </p:cNvPr>
+            <p:cNvSpPr/>
+            <p:nvPr>
+              <p:extLst>
+                <p:ext uri="{386F3935-93C4-4BCD-93E2-E3B085C9AB24}">
+                  <p16:designElem xmlns:p16="http://schemas.microsoft.com/office/powerpoint/2015/main" val="1"/>
+                </p:ext>
+              </p:extLst>
+            </p:nvPr>
+          </p:nvSpPr>
+          <p:spPr bwMode="auto">
+            <a:xfrm>
+              <a:off x="669925" y="6330950"/>
+              <a:ext cx="417513" cy="517525"/>
+            </a:xfrm>
+            <a:custGeom>
+              <a:avLst/>
+              <a:gdLst/>
+              <a:ahLst/>
+              <a:cxnLst/>
+              <a:rect l="0" t="0" r="r" b="b"/>
+              <a:pathLst>
+                <a:path w="263" h="326">
+                  <a:moveTo>
+                    <a:pt x="15" y="326"/>
+                  </a:moveTo>
+                  <a:lnTo>
+                    <a:pt x="0" y="320"/>
+                  </a:lnTo>
+                  <a:lnTo>
+                    <a:pt x="45" y="206"/>
+                  </a:lnTo>
+                  <a:lnTo>
+                    <a:pt x="48" y="206"/>
+                  </a:lnTo>
+                  <a:lnTo>
+                    <a:pt x="254" y="0"/>
+                  </a:lnTo>
+                  <a:lnTo>
+                    <a:pt x="263" y="12"/>
+                  </a:lnTo>
+                  <a:lnTo>
+                    <a:pt x="60" y="215"/>
+                  </a:lnTo>
+                  <a:lnTo>
+                    <a:pt x="15" y="326"/>
+                  </a:lnTo>
+                  <a:close/>
+                </a:path>
+              </a:pathLst>
+            </a:custGeom>
+            <a:grpFill/>
+            <a:ln>
+              <a:noFill/>
+            </a:ln>
+            <a:extLst>
+              <a:ext uri="{91240B29-F687-4f45-9708-019B960494DF}">
+                <a14:hiddenLine xmlns="" xmlns:a16="http://schemas.microsoft.com/office/drawing/2014/main" xmlns:p14="http://schemas.microsoft.com/office/powerpoint/2010/main" xmlns:a14="http://schemas.microsoft.com/office/drawing/2010/main" w="9525">
+                  <a:solidFill>
+                    <a:srgbClr val="000000"/>
+                  </a:solidFill>
+                  <a:round/>
+                  <a:headEnd/>
+                  <a:tailEnd/>
+                </a14:hiddenLine>
+              </a:ext>
+            </a:extLst>
+          </p:spPr>
+        </p:sp>
+        <p:sp>
+          <p:nvSpPr>
+            <p:cNvPr id="39" name="Freeform 31">
+              <a:extLst>
+                <a:ext uri="{FF2B5EF4-FFF2-40B4-BE49-F238E27FC236}">
+                  <a16:creationId xmlns:a16="http://schemas.microsoft.com/office/drawing/2014/main" id="{B8B0FFC4-D1BB-4BB9-A224-BB78BFD33801}"/>
+                </a:ext>
+                <a:ext uri="{C183D7F6-B498-43B3-948B-1728B52AA6E4}">
+                  <adec:decorative xmlns:adec="http://schemas.microsoft.com/office/drawing/2017/decorative" val="1"/>
+                </a:ext>
+              </a:extLst>
+            </p:cNvPr>
+            <p:cNvSpPr>
+              <a:spLocks noEditPoints="1"/>
+            </p:cNvSpPr>
+            <p:nvPr>
+              <p:extLst>
+                <p:ext uri="{386F3935-93C4-4BCD-93E2-E3B085C9AB24}">
+                  <p16:designElem xmlns:p16="http://schemas.microsoft.com/office/powerpoint/2015/main" val="1"/>
+                </p:ext>
+              </p:extLst>
+            </p:nvPr>
+          </p:nvSpPr>
+          <p:spPr bwMode="auto">
+            <a:xfrm>
+              <a:off x="1049337" y="6221413"/>
+              <a:ext cx="157163" cy="147638"/>
+            </a:xfrm>
+            <a:custGeom>
+              <a:avLst/>
+              <a:gdLst/>
+              <a:ahLst/>
+              <a:cxnLst/>
+              <a:rect l="0" t="0" r="r" b="b"/>
+              <a:pathLst>
+                <a:path w="33" h="31">
+                  <a:moveTo>
+                    <a:pt x="16" y="31"/>
+                  </a:moveTo>
+                  <a:cubicBezTo>
+                    <a:pt x="12" y="31"/>
+                    <a:pt x="8" y="29"/>
+                    <a:pt x="5" y="26"/>
+                  </a:cubicBezTo>
+                  <a:cubicBezTo>
+                    <a:pt x="2" y="24"/>
+                    <a:pt x="0" y="20"/>
+                    <a:pt x="0" y="15"/>
+                  </a:cubicBezTo>
+                  <a:cubicBezTo>
+                    <a:pt x="0" y="11"/>
+                    <a:pt x="2" y="7"/>
+                    <a:pt x="5" y="4"/>
+                  </a:cubicBezTo>
+                  <a:cubicBezTo>
+                    <a:pt x="8" y="1"/>
+                    <a:pt x="12" y="0"/>
+                    <a:pt x="16" y="0"/>
+                  </a:cubicBezTo>
+                  <a:cubicBezTo>
+                    <a:pt x="20" y="0"/>
+                    <a:pt x="24" y="1"/>
+                    <a:pt x="27" y="4"/>
+                  </a:cubicBezTo>
+                  <a:cubicBezTo>
+                    <a:pt x="33" y="10"/>
+                    <a:pt x="33" y="20"/>
+                    <a:pt x="27" y="26"/>
+                  </a:cubicBezTo>
+                  <a:cubicBezTo>
+                    <a:pt x="24" y="29"/>
+                    <a:pt x="20" y="31"/>
+                    <a:pt x="16" y="31"/>
+                  </a:cubicBezTo>
+                  <a:close/>
+                  <a:moveTo>
+                    <a:pt x="16" y="4"/>
+                  </a:moveTo>
+                  <a:cubicBezTo>
+                    <a:pt x="13" y="4"/>
+                    <a:pt x="10" y="5"/>
+                    <a:pt x="8" y="7"/>
+                  </a:cubicBezTo>
+                  <a:cubicBezTo>
+                    <a:pt x="6" y="9"/>
+                    <a:pt x="4" y="12"/>
+                    <a:pt x="4" y="15"/>
+                  </a:cubicBezTo>
+                  <a:cubicBezTo>
+                    <a:pt x="4" y="19"/>
+                    <a:pt x="6" y="21"/>
+                    <a:pt x="8" y="24"/>
+                  </a:cubicBezTo>
+                  <a:cubicBezTo>
+                    <a:pt x="10" y="26"/>
+                    <a:pt x="13" y="27"/>
+                    <a:pt x="16" y="27"/>
+                  </a:cubicBezTo>
+                  <a:cubicBezTo>
+                    <a:pt x="19" y="27"/>
+                    <a:pt x="22" y="26"/>
+                    <a:pt x="24" y="24"/>
+                  </a:cubicBezTo>
+                  <a:cubicBezTo>
+                    <a:pt x="29" y="19"/>
+                    <a:pt x="29" y="12"/>
+                    <a:pt x="24" y="7"/>
+                  </a:cubicBezTo>
+                  <a:cubicBezTo>
+                    <a:pt x="22" y="5"/>
+                    <a:pt x="19" y="4"/>
+                    <a:pt x="16" y="4"/>
+                  </a:cubicBezTo>
+                  <a:close/>
+                </a:path>
+              </a:pathLst>
+            </a:custGeom>
+            <a:grpFill/>
+            <a:ln>
+              <a:noFill/>
+            </a:ln>
+            <a:extLst>
+              <a:ext uri="{91240B29-F687-4f45-9708-019B960494DF}">
+                <a14:hiddenLine xmlns="" xmlns:a16="http://schemas.microsoft.com/office/drawing/2014/main" xmlns:p14="http://schemas.microsoft.com/office/powerpoint/2010/main" xmlns:a14="http://schemas.microsoft.com/office/drawing/2010/main" w="9525">
+                  <a:solidFill>
+                    <a:srgbClr val="000000"/>
+                  </a:solidFill>
+                  <a:round/>
+                  <a:headEnd/>
+                  <a:tailEnd/>
+                </a14:hiddenLine>
+              </a:ext>
+            </a:extLst>
+          </p:spPr>
+        </p:sp>
+      </p:grpSp>
+      <p:sp>
+        <p:nvSpPr>
+          <p:cNvPr id="2" name="Title 1">
+            <a:extLst>
+              <a:ext uri="{FF2B5EF4-FFF2-40B4-BE49-F238E27FC236}">
+                <a16:creationId xmlns:a16="http://schemas.microsoft.com/office/drawing/2014/main" id="{47BD4C74-0019-1F3A-6ECA-1225B5AD39AA}"/>
               </a:ext>
             </a:extLst>
           </p:cNvPr>
@@ -27765,28 +31972,23 @@
             <a:spLocks noGrp="1"/>
           </p:cNvSpPr>
           <p:nvPr>
-            <p:ph idx="1"/>
+            <p:ph type="title"/>
           </p:nvPr>
         </p:nvSpPr>
         <p:spPr>
           <a:xfrm>
-            <a:off x="1206500" y="2185988"/>
-            <a:ext cx="9840911" cy="3605213"/>
+            <a:off x="1141411" y="748240"/>
+            <a:ext cx="9906000" cy="1117073"/>
           </a:xfrm>
         </p:spPr>
         <p:txBody>
-          <a:bodyPr anchor="t">
+          <a:bodyPr>
             <a:normAutofit/>
           </a:bodyPr>
           <a:lstStyle/>
           <a:p>
-            <a:pPr marL="0" indent="0">
-              <a:lnSpc>
-                <a:spcPct val="150000"/>
-              </a:lnSpc>
-              <a:buNone/>
-            </a:pPr>
-            <a:endParaRPr lang="en-US" dirty="0"/>
+            <a:pPr algn="ctr"/>
+            <a:endParaRPr lang="en-US" sz="4000" dirty="0"/>
           </a:p>
         </p:txBody>
       </p:sp>
@@ -27894,7 +32096,7 @@
             </a:ln>
             <a:extLst>
               <a:ext uri="{91240B29-F687-4f45-9708-019B960494DF}">
-                <a14:hiddenLine xmlns:a14="http://schemas.microsoft.com/office/drawing/2010/main" xmlns:p14="http://schemas.microsoft.com/office/powerpoint/2010/main" xmlns:a16="http://schemas.microsoft.com/office/drawing/2014/main" xmlns="" w="9525">
+                <a14:hiddenLine xmlns="" xmlns:a16="http://schemas.microsoft.com/office/drawing/2014/main" xmlns:p14="http://schemas.microsoft.com/office/powerpoint/2010/main" xmlns:a14="http://schemas.microsoft.com/office/drawing/2010/main" w="9525">
                   <a:solidFill>
                     <a:srgbClr val="000000"/>
                   </a:solidFill>
@@ -28024,7 +32226,7 @@
             </a:ln>
             <a:extLst>
               <a:ext uri="{91240B29-F687-4f45-9708-019B960494DF}">
-                <a14:hiddenLine xmlns:a14="http://schemas.microsoft.com/office/drawing/2010/main" xmlns:p14="http://schemas.microsoft.com/office/powerpoint/2010/main" xmlns:a16="http://schemas.microsoft.com/office/drawing/2014/main" xmlns="" w="9525">
+                <a14:hiddenLine xmlns="" xmlns:a16="http://schemas.microsoft.com/office/drawing/2014/main" xmlns:p14="http://schemas.microsoft.com/office/powerpoint/2010/main" xmlns:a14="http://schemas.microsoft.com/office/drawing/2010/main" w="9525">
                   <a:solidFill>
                     <a:srgbClr val="000000"/>
                   </a:solidFill>
@@ -28129,7 +32331,7 @@
             </a:ln>
             <a:extLst>
               <a:ext uri="{91240B29-F687-4f45-9708-019B960494DF}">
-                <a14:hiddenLine xmlns:a14="http://schemas.microsoft.com/office/drawing/2010/main" xmlns:p14="http://schemas.microsoft.com/office/powerpoint/2010/main" xmlns:a16="http://schemas.microsoft.com/office/drawing/2014/main" xmlns="" w="9525">
+                <a14:hiddenLine xmlns="" xmlns:a16="http://schemas.microsoft.com/office/drawing/2014/main" xmlns:p14="http://schemas.microsoft.com/office/powerpoint/2010/main" xmlns:a14="http://schemas.microsoft.com/office/drawing/2010/main" w="9525">
                   <a:solidFill>
                     <a:srgbClr val="000000"/>
                   </a:solidFill>
@@ -28209,7 +32411,7 @@
             </a:ln>
             <a:extLst>
               <a:ext uri="{91240B29-F687-4f45-9708-019B960494DF}">
-                <a14:hiddenLine xmlns:a14="http://schemas.microsoft.com/office/drawing/2010/main" xmlns:p14="http://schemas.microsoft.com/office/powerpoint/2010/main" xmlns:a16="http://schemas.microsoft.com/office/drawing/2014/main" xmlns="" w="9525">
+                <a14:hiddenLine xmlns="" xmlns:a16="http://schemas.microsoft.com/office/drawing/2014/main" xmlns:p14="http://schemas.microsoft.com/office/powerpoint/2010/main" xmlns:a14="http://schemas.microsoft.com/office/drawing/2010/main" w="9525">
                   <a:solidFill>
                     <a:srgbClr val="000000"/>
                   </a:solidFill>
@@ -28314,7 +32516,7 @@
             </a:ln>
             <a:extLst>
               <a:ext uri="{91240B29-F687-4f45-9708-019B960494DF}">
-                <a14:hiddenLine xmlns:a14="http://schemas.microsoft.com/office/drawing/2010/main" xmlns:p14="http://schemas.microsoft.com/office/powerpoint/2010/main" xmlns:a16="http://schemas.microsoft.com/office/drawing/2014/main" xmlns="" w="9525">
+                <a14:hiddenLine xmlns="" xmlns:a16="http://schemas.microsoft.com/office/drawing/2014/main" xmlns:p14="http://schemas.microsoft.com/office/powerpoint/2010/main" xmlns:a14="http://schemas.microsoft.com/office/drawing/2010/main" w="9525">
                   <a:solidFill>
                     <a:srgbClr val="000000"/>
                   </a:solidFill>
@@ -28397,7 +32599,7 @@
             </a:ln>
             <a:extLst>
               <a:ext uri="{91240B29-F687-4f45-9708-019B960494DF}">
-                <a14:hiddenLine xmlns:a14="http://schemas.microsoft.com/office/drawing/2010/main" xmlns:p14="http://schemas.microsoft.com/office/powerpoint/2010/main" xmlns:a16="http://schemas.microsoft.com/office/drawing/2014/main" xmlns="" w="9525">
+                <a14:hiddenLine xmlns="" xmlns:a16="http://schemas.microsoft.com/office/drawing/2014/main" xmlns:p14="http://schemas.microsoft.com/office/powerpoint/2010/main" xmlns:a14="http://schemas.microsoft.com/office/drawing/2010/main" w="9525">
                   <a:solidFill>
                     <a:srgbClr val="000000"/>
                   </a:solidFill>
@@ -28502,7 +32704,7 @@
             </a:ln>
             <a:extLst>
               <a:ext uri="{91240B29-F687-4f45-9708-019B960494DF}">
-                <a14:hiddenLine xmlns:a14="http://schemas.microsoft.com/office/drawing/2010/main" xmlns:p14="http://schemas.microsoft.com/office/powerpoint/2010/main" xmlns:a16="http://schemas.microsoft.com/office/drawing/2014/main" xmlns="" w="9525">
+                <a14:hiddenLine xmlns="" xmlns:a16="http://schemas.microsoft.com/office/drawing/2014/main" xmlns:p14="http://schemas.microsoft.com/office/powerpoint/2010/main" xmlns:a14="http://schemas.microsoft.com/office/drawing/2010/main" w="9525">
                   <a:solidFill>
                     <a:srgbClr val="000000"/>
                   </a:solidFill>
@@ -28585,7 +32787,7 @@
             </a:ln>
             <a:extLst>
               <a:ext uri="{91240B29-F687-4f45-9708-019B960494DF}">
-                <a14:hiddenLine xmlns:a14="http://schemas.microsoft.com/office/drawing/2010/main" xmlns:p14="http://schemas.microsoft.com/office/powerpoint/2010/main" xmlns:a16="http://schemas.microsoft.com/office/drawing/2014/main" xmlns="" w="9525">
+                <a14:hiddenLine xmlns="" xmlns:a16="http://schemas.microsoft.com/office/drawing/2014/main" xmlns:p14="http://schemas.microsoft.com/office/powerpoint/2010/main" xmlns:a14="http://schemas.microsoft.com/office/drawing/2010/main" w="9525">
                   <a:solidFill>
                     <a:srgbClr val="000000"/>
                   </a:solidFill>
@@ -28690,7 +32892,7 @@
             </a:ln>
             <a:extLst>
               <a:ext uri="{91240B29-F687-4f45-9708-019B960494DF}">
-                <a14:hiddenLine xmlns:a14="http://schemas.microsoft.com/office/drawing/2010/main" xmlns:p14="http://schemas.microsoft.com/office/powerpoint/2010/main" xmlns:a16="http://schemas.microsoft.com/office/drawing/2014/main" xmlns="" w="9525">
+                <a14:hiddenLine xmlns="" xmlns:a16="http://schemas.microsoft.com/office/drawing/2014/main" xmlns:p14="http://schemas.microsoft.com/office/powerpoint/2010/main" xmlns:a14="http://schemas.microsoft.com/office/drawing/2010/main" w="9525">
                   <a:solidFill>
                     <a:srgbClr val="000000"/>
                   </a:solidFill>
@@ -28739,7 +32941,7 @@
             </a:ln>
             <a:extLst>
               <a:ext uri="{91240B29-F687-4f45-9708-019B960494DF}">
-                <a14:hiddenLine xmlns:a14="http://schemas.microsoft.com/office/drawing/2010/main" xmlns:p14="http://schemas.microsoft.com/office/powerpoint/2010/main" xmlns:a16="http://schemas.microsoft.com/office/drawing/2014/main" xmlns="" w="9525">
+                <a14:hiddenLine xmlns="" xmlns:a16="http://schemas.microsoft.com/office/drawing/2014/main" xmlns:p14="http://schemas.microsoft.com/office/powerpoint/2010/main" xmlns:a14="http://schemas.microsoft.com/office/drawing/2010/main" w="9525">
                   <a:solidFill>
                     <a:srgbClr val="000000"/>
                   </a:solidFill>
@@ -28752,15 +32954,195 @@
           </p:spPr>
         </p:sp>
       </p:grpSp>
+      <p:sp>
+        <p:nvSpPr>
+          <p:cNvPr id="4" name="Content Placeholder 3">
+            <a:extLst>
+              <a:ext uri="{FF2B5EF4-FFF2-40B4-BE49-F238E27FC236}">
+                <a16:creationId xmlns:a16="http://schemas.microsoft.com/office/drawing/2014/main" id="{57A1796B-D2E3-D7C1-D479-519A74B7A62B}"/>
+              </a:ext>
+            </a:extLst>
+          </p:cNvPr>
+          <p:cNvSpPr>
+            <a:spLocks noGrp="1"/>
+          </p:cNvSpPr>
+          <p:nvPr>
+            <p:ph idx="1"/>
+          </p:nvPr>
+        </p:nvSpPr>
+        <p:spPr/>
+        <p:txBody>
+          <a:bodyPr>
+            <a:normAutofit/>
+          </a:bodyPr>
+          <a:lstStyle/>
+          <a:p>
+            <a:pPr marL="0" indent="0">
+              <a:buNone/>
+            </a:pPr>
+            <a:endParaRPr lang="en-US" sz="3000" dirty="0"/>
+          </a:p>
+        </p:txBody>
+      </p:sp>
     </p:spTree>
     <p:extLst>
       <p:ext uri="{BB962C8B-B14F-4D97-AF65-F5344CB8AC3E}">
-        <p14:creationId xmlns:p14="http://schemas.microsoft.com/office/powerpoint/2010/main" val="728638742"/>
+        <p14:creationId xmlns:p14="http://schemas.microsoft.com/office/powerpoint/2010/main" val="1747460760"/>
       </p:ext>
     </p:extLst>
   </p:cSld>
   <p:clrMapOvr>
     <a:overrideClrMapping bg1="lt1" tx1="dk1" bg2="lt2" tx2="dk2" accent1="accent1" accent2="accent2" accent3="accent3" accent4="accent4" accent5="accent5" accent6="accent6" hlink="hlink" folHlink="folHlink"/>
+  </p:clrMapOvr>
+</p:sld>
+</file>
+
+<file path=ppt/slides/slide6.xml><?xml version="1.0" encoding="utf-8"?>
+<p:sld xmlns:a="http://schemas.openxmlformats.org/drawingml/2006/main" xmlns:r="http://schemas.openxmlformats.org/officeDocument/2006/relationships" xmlns:p="http://schemas.openxmlformats.org/presentationml/2006/main">
+  <p:cSld>
+    <p:spTree>
+      <p:nvGrpSpPr>
+        <p:cNvPr id="1" name=""/>
+        <p:cNvGrpSpPr/>
+        <p:nvPr/>
+      </p:nvGrpSpPr>
+      <p:grpSpPr>
+        <a:xfrm>
+          <a:off x="0" y="0"/>
+          <a:ext cx="0" cy="0"/>
+          <a:chOff x="0" y="0"/>
+          <a:chExt cx="0" cy="0"/>
+        </a:xfrm>
+      </p:grpSpPr>
+      <p:sp>
+        <p:nvSpPr>
+          <p:cNvPr id="2" name="Title 1">
+            <a:extLst>
+              <a:ext uri="{FF2B5EF4-FFF2-40B4-BE49-F238E27FC236}">
+                <a16:creationId xmlns:a16="http://schemas.microsoft.com/office/drawing/2014/main" id="{47BD4C74-0019-1F3A-6ECA-1225B5AD39AA}"/>
+              </a:ext>
+            </a:extLst>
+          </p:cNvPr>
+          <p:cNvSpPr>
+            <a:spLocks noGrp="1"/>
+          </p:cNvSpPr>
+          <p:nvPr>
+            <p:ph type="title"/>
+          </p:nvPr>
+        </p:nvSpPr>
+        <p:spPr>
+          <a:xfrm>
+            <a:off x="1141411" y="748240"/>
+            <a:ext cx="9906000" cy="1117073"/>
+          </a:xfrm>
+        </p:spPr>
+        <p:txBody>
+          <a:bodyPr>
+            <a:normAutofit/>
+          </a:bodyPr>
+          <a:lstStyle/>
+          <a:p>
+            <a:pPr algn="ctr"/>
+            <a:r>
+              <a:rPr lang="en-US" sz="4000" dirty="0"/>
+              <a:t>Challenges in training PInns</a:t>
+            </a:r>
+          </a:p>
+        </p:txBody>
+      </p:sp>
+      <p:pic>
+        <p:nvPicPr>
+          <p:cNvPr id="5" name="Content Placeholder 4" descr="Chart, line chart&#10;&#10;Description automatically generated">
+            <a:extLst>
+              <a:ext uri="{FF2B5EF4-FFF2-40B4-BE49-F238E27FC236}">
+                <a16:creationId xmlns:a16="http://schemas.microsoft.com/office/drawing/2014/main" id="{2DF8B08F-39FC-2662-FB6F-C656746E5153}"/>
+              </a:ext>
+            </a:extLst>
+          </p:cNvPr>
+          <p:cNvPicPr>
+            <a:picLocks noGrp="1" noChangeAspect="1"/>
+          </p:cNvPicPr>
+          <p:nvPr>
+            <p:ph idx="1"/>
+          </p:nvPr>
+        </p:nvPicPr>
+        <p:blipFill>
+          <a:blip r:embed="rId3">
+            <a:extLst>
+              <a:ext uri="{28A0092B-C50C-407E-A947-70E740481C1C}">
+                <a14:useLocalDpi xmlns:a14="http://schemas.microsoft.com/office/drawing/2010/main" val="0"/>
+              </a:ext>
+            </a:extLst>
+          </a:blip>
+          <a:stretch>
+            <a:fillRect/>
+          </a:stretch>
+        </p:blipFill>
+        <p:spPr>
+          <a:xfrm>
+            <a:off x="2173025" y="1963051"/>
+            <a:ext cx="8017401" cy="3006525"/>
+          </a:xfrm>
+        </p:spPr>
+      </p:pic>
+      <p:sp>
+        <p:nvSpPr>
+          <p:cNvPr id="6" name="TextBox 5">
+            <a:extLst>
+              <a:ext uri="{FF2B5EF4-FFF2-40B4-BE49-F238E27FC236}">
+                <a16:creationId xmlns:a16="http://schemas.microsoft.com/office/drawing/2014/main" id="{12FCD387-5CBC-EB21-57DD-D67034C626CE}"/>
+              </a:ext>
+            </a:extLst>
+          </p:cNvPr>
+          <p:cNvSpPr txBox="1"/>
+          <p:nvPr/>
+        </p:nvSpPr>
+        <p:spPr>
+          <a:xfrm>
+            <a:off x="2173025" y="5246688"/>
+            <a:ext cx="8017401" cy="1015663"/>
+          </a:xfrm>
+          <a:prstGeom prst="rect">
+            <a:avLst/>
+          </a:prstGeom>
+          <a:noFill/>
+        </p:spPr>
+        <p:txBody>
+          <a:bodyPr wrap="square" rtlCol="0">
+            <a:spAutoFit/>
+          </a:bodyPr>
+          <a:lstStyle/>
+          <a:p>
+            <a:pPr marL="285750" indent="-285750" algn="ctr">
+              <a:buFont typeface="Arial" panose="020B0604020202020204" pitchFamily="34" charset="0"/>
+              <a:buChar char="•"/>
+            </a:pPr>
+            <a:r>
+              <a:rPr lang="en-US" sz="3000" dirty="0"/>
+              <a:t>High frequency solutions</a:t>
+            </a:r>
+          </a:p>
+          <a:p>
+            <a:pPr marL="285750" indent="-285750" algn="ctr">
+              <a:buFont typeface="Arial" panose="020B0604020202020204" pitchFamily="34" charset="0"/>
+              <a:buChar char="•"/>
+            </a:pPr>
+            <a:r>
+              <a:rPr lang="en-US" sz="3000" dirty="0"/>
+              <a:t>Fixed point solutions</a:t>
+            </a:r>
+          </a:p>
+        </p:txBody>
+      </p:sp>
+    </p:spTree>
+    <p:extLst>
+      <p:ext uri="{BB962C8B-B14F-4D97-AF65-F5344CB8AC3E}">
+        <p14:creationId xmlns:p14="http://schemas.microsoft.com/office/powerpoint/2010/main" val="1620217874"/>
+      </p:ext>
+    </p:extLst>
+  </p:cSld>
+  <p:clrMapOvr>
+    <a:masterClrMapping/>
   </p:clrMapOvr>
 </p:sld>
 </file>

</xml_diff>

<commit_message>
I plotted the solutiong to the wave equation. The solution got worse when we added the multifidelity method. I am going to change the initialization of the network so that it starts off as the low fidelity prediction.
</commit_message>
<xml_diff>
--- a/MFFBPINNs.pptx
+++ b/MFFBPINNs.pptx
@@ -13,7 +13,7 @@
     <p:sldId id="258" r:id="rId4"/>
     <p:sldId id="261" r:id="rId5"/>
     <p:sldId id="263" r:id="rId6"/>
-    <p:sldId id="262" r:id="rId7"/>
+    <p:sldId id="266" r:id="rId7"/>
   </p:sldIdLst>
   <p:sldSz cx="12192000" cy="6858000"/>
   <p:notesSz cx="6858000" cy="9144000"/>
@@ -894,57 +894,15 @@
           <a:bodyPr/>
           <a:lstStyle/>
           <a:p>
-            <a:pPr marL="0" indent="0">
-              <a:buFontTx/>
-              <a:buNone/>
-            </a:pPr>
             <a:r>
-              <a:rPr lang="en-US" dirty="0"/>
-              <a:t>May want to find a prettier example</a:t>
+              <a:rPr lang="en-US" sz="1200" dirty="0"/>
+              <a:t>- Neural networks are encouraged to find minimum norm solutions</a:t>
             </a:r>
           </a:p>
           <a:p>
-            <a:pPr marL="171450" indent="-171450">
-              <a:buFontTx/>
-              <a:buChar char="-"/>
-            </a:pPr>
-            <a:endParaRPr lang="en-US" dirty="0"/>
-          </a:p>
-          <a:p>
-            <a:pPr marL="171450" indent="-171450">
-              <a:buFontTx/>
-              <a:buChar char="-"/>
-            </a:pPr>
             <a:r>
-              <a:rPr lang="en-US" dirty="0"/>
-              <a:t>High frequency problems (cite spectral bias)</a:t>
-            </a:r>
-          </a:p>
-          <a:p>
-            <a:pPr marL="171450" indent="-171450">
-              <a:buFontTx/>
-              <a:buChar char="-"/>
-            </a:pPr>
-            <a:r>
-              <a:rPr lang="en-US" dirty="0"/>
-              <a:t>Converging to erroneous fixed points (cite fixed point paper)</a:t>
-            </a:r>
-          </a:p>
-          <a:p>
-            <a:pPr marL="0" indent="0">
-              <a:buFontTx/>
-              <a:buNone/>
-            </a:pPr>
-            <a:endParaRPr lang="en-US" dirty="0"/>
-          </a:p>
-          <a:p>
-            <a:pPr marL="0" indent="0">
-              <a:buFontTx/>
-              <a:buNone/>
-            </a:pPr>
-            <a:r>
-              <a:rPr lang="en-US" dirty="0"/>
-              <a:t>Training </a:t>
+              <a:rPr lang="en-US" sz="1200" dirty="0"/>
+              <a:t>- Satisfying one constraint may mean violating another</a:t>
             </a:r>
           </a:p>
           <a:p>
@@ -1050,79 +1008,10 @@
           <a:bodyPr/>
           <a:lstStyle/>
           <a:p>
-            <a:pPr marL="0" indent="0">
-              <a:buFontTx/>
-              <a:buNone/>
-            </a:pPr>
             <a:r>
               <a:rPr lang="en-US" dirty="0"/>
-              <a:t>May want to find a prettier example</a:t>
+              <a:t>The more that we know </a:t>
             </a:r>
-          </a:p>
-          <a:p>
-            <a:pPr marL="171450" indent="-171450">
-              <a:buFontTx/>
-              <a:buChar char="-"/>
-            </a:pPr>
-            <a:endParaRPr lang="en-US" dirty="0"/>
-          </a:p>
-          <a:p>
-            <a:pPr marL="171450" indent="-171450">
-              <a:buFontTx/>
-              <a:buChar char="-"/>
-            </a:pPr>
-            <a:r>
-              <a:rPr lang="en-US" dirty="0"/>
-              <a:t>High frequency problems (cite spectral bias)</a:t>
-            </a:r>
-          </a:p>
-          <a:p>
-            <a:pPr marL="171450" indent="-171450">
-              <a:buFontTx/>
-              <a:buChar char="-"/>
-            </a:pPr>
-            <a:r>
-              <a:rPr lang="en-US" dirty="0"/>
-              <a:t>Converging to erroneous fixed points (cite fixed point paper)</a:t>
-            </a:r>
-          </a:p>
-          <a:p>
-            <a:pPr marL="0" indent="0">
-              <a:buFontTx/>
-              <a:buNone/>
-            </a:pPr>
-            <a:endParaRPr lang="en-US" dirty="0"/>
-          </a:p>
-          <a:p>
-            <a:pPr marL="0" indent="0">
-              <a:buFontTx/>
-              <a:buNone/>
-            </a:pPr>
-            <a:r>
-              <a:rPr lang="en-US" dirty="0"/>
-              <a:t>Training </a:t>
-            </a:r>
-          </a:p>
-          <a:p>
-            <a:pPr marL="171450" indent="-171450">
-              <a:buFontTx/>
-              <a:buChar char="-"/>
-            </a:pPr>
-            <a:endParaRPr lang="en-US" dirty="0"/>
-          </a:p>
-          <a:p>
-            <a:pPr marL="0" indent="0">
-              <a:buFontTx/>
-              <a:buNone/>
-            </a:pPr>
-            <a:endParaRPr lang="en-US" dirty="0"/>
-          </a:p>
-          <a:p>
-            <a:pPr marL="171450" indent="-171450">
-              <a:buFontTx/>
-              <a:buChar char="-"/>
-            </a:pPr>
-            <a:endParaRPr lang="en-US" dirty="0"/>
           </a:p>
         </p:txBody>
       </p:sp>
@@ -1152,7 +1041,7 @@
     </p:spTree>
     <p:extLst>
       <p:ext uri="{BB962C8B-B14F-4D97-AF65-F5344CB8AC3E}">
-        <p14:creationId xmlns:p14="http://schemas.microsoft.com/office/powerpoint/2010/main" val="437354053"/>
+        <p14:creationId xmlns:p14="http://schemas.microsoft.com/office/powerpoint/2010/main" val="939924206"/>
       </p:ext>
     </p:extLst>
   </p:cSld>
@@ -25713,6 +25602,7 @@
                 <a:hueMod val="94000"/>
                 <a:satMod val="148000"/>
                 <a:lumMod val="150000"/>
+                <a:alpha val="54000"/>
               </a:schemeClr>
             </a:gs>
             <a:gs pos="100000">
@@ -28348,9 +28238,16 @@
         </p:blipFill>
         <p:spPr>
           <a:xfrm>
-            <a:off x="2173025" y="1963051"/>
-            <a:ext cx="8017401" cy="3006525"/>
+            <a:off x="8902262" y="1"/>
+            <a:ext cx="2055676" cy="766808"/>
           </a:xfrm>
+          <a:effectLst>
+            <a:outerShdw blurRad="50800" dist="38100" dir="8100000" algn="tr" rotWithShape="0">
+              <a:prstClr val="black">
+                <a:alpha val="40000"/>
+              </a:prstClr>
+            </a:outerShdw>
+          </a:effectLst>
         </p:spPr>
       </p:pic>
       <p:grpSp>
@@ -29329,8 +29226,8 @@
         </p:nvSpPr>
         <p:spPr>
           <a:xfrm>
-            <a:off x="1921945" y="5401012"/>
-            <a:ext cx="8017401" cy="1015663"/>
+            <a:off x="7497191" y="2993371"/>
+            <a:ext cx="4699572" cy="1938992"/>
           </a:xfrm>
           <a:prstGeom prst="rect">
             <a:avLst/>
@@ -29349,7 +29246,7 @@
             </a:pPr>
             <a:r>
               <a:rPr lang="en-US" sz="3000" dirty="0"/>
-              <a:t>High frequency solutions</a:t>
+              <a:t>Difficulty representing high frequency solutions</a:t>
             </a:r>
           </a:p>
           <a:p>
@@ -29359,8 +29256,89 @@
             </a:pPr>
             <a:r>
               <a:rPr lang="en-US" sz="3000" dirty="0"/>
-              <a:t>Fixed point solutions</a:t>
+              <a:t>Erroneous convergence to steady state solutions</a:t>
             </a:r>
+          </a:p>
+        </p:txBody>
+      </p:sp>
+      <p:pic>
+        <p:nvPicPr>
+          <p:cNvPr id="4" name="Picture 3">
+            <a:extLst>
+              <a:ext uri="{FF2B5EF4-FFF2-40B4-BE49-F238E27FC236}">
+                <a16:creationId xmlns:a16="http://schemas.microsoft.com/office/drawing/2014/main" id="{0182EF20-8B4D-1A05-3266-B91C0185E595}"/>
+              </a:ext>
+            </a:extLst>
+          </p:cNvPr>
+          <p:cNvPicPr>
+            <a:picLocks noChangeAspect="1"/>
+          </p:cNvPicPr>
+          <p:nvPr/>
+        </p:nvPicPr>
+        <p:blipFill>
+          <a:blip r:embed="rId5"/>
+          <a:stretch>
+            <a:fillRect/>
+          </a:stretch>
+        </p:blipFill>
+        <p:spPr>
+          <a:xfrm>
+            <a:off x="1141412" y="2046432"/>
+            <a:ext cx="6355974" cy="3749964"/>
+          </a:xfrm>
+          <a:prstGeom prst="rect">
+            <a:avLst/>
+          </a:prstGeom>
+          <a:solidFill>
+            <a:schemeClr val="tx1">
+              <a:lumMod val="50000"/>
+              <a:lumOff val="50000"/>
+            </a:schemeClr>
+          </a:solidFill>
+          <a:effectLst>
+            <a:outerShdw blurRad="50800" dist="38100" dir="8100000" algn="tr" rotWithShape="0">
+              <a:prstClr val="black">
+                <a:alpha val="40000"/>
+              </a:prstClr>
+            </a:outerShdw>
+          </a:effectLst>
+        </p:spPr>
+      </p:pic>
+      <p:sp>
+        <p:nvSpPr>
+          <p:cNvPr id="7" name="TextBox 6">
+            <a:extLst>
+              <a:ext uri="{FF2B5EF4-FFF2-40B4-BE49-F238E27FC236}">
+                <a16:creationId xmlns:a16="http://schemas.microsoft.com/office/drawing/2014/main" id="{AB8DACCB-DC9F-69EA-648E-A62051D63A24}"/>
+              </a:ext>
+            </a:extLst>
+          </p:cNvPr>
+          <p:cNvSpPr txBox="1"/>
+          <p:nvPr/>
+        </p:nvSpPr>
+        <p:spPr>
+          <a:xfrm>
+            <a:off x="1321435" y="5246688"/>
+            <a:ext cx="1605280" cy="923330"/>
+          </a:xfrm>
+          <a:prstGeom prst="rect">
+            <a:avLst/>
+          </a:prstGeom>
+          <a:noFill/>
+        </p:spPr>
+        <p:txBody>
+          <a:bodyPr wrap="square" rtlCol="0">
+            <a:spAutoFit/>
+          </a:bodyPr>
+          <a:lstStyle/>
+          <a:p>
+            <a:r>
+              <a:rPr lang="en-US" dirty="0"/>
+              <a:t>Cite Fixed points in PINNs</a:t>
+            </a:r>
+          </a:p>
+          <a:p>
+            <a:endParaRPr lang="en-US" dirty="0"/>
           </a:p>
         </p:txBody>
       </p:sp>
@@ -31988,7 +31966,10 @@
           <a:lstStyle/>
           <a:p>
             <a:pPr algn="ctr"/>
-            <a:endParaRPr lang="en-US" sz="4000" dirty="0"/>
+            <a:r>
+              <a:rPr lang="en-US" sz="4000" dirty="0"/>
+              <a:t>Why does this occur?</a:t>
+            </a:r>
           </a:p>
         </p:txBody>
       </p:sp>
@@ -32954,33 +32935,117 @@
           </p:spPr>
         </p:sp>
       </p:grpSp>
-      <p:sp>
-        <p:nvSpPr>
-          <p:cNvPr id="4" name="Content Placeholder 3">
+      <p:pic>
+        <p:nvPicPr>
+          <p:cNvPr id="7" name="Picture 6">
             <a:extLst>
               <a:ext uri="{FF2B5EF4-FFF2-40B4-BE49-F238E27FC236}">
-                <a16:creationId xmlns:a16="http://schemas.microsoft.com/office/drawing/2014/main" id="{57A1796B-D2E3-D7C1-D479-519A74B7A62B}"/>
+                <a16:creationId xmlns:a16="http://schemas.microsoft.com/office/drawing/2014/main" id="{04303DCC-CDF7-094A-27FF-57718C58D95E}"/>
               </a:ext>
             </a:extLst>
           </p:cNvPr>
-          <p:cNvSpPr>
-            <a:spLocks noGrp="1"/>
-          </p:cNvSpPr>
-          <p:nvPr>
-            <p:ph idx="1"/>
-          </p:nvPr>
+          <p:cNvPicPr>
+            <a:picLocks noChangeAspect="1"/>
+          </p:cNvPicPr>
+          <p:nvPr/>
+        </p:nvPicPr>
+        <p:blipFill>
+          <a:blip r:embed="rId4"/>
+          <a:stretch>
+            <a:fillRect/>
+          </a:stretch>
+        </p:blipFill>
+        <p:spPr>
+          <a:xfrm>
+            <a:off x="1101725" y="2231260"/>
+            <a:ext cx="6628948" cy="3320228"/>
+          </a:xfrm>
+          <a:prstGeom prst="rect">
+            <a:avLst/>
+          </a:prstGeom>
+          <a:effectLst>
+            <a:outerShdw blurRad="50800" dist="38100" dir="8100000" algn="tr" rotWithShape="0">
+              <a:prstClr val="black">
+                <a:alpha val="40000"/>
+              </a:prstClr>
+            </a:outerShdw>
+          </a:effectLst>
+        </p:spPr>
+      </p:pic>
+      <p:sp>
+        <p:nvSpPr>
+          <p:cNvPr id="11" name="TextBox 10">
+            <a:extLst>
+              <a:ext uri="{FF2B5EF4-FFF2-40B4-BE49-F238E27FC236}">
+                <a16:creationId xmlns:a16="http://schemas.microsoft.com/office/drawing/2014/main" id="{D0FDAF7D-028E-A581-3DB7-9B01E80B6887}"/>
+              </a:ext>
+            </a:extLst>
+          </p:cNvPr>
+          <p:cNvSpPr txBox="1"/>
+          <p:nvPr/>
         </p:nvSpPr>
-        <p:spPr/>
+        <p:spPr>
+          <a:xfrm>
+            <a:off x="8133898" y="2676553"/>
+            <a:ext cx="3686627" cy="2400657"/>
+          </a:xfrm>
+          <a:prstGeom prst="rect">
+            <a:avLst/>
+          </a:prstGeom>
+          <a:noFill/>
+        </p:spPr>
         <p:txBody>
-          <a:bodyPr>
-            <a:normAutofit/>
+          <a:bodyPr wrap="square" rtlCol="0">
+            <a:spAutoFit/>
           </a:bodyPr>
           <a:lstStyle/>
           <a:p>
-            <a:pPr marL="0" indent="0">
-              <a:buNone/>
+            <a:pPr marL="285750" indent="-285750">
+              <a:buFont typeface="Arial" panose="020B0604020202020204" pitchFamily="34" charset="0"/>
+              <a:buChar char="•"/>
             </a:pPr>
-            <a:endParaRPr lang="en-US" sz="3000" dirty="0"/>
+            <a:r>
+              <a:rPr lang="en-US" sz="3000" dirty="0"/>
+              <a:t>Non-physical fixed points can create saddle points or even local optima in the loss function</a:t>
+            </a:r>
+          </a:p>
+        </p:txBody>
+      </p:sp>
+      <p:sp>
+        <p:nvSpPr>
+          <p:cNvPr id="40" name="TextBox 39">
+            <a:extLst>
+              <a:ext uri="{FF2B5EF4-FFF2-40B4-BE49-F238E27FC236}">
+                <a16:creationId xmlns:a16="http://schemas.microsoft.com/office/drawing/2014/main" id="{AF77AFDA-EA5E-E759-A6B6-1A580897E4EA}"/>
+              </a:ext>
+            </a:extLst>
+          </p:cNvPr>
+          <p:cNvSpPr txBox="1"/>
+          <p:nvPr/>
+        </p:nvSpPr>
+        <p:spPr>
+          <a:xfrm>
+            <a:off x="1321435" y="5246688"/>
+            <a:ext cx="1605280" cy="923330"/>
+          </a:xfrm>
+          <a:prstGeom prst="rect">
+            <a:avLst/>
+          </a:prstGeom>
+          <a:noFill/>
+        </p:spPr>
+        <p:txBody>
+          <a:bodyPr wrap="square" rtlCol="0">
+            <a:spAutoFit/>
+          </a:bodyPr>
+          <a:lstStyle/>
+          <a:p>
+            <a:r>
+              <a:rPr lang="en-US" dirty="0"/>
+              <a:t>Cite Fixed points in PINNs</a:t>
+            </a:r>
+          </a:p>
+          <a:p>
+            <a:endParaRPr lang="en-US" dirty="0"/>
           </a:p>
         </p:txBody>
       </p:sp>
@@ -33000,6 +33065,32 @@
 <file path=ppt/slides/slide6.xml><?xml version="1.0" encoding="utf-8"?>
 <p:sld xmlns:a="http://schemas.openxmlformats.org/drawingml/2006/main" xmlns:r="http://schemas.openxmlformats.org/officeDocument/2006/relationships" xmlns:p="http://schemas.openxmlformats.org/presentationml/2006/main">
   <p:cSld>
+    <p:bg>
+      <p:bgPr>
+        <a:gradFill rotWithShape="1">
+          <a:gsLst>
+            <a:gs pos="0">
+              <a:schemeClr val="bg1">
+                <a:tint val="98000"/>
+                <a:hueMod val="94000"/>
+                <a:satMod val="148000"/>
+                <a:lumMod val="150000"/>
+              </a:schemeClr>
+            </a:gs>
+            <a:gs pos="100000">
+              <a:schemeClr val="bg1">
+                <a:shade val="92000"/>
+                <a:hueMod val="104000"/>
+                <a:satMod val="140000"/>
+                <a:lumMod val="68000"/>
+              </a:schemeClr>
+            </a:gs>
+          </a:gsLst>
+          <a:lin ang="5040000" scaled="0"/>
+        </a:gradFill>
+        <a:effectLst/>
+      </p:bgPr>
+    </p:bg>
     <p:spTree>
       <p:nvGrpSpPr>
         <p:cNvPr id="1" name=""/>
@@ -33014,6 +33105,2545 @@
           <a:chExt cx="0" cy="0"/>
         </a:xfrm>
       </p:grpSpPr>
+      <p:sp useBgFill="1">
+        <p:nvSpPr>
+          <p:cNvPr id="8" name="Rectangle 7">
+            <a:extLst>
+              <a:ext uri="{FF2B5EF4-FFF2-40B4-BE49-F238E27FC236}">
+                <a16:creationId xmlns:a16="http://schemas.microsoft.com/office/drawing/2014/main" id="{E9B448F0-DA06-4165-AB5F-4330A20E06D0}"/>
+              </a:ext>
+              <a:ext uri="{C183D7F6-B498-43B3-948B-1728B52AA6E4}">
+                <adec:decorative xmlns:adec="http://schemas.microsoft.com/office/drawing/2017/decorative" val="1"/>
+              </a:ext>
+            </a:extLst>
+          </p:cNvPr>
+          <p:cNvSpPr>
+            <a:spLocks noGrp="1" noRot="1" noChangeAspect="1" noMove="1" noResize="1" noEditPoints="1" noAdjustHandles="1" noChangeArrowheads="1" noChangeShapeType="1" noTextEdit="1"/>
+          </p:cNvSpPr>
+          <p:nvPr>
+            <p:extLst>
+              <p:ext uri="{386F3935-93C4-4BCD-93E2-E3B085C9AB24}">
+                <p16:designElem xmlns:p16="http://schemas.microsoft.com/office/powerpoint/2015/main" val="1"/>
+              </p:ext>
+            </p:extLst>
+          </p:nvPr>
+        </p:nvSpPr>
+        <p:spPr>
+          <a:xfrm>
+            <a:off x="1" y="-1"/>
+            <a:ext cx="12192000" cy="6858000"/>
+          </a:xfrm>
+          <a:prstGeom prst="rect">
+            <a:avLst/>
+          </a:prstGeom>
+          <a:ln>
+            <a:noFill/>
+          </a:ln>
+        </p:spPr>
+        <p:style>
+          <a:lnRef idx="2">
+            <a:schemeClr val="accent1">
+              <a:shade val="50000"/>
+            </a:schemeClr>
+          </a:lnRef>
+          <a:fillRef idx="1">
+            <a:schemeClr val="accent1"/>
+          </a:fillRef>
+          <a:effectRef idx="0">
+            <a:schemeClr val="accent1"/>
+          </a:effectRef>
+          <a:fontRef idx="minor">
+            <a:schemeClr val="lt1"/>
+          </a:fontRef>
+        </p:style>
+        <p:txBody>
+          <a:bodyPr rtlCol="0" anchor="ctr"/>
+          <a:lstStyle/>
+          <a:p>
+            <a:pPr algn="ctr"/>
+            <a:endParaRPr lang="en-US"/>
+          </a:p>
+        </p:txBody>
+      </p:sp>
+      <p:pic>
+        <p:nvPicPr>
+          <p:cNvPr id="10" name="Picture 2">
+            <a:extLst>
+              <a:ext uri="{FF2B5EF4-FFF2-40B4-BE49-F238E27FC236}">
+                <a16:creationId xmlns:a16="http://schemas.microsoft.com/office/drawing/2014/main" id="{92D83638-A467-411A-9C31-FE9A111CD885}"/>
+              </a:ext>
+              <a:ext uri="{C183D7F6-B498-43B3-948B-1728B52AA6E4}">
+                <adec:decorative xmlns:adec="http://schemas.microsoft.com/office/drawing/2017/decorative" val="1"/>
+              </a:ext>
+            </a:extLst>
+          </p:cNvPr>
+          <p:cNvPicPr>
+            <a:picLocks noGrp="1" noRot="1" noChangeAspect="1" noMove="1" noResize="1" noEditPoints="1" noAdjustHandles="1" noChangeArrowheads="1" noChangeShapeType="1" noCrop="1"/>
+          </p:cNvPicPr>
+          <p:nvPr>
+            <p:extLst>
+              <p:ext uri="{386F3935-93C4-4BCD-93E2-E3B085C9AB24}">
+                <p16:designElem xmlns:p16="http://schemas.microsoft.com/office/powerpoint/2015/main" val="1"/>
+              </p:ext>
+            </p:extLst>
+          </p:nvPr>
+        </p:nvPicPr>
+        <p:blipFill>
+          <a:blip r:embed="rId3">
+            <a:alphaModFix amt="30000"/>
+            <a:duotone>
+              <a:prstClr val="black"/>
+              <a:schemeClr val="tx2">
+                <a:tint val="45000"/>
+                <a:satMod val="400000"/>
+              </a:schemeClr>
+            </a:duotone>
+            <a:extLst>
+              <a:ext uri="{28A0092B-C50C-407E-A947-70E740481C1C}">
+                <a14:useLocalDpi xmlns:a14="http://schemas.microsoft.com/office/drawing/2010/main" val="0"/>
+              </a:ext>
+            </a:extLst>
+          </a:blip>
+          <a:srcRect/>
+          <a:stretch>
+            <a:fillRect/>
+          </a:stretch>
+        </p:blipFill>
+        <p:spPr bwMode="auto">
+          <a:xfrm>
+            <a:off x="0" y="0"/>
+            <a:ext cx="12192003" cy="6858001"/>
+          </a:xfrm>
+          <a:prstGeom prst="rect">
+            <a:avLst/>
+          </a:prstGeom>
+          <a:noFill/>
+          <a:extLst>
+            <a:ext uri="{909E8E84-426E-40dd-AFC4-6F175D3DCCD1}">
+              <a14:hiddenFill xmlns:a14="http://schemas.microsoft.com/office/drawing/2010/main" xmlns:p14="http://schemas.microsoft.com/office/powerpoint/2010/main" xmlns:a16="http://schemas.microsoft.com/office/drawing/2014/main" xmlns="">
+                <a:solidFill>
+                  <a:srgbClr val="FFFFFF"/>
+                </a:solidFill>
+              </a14:hiddenFill>
+            </a:ext>
+          </a:extLst>
+        </p:spPr>
+      </p:pic>
+      <p:grpSp>
+        <p:nvGrpSpPr>
+          <p:cNvPr id="12" name="Group 11">
+            <a:extLst>
+              <a:ext uri="{FF2B5EF4-FFF2-40B4-BE49-F238E27FC236}">
+                <a16:creationId xmlns:a16="http://schemas.microsoft.com/office/drawing/2014/main" id="{2576BCDF-119F-4EB5-83D7-ED823C93EBBD}"/>
+              </a:ext>
+              <a:ext uri="{C183D7F6-B498-43B3-948B-1728B52AA6E4}">
+                <adec:decorative xmlns:adec="http://schemas.microsoft.com/office/drawing/2017/decorative" val="1"/>
+              </a:ext>
+            </a:extLst>
+          </p:cNvPr>
+          <p:cNvGrpSpPr>
+            <a:grpSpLocks noGrp="1" noUngrp="1" noRot="1" noChangeAspect="1" noMove="1" noResize="1"/>
+          </p:cNvGrpSpPr>
+          <p:nvPr>
+            <p:extLst>
+              <p:ext uri="{386F3935-93C4-4BCD-93E2-E3B085C9AB24}">
+                <p16:designElem xmlns:p16="http://schemas.microsoft.com/office/powerpoint/2015/main" val="1"/>
+              </p:ext>
+            </p:extLst>
+          </p:nvPr>
+        </p:nvGrpSpPr>
+        <p:grpSpPr>
+          <a:xfrm>
+            <a:off x="0" y="0"/>
+            <a:ext cx="1220788" cy="6858001"/>
+            <a:chOff x="-14288" y="0"/>
+            <a:chExt cx="1220788" cy="6858001"/>
+          </a:xfrm>
+          <a:solidFill>
+            <a:schemeClr val="tx2">
+              <a:alpha val="45000"/>
+            </a:schemeClr>
+          </a:solidFill>
+        </p:grpSpPr>
+        <p:sp>
+          <p:nvSpPr>
+            <p:cNvPr id="13" name="Rectangle 5">
+              <a:extLst>
+                <a:ext uri="{FF2B5EF4-FFF2-40B4-BE49-F238E27FC236}">
+                  <a16:creationId xmlns:a16="http://schemas.microsoft.com/office/drawing/2014/main" id="{43D63E8F-FD8A-4CE3-B7C9-3E9E2B66B5FD}"/>
+                </a:ext>
+                <a:ext uri="{C183D7F6-B498-43B3-948B-1728B52AA6E4}">
+                  <adec:decorative xmlns:adec="http://schemas.microsoft.com/office/drawing/2017/decorative" val="1"/>
+                </a:ext>
+              </a:extLst>
+            </p:cNvPr>
+            <p:cNvSpPr>
+              <a:spLocks noChangeArrowheads="1"/>
+            </p:cNvSpPr>
+            <p:nvPr>
+              <p:extLst>
+                <p:ext uri="{386F3935-93C4-4BCD-93E2-E3B085C9AB24}">
+                  <p16:designElem xmlns:p16="http://schemas.microsoft.com/office/powerpoint/2015/main" val="1"/>
+                </p:ext>
+              </p:extLst>
+            </p:nvPr>
+          </p:nvSpPr>
+          <p:spPr bwMode="auto">
+            <a:xfrm>
+              <a:off x="114300" y="4763"/>
+              <a:ext cx="23813" cy="2181225"/>
+            </a:xfrm>
+            <a:prstGeom prst="rect">
+              <a:avLst/>
+            </a:prstGeom>
+            <a:grpFill/>
+            <a:ln>
+              <a:noFill/>
+            </a:ln>
+            <a:extLst>
+              <a:ext uri="{91240B29-F687-4f45-9708-019B960494DF}">
+                <a14:hiddenLine xmlns:a14="http://schemas.microsoft.com/office/drawing/2010/main" xmlns:p14="http://schemas.microsoft.com/office/powerpoint/2010/main" xmlns:a16="http://schemas.microsoft.com/office/drawing/2014/main" xmlns="" w="9525">
+                  <a:solidFill>
+                    <a:srgbClr val="000000"/>
+                  </a:solidFill>
+                  <a:miter lim="800000"/>
+                  <a:headEnd/>
+                  <a:tailEnd/>
+                </a14:hiddenLine>
+              </a:ext>
+            </a:extLst>
+          </p:spPr>
+        </p:sp>
+        <p:sp>
+          <p:nvSpPr>
+            <p:cNvPr id="14" name="Freeform 6">
+              <a:extLst>
+                <a:ext uri="{FF2B5EF4-FFF2-40B4-BE49-F238E27FC236}">
+                  <a16:creationId xmlns:a16="http://schemas.microsoft.com/office/drawing/2014/main" id="{D107D890-1831-46D8-90FB-F2FC0B28841D}"/>
+                </a:ext>
+                <a:ext uri="{C183D7F6-B498-43B3-948B-1728B52AA6E4}">
+                  <adec:decorative xmlns:adec="http://schemas.microsoft.com/office/drawing/2017/decorative" val="1"/>
+                </a:ext>
+              </a:extLst>
+            </p:cNvPr>
+            <p:cNvSpPr>
+              <a:spLocks noEditPoints="1"/>
+            </p:cNvSpPr>
+            <p:nvPr>
+              <p:extLst>
+                <p:ext uri="{386F3935-93C4-4BCD-93E2-E3B085C9AB24}">
+                  <p16:designElem xmlns:p16="http://schemas.microsoft.com/office/powerpoint/2015/main" val="1"/>
+                </p:ext>
+              </p:extLst>
+            </p:nvPr>
+          </p:nvSpPr>
+          <p:spPr bwMode="auto">
+            <a:xfrm>
+              <a:off x="33337" y="2176463"/>
+              <a:ext cx="190500" cy="190500"/>
+            </a:xfrm>
+            <a:custGeom>
+              <a:avLst/>
+              <a:gdLst/>
+              <a:ahLst/>
+              <a:cxnLst/>
+              <a:rect l="0" t="0" r="r" b="b"/>
+              <a:pathLst>
+                <a:path w="40" h="40">
+                  <a:moveTo>
+                    <a:pt x="20" y="40"/>
+                  </a:moveTo>
+                  <a:cubicBezTo>
+                    <a:pt x="9" y="40"/>
+                    <a:pt x="0" y="31"/>
+                    <a:pt x="0" y="20"/>
+                  </a:cubicBezTo>
+                  <a:cubicBezTo>
+                    <a:pt x="0" y="9"/>
+                    <a:pt x="9" y="0"/>
+                    <a:pt x="20" y="0"/>
+                  </a:cubicBezTo>
+                  <a:cubicBezTo>
+                    <a:pt x="31" y="0"/>
+                    <a:pt x="40" y="9"/>
+                    <a:pt x="40" y="20"/>
+                  </a:cubicBezTo>
+                  <a:cubicBezTo>
+                    <a:pt x="40" y="31"/>
+                    <a:pt x="31" y="40"/>
+                    <a:pt x="20" y="40"/>
+                  </a:cubicBezTo>
+                  <a:close/>
+                  <a:moveTo>
+                    <a:pt x="20" y="4"/>
+                  </a:moveTo>
+                  <a:cubicBezTo>
+                    <a:pt x="11" y="4"/>
+                    <a:pt x="4" y="11"/>
+                    <a:pt x="4" y="20"/>
+                  </a:cubicBezTo>
+                  <a:cubicBezTo>
+                    <a:pt x="4" y="29"/>
+                    <a:pt x="11" y="36"/>
+                    <a:pt x="20" y="36"/>
+                  </a:cubicBezTo>
+                  <a:cubicBezTo>
+                    <a:pt x="28" y="36"/>
+                    <a:pt x="36" y="29"/>
+                    <a:pt x="36" y="20"/>
+                  </a:cubicBezTo>
+                  <a:cubicBezTo>
+                    <a:pt x="36" y="11"/>
+                    <a:pt x="28" y="4"/>
+                    <a:pt x="20" y="4"/>
+                  </a:cubicBezTo>
+                  <a:close/>
+                </a:path>
+              </a:pathLst>
+            </a:custGeom>
+            <a:grpFill/>
+            <a:ln>
+              <a:noFill/>
+            </a:ln>
+            <a:extLst>
+              <a:ext uri="{91240B29-F687-4f45-9708-019B960494DF}">
+                <a14:hiddenLine xmlns:a14="http://schemas.microsoft.com/office/drawing/2010/main" xmlns:p14="http://schemas.microsoft.com/office/powerpoint/2010/main" xmlns:a16="http://schemas.microsoft.com/office/drawing/2014/main" xmlns="" w="9525">
+                  <a:solidFill>
+                    <a:srgbClr val="000000"/>
+                  </a:solidFill>
+                  <a:round/>
+                  <a:headEnd/>
+                  <a:tailEnd/>
+                </a14:hiddenLine>
+              </a:ext>
+            </a:extLst>
+          </p:spPr>
+        </p:sp>
+        <p:sp>
+          <p:nvSpPr>
+            <p:cNvPr id="15" name="Freeform 7">
+              <a:extLst>
+                <a:ext uri="{FF2B5EF4-FFF2-40B4-BE49-F238E27FC236}">
+                  <a16:creationId xmlns:a16="http://schemas.microsoft.com/office/drawing/2014/main" id="{02440904-A4EC-4F72-8E22-AAF4D9DB5C1B}"/>
+                </a:ext>
+                <a:ext uri="{C183D7F6-B498-43B3-948B-1728B52AA6E4}">
+                  <adec:decorative xmlns:adec="http://schemas.microsoft.com/office/drawing/2017/decorative" val="1"/>
+                </a:ext>
+              </a:extLst>
+            </p:cNvPr>
+            <p:cNvSpPr>
+              <a:spLocks noEditPoints="1"/>
+            </p:cNvSpPr>
+            <p:nvPr>
+              <p:extLst>
+                <p:ext uri="{386F3935-93C4-4BCD-93E2-E3B085C9AB24}">
+                  <p16:designElem xmlns:p16="http://schemas.microsoft.com/office/powerpoint/2015/main" val="1"/>
+                </p:ext>
+              </p:extLst>
+            </p:nvPr>
+          </p:nvSpPr>
+          <p:spPr bwMode="auto">
+            <a:xfrm>
+              <a:off x="28575" y="4021138"/>
+              <a:ext cx="190500" cy="188913"/>
+            </a:xfrm>
+            <a:custGeom>
+              <a:avLst/>
+              <a:gdLst/>
+              <a:ahLst/>
+              <a:cxnLst/>
+              <a:rect l="0" t="0" r="r" b="b"/>
+              <a:pathLst>
+                <a:path w="40" h="40">
+                  <a:moveTo>
+                    <a:pt x="20" y="40"/>
+                  </a:moveTo>
+                  <a:cubicBezTo>
+                    <a:pt x="9" y="40"/>
+                    <a:pt x="0" y="31"/>
+                    <a:pt x="0" y="20"/>
+                  </a:cubicBezTo>
+                  <a:cubicBezTo>
+                    <a:pt x="0" y="9"/>
+                    <a:pt x="9" y="0"/>
+                    <a:pt x="20" y="0"/>
+                  </a:cubicBezTo>
+                  <a:cubicBezTo>
+                    <a:pt x="31" y="0"/>
+                    <a:pt x="40" y="9"/>
+                    <a:pt x="40" y="20"/>
+                  </a:cubicBezTo>
+                  <a:cubicBezTo>
+                    <a:pt x="40" y="31"/>
+                    <a:pt x="31" y="40"/>
+                    <a:pt x="20" y="40"/>
+                  </a:cubicBezTo>
+                  <a:close/>
+                  <a:moveTo>
+                    <a:pt x="20" y="4"/>
+                  </a:moveTo>
+                  <a:cubicBezTo>
+                    <a:pt x="12" y="4"/>
+                    <a:pt x="4" y="11"/>
+                    <a:pt x="4" y="20"/>
+                  </a:cubicBezTo>
+                  <a:cubicBezTo>
+                    <a:pt x="4" y="29"/>
+                    <a:pt x="12" y="36"/>
+                    <a:pt x="20" y="36"/>
+                  </a:cubicBezTo>
+                  <a:cubicBezTo>
+                    <a:pt x="29" y="36"/>
+                    <a:pt x="36" y="29"/>
+                    <a:pt x="36" y="20"/>
+                  </a:cubicBezTo>
+                  <a:cubicBezTo>
+                    <a:pt x="36" y="11"/>
+                    <a:pt x="29" y="4"/>
+                    <a:pt x="20" y="4"/>
+                  </a:cubicBezTo>
+                  <a:close/>
+                </a:path>
+              </a:pathLst>
+            </a:custGeom>
+            <a:grpFill/>
+            <a:ln>
+              <a:noFill/>
+            </a:ln>
+            <a:extLst>
+              <a:ext uri="{91240B29-F687-4f45-9708-019B960494DF}">
+                <a14:hiddenLine xmlns:a14="http://schemas.microsoft.com/office/drawing/2010/main" xmlns:p14="http://schemas.microsoft.com/office/powerpoint/2010/main" xmlns:a16="http://schemas.microsoft.com/office/drawing/2014/main" xmlns="" w="9525">
+                  <a:solidFill>
+                    <a:srgbClr val="000000"/>
+                  </a:solidFill>
+                  <a:round/>
+                  <a:headEnd/>
+                  <a:tailEnd/>
+                </a14:hiddenLine>
+              </a:ext>
+            </a:extLst>
+          </p:spPr>
+        </p:sp>
+        <p:sp>
+          <p:nvSpPr>
+            <p:cNvPr id="16" name="Freeform 8">
+              <a:extLst>
+                <a:ext uri="{FF2B5EF4-FFF2-40B4-BE49-F238E27FC236}">
+                  <a16:creationId xmlns:a16="http://schemas.microsoft.com/office/drawing/2014/main" id="{625E9C1F-1569-416B-A85C-FA143487225D}"/>
+                </a:ext>
+                <a:ext uri="{C183D7F6-B498-43B3-948B-1728B52AA6E4}">
+                  <adec:decorative xmlns:adec="http://schemas.microsoft.com/office/drawing/2017/decorative" val="1"/>
+                </a:ext>
+              </a:extLst>
+            </p:cNvPr>
+            <p:cNvSpPr/>
+            <p:nvPr>
+              <p:extLst>
+                <p:ext uri="{386F3935-93C4-4BCD-93E2-E3B085C9AB24}">
+                  <p16:designElem xmlns:p16="http://schemas.microsoft.com/office/powerpoint/2015/main" val="1"/>
+                </p:ext>
+              </p:extLst>
+            </p:nvPr>
+          </p:nvSpPr>
+          <p:spPr bwMode="auto">
+            <a:xfrm>
+              <a:off x="200025" y="4763"/>
+              <a:ext cx="369888" cy="1811338"/>
+            </a:xfrm>
+            <a:custGeom>
+              <a:avLst/>
+              <a:gdLst/>
+              <a:ahLst/>
+              <a:cxnLst/>
+              <a:rect l="0" t="0" r="r" b="b"/>
+              <a:pathLst>
+                <a:path w="233" h="1141">
+                  <a:moveTo>
+                    <a:pt x="218" y="1141"/>
+                  </a:moveTo>
+                  <a:lnTo>
+                    <a:pt x="0" y="626"/>
+                  </a:lnTo>
+                  <a:lnTo>
+                    <a:pt x="0" y="0"/>
+                  </a:lnTo>
+                  <a:lnTo>
+                    <a:pt x="15" y="0"/>
+                  </a:lnTo>
+                  <a:lnTo>
+                    <a:pt x="15" y="623"/>
+                  </a:lnTo>
+                  <a:lnTo>
+                    <a:pt x="233" y="1135"/>
+                  </a:lnTo>
+                  <a:lnTo>
+                    <a:pt x="218" y="1141"/>
+                  </a:lnTo>
+                  <a:close/>
+                </a:path>
+              </a:pathLst>
+            </a:custGeom>
+            <a:grpFill/>
+            <a:ln>
+              <a:noFill/>
+            </a:ln>
+            <a:extLst>
+              <a:ext uri="{91240B29-F687-4f45-9708-019B960494DF}">
+                <a14:hiddenLine xmlns:a14="http://schemas.microsoft.com/office/drawing/2010/main" xmlns:p14="http://schemas.microsoft.com/office/powerpoint/2010/main" xmlns:a16="http://schemas.microsoft.com/office/drawing/2014/main" xmlns="" w="9525">
+                  <a:solidFill>
+                    <a:srgbClr val="000000"/>
+                  </a:solidFill>
+                  <a:round/>
+                  <a:headEnd/>
+                  <a:tailEnd/>
+                </a14:hiddenLine>
+              </a:ext>
+            </a:extLst>
+          </p:spPr>
+        </p:sp>
+        <p:sp>
+          <p:nvSpPr>
+            <p:cNvPr id="17" name="Freeform 9">
+              <a:extLst>
+                <a:ext uri="{FF2B5EF4-FFF2-40B4-BE49-F238E27FC236}">
+                  <a16:creationId xmlns:a16="http://schemas.microsoft.com/office/drawing/2014/main" id="{3A186C77-43BF-4B1B-8170-48944F305750}"/>
+                </a:ext>
+                <a:ext uri="{C183D7F6-B498-43B3-948B-1728B52AA6E4}">
+                  <adec:decorative xmlns:adec="http://schemas.microsoft.com/office/drawing/2017/decorative" val="1"/>
+                </a:ext>
+              </a:extLst>
+            </p:cNvPr>
+            <p:cNvSpPr>
+              <a:spLocks noEditPoints="1"/>
+            </p:cNvSpPr>
+            <p:nvPr>
+              <p:extLst>
+                <p:ext uri="{386F3935-93C4-4BCD-93E2-E3B085C9AB24}">
+                  <p16:designElem xmlns:p16="http://schemas.microsoft.com/office/powerpoint/2015/main" val="1"/>
+                </p:ext>
+              </p:extLst>
+            </p:nvPr>
+          </p:nvSpPr>
+          <p:spPr bwMode="auto">
+            <a:xfrm>
+              <a:off x="503237" y="1801813"/>
+              <a:ext cx="190500" cy="188913"/>
+            </a:xfrm>
+            <a:custGeom>
+              <a:avLst/>
+              <a:gdLst/>
+              <a:ahLst/>
+              <a:cxnLst/>
+              <a:rect l="0" t="0" r="r" b="b"/>
+              <a:pathLst>
+                <a:path w="40" h="40">
+                  <a:moveTo>
+                    <a:pt x="20" y="40"/>
+                  </a:moveTo>
+                  <a:cubicBezTo>
+                    <a:pt x="9" y="40"/>
+                    <a:pt x="0" y="31"/>
+                    <a:pt x="0" y="20"/>
+                  </a:cubicBezTo>
+                  <a:cubicBezTo>
+                    <a:pt x="0" y="9"/>
+                    <a:pt x="9" y="0"/>
+                    <a:pt x="20" y="0"/>
+                  </a:cubicBezTo>
+                  <a:cubicBezTo>
+                    <a:pt x="33" y="0"/>
+                    <a:pt x="40" y="6"/>
+                    <a:pt x="40" y="20"/>
+                  </a:cubicBezTo>
+                  <a:cubicBezTo>
+                    <a:pt x="40" y="31"/>
+                    <a:pt x="31" y="40"/>
+                    <a:pt x="20" y="40"/>
+                  </a:cubicBezTo>
+                  <a:close/>
+                  <a:moveTo>
+                    <a:pt x="20" y="4"/>
+                  </a:moveTo>
+                  <a:cubicBezTo>
+                    <a:pt x="11" y="4"/>
+                    <a:pt x="4" y="11"/>
+                    <a:pt x="4" y="20"/>
+                  </a:cubicBezTo>
+                  <a:cubicBezTo>
+                    <a:pt x="4" y="29"/>
+                    <a:pt x="11" y="36"/>
+                    <a:pt x="20" y="36"/>
+                  </a:cubicBezTo>
+                  <a:cubicBezTo>
+                    <a:pt x="28" y="36"/>
+                    <a:pt x="36" y="29"/>
+                    <a:pt x="36" y="20"/>
+                  </a:cubicBezTo>
+                  <a:cubicBezTo>
+                    <a:pt x="36" y="9"/>
+                    <a:pt x="31" y="4"/>
+                    <a:pt x="20" y="4"/>
+                  </a:cubicBezTo>
+                  <a:close/>
+                </a:path>
+              </a:pathLst>
+            </a:custGeom>
+            <a:grpFill/>
+            <a:ln>
+              <a:noFill/>
+            </a:ln>
+            <a:extLst>
+              <a:ext uri="{91240B29-F687-4f45-9708-019B960494DF}">
+                <a14:hiddenLine xmlns:a14="http://schemas.microsoft.com/office/drawing/2010/main" xmlns:p14="http://schemas.microsoft.com/office/powerpoint/2010/main" xmlns:a16="http://schemas.microsoft.com/office/drawing/2014/main" xmlns="" w="9525">
+                  <a:solidFill>
+                    <a:srgbClr val="000000"/>
+                  </a:solidFill>
+                  <a:round/>
+                  <a:headEnd/>
+                  <a:tailEnd/>
+                </a14:hiddenLine>
+              </a:ext>
+            </a:extLst>
+          </p:spPr>
+        </p:sp>
+        <p:sp>
+          <p:nvSpPr>
+            <p:cNvPr id="18" name="Freeform 10">
+              <a:extLst>
+                <a:ext uri="{FF2B5EF4-FFF2-40B4-BE49-F238E27FC236}">
+                  <a16:creationId xmlns:a16="http://schemas.microsoft.com/office/drawing/2014/main" id="{FA8D72C1-8526-44B4-9333-5E0057ECCA29}"/>
+                </a:ext>
+                <a:ext uri="{C183D7F6-B498-43B3-948B-1728B52AA6E4}">
+                  <adec:decorative xmlns:adec="http://schemas.microsoft.com/office/drawing/2017/decorative" val="1"/>
+                </a:ext>
+              </a:extLst>
+            </p:cNvPr>
+            <p:cNvSpPr/>
+            <p:nvPr>
+              <p:extLst>
+                <p:ext uri="{386F3935-93C4-4BCD-93E2-E3B085C9AB24}">
+                  <p16:designElem xmlns:p16="http://schemas.microsoft.com/office/powerpoint/2015/main" val="1"/>
+                </p:ext>
+              </p:extLst>
+            </p:nvPr>
+          </p:nvSpPr>
+          <p:spPr bwMode="auto">
+            <a:xfrm>
+              <a:off x="285750" y="4763"/>
+              <a:ext cx="369888" cy="1430338"/>
+            </a:xfrm>
+            <a:custGeom>
+              <a:avLst/>
+              <a:gdLst/>
+              <a:ahLst/>
+              <a:cxnLst/>
+              <a:rect l="0" t="0" r="r" b="b"/>
+              <a:pathLst>
+                <a:path w="233" h="901">
+                  <a:moveTo>
+                    <a:pt x="221" y="901"/>
+                  </a:moveTo>
+                  <a:lnTo>
+                    <a:pt x="0" y="383"/>
+                  </a:lnTo>
+                  <a:lnTo>
+                    <a:pt x="0" y="0"/>
+                  </a:lnTo>
+                  <a:lnTo>
+                    <a:pt x="18" y="0"/>
+                  </a:lnTo>
+                  <a:lnTo>
+                    <a:pt x="18" y="380"/>
+                  </a:lnTo>
+                  <a:lnTo>
+                    <a:pt x="233" y="895"/>
+                  </a:lnTo>
+                  <a:lnTo>
+                    <a:pt x="221" y="901"/>
+                  </a:lnTo>
+                  <a:close/>
+                </a:path>
+              </a:pathLst>
+            </a:custGeom>
+            <a:grpFill/>
+            <a:ln>
+              <a:noFill/>
+            </a:ln>
+            <a:extLst>
+              <a:ext uri="{91240B29-F687-4f45-9708-019B960494DF}">
+                <a14:hiddenLine xmlns:a14="http://schemas.microsoft.com/office/drawing/2010/main" xmlns:p14="http://schemas.microsoft.com/office/powerpoint/2010/main" xmlns:a16="http://schemas.microsoft.com/office/drawing/2014/main" xmlns="" w="9525">
+                  <a:solidFill>
+                    <a:srgbClr val="000000"/>
+                  </a:solidFill>
+                  <a:round/>
+                  <a:headEnd/>
+                  <a:tailEnd/>
+                </a14:hiddenLine>
+              </a:ext>
+            </a:extLst>
+          </p:spPr>
+        </p:sp>
+        <p:sp>
+          <p:nvSpPr>
+            <p:cNvPr id="19" name="Freeform 11">
+              <a:extLst>
+                <a:ext uri="{FF2B5EF4-FFF2-40B4-BE49-F238E27FC236}">
+                  <a16:creationId xmlns:a16="http://schemas.microsoft.com/office/drawing/2014/main" id="{790E4BA0-9C47-48B6-AA4A-8FC22DA9541E}"/>
+                </a:ext>
+                <a:ext uri="{C183D7F6-B498-43B3-948B-1728B52AA6E4}">
+                  <adec:decorative xmlns:adec="http://schemas.microsoft.com/office/drawing/2017/decorative" val="1"/>
+                </a:ext>
+              </a:extLst>
+            </p:cNvPr>
+            <p:cNvSpPr/>
+            <p:nvPr>
+              <p:extLst>
+                <p:ext uri="{386F3935-93C4-4BCD-93E2-E3B085C9AB24}">
+                  <p16:designElem xmlns:p16="http://schemas.microsoft.com/office/powerpoint/2015/main" val="1"/>
+                </p:ext>
+              </p:extLst>
+            </p:nvPr>
+          </p:nvSpPr>
+          <p:spPr bwMode="auto">
+            <a:xfrm>
+              <a:off x="546100" y="0"/>
+              <a:ext cx="152400" cy="912813"/>
+            </a:xfrm>
+            <a:custGeom>
+              <a:avLst/>
+              <a:gdLst/>
+              <a:ahLst/>
+              <a:cxnLst/>
+              <a:rect l="0" t="0" r="r" b="b"/>
+              <a:pathLst>
+                <a:path w="96" h="575">
+                  <a:moveTo>
+                    <a:pt x="96" y="575"/>
+                  </a:moveTo>
+                  <a:lnTo>
+                    <a:pt x="78" y="575"/>
+                  </a:lnTo>
+                  <a:lnTo>
+                    <a:pt x="78" y="192"/>
+                  </a:lnTo>
+                  <a:lnTo>
+                    <a:pt x="0" y="6"/>
+                  </a:lnTo>
+                  <a:lnTo>
+                    <a:pt x="15" y="0"/>
+                  </a:lnTo>
+                  <a:lnTo>
+                    <a:pt x="96" y="189"/>
+                  </a:lnTo>
+                  <a:lnTo>
+                    <a:pt x="96" y="575"/>
+                  </a:lnTo>
+                  <a:close/>
+                </a:path>
+              </a:pathLst>
+            </a:custGeom>
+            <a:grpFill/>
+            <a:ln>
+              <a:noFill/>
+            </a:ln>
+            <a:extLst>
+              <a:ext uri="{91240B29-F687-4f45-9708-019B960494DF}">
+                <a14:hiddenLine xmlns:a14="http://schemas.microsoft.com/office/drawing/2010/main" xmlns:p14="http://schemas.microsoft.com/office/powerpoint/2010/main" xmlns:a16="http://schemas.microsoft.com/office/drawing/2014/main" xmlns="" w="9525">
+                  <a:solidFill>
+                    <a:srgbClr val="000000"/>
+                  </a:solidFill>
+                  <a:round/>
+                  <a:headEnd/>
+                  <a:tailEnd/>
+                </a14:hiddenLine>
+              </a:ext>
+            </a:extLst>
+          </p:spPr>
+        </p:sp>
+        <p:sp>
+          <p:nvSpPr>
+            <p:cNvPr id="20" name="Freeform 12">
+              <a:extLst>
+                <a:ext uri="{FF2B5EF4-FFF2-40B4-BE49-F238E27FC236}">
+                  <a16:creationId xmlns:a16="http://schemas.microsoft.com/office/drawing/2014/main" id="{FD051475-431F-4B9D-94C6-7B49A69582F2}"/>
+                </a:ext>
+                <a:ext uri="{C183D7F6-B498-43B3-948B-1728B52AA6E4}">
+                  <adec:decorative xmlns:adec="http://schemas.microsoft.com/office/drawing/2017/decorative" val="1"/>
+                </a:ext>
+              </a:extLst>
+            </p:cNvPr>
+            <p:cNvSpPr>
+              <a:spLocks noEditPoints="1"/>
+            </p:cNvSpPr>
+            <p:nvPr>
+              <p:extLst>
+                <p:ext uri="{386F3935-93C4-4BCD-93E2-E3B085C9AB24}">
+                  <p16:designElem xmlns:p16="http://schemas.microsoft.com/office/powerpoint/2015/main" val="1"/>
+                </p:ext>
+              </p:extLst>
+            </p:nvPr>
+          </p:nvSpPr>
+          <p:spPr bwMode="auto">
+            <a:xfrm>
+              <a:off x="588962" y="1420813"/>
+              <a:ext cx="190500" cy="190500"/>
+            </a:xfrm>
+            <a:custGeom>
+              <a:avLst/>
+              <a:gdLst/>
+              <a:ahLst/>
+              <a:cxnLst/>
+              <a:rect l="0" t="0" r="r" b="b"/>
+              <a:pathLst>
+                <a:path w="40" h="40">
+                  <a:moveTo>
+                    <a:pt x="20" y="40"/>
+                  </a:moveTo>
+                  <a:cubicBezTo>
+                    <a:pt x="9" y="40"/>
+                    <a:pt x="0" y="31"/>
+                    <a:pt x="0" y="20"/>
+                  </a:cubicBezTo>
+                  <a:cubicBezTo>
+                    <a:pt x="0" y="9"/>
+                    <a:pt x="9" y="0"/>
+                    <a:pt x="20" y="0"/>
+                  </a:cubicBezTo>
+                  <a:cubicBezTo>
+                    <a:pt x="33" y="0"/>
+                    <a:pt x="40" y="7"/>
+                    <a:pt x="40" y="20"/>
+                  </a:cubicBezTo>
+                  <a:cubicBezTo>
+                    <a:pt x="40" y="31"/>
+                    <a:pt x="31" y="40"/>
+                    <a:pt x="20" y="40"/>
+                  </a:cubicBezTo>
+                  <a:close/>
+                  <a:moveTo>
+                    <a:pt x="20" y="4"/>
+                  </a:moveTo>
+                  <a:cubicBezTo>
+                    <a:pt x="11" y="4"/>
+                    <a:pt x="4" y="11"/>
+                    <a:pt x="4" y="20"/>
+                  </a:cubicBezTo>
+                  <a:cubicBezTo>
+                    <a:pt x="4" y="29"/>
+                    <a:pt x="11" y="36"/>
+                    <a:pt x="20" y="36"/>
+                  </a:cubicBezTo>
+                  <a:cubicBezTo>
+                    <a:pt x="29" y="36"/>
+                    <a:pt x="36" y="29"/>
+                    <a:pt x="36" y="20"/>
+                  </a:cubicBezTo>
+                  <a:cubicBezTo>
+                    <a:pt x="36" y="9"/>
+                    <a:pt x="31" y="4"/>
+                    <a:pt x="20" y="4"/>
+                  </a:cubicBezTo>
+                  <a:close/>
+                </a:path>
+              </a:pathLst>
+            </a:custGeom>
+            <a:grpFill/>
+            <a:ln>
+              <a:noFill/>
+            </a:ln>
+            <a:extLst>
+              <a:ext uri="{91240B29-F687-4f45-9708-019B960494DF}">
+                <a14:hiddenLine xmlns:a14="http://schemas.microsoft.com/office/drawing/2010/main" xmlns:p14="http://schemas.microsoft.com/office/powerpoint/2010/main" xmlns:a16="http://schemas.microsoft.com/office/drawing/2014/main" xmlns="" w="9525">
+                  <a:solidFill>
+                    <a:srgbClr val="000000"/>
+                  </a:solidFill>
+                  <a:round/>
+                  <a:headEnd/>
+                  <a:tailEnd/>
+                </a14:hiddenLine>
+              </a:ext>
+            </a:extLst>
+          </p:spPr>
+        </p:sp>
+        <p:sp>
+          <p:nvSpPr>
+            <p:cNvPr id="21" name="Freeform 13">
+              <a:extLst>
+                <a:ext uri="{FF2B5EF4-FFF2-40B4-BE49-F238E27FC236}">
+                  <a16:creationId xmlns:a16="http://schemas.microsoft.com/office/drawing/2014/main" id="{82255D2F-85A1-4A19-8BC4-EB2715F36CCE}"/>
+                </a:ext>
+                <a:ext uri="{C183D7F6-B498-43B3-948B-1728B52AA6E4}">
+                  <adec:decorative xmlns:adec="http://schemas.microsoft.com/office/drawing/2017/decorative" val="1"/>
+                </a:ext>
+              </a:extLst>
+            </p:cNvPr>
+            <p:cNvSpPr>
+              <a:spLocks noEditPoints="1"/>
+            </p:cNvSpPr>
+            <p:nvPr>
+              <p:extLst>
+                <p:ext uri="{386F3935-93C4-4BCD-93E2-E3B085C9AB24}">
+                  <p16:designElem xmlns:p16="http://schemas.microsoft.com/office/powerpoint/2015/main" val="1"/>
+                </p:ext>
+              </p:extLst>
+            </p:nvPr>
+          </p:nvSpPr>
+          <p:spPr bwMode="auto">
+            <a:xfrm>
+              <a:off x="588962" y="903288"/>
+              <a:ext cx="190500" cy="190500"/>
+            </a:xfrm>
+            <a:custGeom>
+              <a:avLst/>
+              <a:gdLst/>
+              <a:ahLst/>
+              <a:cxnLst/>
+              <a:rect l="0" t="0" r="r" b="b"/>
+              <a:pathLst>
+                <a:path w="40" h="40">
+                  <a:moveTo>
+                    <a:pt x="20" y="40"/>
+                  </a:moveTo>
+                  <a:cubicBezTo>
+                    <a:pt x="9" y="40"/>
+                    <a:pt x="0" y="31"/>
+                    <a:pt x="0" y="20"/>
+                  </a:cubicBezTo>
+                  <a:cubicBezTo>
+                    <a:pt x="0" y="9"/>
+                    <a:pt x="9" y="0"/>
+                    <a:pt x="20" y="0"/>
+                  </a:cubicBezTo>
+                  <a:cubicBezTo>
+                    <a:pt x="31" y="0"/>
+                    <a:pt x="40" y="9"/>
+                    <a:pt x="40" y="20"/>
+                  </a:cubicBezTo>
+                  <a:cubicBezTo>
+                    <a:pt x="40" y="31"/>
+                    <a:pt x="31" y="40"/>
+                    <a:pt x="20" y="40"/>
+                  </a:cubicBezTo>
+                  <a:close/>
+                  <a:moveTo>
+                    <a:pt x="20" y="4"/>
+                  </a:moveTo>
+                  <a:cubicBezTo>
+                    <a:pt x="11" y="4"/>
+                    <a:pt x="4" y="11"/>
+                    <a:pt x="4" y="20"/>
+                  </a:cubicBezTo>
+                  <a:cubicBezTo>
+                    <a:pt x="4" y="29"/>
+                    <a:pt x="11" y="36"/>
+                    <a:pt x="20" y="36"/>
+                  </a:cubicBezTo>
+                  <a:cubicBezTo>
+                    <a:pt x="29" y="36"/>
+                    <a:pt x="36" y="29"/>
+                    <a:pt x="36" y="20"/>
+                  </a:cubicBezTo>
+                  <a:cubicBezTo>
+                    <a:pt x="36" y="11"/>
+                    <a:pt x="29" y="4"/>
+                    <a:pt x="20" y="4"/>
+                  </a:cubicBezTo>
+                  <a:close/>
+                </a:path>
+              </a:pathLst>
+            </a:custGeom>
+            <a:grpFill/>
+            <a:ln>
+              <a:noFill/>
+            </a:ln>
+            <a:extLst>
+              <a:ext uri="{91240B29-F687-4f45-9708-019B960494DF}">
+                <a14:hiddenLine xmlns:a14="http://schemas.microsoft.com/office/drawing/2010/main" xmlns:p14="http://schemas.microsoft.com/office/powerpoint/2010/main" xmlns:a16="http://schemas.microsoft.com/office/drawing/2014/main" xmlns="" w="9525">
+                  <a:solidFill>
+                    <a:srgbClr val="000000"/>
+                  </a:solidFill>
+                  <a:round/>
+                  <a:headEnd/>
+                  <a:tailEnd/>
+                </a14:hiddenLine>
+              </a:ext>
+            </a:extLst>
+          </p:spPr>
+        </p:sp>
+        <p:sp>
+          <p:nvSpPr>
+            <p:cNvPr id="22" name="Freeform 14">
+              <a:extLst>
+                <a:ext uri="{FF2B5EF4-FFF2-40B4-BE49-F238E27FC236}">
+                  <a16:creationId xmlns:a16="http://schemas.microsoft.com/office/drawing/2014/main" id="{EBC3A004-9794-4EFA-83F0-989248797CD9}"/>
+                </a:ext>
+                <a:ext uri="{C183D7F6-B498-43B3-948B-1728B52AA6E4}">
+                  <adec:decorative xmlns:adec="http://schemas.microsoft.com/office/drawing/2017/decorative" val="1"/>
+                </a:ext>
+              </a:extLst>
+            </p:cNvPr>
+            <p:cNvSpPr/>
+            <p:nvPr>
+              <p:extLst>
+                <p:ext uri="{386F3935-93C4-4BCD-93E2-E3B085C9AB24}">
+                  <p16:designElem xmlns:p16="http://schemas.microsoft.com/office/powerpoint/2015/main" val="1"/>
+                </p:ext>
+              </p:extLst>
+            </p:nvPr>
+          </p:nvSpPr>
+          <p:spPr bwMode="auto">
+            <a:xfrm>
+              <a:off x="641350" y="0"/>
+              <a:ext cx="422275" cy="527050"/>
+            </a:xfrm>
+            <a:custGeom>
+              <a:avLst/>
+              <a:gdLst/>
+              <a:ahLst/>
+              <a:cxnLst/>
+              <a:rect l="0" t="0" r="r" b="b"/>
+              <a:pathLst>
+                <a:path w="266" h="332">
+                  <a:moveTo>
+                    <a:pt x="257" y="332"/>
+                  </a:moveTo>
+                  <a:lnTo>
+                    <a:pt x="48" y="123"/>
+                  </a:lnTo>
+                  <a:lnTo>
+                    <a:pt x="0" y="6"/>
+                  </a:lnTo>
+                  <a:lnTo>
+                    <a:pt x="15" y="0"/>
+                  </a:lnTo>
+                  <a:lnTo>
+                    <a:pt x="63" y="114"/>
+                  </a:lnTo>
+                  <a:lnTo>
+                    <a:pt x="266" y="320"/>
+                  </a:lnTo>
+                  <a:lnTo>
+                    <a:pt x="257" y="332"/>
+                  </a:lnTo>
+                  <a:close/>
+                </a:path>
+              </a:pathLst>
+            </a:custGeom>
+            <a:grpFill/>
+            <a:ln>
+              <a:noFill/>
+            </a:ln>
+            <a:extLst>
+              <a:ext uri="{91240B29-F687-4f45-9708-019B960494DF}">
+                <a14:hiddenLine xmlns:a14="http://schemas.microsoft.com/office/drawing/2010/main" xmlns:p14="http://schemas.microsoft.com/office/powerpoint/2010/main" xmlns:a16="http://schemas.microsoft.com/office/drawing/2014/main" xmlns="" w="9525">
+                  <a:solidFill>
+                    <a:srgbClr val="000000"/>
+                  </a:solidFill>
+                  <a:round/>
+                  <a:headEnd/>
+                  <a:tailEnd/>
+                </a14:hiddenLine>
+              </a:ext>
+            </a:extLst>
+          </p:spPr>
+        </p:sp>
+        <p:sp>
+          <p:nvSpPr>
+            <p:cNvPr id="23" name="Freeform 15">
+              <a:extLst>
+                <a:ext uri="{FF2B5EF4-FFF2-40B4-BE49-F238E27FC236}">
+                  <a16:creationId xmlns:a16="http://schemas.microsoft.com/office/drawing/2014/main" id="{6EFD9FC3-E11A-44E3-BCAC-A07F3C601F22}"/>
+                </a:ext>
+                <a:ext uri="{C183D7F6-B498-43B3-948B-1728B52AA6E4}">
+                  <adec:decorative xmlns:adec="http://schemas.microsoft.com/office/drawing/2017/decorative" val="1"/>
+                </a:ext>
+              </a:extLst>
+            </p:cNvPr>
+            <p:cNvSpPr>
+              <a:spLocks noEditPoints="1"/>
+            </p:cNvSpPr>
+            <p:nvPr>
+              <p:extLst>
+                <p:ext uri="{386F3935-93C4-4BCD-93E2-E3B085C9AB24}">
+                  <p16:designElem xmlns:p16="http://schemas.microsoft.com/office/powerpoint/2015/main" val="1"/>
+                </p:ext>
+              </p:extLst>
+            </p:nvPr>
+          </p:nvSpPr>
+          <p:spPr bwMode="auto">
+            <a:xfrm>
+              <a:off x="1020762" y="488950"/>
+              <a:ext cx="161925" cy="147638"/>
+            </a:xfrm>
+            <a:custGeom>
+              <a:avLst/>
+              <a:gdLst/>
+              <a:ahLst/>
+              <a:cxnLst/>
+              <a:rect l="0" t="0" r="r" b="b"/>
+              <a:pathLst>
+                <a:path w="34" h="31">
+                  <a:moveTo>
+                    <a:pt x="17" y="31"/>
+                  </a:moveTo>
+                  <a:cubicBezTo>
+                    <a:pt x="13" y="31"/>
+                    <a:pt x="9" y="30"/>
+                    <a:pt x="6" y="27"/>
+                  </a:cubicBezTo>
+                  <a:cubicBezTo>
+                    <a:pt x="0" y="20"/>
+                    <a:pt x="0" y="10"/>
+                    <a:pt x="6" y="4"/>
+                  </a:cubicBezTo>
+                  <a:cubicBezTo>
+                    <a:pt x="9" y="1"/>
+                    <a:pt x="13" y="0"/>
+                    <a:pt x="17" y="0"/>
+                  </a:cubicBezTo>
+                  <a:cubicBezTo>
+                    <a:pt x="21" y="0"/>
+                    <a:pt x="25" y="1"/>
+                    <a:pt x="28" y="4"/>
+                  </a:cubicBezTo>
+                  <a:cubicBezTo>
+                    <a:pt x="34" y="10"/>
+                    <a:pt x="34" y="20"/>
+                    <a:pt x="28" y="27"/>
+                  </a:cubicBezTo>
+                  <a:cubicBezTo>
+                    <a:pt x="25" y="30"/>
+                    <a:pt x="21" y="31"/>
+                    <a:pt x="17" y="31"/>
+                  </a:cubicBezTo>
+                  <a:close/>
+                  <a:moveTo>
+                    <a:pt x="17" y="4"/>
+                  </a:moveTo>
+                  <a:cubicBezTo>
+                    <a:pt x="14" y="4"/>
+                    <a:pt x="11" y="5"/>
+                    <a:pt x="9" y="7"/>
+                  </a:cubicBezTo>
+                  <a:cubicBezTo>
+                    <a:pt x="4" y="12"/>
+                    <a:pt x="4" y="19"/>
+                    <a:pt x="9" y="24"/>
+                  </a:cubicBezTo>
+                  <a:cubicBezTo>
+                    <a:pt x="11" y="26"/>
+                    <a:pt x="14" y="27"/>
+                    <a:pt x="17" y="27"/>
+                  </a:cubicBezTo>
+                  <a:cubicBezTo>
+                    <a:pt x="20" y="27"/>
+                    <a:pt x="23" y="26"/>
+                    <a:pt x="25" y="24"/>
+                  </a:cubicBezTo>
+                  <a:cubicBezTo>
+                    <a:pt x="30" y="19"/>
+                    <a:pt x="30" y="12"/>
+                    <a:pt x="25" y="7"/>
+                  </a:cubicBezTo>
+                  <a:cubicBezTo>
+                    <a:pt x="23" y="5"/>
+                    <a:pt x="20" y="4"/>
+                    <a:pt x="17" y="4"/>
+                  </a:cubicBezTo>
+                  <a:close/>
+                </a:path>
+              </a:pathLst>
+            </a:custGeom>
+            <a:grpFill/>
+            <a:ln>
+              <a:noFill/>
+            </a:ln>
+            <a:extLst>
+              <a:ext uri="{91240B29-F687-4f45-9708-019B960494DF}">
+                <a14:hiddenLine xmlns:a14="http://schemas.microsoft.com/office/drawing/2010/main" xmlns:p14="http://schemas.microsoft.com/office/powerpoint/2010/main" xmlns:a16="http://schemas.microsoft.com/office/drawing/2014/main" xmlns="" w="9525">
+                  <a:solidFill>
+                    <a:srgbClr val="000000"/>
+                  </a:solidFill>
+                  <a:round/>
+                  <a:headEnd/>
+                  <a:tailEnd/>
+                </a14:hiddenLine>
+              </a:ext>
+            </a:extLst>
+          </p:spPr>
+        </p:sp>
+        <p:sp>
+          <p:nvSpPr>
+            <p:cNvPr id="24" name="Line 16">
+              <a:extLst>
+                <a:ext uri="{FF2B5EF4-FFF2-40B4-BE49-F238E27FC236}">
+                  <a16:creationId xmlns:a16="http://schemas.microsoft.com/office/drawing/2014/main" id="{AB6AB6F7-6592-4028-B349-1C0E53A29CDC}"/>
+                </a:ext>
+                <a:ext uri="{C183D7F6-B498-43B3-948B-1728B52AA6E4}">
+                  <adec:decorative xmlns:adec="http://schemas.microsoft.com/office/drawing/2017/decorative" val="1"/>
+                </a:ext>
+              </a:extLst>
+            </p:cNvPr>
+            <p:cNvSpPr>
+              <a:spLocks noChangeShapeType="1"/>
+            </p:cNvSpPr>
+            <p:nvPr>
+              <p:extLst>
+                <p:ext uri="{386F3935-93C4-4BCD-93E2-E3B085C9AB24}">
+                  <p16:designElem xmlns:p16="http://schemas.microsoft.com/office/powerpoint/2015/main" val="1"/>
+                </p:ext>
+              </p:extLst>
+            </p:nvPr>
+          </p:nvSpPr>
+          <p:spPr bwMode="auto">
+            <a:xfrm>
+              <a:off x="-4763" y="9525"/>
+              <a:ext cx="0" cy="0"/>
+            </a:xfrm>
+            <a:prstGeom prst="line">
+              <a:avLst/>
+            </a:prstGeom>
+            <a:grpFill/>
+            <a:ln w="15" cap="flat">
+              <a:solidFill>
+                <a:srgbClr val="FFFFFF"/>
+              </a:solidFill>
+              <a:prstDash val="solid"/>
+              <a:miter lim="800000"/>
+              <a:headEnd/>
+              <a:tailEnd/>
+            </a:ln>
+          </p:spPr>
+        </p:sp>
+        <p:sp>
+          <p:nvSpPr>
+            <p:cNvPr id="25" name="Freeform 17">
+              <a:extLst>
+                <a:ext uri="{FF2B5EF4-FFF2-40B4-BE49-F238E27FC236}">
+                  <a16:creationId xmlns:a16="http://schemas.microsoft.com/office/drawing/2014/main" id="{6C2415E6-F914-4C11-B48B-4910AA6CA6BD}"/>
+                </a:ext>
+                <a:ext uri="{C183D7F6-B498-43B3-948B-1728B52AA6E4}">
+                  <adec:decorative xmlns:adec="http://schemas.microsoft.com/office/drawing/2017/decorative" val="1"/>
+                </a:ext>
+              </a:extLst>
+            </p:cNvPr>
+            <p:cNvSpPr/>
+            <p:nvPr>
+              <p:extLst>
+                <p:ext uri="{386F3935-93C4-4BCD-93E2-E3B085C9AB24}">
+                  <p16:designElem xmlns:p16="http://schemas.microsoft.com/office/powerpoint/2015/main" val="1"/>
+                </p:ext>
+              </p:extLst>
+            </p:nvPr>
+          </p:nvSpPr>
+          <p:spPr bwMode="auto">
+            <a:xfrm>
+              <a:off x="9525" y="1801813"/>
+              <a:ext cx="123825" cy="127000"/>
+            </a:xfrm>
+            <a:custGeom>
+              <a:avLst/>
+              <a:gdLst/>
+              <a:ahLst/>
+              <a:cxnLst/>
+              <a:rect l="0" t="0" r="r" b="b"/>
+              <a:pathLst>
+                <a:path w="78" h="80">
+                  <a:moveTo>
+                    <a:pt x="6" y="80"/>
+                  </a:moveTo>
+                  <a:lnTo>
+                    <a:pt x="0" y="71"/>
+                  </a:lnTo>
+                  <a:lnTo>
+                    <a:pt x="69" y="0"/>
+                  </a:lnTo>
+                  <a:lnTo>
+                    <a:pt x="78" y="9"/>
+                  </a:lnTo>
+                  <a:lnTo>
+                    <a:pt x="6" y="80"/>
+                  </a:lnTo>
+                  <a:close/>
+                </a:path>
+              </a:pathLst>
+            </a:custGeom>
+            <a:grpFill/>
+            <a:ln>
+              <a:noFill/>
+            </a:ln>
+            <a:extLst>
+              <a:ext uri="{91240B29-F687-4f45-9708-019B960494DF}">
+                <a14:hiddenLine xmlns:a14="http://schemas.microsoft.com/office/drawing/2010/main" xmlns:p14="http://schemas.microsoft.com/office/powerpoint/2010/main" xmlns:a16="http://schemas.microsoft.com/office/drawing/2014/main" xmlns="" w="9525">
+                  <a:solidFill>
+                    <a:srgbClr val="000000"/>
+                  </a:solidFill>
+                  <a:round/>
+                  <a:headEnd/>
+                  <a:tailEnd/>
+                </a14:hiddenLine>
+              </a:ext>
+            </a:extLst>
+          </p:spPr>
+        </p:sp>
+        <p:sp>
+          <p:nvSpPr>
+            <p:cNvPr id="26" name="Freeform 18">
+              <a:extLst>
+                <a:ext uri="{FF2B5EF4-FFF2-40B4-BE49-F238E27FC236}">
+                  <a16:creationId xmlns:a16="http://schemas.microsoft.com/office/drawing/2014/main" id="{2412013C-072A-489E-851A-CFEF91A9A6A9}"/>
+                </a:ext>
+                <a:ext uri="{C183D7F6-B498-43B3-948B-1728B52AA6E4}">
+                  <adec:decorative xmlns:adec="http://schemas.microsoft.com/office/drawing/2017/decorative" val="1"/>
+                </a:ext>
+              </a:extLst>
+            </p:cNvPr>
+            <p:cNvSpPr/>
+            <p:nvPr>
+              <p:extLst>
+                <p:ext uri="{386F3935-93C4-4BCD-93E2-E3B085C9AB24}">
+                  <p16:designElem xmlns:p16="http://schemas.microsoft.com/office/powerpoint/2015/main" val="1"/>
+                </p:ext>
+              </p:extLst>
+            </p:nvPr>
+          </p:nvSpPr>
+          <p:spPr bwMode="auto">
+            <a:xfrm>
+              <a:off x="-9525" y="3549650"/>
+              <a:ext cx="147638" cy="481013"/>
+            </a:xfrm>
+            <a:custGeom>
+              <a:avLst/>
+              <a:gdLst/>
+              <a:ahLst/>
+              <a:cxnLst/>
+              <a:rect l="0" t="0" r="r" b="b"/>
+              <a:pathLst>
+                <a:path w="93" h="303">
+                  <a:moveTo>
+                    <a:pt x="93" y="303"/>
+                  </a:moveTo>
+                  <a:lnTo>
+                    <a:pt x="78" y="303"/>
+                  </a:lnTo>
+                  <a:lnTo>
+                    <a:pt x="78" y="78"/>
+                  </a:lnTo>
+                  <a:lnTo>
+                    <a:pt x="0" y="12"/>
+                  </a:lnTo>
+                  <a:lnTo>
+                    <a:pt x="12" y="0"/>
+                  </a:lnTo>
+                  <a:lnTo>
+                    <a:pt x="93" y="69"/>
+                  </a:lnTo>
+                  <a:lnTo>
+                    <a:pt x="93" y="303"/>
+                  </a:lnTo>
+                  <a:close/>
+                </a:path>
+              </a:pathLst>
+            </a:custGeom>
+            <a:grpFill/>
+            <a:ln>
+              <a:noFill/>
+            </a:ln>
+            <a:extLst>
+              <a:ext uri="{91240B29-F687-4f45-9708-019B960494DF}">
+                <a14:hiddenLine xmlns:a14="http://schemas.microsoft.com/office/drawing/2010/main" xmlns:p14="http://schemas.microsoft.com/office/powerpoint/2010/main" xmlns:a16="http://schemas.microsoft.com/office/drawing/2014/main" xmlns="" w="9525">
+                  <a:solidFill>
+                    <a:srgbClr val="000000"/>
+                  </a:solidFill>
+                  <a:round/>
+                  <a:headEnd/>
+                  <a:tailEnd/>
+                </a14:hiddenLine>
+              </a:ext>
+            </a:extLst>
+          </p:spPr>
+        </p:sp>
+        <p:sp>
+          <p:nvSpPr>
+            <p:cNvPr id="27" name="Freeform 19">
+              <a:extLst>
+                <a:ext uri="{FF2B5EF4-FFF2-40B4-BE49-F238E27FC236}">
+                  <a16:creationId xmlns:a16="http://schemas.microsoft.com/office/drawing/2014/main" id="{DE93DF9F-296F-4DE4-8813-D8C04DE4CFC5}"/>
+                </a:ext>
+                <a:ext uri="{C183D7F6-B498-43B3-948B-1728B52AA6E4}">
+                  <adec:decorative xmlns:adec="http://schemas.microsoft.com/office/drawing/2017/decorative" val="1"/>
+                </a:ext>
+              </a:extLst>
+            </p:cNvPr>
+            <p:cNvSpPr/>
+            <p:nvPr>
+              <p:extLst>
+                <p:ext uri="{386F3935-93C4-4BCD-93E2-E3B085C9AB24}">
+                  <p16:designElem xmlns:p16="http://schemas.microsoft.com/office/powerpoint/2015/main" val="1"/>
+                </p:ext>
+              </p:extLst>
+            </p:nvPr>
+          </p:nvSpPr>
+          <p:spPr bwMode="auto">
+            <a:xfrm>
+              <a:off x="128587" y="1382713"/>
+              <a:ext cx="142875" cy="476250"/>
+            </a:xfrm>
+            <a:custGeom>
+              <a:avLst/>
+              <a:gdLst/>
+              <a:ahLst/>
+              <a:cxnLst/>
+              <a:rect l="0" t="0" r="r" b="b"/>
+              <a:pathLst>
+                <a:path w="90" h="300">
+                  <a:moveTo>
+                    <a:pt x="90" y="300"/>
+                  </a:moveTo>
+                  <a:lnTo>
+                    <a:pt x="78" y="300"/>
+                  </a:lnTo>
+                  <a:lnTo>
+                    <a:pt x="78" y="84"/>
+                  </a:lnTo>
+                  <a:lnTo>
+                    <a:pt x="0" y="9"/>
+                  </a:lnTo>
+                  <a:lnTo>
+                    <a:pt x="9" y="0"/>
+                  </a:lnTo>
+                  <a:lnTo>
+                    <a:pt x="90" y="81"/>
+                  </a:lnTo>
+                  <a:lnTo>
+                    <a:pt x="90" y="300"/>
+                  </a:lnTo>
+                  <a:close/>
+                </a:path>
+              </a:pathLst>
+            </a:custGeom>
+            <a:grpFill/>
+            <a:ln>
+              <a:noFill/>
+            </a:ln>
+            <a:extLst>
+              <a:ext uri="{91240B29-F687-4f45-9708-019B960494DF}">
+                <a14:hiddenLine xmlns:a14="http://schemas.microsoft.com/office/drawing/2010/main" xmlns:p14="http://schemas.microsoft.com/office/powerpoint/2010/main" xmlns:a16="http://schemas.microsoft.com/office/drawing/2014/main" xmlns="" w="9525">
+                  <a:solidFill>
+                    <a:srgbClr val="000000"/>
+                  </a:solidFill>
+                  <a:round/>
+                  <a:headEnd/>
+                  <a:tailEnd/>
+                </a14:hiddenLine>
+              </a:ext>
+            </a:extLst>
+          </p:spPr>
+        </p:sp>
+        <p:sp>
+          <p:nvSpPr>
+            <p:cNvPr id="28" name="Freeform 20">
+              <a:extLst>
+                <a:ext uri="{FF2B5EF4-FFF2-40B4-BE49-F238E27FC236}">
+                  <a16:creationId xmlns:a16="http://schemas.microsoft.com/office/drawing/2014/main" id="{F440D966-5030-460C-9916-BF9B91542185}"/>
+                </a:ext>
+                <a:ext uri="{C183D7F6-B498-43B3-948B-1728B52AA6E4}">
+                  <adec:decorative xmlns:adec="http://schemas.microsoft.com/office/drawing/2017/decorative" val="1"/>
+                </a:ext>
+              </a:extLst>
+            </p:cNvPr>
+            <p:cNvSpPr>
+              <a:spLocks noEditPoints="1"/>
+            </p:cNvSpPr>
+            <p:nvPr>
+              <p:extLst>
+                <p:ext uri="{386F3935-93C4-4BCD-93E2-E3B085C9AB24}">
+                  <p16:designElem xmlns:p16="http://schemas.microsoft.com/office/powerpoint/2015/main" val="1"/>
+                </p:ext>
+              </p:extLst>
+            </p:nvPr>
+          </p:nvSpPr>
+          <p:spPr bwMode="auto">
+            <a:xfrm>
+              <a:off x="204787" y="1849438"/>
+              <a:ext cx="114300" cy="107950"/>
+            </a:xfrm>
+            <a:custGeom>
+              <a:avLst/>
+              <a:gdLst/>
+              <a:ahLst/>
+              <a:cxnLst/>
+              <a:rect l="0" t="0" r="r" b="b"/>
+              <a:pathLst>
+                <a:path w="24" h="23">
+                  <a:moveTo>
+                    <a:pt x="12" y="23"/>
+                  </a:moveTo>
+                  <a:cubicBezTo>
+                    <a:pt x="6" y="23"/>
+                    <a:pt x="0" y="18"/>
+                    <a:pt x="0" y="12"/>
+                  </a:cubicBezTo>
+                  <a:cubicBezTo>
+                    <a:pt x="0" y="5"/>
+                    <a:pt x="6" y="0"/>
+                    <a:pt x="12" y="0"/>
+                  </a:cubicBezTo>
+                  <a:cubicBezTo>
+                    <a:pt x="18" y="0"/>
+                    <a:pt x="24" y="5"/>
+                    <a:pt x="24" y="12"/>
+                  </a:cubicBezTo>
+                  <a:cubicBezTo>
+                    <a:pt x="24" y="18"/>
+                    <a:pt x="18" y="23"/>
+                    <a:pt x="12" y="23"/>
+                  </a:cubicBezTo>
+                  <a:close/>
+                  <a:moveTo>
+                    <a:pt x="12" y="4"/>
+                  </a:moveTo>
+                  <a:cubicBezTo>
+                    <a:pt x="8" y="4"/>
+                    <a:pt x="4" y="8"/>
+                    <a:pt x="4" y="12"/>
+                  </a:cubicBezTo>
+                  <a:cubicBezTo>
+                    <a:pt x="4" y="16"/>
+                    <a:pt x="8" y="19"/>
+                    <a:pt x="12" y="19"/>
+                  </a:cubicBezTo>
+                  <a:cubicBezTo>
+                    <a:pt x="16" y="19"/>
+                    <a:pt x="20" y="16"/>
+                    <a:pt x="20" y="12"/>
+                  </a:cubicBezTo>
+                  <a:cubicBezTo>
+                    <a:pt x="20" y="8"/>
+                    <a:pt x="16" y="4"/>
+                    <a:pt x="12" y="4"/>
+                  </a:cubicBezTo>
+                  <a:close/>
+                </a:path>
+              </a:pathLst>
+            </a:custGeom>
+            <a:grpFill/>
+            <a:ln>
+              <a:noFill/>
+            </a:ln>
+            <a:extLst>
+              <a:ext uri="{91240B29-F687-4f45-9708-019B960494DF}">
+                <a14:hiddenLine xmlns:a14="http://schemas.microsoft.com/office/drawing/2010/main" xmlns:p14="http://schemas.microsoft.com/office/powerpoint/2010/main" xmlns:a16="http://schemas.microsoft.com/office/drawing/2014/main" xmlns="" w="9525">
+                  <a:solidFill>
+                    <a:srgbClr val="000000"/>
+                  </a:solidFill>
+                  <a:round/>
+                  <a:headEnd/>
+                  <a:tailEnd/>
+                </a14:hiddenLine>
+              </a:ext>
+            </a:extLst>
+          </p:spPr>
+        </p:sp>
+        <p:sp>
+          <p:nvSpPr>
+            <p:cNvPr id="29" name="Rectangle 21">
+              <a:extLst>
+                <a:ext uri="{FF2B5EF4-FFF2-40B4-BE49-F238E27FC236}">
+                  <a16:creationId xmlns:a16="http://schemas.microsoft.com/office/drawing/2014/main" id="{1EFE245D-BA05-4F4D-A6E8-40739F48E769}"/>
+                </a:ext>
+                <a:ext uri="{C183D7F6-B498-43B3-948B-1728B52AA6E4}">
+                  <adec:decorative xmlns:adec="http://schemas.microsoft.com/office/drawing/2017/decorative" val="1"/>
+                </a:ext>
+              </a:extLst>
+            </p:cNvPr>
+            <p:cNvSpPr>
+              <a:spLocks noChangeArrowheads="1"/>
+            </p:cNvSpPr>
+            <p:nvPr>
+              <p:extLst>
+                <p:ext uri="{386F3935-93C4-4BCD-93E2-E3B085C9AB24}">
+                  <p16:designElem xmlns:p16="http://schemas.microsoft.com/office/powerpoint/2015/main" val="1"/>
+                </p:ext>
+              </p:extLst>
+            </p:nvPr>
+          </p:nvSpPr>
+          <p:spPr bwMode="auto">
+            <a:xfrm>
+              <a:off x="133350" y="4662488"/>
+              <a:ext cx="23813" cy="2181225"/>
+            </a:xfrm>
+            <a:prstGeom prst="rect">
+              <a:avLst/>
+            </a:prstGeom>
+            <a:grpFill/>
+            <a:ln>
+              <a:noFill/>
+            </a:ln>
+            <a:extLst>
+              <a:ext uri="{91240B29-F687-4f45-9708-019B960494DF}">
+                <a14:hiddenLine xmlns:a14="http://schemas.microsoft.com/office/drawing/2010/main" xmlns:p14="http://schemas.microsoft.com/office/powerpoint/2010/main" xmlns:a16="http://schemas.microsoft.com/office/drawing/2014/main" xmlns="" w="9525">
+                  <a:solidFill>
+                    <a:srgbClr val="000000"/>
+                  </a:solidFill>
+                  <a:miter lim="800000"/>
+                  <a:headEnd/>
+                  <a:tailEnd/>
+                </a14:hiddenLine>
+              </a:ext>
+            </a:extLst>
+          </p:spPr>
+        </p:sp>
+        <p:sp>
+          <p:nvSpPr>
+            <p:cNvPr id="30" name="Freeform 22">
+              <a:extLst>
+                <a:ext uri="{FF2B5EF4-FFF2-40B4-BE49-F238E27FC236}">
+                  <a16:creationId xmlns:a16="http://schemas.microsoft.com/office/drawing/2014/main" id="{ED67811C-F735-441C-98A6-2517EC099AFD}"/>
+                </a:ext>
+                <a:ext uri="{C183D7F6-B498-43B3-948B-1728B52AA6E4}">
+                  <adec:decorative xmlns:adec="http://schemas.microsoft.com/office/drawing/2017/decorative" val="1"/>
+                </a:ext>
+              </a:extLst>
+            </p:cNvPr>
+            <p:cNvSpPr/>
+            <p:nvPr>
+              <p:extLst>
+                <p:ext uri="{386F3935-93C4-4BCD-93E2-E3B085C9AB24}">
+                  <p16:designElem xmlns:p16="http://schemas.microsoft.com/office/powerpoint/2015/main" val="1"/>
+                </p:ext>
+              </p:extLst>
+            </p:nvPr>
+          </p:nvSpPr>
+          <p:spPr bwMode="auto">
+            <a:xfrm>
+              <a:off x="223837" y="5041900"/>
+              <a:ext cx="369888" cy="1801813"/>
+            </a:xfrm>
+            <a:custGeom>
+              <a:avLst/>
+              <a:gdLst/>
+              <a:ahLst/>
+              <a:cxnLst/>
+              <a:rect l="0" t="0" r="r" b="b"/>
+              <a:pathLst>
+                <a:path w="233" h="1135">
+                  <a:moveTo>
+                    <a:pt x="15" y="1135"/>
+                  </a:moveTo>
+                  <a:lnTo>
+                    <a:pt x="0" y="1135"/>
+                  </a:lnTo>
+                  <a:lnTo>
+                    <a:pt x="0" y="515"/>
+                  </a:lnTo>
+                  <a:lnTo>
+                    <a:pt x="0" y="512"/>
+                  </a:lnTo>
+                  <a:lnTo>
+                    <a:pt x="218" y="0"/>
+                  </a:lnTo>
+                  <a:lnTo>
+                    <a:pt x="233" y="6"/>
+                  </a:lnTo>
+                  <a:lnTo>
+                    <a:pt x="15" y="518"/>
+                  </a:lnTo>
+                  <a:lnTo>
+                    <a:pt x="15" y="1135"/>
+                  </a:lnTo>
+                  <a:close/>
+                </a:path>
+              </a:pathLst>
+            </a:custGeom>
+            <a:grpFill/>
+            <a:ln>
+              <a:noFill/>
+            </a:ln>
+            <a:extLst>
+              <a:ext uri="{91240B29-F687-4f45-9708-019B960494DF}">
+                <a14:hiddenLine xmlns:a14="http://schemas.microsoft.com/office/drawing/2010/main" xmlns:p14="http://schemas.microsoft.com/office/powerpoint/2010/main" xmlns:a16="http://schemas.microsoft.com/office/drawing/2014/main" xmlns="" w="9525">
+                  <a:solidFill>
+                    <a:srgbClr val="000000"/>
+                  </a:solidFill>
+                  <a:round/>
+                  <a:headEnd/>
+                  <a:tailEnd/>
+                </a14:hiddenLine>
+              </a:ext>
+            </a:extLst>
+          </p:spPr>
+        </p:sp>
+        <p:sp>
+          <p:nvSpPr>
+            <p:cNvPr id="31" name="Freeform 23">
+              <a:extLst>
+                <a:ext uri="{FF2B5EF4-FFF2-40B4-BE49-F238E27FC236}">
+                  <a16:creationId xmlns:a16="http://schemas.microsoft.com/office/drawing/2014/main" id="{3070FC44-32F9-470F-A131-868F3F1DB72F}"/>
+                </a:ext>
+                <a:ext uri="{C183D7F6-B498-43B3-948B-1728B52AA6E4}">
+                  <adec:decorative xmlns:adec="http://schemas.microsoft.com/office/drawing/2017/decorative" val="1"/>
+                </a:ext>
+              </a:extLst>
+            </p:cNvPr>
+            <p:cNvSpPr>
+              <a:spLocks noEditPoints="1"/>
+            </p:cNvSpPr>
+            <p:nvPr>
+              <p:extLst>
+                <p:ext uri="{386F3935-93C4-4BCD-93E2-E3B085C9AB24}">
+                  <p16:designElem xmlns:p16="http://schemas.microsoft.com/office/powerpoint/2015/main" val="1"/>
+                </p:ext>
+              </p:extLst>
+            </p:nvPr>
+          </p:nvSpPr>
+          <p:spPr bwMode="auto">
+            <a:xfrm>
+              <a:off x="52387" y="4481513"/>
+              <a:ext cx="190500" cy="190500"/>
+            </a:xfrm>
+            <a:custGeom>
+              <a:avLst/>
+              <a:gdLst/>
+              <a:ahLst/>
+              <a:cxnLst/>
+              <a:rect l="0" t="0" r="r" b="b"/>
+              <a:pathLst>
+                <a:path w="40" h="40">
+                  <a:moveTo>
+                    <a:pt x="20" y="40"/>
+                  </a:moveTo>
+                  <a:cubicBezTo>
+                    <a:pt x="9" y="40"/>
+                    <a:pt x="0" y="31"/>
+                    <a:pt x="0" y="20"/>
+                  </a:cubicBezTo>
+                  <a:cubicBezTo>
+                    <a:pt x="0" y="9"/>
+                    <a:pt x="9" y="0"/>
+                    <a:pt x="20" y="0"/>
+                  </a:cubicBezTo>
+                  <a:cubicBezTo>
+                    <a:pt x="31" y="0"/>
+                    <a:pt x="40" y="9"/>
+                    <a:pt x="40" y="20"/>
+                  </a:cubicBezTo>
+                  <a:cubicBezTo>
+                    <a:pt x="40" y="31"/>
+                    <a:pt x="31" y="40"/>
+                    <a:pt x="20" y="40"/>
+                  </a:cubicBezTo>
+                  <a:close/>
+                  <a:moveTo>
+                    <a:pt x="20" y="4"/>
+                  </a:moveTo>
+                  <a:cubicBezTo>
+                    <a:pt x="11" y="4"/>
+                    <a:pt x="4" y="11"/>
+                    <a:pt x="4" y="20"/>
+                  </a:cubicBezTo>
+                  <a:cubicBezTo>
+                    <a:pt x="4" y="29"/>
+                    <a:pt x="11" y="36"/>
+                    <a:pt x="20" y="36"/>
+                  </a:cubicBezTo>
+                  <a:cubicBezTo>
+                    <a:pt x="28" y="36"/>
+                    <a:pt x="36" y="29"/>
+                    <a:pt x="36" y="20"/>
+                  </a:cubicBezTo>
+                  <a:cubicBezTo>
+                    <a:pt x="36" y="11"/>
+                    <a:pt x="28" y="4"/>
+                    <a:pt x="20" y="4"/>
+                  </a:cubicBezTo>
+                  <a:close/>
+                </a:path>
+              </a:pathLst>
+            </a:custGeom>
+            <a:grpFill/>
+            <a:ln>
+              <a:noFill/>
+            </a:ln>
+            <a:extLst>
+              <a:ext uri="{91240B29-F687-4f45-9708-019B960494DF}">
+                <a14:hiddenLine xmlns:a14="http://schemas.microsoft.com/office/drawing/2010/main" xmlns:p14="http://schemas.microsoft.com/office/powerpoint/2010/main" xmlns:a16="http://schemas.microsoft.com/office/drawing/2014/main" xmlns="" w="9525">
+                  <a:solidFill>
+                    <a:srgbClr val="000000"/>
+                  </a:solidFill>
+                  <a:round/>
+                  <a:headEnd/>
+                  <a:tailEnd/>
+                </a14:hiddenLine>
+              </a:ext>
+            </a:extLst>
+          </p:spPr>
+        </p:sp>
+        <p:sp>
+          <p:nvSpPr>
+            <p:cNvPr id="32" name="Freeform 24">
+              <a:extLst>
+                <a:ext uri="{FF2B5EF4-FFF2-40B4-BE49-F238E27FC236}">
+                  <a16:creationId xmlns:a16="http://schemas.microsoft.com/office/drawing/2014/main" id="{95FB52C7-C779-4E3F-978C-4595FEF868F5}"/>
+                </a:ext>
+                <a:ext uri="{C183D7F6-B498-43B3-948B-1728B52AA6E4}">
+                  <adec:decorative xmlns:adec="http://schemas.microsoft.com/office/drawing/2017/decorative" val="1"/>
+                </a:ext>
+              </a:extLst>
+            </p:cNvPr>
+            <p:cNvSpPr/>
+            <p:nvPr>
+              <p:extLst>
+                <p:ext uri="{386F3935-93C4-4BCD-93E2-E3B085C9AB24}">
+                  <p16:designElem xmlns:p16="http://schemas.microsoft.com/office/powerpoint/2015/main" val="1"/>
+                </p:ext>
+              </p:extLst>
+            </p:nvPr>
+          </p:nvSpPr>
+          <p:spPr bwMode="auto">
+            <a:xfrm>
+              <a:off x="-14288" y="5627688"/>
+              <a:ext cx="85725" cy="1216025"/>
+            </a:xfrm>
+            <a:custGeom>
+              <a:avLst/>
+              <a:gdLst/>
+              <a:ahLst/>
+              <a:cxnLst/>
+              <a:rect l="0" t="0" r="r" b="b"/>
+              <a:pathLst>
+                <a:path w="54" h="766">
+                  <a:moveTo>
+                    <a:pt x="54" y="766"/>
+                  </a:moveTo>
+                  <a:lnTo>
+                    <a:pt x="36" y="766"/>
+                  </a:lnTo>
+                  <a:lnTo>
+                    <a:pt x="36" y="149"/>
+                  </a:lnTo>
+                  <a:lnTo>
+                    <a:pt x="0" y="3"/>
+                  </a:lnTo>
+                  <a:lnTo>
+                    <a:pt x="18" y="0"/>
+                  </a:lnTo>
+                  <a:lnTo>
+                    <a:pt x="54" y="146"/>
+                  </a:lnTo>
+                  <a:lnTo>
+                    <a:pt x="54" y="766"/>
+                  </a:lnTo>
+                  <a:close/>
+                </a:path>
+              </a:pathLst>
+            </a:custGeom>
+            <a:grpFill/>
+            <a:ln>
+              <a:noFill/>
+            </a:ln>
+            <a:extLst>
+              <a:ext uri="{91240B29-F687-4f45-9708-019B960494DF}">
+                <a14:hiddenLine xmlns:a14="http://schemas.microsoft.com/office/drawing/2010/main" xmlns:p14="http://schemas.microsoft.com/office/powerpoint/2010/main" xmlns:a16="http://schemas.microsoft.com/office/drawing/2014/main" xmlns="" w="9525">
+                  <a:solidFill>
+                    <a:srgbClr val="000000"/>
+                  </a:solidFill>
+                  <a:round/>
+                  <a:headEnd/>
+                  <a:tailEnd/>
+                </a14:hiddenLine>
+              </a:ext>
+            </a:extLst>
+          </p:spPr>
+        </p:sp>
+        <p:sp>
+          <p:nvSpPr>
+            <p:cNvPr id="33" name="Freeform 25">
+              <a:extLst>
+                <a:ext uri="{FF2B5EF4-FFF2-40B4-BE49-F238E27FC236}">
+                  <a16:creationId xmlns:a16="http://schemas.microsoft.com/office/drawing/2014/main" id="{D4EB1759-62AC-4B24-9DC6-E4F8737E8984}"/>
+                </a:ext>
+                <a:ext uri="{C183D7F6-B498-43B3-948B-1728B52AA6E4}">
+                  <adec:decorative xmlns:adec="http://schemas.microsoft.com/office/drawing/2017/decorative" val="1"/>
+                </a:ext>
+              </a:extLst>
+            </p:cNvPr>
+            <p:cNvSpPr>
+              <a:spLocks noEditPoints="1"/>
+            </p:cNvSpPr>
+            <p:nvPr>
+              <p:extLst>
+                <p:ext uri="{386F3935-93C4-4BCD-93E2-E3B085C9AB24}">
+                  <p16:designElem xmlns:p16="http://schemas.microsoft.com/office/powerpoint/2015/main" val="1"/>
+                </p:ext>
+              </p:extLst>
+            </p:nvPr>
+          </p:nvSpPr>
+          <p:spPr bwMode="auto">
+            <a:xfrm>
+              <a:off x="527050" y="4867275"/>
+              <a:ext cx="190500" cy="188913"/>
+            </a:xfrm>
+            <a:custGeom>
+              <a:avLst/>
+              <a:gdLst/>
+              <a:ahLst/>
+              <a:cxnLst/>
+              <a:rect l="0" t="0" r="r" b="b"/>
+              <a:pathLst>
+                <a:path w="40" h="40">
+                  <a:moveTo>
+                    <a:pt x="20" y="40"/>
+                  </a:moveTo>
+                  <a:cubicBezTo>
+                    <a:pt x="9" y="40"/>
+                    <a:pt x="0" y="31"/>
+                    <a:pt x="0" y="20"/>
+                  </a:cubicBezTo>
+                  <a:cubicBezTo>
+                    <a:pt x="0" y="9"/>
+                    <a:pt x="9" y="0"/>
+                    <a:pt x="20" y="0"/>
+                  </a:cubicBezTo>
+                  <a:cubicBezTo>
+                    <a:pt x="31" y="0"/>
+                    <a:pt x="40" y="9"/>
+                    <a:pt x="40" y="20"/>
+                  </a:cubicBezTo>
+                  <a:cubicBezTo>
+                    <a:pt x="40" y="31"/>
+                    <a:pt x="31" y="40"/>
+                    <a:pt x="20" y="40"/>
+                  </a:cubicBezTo>
+                  <a:close/>
+                  <a:moveTo>
+                    <a:pt x="20" y="4"/>
+                  </a:moveTo>
+                  <a:cubicBezTo>
+                    <a:pt x="11" y="4"/>
+                    <a:pt x="4" y="11"/>
+                    <a:pt x="4" y="20"/>
+                  </a:cubicBezTo>
+                  <a:cubicBezTo>
+                    <a:pt x="4" y="29"/>
+                    <a:pt x="11" y="36"/>
+                    <a:pt x="20" y="36"/>
+                  </a:cubicBezTo>
+                  <a:cubicBezTo>
+                    <a:pt x="29" y="36"/>
+                    <a:pt x="36" y="29"/>
+                    <a:pt x="36" y="20"/>
+                  </a:cubicBezTo>
+                  <a:cubicBezTo>
+                    <a:pt x="36" y="11"/>
+                    <a:pt x="29" y="4"/>
+                    <a:pt x="20" y="4"/>
+                  </a:cubicBezTo>
+                  <a:close/>
+                </a:path>
+              </a:pathLst>
+            </a:custGeom>
+            <a:grpFill/>
+            <a:ln>
+              <a:noFill/>
+            </a:ln>
+            <a:extLst>
+              <a:ext uri="{91240B29-F687-4f45-9708-019B960494DF}">
+                <a14:hiddenLine xmlns:a14="http://schemas.microsoft.com/office/drawing/2010/main" xmlns:p14="http://schemas.microsoft.com/office/powerpoint/2010/main" xmlns:a16="http://schemas.microsoft.com/office/drawing/2014/main" xmlns="" w="9525">
+                  <a:solidFill>
+                    <a:srgbClr val="000000"/>
+                  </a:solidFill>
+                  <a:round/>
+                  <a:headEnd/>
+                  <a:tailEnd/>
+                </a14:hiddenLine>
+              </a:ext>
+            </a:extLst>
+          </p:spPr>
+        </p:sp>
+        <p:sp>
+          <p:nvSpPr>
+            <p:cNvPr id="34" name="Freeform 26">
+              <a:extLst>
+                <a:ext uri="{FF2B5EF4-FFF2-40B4-BE49-F238E27FC236}">
+                  <a16:creationId xmlns:a16="http://schemas.microsoft.com/office/drawing/2014/main" id="{7BF6FB39-864B-4F58-86E8-790E16FB3CD7}"/>
+                </a:ext>
+                <a:ext uri="{C183D7F6-B498-43B3-948B-1728B52AA6E4}">
+                  <adec:decorative xmlns:adec="http://schemas.microsoft.com/office/drawing/2017/decorative" val="1"/>
+                </a:ext>
+              </a:extLst>
+            </p:cNvPr>
+            <p:cNvSpPr/>
+            <p:nvPr>
+              <p:extLst>
+                <p:ext uri="{386F3935-93C4-4BCD-93E2-E3B085C9AB24}">
+                  <p16:designElem xmlns:p16="http://schemas.microsoft.com/office/powerpoint/2015/main" val="1"/>
+                </p:ext>
+              </p:extLst>
+            </p:nvPr>
+          </p:nvSpPr>
+          <p:spPr bwMode="auto">
+            <a:xfrm>
+              <a:off x="309562" y="5422900"/>
+              <a:ext cx="374650" cy="1425575"/>
+            </a:xfrm>
+            <a:custGeom>
+              <a:avLst/>
+              <a:gdLst/>
+              <a:ahLst/>
+              <a:cxnLst/>
+              <a:rect l="0" t="0" r="r" b="b"/>
+              <a:pathLst>
+                <a:path w="236" h="898">
+                  <a:moveTo>
+                    <a:pt x="18" y="898"/>
+                  </a:moveTo>
+                  <a:lnTo>
+                    <a:pt x="0" y="898"/>
+                  </a:lnTo>
+                  <a:lnTo>
+                    <a:pt x="0" y="515"/>
+                  </a:lnTo>
+                  <a:lnTo>
+                    <a:pt x="3" y="512"/>
+                  </a:lnTo>
+                  <a:lnTo>
+                    <a:pt x="221" y="0"/>
+                  </a:lnTo>
+                  <a:lnTo>
+                    <a:pt x="236" y="6"/>
+                  </a:lnTo>
+                  <a:lnTo>
+                    <a:pt x="18" y="518"/>
+                  </a:lnTo>
+                  <a:lnTo>
+                    <a:pt x="18" y="898"/>
+                  </a:lnTo>
+                  <a:close/>
+                </a:path>
+              </a:pathLst>
+            </a:custGeom>
+            <a:grpFill/>
+            <a:ln>
+              <a:noFill/>
+            </a:ln>
+            <a:extLst>
+              <a:ext uri="{91240B29-F687-4f45-9708-019B960494DF}">
+                <a14:hiddenLine xmlns:a14="http://schemas.microsoft.com/office/drawing/2010/main" xmlns:p14="http://schemas.microsoft.com/office/powerpoint/2010/main" xmlns:a16="http://schemas.microsoft.com/office/drawing/2014/main" xmlns="" w="9525">
+                  <a:solidFill>
+                    <a:srgbClr val="000000"/>
+                  </a:solidFill>
+                  <a:round/>
+                  <a:headEnd/>
+                  <a:tailEnd/>
+                </a14:hiddenLine>
+              </a:ext>
+            </a:extLst>
+          </p:spPr>
+        </p:sp>
+        <p:sp>
+          <p:nvSpPr>
+            <p:cNvPr id="35" name="Freeform 27">
+              <a:extLst>
+                <a:ext uri="{FF2B5EF4-FFF2-40B4-BE49-F238E27FC236}">
+                  <a16:creationId xmlns:a16="http://schemas.microsoft.com/office/drawing/2014/main" id="{5FE4FA46-B51C-43DA-87FC-2644ED117A01}"/>
+                </a:ext>
+                <a:ext uri="{C183D7F6-B498-43B3-948B-1728B52AA6E4}">
+                  <adec:decorative xmlns:adec="http://schemas.microsoft.com/office/drawing/2017/decorative" val="1"/>
+                </a:ext>
+              </a:extLst>
+            </p:cNvPr>
+            <p:cNvSpPr/>
+            <p:nvPr>
+              <p:extLst>
+                <p:ext uri="{386F3935-93C4-4BCD-93E2-E3B085C9AB24}">
+                  <p16:designElem xmlns:p16="http://schemas.microsoft.com/office/powerpoint/2015/main" val="1"/>
+                </p:ext>
+              </p:extLst>
+            </p:nvPr>
+          </p:nvSpPr>
+          <p:spPr bwMode="auto">
+            <a:xfrm>
+              <a:off x="569912" y="5945188"/>
+              <a:ext cx="152400" cy="912813"/>
+            </a:xfrm>
+            <a:custGeom>
+              <a:avLst/>
+              <a:gdLst/>
+              <a:ahLst/>
+              <a:cxnLst/>
+              <a:rect l="0" t="0" r="r" b="b"/>
+              <a:pathLst>
+                <a:path w="96" h="575">
+                  <a:moveTo>
+                    <a:pt x="15" y="575"/>
+                  </a:moveTo>
+                  <a:lnTo>
+                    <a:pt x="0" y="569"/>
+                  </a:lnTo>
+                  <a:lnTo>
+                    <a:pt x="81" y="383"/>
+                  </a:lnTo>
+                  <a:lnTo>
+                    <a:pt x="81" y="0"/>
+                  </a:lnTo>
+                  <a:lnTo>
+                    <a:pt x="96" y="0"/>
+                  </a:lnTo>
+                  <a:lnTo>
+                    <a:pt x="96" y="386"/>
+                  </a:lnTo>
+                  <a:lnTo>
+                    <a:pt x="15" y="575"/>
+                  </a:lnTo>
+                  <a:close/>
+                </a:path>
+              </a:pathLst>
+            </a:custGeom>
+            <a:grpFill/>
+            <a:ln>
+              <a:noFill/>
+            </a:ln>
+            <a:extLst>
+              <a:ext uri="{91240B29-F687-4f45-9708-019B960494DF}">
+                <a14:hiddenLine xmlns:a14="http://schemas.microsoft.com/office/drawing/2010/main" xmlns:p14="http://schemas.microsoft.com/office/powerpoint/2010/main" xmlns:a16="http://schemas.microsoft.com/office/drawing/2014/main" xmlns="" w="9525">
+                  <a:solidFill>
+                    <a:srgbClr val="000000"/>
+                  </a:solidFill>
+                  <a:round/>
+                  <a:headEnd/>
+                  <a:tailEnd/>
+                </a14:hiddenLine>
+              </a:ext>
+            </a:extLst>
+          </p:spPr>
+        </p:sp>
+        <p:sp>
+          <p:nvSpPr>
+            <p:cNvPr id="36" name="Freeform 28">
+              <a:extLst>
+                <a:ext uri="{FF2B5EF4-FFF2-40B4-BE49-F238E27FC236}">
+                  <a16:creationId xmlns:a16="http://schemas.microsoft.com/office/drawing/2014/main" id="{25DD1322-2D3A-4E7B-B23B-B4F96E02C29F}"/>
+                </a:ext>
+                <a:ext uri="{C183D7F6-B498-43B3-948B-1728B52AA6E4}">
+                  <adec:decorative xmlns:adec="http://schemas.microsoft.com/office/drawing/2017/decorative" val="1"/>
+                </a:ext>
+              </a:extLst>
+            </p:cNvPr>
+            <p:cNvSpPr>
+              <a:spLocks noEditPoints="1"/>
+            </p:cNvSpPr>
+            <p:nvPr>
+              <p:extLst>
+                <p:ext uri="{386F3935-93C4-4BCD-93E2-E3B085C9AB24}">
+                  <p16:designElem xmlns:p16="http://schemas.microsoft.com/office/powerpoint/2015/main" val="1"/>
+                </p:ext>
+              </p:extLst>
+            </p:nvPr>
+          </p:nvSpPr>
+          <p:spPr bwMode="auto">
+            <a:xfrm>
+              <a:off x="612775" y="5246688"/>
+              <a:ext cx="190500" cy="190500"/>
+            </a:xfrm>
+            <a:custGeom>
+              <a:avLst/>
+              <a:gdLst/>
+              <a:ahLst/>
+              <a:cxnLst/>
+              <a:rect l="0" t="0" r="r" b="b"/>
+              <a:pathLst>
+                <a:path w="40" h="40">
+                  <a:moveTo>
+                    <a:pt x="20" y="40"/>
+                  </a:moveTo>
+                  <a:cubicBezTo>
+                    <a:pt x="9" y="40"/>
+                    <a:pt x="0" y="31"/>
+                    <a:pt x="0" y="20"/>
+                  </a:cubicBezTo>
+                  <a:cubicBezTo>
+                    <a:pt x="0" y="9"/>
+                    <a:pt x="9" y="0"/>
+                    <a:pt x="20" y="0"/>
+                  </a:cubicBezTo>
+                  <a:cubicBezTo>
+                    <a:pt x="31" y="0"/>
+                    <a:pt x="40" y="9"/>
+                    <a:pt x="40" y="20"/>
+                  </a:cubicBezTo>
+                  <a:cubicBezTo>
+                    <a:pt x="40" y="31"/>
+                    <a:pt x="31" y="40"/>
+                    <a:pt x="20" y="40"/>
+                  </a:cubicBezTo>
+                  <a:close/>
+                  <a:moveTo>
+                    <a:pt x="20" y="4"/>
+                  </a:moveTo>
+                  <a:cubicBezTo>
+                    <a:pt x="12" y="4"/>
+                    <a:pt x="4" y="11"/>
+                    <a:pt x="4" y="20"/>
+                  </a:cubicBezTo>
+                  <a:cubicBezTo>
+                    <a:pt x="4" y="29"/>
+                    <a:pt x="12" y="36"/>
+                    <a:pt x="20" y="36"/>
+                  </a:cubicBezTo>
+                  <a:cubicBezTo>
+                    <a:pt x="29" y="36"/>
+                    <a:pt x="36" y="29"/>
+                    <a:pt x="36" y="20"/>
+                  </a:cubicBezTo>
+                  <a:cubicBezTo>
+                    <a:pt x="36" y="11"/>
+                    <a:pt x="29" y="4"/>
+                    <a:pt x="20" y="4"/>
+                  </a:cubicBezTo>
+                  <a:close/>
+                </a:path>
+              </a:pathLst>
+            </a:custGeom>
+            <a:grpFill/>
+            <a:ln>
+              <a:noFill/>
+            </a:ln>
+            <a:extLst>
+              <a:ext uri="{91240B29-F687-4f45-9708-019B960494DF}">
+                <a14:hiddenLine xmlns:a14="http://schemas.microsoft.com/office/drawing/2010/main" xmlns:p14="http://schemas.microsoft.com/office/powerpoint/2010/main" xmlns:a16="http://schemas.microsoft.com/office/drawing/2014/main" xmlns="" w="9525">
+                  <a:solidFill>
+                    <a:srgbClr val="000000"/>
+                  </a:solidFill>
+                  <a:round/>
+                  <a:headEnd/>
+                  <a:tailEnd/>
+                </a14:hiddenLine>
+              </a:ext>
+            </a:extLst>
+          </p:spPr>
+        </p:sp>
+        <p:sp>
+          <p:nvSpPr>
+            <p:cNvPr id="37" name="Freeform 29">
+              <a:extLst>
+                <a:ext uri="{FF2B5EF4-FFF2-40B4-BE49-F238E27FC236}">
+                  <a16:creationId xmlns:a16="http://schemas.microsoft.com/office/drawing/2014/main" id="{6E4FFBEB-52BB-494D-AD99-A0F072AB6F35}"/>
+                </a:ext>
+                <a:ext uri="{C183D7F6-B498-43B3-948B-1728B52AA6E4}">
+                  <adec:decorative xmlns:adec="http://schemas.microsoft.com/office/drawing/2017/decorative" val="1"/>
+                </a:ext>
+              </a:extLst>
+            </p:cNvPr>
+            <p:cNvSpPr>
+              <a:spLocks noEditPoints="1"/>
+            </p:cNvSpPr>
+            <p:nvPr>
+              <p:extLst>
+                <p:ext uri="{386F3935-93C4-4BCD-93E2-E3B085C9AB24}">
+                  <p16:designElem xmlns:p16="http://schemas.microsoft.com/office/powerpoint/2015/main" val="1"/>
+                </p:ext>
+              </p:extLst>
+            </p:nvPr>
+          </p:nvSpPr>
+          <p:spPr bwMode="auto">
+            <a:xfrm>
+              <a:off x="612775" y="5764213"/>
+              <a:ext cx="190500" cy="190500"/>
+            </a:xfrm>
+            <a:custGeom>
+              <a:avLst/>
+              <a:gdLst/>
+              <a:ahLst/>
+              <a:cxnLst/>
+              <a:rect l="0" t="0" r="r" b="b"/>
+              <a:pathLst>
+                <a:path w="40" h="40">
+                  <a:moveTo>
+                    <a:pt x="20" y="40"/>
+                  </a:moveTo>
+                  <a:cubicBezTo>
+                    <a:pt x="9" y="40"/>
+                    <a:pt x="0" y="31"/>
+                    <a:pt x="0" y="20"/>
+                  </a:cubicBezTo>
+                  <a:cubicBezTo>
+                    <a:pt x="0" y="9"/>
+                    <a:pt x="9" y="0"/>
+                    <a:pt x="20" y="0"/>
+                  </a:cubicBezTo>
+                  <a:cubicBezTo>
+                    <a:pt x="31" y="0"/>
+                    <a:pt x="40" y="9"/>
+                    <a:pt x="40" y="20"/>
+                  </a:cubicBezTo>
+                  <a:cubicBezTo>
+                    <a:pt x="40" y="31"/>
+                    <a:pt x="31" y="40"/>
+                    <a:pt x="20" y="40"/>
+                  </a:cubicBezTo>
+                  <a:close/>
+                  <a:moveTo>
+                    <a:pt x="20" y="4"/>
+                  </a:moveTo>
+                  <a:cubicBezTo>
+                    <a:pt x="12" y="4"/>
+                    <a:pt x="4" y="11"/>
+                    <a:pt x="4" y="20"/>
+                  </a:cubicBezTo>
+                  <a:cubicBezTo>
+                    <a:pt x="4" y="29"/>
+                    <a:pt x="12" y="36"/>
+                    <a:pt x="20" y="36"/>
+                  </a:cubicBezTo>
+                  <a:cubicBezTo>
+                    <a:pt x="29" y="36"/>
+                    <a:pt x="36" y="29"/>
+                    <a:pt x="36" y="20"/>
+                  </a:cubicBezTo>
+                  <a:cubicBezTo>
+                    <a:pt x="36" y="11"/>
+                    <a:pt x="29" y="4"/>
+                    <a:pt x="20" y="4"/>
+                  </a:cubicBezTo>
+                  <a:close/>
+                </a:path>
+              </a:pathLst>
+            </a:custGeom>
+            <a:grpFill/>
+            <a:ln>
+              <a:noFill/>
+            </a:ln>
+            <a:extLst>
+              <a:ext uri="{91240B29-F687-4f45-9708-019B960494DF}">
+                <a14:hiddenLine xmlns:a14="http://schemas.microsoft.com/office/drawing/2010/main" xmlns:p14="http://schemas.microsoft.com/office/powerpoint/2010/main" xmlns:a16="http://schemas.microsoft.com/office/drawing/2014/main" xmlns="" w="9525">
+                  <a:solidFill>
+                    <a:srgbClr val="000000"/>
+                  </a:solidFill>
+                  <a:round/>
+                  <a:headEnd/>
+                  <a:tailEnd/>
+                </a14:hiddenLine>
+              </a:ext>
+            </a:extLst>
+          </p:spPr>
+        </p:sp>
+        <p:sp>
+          <p:nvSpPr>
+            <p:cNvPr id="38" name="Freeform 30">
+              <a:extLst>
+                <a:ext uri="{FF2B5EF4-FFF2-40B4-BE49-F238E27FC236}">
+                  <a16:creationId xmlns:a16="http://schemas.microsoft.com/office/drawing/2014/main" id="{7DE92406-3F65-4333-BAAA-A9A7B5AEE911}"/>
+                </a:ext>
+                <a:ext uri="{C183D7F6-B498-43B3-948B-1728B52AA6E4}">
+                  <adec:decorative xmlns:adec="http://schemas.microsoft.com/office/drawing/2017/decorative" val="1"/>
+                </a:ext>
+              </a:extLst>
+            </p:cNvPr>
+            <p:cNvSpPr/>
+            <p:nvPr>
+              <p:extLst>
+                <p:ext uri="{386F3935-93C4-4BCD-93E2-E3B085C9AB24}">
+                  <p16:designElem xmlns:p16="http://schemas.microsoft.com/office/powerpoint/2015/main" val="1"/>
+                </p:ext>
+              </p:extLst>
+            </p:nvPr>
+          </p:nvSpPr>
+          <p:spPr bwMode="auto">
+            <a:xfrm>
+              <a:off x="669925" y="6330950"/>
+              <a:ext cx="417513" cy="517525"/>
+            </a:xfrm>
+            <a:custGeom>
+              <a:avLst/>
+              <a:gdLst/>
+              <a:ahLst/>
+              <a:cxnLst/>
+              <a:rect l="0" t="0" r="r" b="b"/>
+              <a:pathLst>
+                <a:path w="263" h="326">
+                  <a:moveTo>
+                    <a:pt x="15" y="326"/>
+                  </a:moveTo>
+                  <a:lnTo>
+                    <a:pt x="0" y="320"/>
+                  </a:lnTo>
+                  <a:lnTo>
+                    <a:pt x="45" y="206"/>
+                  </a:lnTo>
+                  <a:lnTo>
+                    <a:pt x="48" y="206"/>
+                  </a:lnTo>
+                  <a:lnTo>
+                    <a:pt x="254" y="0"/>
+                  </a:lnTo>
+                  <a:lnTo>
+                    <a:pt x="263" y="12"/>
+                  </a:lnTo>
+                  <a:lnTo>
+                    <a:pt x="60" y="215"/>
+                  </a:lnTo>
+                  <a:lnTo>
+                    <a:pt x="15" y="326"/>
+                  </a:lnTo>
+                  <a:close/>
+                </a:path>
+              </a:pathLst>
+            </a:custGeom>
+            <a:grpFill/>
+            <a:ln>
+              <a:noFill/>
+            </a:ln>
+            <a:extLst>
+              <a:ext uri="{91240B29-F687-4f45-9708-019B960494DF}">
+                <a14:hiddenLine xmlns:a14="http://schemas.microsoft.com/office/drawing/2010/main" xmlns:p14="http://schemas.microsoft.com/office/powerpoint/2010/main" xmlns:a16="http://schemas.microsoft.com/office/drawing/2014/main" xmlns="" w="9525">
+                  <a:solidFill>
+                    <a:srgbClr val="000000"/>
+                  </a:solidFill>
+                  <a:round/>
+                  <a:headEnd/>
+                  <a:tailEnd/>
+                </a14:hiddenLine>
+              </a:ext>
+            </a:extLst>
+          </p:spPr>
+        </p:sp>
+        <p:sp>
+          <p:nvSpPr>
+            <p:cNvPr id="39" name="Freeform 31">
+              <a:extLst>
+                <a:ext uri="{FF2B5EF4-FFF2-40B4-BE49-F238E27FC236}">
+                  <a16:creationId xmlns:a16="http://schemas.microsoft.com/office/drawing/2014/main" id="{B8B0FFC4-D1BB-4BB9-A224-BB78BFD33801}"/>
+                </a:ext>
+                <a:ext uri="{C183D7F6-B498-43B3-948B-1728B52AA6E4}">
+                  <adec:decorative xmlns:adec="http://schemas.microsoft.com/office/drawing/2017/decorative" val="1"/>
+                </a:ext>
+              </a:extLst>
+            </p:cNvPr>
+            <p:cNvSpPr>
+              <a:spLocks noEditPoints="1"/>
+            </p:cNvSpPr>
+            <p:nvPr>
+              <p:extLst>
+                <p:ext uri="{386F3935-93C4-4BCD-93E2-E3B085C9AB24}">
+                  <p16:designElem xmlns:p16="http://schemas.microsoft.com/office/powerpoint/2015/main" val="1"/>
+                </p:ext>
+              </p:extLst>
+            </p:nvPr>
+          </p:nvSpPr>
+          <p:spPr bwMode="auto">
+            <a:xfrm>
+              <a:off x="1049337" y="6221413"/>
+              <a:ext cx="157163" cy="147638"/>
+            </a:xfrm>
+            <a:custGeom>
+              <a:avLst/>
+              <a:gdLst/>
+              <a:ahLst/>
+              <a:cxnLst/>
+              <a:rect l="0" t="0" r="r" b="b"/>
+              <a:pathLst>
+                <a:path w="33" h="31">
+                  <a:moveTo>
+                    <a:pt x="16" y="31"/>
+                  </a:moveTo>
+                  <a:cubicBezTo>
+                    <a:pt x="12" y="31"/>
+                    <a:pt x="8" y="29"/>
+                    <a:pt x="5" y="26"/>
+                  </a:cubicBezTo>
+                  <a:cubicBezTo>
+                    <a:pt x="2" y="24"/>
+                    <a:pt x="0" y="20"/>
+                    <a:pt x="0" y="15"/>
+                  </a:cubicBezTo>
+                  <a:cubicBezTo>
+                    <a:pt x="0" y="11"/>
+                    <a:pt x="2" y="7"/>
+                    <a:pt x="5" y="4"/>
+                  </a:cubicBezTo>
+                  <a:cubicBezTo>
+                    <a:pt x="8" y="1"/>
+                    <a:pt x="12" y="0"/>
+                    <a:pt x="16" y="0"/>
+                  </a:cubicBezTo>
+                  <a:cubicBezTo>
+                    <a:pt x="20" y="0"/>
+                    <a:pt x="24" y="1"/>
+                    <a:pt x="27" y="4"/>
+                  </a:cubicBezTo>
+                  <a:cubicBezTo>
+                    <a:pt x="33" y="10"/>
+                    <a:pt x="33" y="20"/>
+                    <a:pt x="27" y="26"/>
+                  </a:cubicBezTo>
+                  <a:cubicBezTo>
+                    <a:pt x="24" y="29"/>
+                    <a:pt x="20" y="31"/>
+                    <a:pt x="16" y="31"/>
+                  </a:cubicBezTo>
+                  <a:close/>
+                  <a:moveTo>
+                    <a:pt x="16" y="4"/>
+                  </a:moveTo>
+                  <a:cubicBezTo>
+                    <a:pt x="13" y="4"/>
+                    <a:pt x="10" y="5"/>
+                    <a:pt x="8" y="7"/>
+                  </a:cubicBezTo>
+                  <a:cubicBezTo>
+                    <a:pt x="6" y="9"/>
+                    <a:pt x="4" y="12"/>
+                    <a:pt x="4" y="15"/>
+                  </a:cubicBezTo>
+                  <a:cubicBezTo>
+                    <a:pt x="4" y="19"/>
+                    <a:pt x="6" y="21"/>
+                    <a:pt x="8" y="24"/>
+                  </a:cubicBezTo>
+                  <a:cubicBezTo>
+                    <a:pt x="10" y="26"/>
+                    <a:pt x="13" y="27"/>
+                    <a:pt x="16" y="27"/>
+                  </a:cubicBezTo>
+                  <a:cubicBezTo>
+                    <a:pt x="19" y="27"/>
+                    <a:pt x="22" y="26"/>
+                    <a:pt x="24" y="24"/>
+                  </a:cubicBezTo>
+                  <a:cubicBezTo>
+                    <a:pt x="29" y="19"/>
+                    <a:pt x="29" y="12"/>
+                    <a:pt x="24" y="7"/>
+                  </a:cubicBezTo>
+                  <a:cubicBezTo>
+                    <a:pt x="22" y="5"/>
+                    <a:pt x="19" y="4"/>
+                    <a:pt x="16" y="4"/>
+                  </a:cubicBezTo>
+                  <a:close/>
+                </a:path>
+              </a:pathLst>
+            </a:custGeom>
+            <a:grpFill/>
+            <a:ln>
+              <a:noFill/>
+            </a:ln>
+            <a:extLst>
+              <a:ext uri="{91240B29-F687-4f45-9708-019B960494DF}">
+                <a14:hiddenLine xmlns:a14="http://schemas.microsoft.com/office/drawing/2010/main" xmlns:p14="http://schemas.microsoft.com/office/powerpoint/2010/main" xmlns:a16="http://schemas.microsoft.com/office/drawing/2014/main" xmlns="" w="9525">
+                  <a:solidFill>
+                    <a:srgbClr val="000000"/>
+                  </a:solidFill>
+                  <a:round/>
+                  <a:headEnd/>
+                  <a:tailEnd/>
+                </a14:hiddenLine>
+              </a:ext>
+            </a:extLst>
+          </p:spPr>
+        </p:sp>
+      </p:grpSp>
       <p:sp>
         <p:nvSpPr>
           <p:cNvPr id="2" name="Title 1">
@@ -33045,104 +35675,1022 @@
             <a:pPr algn="ctr"/>
             <a:r>
               <a:rPr lang="en-US" sz="4000" dirty="0"/>
-              <a:t>Challenges in training PInns</a:t>
+              <a:t>Potential solutions</a:t>
             </a:r>
           </a:p>
         </p:txBody>
       </p:sp>
-      <p:pic>
-        <p:nvPicPr>
-          <p:cNvPr id="5" name="Content Placeholder 4" descr="Chart, line chart&#10;&#10;Description automatically generated">
+      <p:sp>
+        <p:nvSpPr>
+          <p:cNvPr id="3" name="Content Placeholder 2">
             <a:extLst>
               <a:ext uri="{FF2B5EF4-FFF2-40B4-BE49-F238E27FC236}">
-                <a16:creationId xmlns:a16="http://schemas.microsoft.com/office/drawing/2014/main" id="{2DF8B08F-39FC-2662-FB6F-C656746E5153}"/>
+                <a16:creationId xmlns:a16="http://schemas.microsoft.com/office/drawing/2014/main" id="{87E2A805-A87E-8A44-1794-1E173C663651}"/>
               </a:ext>
             </a:extLst>
           </p:cNvPr>
-          <p:cNvPicPr>
-            <a:picLocks noGrp="1" noChangeAspect="1"/>
-          </p:cNvPicPr>
+          <p:cNvSpPr>
+            <a:spLocks noGrp="1"/>
+          </p:cNvSpPr>
           <p:nvPr>
             <p:ph idx="1"/>
           </p:nvPr>
-        </p:nvPicPr>
-        <p:blipFill>
-          <a:blip r:embed="rId3">
-            <a:extLst>
-              <a:ext uri="{28A0092B-C50C-407E-A947-70E740481C1C}">
-                <a14:useLocalDpi xmlns:a14="http://schemas.microsoft.com/office/drawing/2010/main" val="0"/>
-              </a:ext>
-            </a:extLst>
-          </a:blip>
-          <a:stretch>
-            <a:fillRect/>
-          </a:stretch>
-        </p:blipFill>
-        <p:spPr>
-          <a:xfrm>
-            <a:off x="2173025" y="1963051"/>
-            <a:ext cx="8017401" cy="3006525"/>
-          </a:xfrm>
-        </p:spPr>
-      </p:pic>
-      <p:sp>
-        <p:nvSpPr>
-          <p:cNvPr id="6" name="TextBox 5">
-            <a:extLst>
-              <a:ext uri="{FF2B5EF4-FFF2-40B4-BE49-F238E27FC236}">
-                <a16:creationId xmlns:a16="http://schemas.microsoft.com/office/drawing/2014/main" id="{12FCD387-5CBC-EB21-57DD-D67034C626CE}"/>
-              </a:ext>
-            </a:extLst>
-          </p:cNvPr>
-          <p:cNvSpPr txBox="1"/>
-          <p:nvPr/>
         </p:nvSpPr>
         <p:spPr>
           <a:xfrm>
-            <a:off x="2173025" y="5246688"/>
-            <a:ext cx="8017401" cy="1015663"/>
+            <a:off x="1206500" y="2185988"/>
+            <a:ext cx="9840911" cy="3605213"/>
           </a:xfrm>
-          <a:prstGeom prst="rect">
-            <a:avLst/>
-          </a:prstGeom>
-          <a:noFill/>
         </p:spPr>
         <p:txBody>
-          <a:bodyPr wrap="square" rtlCol="0">
-            <a:spAutoFit/>
+          <a:bodyPr anchor="t">
+            <a:normAutofit/>
           </a:bodyPr>
           <a:lstStyle/>
           <a:p>
-            <a:pPr marL="285750" indent="-285750" algn="ctr">
-              <a:buFont typeface="Arial" panose="020B0604020202020204" pitchFamily="34" charset="0"/>
-              <a:buChar char="•"/>
+            <a:pPr>
+              <a:lnSpc>
+                <a:spcPct val="100000"/>
+              </a:lnSpc>
             </a:pPr>
             <a:r>
               <a:rPr lang="en-US" sz="3000" dirty="0"/>
-              <a:t>High frequency solutions</a:t>
-            </a:r>
-          </a:p>
-          <a:p>
-            <a:pPr marL="285750" indent="-285750" algn="ctr">
-              <a:buFont typeface="Arial" panose="020B0604020202020204" pitchFamily="34" charset="0"/>
-              <a:buChar char="•"/>
-            </a:pPr>
-            <a:r>
-              <a:rPr lang="en-US" sz="3000" dirty="0"/>
-              <a:t>Fixed point solutions</a:t>
+              <a:t>Leverage physics theory to push the neural network towards the true solution</a:t>
             </a:r>
           </a:p>
         </p:txBody>
       </p:sp>
+      <p:grpSp>
+        <p:nvGrpSpPr>
+          <p:cNvPr id="41" name="Group 40">
+            <a:extLst>
+              <a:ext uri="{FF2B5EF4-FFF2-40B4-BE49-F238E27FC236}">
+                <a16:creationId xmlns:a16="http://schemas.microsoft.com/office/drawing/2014/main" id="{8DB4BB99-C854-45F9-BED1-63D15E3A2411}"/>
+              </a:ext>
+              <a:ext uri="{C183D7F6-B498-43B3-948B-1728B52AA6E4}">
+                <adec:decorative xmlns:adec="http://schemas.microsoft.com/office/drawing/2017/decorative" val="1"/>
+              </a:ext>
+            </a:extLst>
+          </p:cNvPr>
+          <p:cNvGrpSpPr>
+            <a:grpSpLocks noGrp="1" noUngrp="1" noRot="1" noChangeAspect="1" noMove="1" noResize="1"/>
+          </p:cNvGrpSpPr>
+          <p:nvPr>
+            <p:extLst>
+              <p:ext uri="{386F3935-93C4-4BCD-93E2-E3B085C9AB24}">
+                <p16:designElem xmlns:p16="http://schemas.microsoft.com/office/powerpoint/2015/main" val="1"/>
+              </p:ext>
+            </p:extLst>
+          </p:nvPr>
+        </p:nvGrpSpPr>
+        <p:grpSpPr>
+          <a:xfrm>
+            <a:off x="11364912" y="0"/>
+            <a:ext cx="674688" cy="6848476"/>
+            <a:chOff x="11364912" y="0"/>
+            <a:chExt cx="674688" cy="6848476"/>
+          </a:xfrm>
+          <a:solidFill>
+            <a:schemeClr val="tx2">
+              <a:alpha val="45000"/>
+            </a:schemeClr>
+          </a:solidFill>
+        </p:grpSpPr>
+        <p:sp>
+          <p:nvSpPr>
+            <p:cNvPr id="42" name="Freeform 32">
+              <a:extLst>
+                <a:ext uri="{FF2B5EF4-FFF2-40B4-BE49-F238E27FC236}">
+                  <a16:creationId xmlns:a16="http://schemas.microsoft.com/office/drawing/2014/main" id="{5D1CCC4C-284C-4BF6-97D9-D9746746348F}"/>
+                </a:ext>
+                <a:ext uri="{C183D7F6-B498-43B3-948B-1728B52AA6E4}">
+                  <adec:decorative xmlns:adec="http://schemas.microsoft.com/office/drawing/2017/decorative" val="1"/>
+                </a:ext>
+              </a:extLst>
+            </p:cNvPr>
+            <p:cNvSpPr/>
+            <p:nvPr>
+              <p:extLst>
+                <p:ext uri="{386F3935-93C4-4BCD-93E2-E3B085C9AB24}">
+                  <p16:designElem xmlns:p16="http://schemas.microsoft.com/office/powerpoint/2015/main" val="1"/>
+                </p:ext>
+              </p:extLst>
+            </p:nvPr>
+          </p:nvSpPr>
+          <p:spPr bwMode="auto">
+            <a:xfrm>
+              <a:off x="11483975" y="0"/>
+              <a:ext cx="417513" cy="512763"/>
+            </a:xfrm>
+            <a:custGeom>
+              <a:avLst/>
+              <a:gdLst/>
+              <a:ahLst/>
+              <a:cxnLst/>
+              <a:rect l="0" t="0" r="r" b="b"/>
+              <a:pathLst>
+                <a:path w="263" h="323">
+                  <a:moveTo>
+                    <a:pt x="12" y="323"/>
+                  </a:moveTo>
+                  <a:lnTo>
+                    <a:pt x="0" y="314"/>
+                  </a:lnTo>
+                  <a:lnTo>
+                    <a:pt x="203" y="108"/>
+                  </a:lnTo>
+                  <a:lnTo>
+                    <a:pt x="248" y="0"/>
+                  </a:lnTo>
+                  <a:lnTo>
+                    <a:pt x="263" y="6"/>
+                  </a:lnTo>
+                  <a:lnTo>
+                    <a:pt x="218" y="117"/>
+                  </a:lnTo>
+                  <a:lnTo>
+                    <a:pt x="218" y="117"/>
+                  </a:lnTo>
+                  <a:lnTo>
+                    <a:pt x="12" y="323"/>
+                  </a:lnTo>
+                  <a:close/>
+                </a:path>
+              </a:pathLst>
+            </a:custGeom>
+            <a:grpFill/>
+            <a:ln>
+              <a:noFill/>
+            </a:ln>
+            <a:extLst>
+              <a:ext uri="{91240B29-F687-4f45-9708-019B960494DF}">
+                <a14:hiddenLine xmlns:a14="http://schemas.microsoft.com/office/drawing/2010/main" xmlns:p14="http://schemas.microsoft.com/office/powerpoint/2010/main" xmlns:a16="http://schemas.microsoft.com/office/drawing/2014/main" xmlns="" w="9525">
+                  <a:solidFill>
+                    <a:srgbClr val="000000"/>
+                  </a:solidFill>
+                  <a:round/>
+                  <a:headEnd/>
+                  <a:tailEnd/>
+                </a14:hiddenLine>
+              </a:ext>
+            </a:extLst>
+          </p:spPr>
+        </p:sp>
+        <p:sp>
+          <p:nvSpPr>
+            <p:cNvPr id="43" name="Freeform 33">
+              <a:extLst>
+                <a:ext uri="{FF2B5EF4-FFF2-40B4-BE49-F238E27FC236}">
+                  <a16:creationId xmlns:a16="http://schemas.microsoft.com/office/drawing/2014/main" id="{35D82D1B-EB09-4028-9107-D60B547C7B42}"/>
+                </a:ext>
+                <a:ext uri="{C183D7F6-B498-43B3-948B-1728B52AA6E4}">
+                  <adec:decorative xmlns:adec="http://schemas.microsoft.com/office/drawing/2017/decorative" val="1"/>
+                </a:ext>
+              </a:extLst>
+            </p:cNvPr>
+            <p:cNvSpPr>
+              <a:spLocks noEditPoints="1"/>
+            </p:cNvSpPr>
+            <p:nvPr>
+              <p:extLst>
+                <p:ext uri="{386F3935-93C4-4BCD-93E2-E3B085C9AB24}">
+                  <p16:designElem xmlns:p16="http://schemas.microsoft.com/office/powerpoint/2015/main" val="1"/>
+                </p:ext>
+              </p:extLst>
+            </p:nvPr>
+          </p:nvSpPr>
+          <p:spPr bwMode="auto">
+            <a:xfrm>
+              <a:off x="11364912" y="474663"/>
+              <a:ext cx="157163" cy="152400"/>
+            </a:xfrm>
+            <a:custGeom>
+              <a:avLst/>
+              <a:gdLst/>
+              <a:ahLst/>
+              <a:cxnLst/>
+              <a:rect l="0" t="0" r="r" b="b"/>
+              <a:pathLst>
+                <a:path w="33" h="32">
+                  <a:moveTo>
+                    <a:pt x="17" y="32"/>
+                  </a:moveTo>
+                  <a:cubicBezTo>
+                    <a:pt x="13" y="32"/>
+                    <a:pt x="9" y="30"/>
+                    <a:pt x="6" y="27"/>
+                  </a:cubicBezTo>
+                  <a:cubicBezTo>
+                    <a:pt x="0" y="21"/>
+                    <a:pt x="0" y="11"/>
+                    <a:pt x="6" y="5"/>
+                  </a:cubicBezTo>
+                  <a:cubicBezTo>
+                    <a:pt x="9" y="2"/>
+                    <a:pt x="13" y="0"/>
+                    <a:pt x="17" y="0"/>
+                  </a:cubicBezTo>
+                  <a:cubicBezTo>
+                    <a:pt x="21" y="0"/>
+                    <a:pt x="25" y="2"/>
+                    <a:pt x="28" y="5"/>
+                  </a:cubicBezTo>
+                  <a:cubicBezTo>
+                    <a:pt x="31" y="8"/>
+                    <a:pt x="33" y="12"/>
+                    <a:pt x="33" y="16"/>
+                  </a:cubicBezTo>
+                  <a:cubicBezTo>
+                    <a:pt x="33" y="20"/>
+                    <a:pt x="31" y="24"/>
+                    <a:pt x="28" y="27"/>
+                  </a:cubicBezTo>
+                  <a:cubicBezTo>
+                    <a:pt x="25" y="30"/>
+                    <a:pt x="21" y="32"/>
+                    <a:pt x="17" y="32"/>
+                  </a:cubicBezTo>
+                  <a:close/>
+                  <a:moveTo>
+                    <a:pt x="17" y="4"/>
+                  </a:moveTo>
+                  <a:cubicBezTo>
+                    <a:pt x="14" y="4"/>
+                    <a:pt x="11" y="6"/>
+                    <a:pt x="9" y="8"/>
+                  </a:cubicBezTo>
+                  <a:cubicBezTo>
+                    <a:pt x="4" y="12"/>
+                    <a:pt x="4" y="20"/>
+                    <a:pt x="9" y="24"/>
+                  </a:cubicBezTo>
+                  <a:cubicBezTo>
+                    <a:pt x="11" y="27"/>
+                    <a:pt x="14" y="28"/>
+                    <a:pt x="17" y="28"/>
+                  </a:cubicBezTo>
+                  <a:cubicBezTo>
+                    <a:pt x="20" y="28"/>
+                    <a:pt x="23" y="27"/>
+                    <a:pt x="26" y="24"/>
+                  </a:cubicBezTo>
+                  <a:cubicBezTo>
+                    <a:pt x="30" y="20"/>
+                    <a:pt x="30" y="12"/>
+                    <a:pt x="26" y="8"/>
+                  </a:cubicBezTo>
+                  <a:cubicBezTo>
+                    <a:pt x="23" y="6"/>
+                    <a:pt x="20" y="4"/>
+                    <a:pt x="17" y="4"/>
+                  </a:cubicBezTo>
+                  <a:close/>
+                </a:path>
+              </a:pathLst>
+            </a:custGeom>
+            <a:grpFill/>
+            <a:ln>
+              <a:noFill/>
+            </a:ln>
+            <a:extLst>
+              <a:ext uri="{91240B29-F687-4f45-9708-019B960494DF}">
+                <a14:hiddenLine xmlns:a14="http://schemas.microsoft.com/office/drawing/2010/main" xmlns:p14="http://schemas.microsoft.com/office/powerpoint/2010/main" xmlns:a16="http://schemas.microsoft.com/office/drawing/2014/main" xmlns="" w="9525">
+                  <a:solidFill>
+                    <a:srgbClr val="000000"/>
+                  </a:solidFill>
+                  <a:round/>
+                  <a:headEnd/>
+                  <a:tailEnd/>
+                </a14:hiddenLine>
+              </a:ext>
+            </a:extLst>
+          </p:spPr>
+        </p:sp>
+        <p:sp>
+          <p:nvSpPr>
+            <p:cNvPr id="44" name="Freeform 34">
+              <a:extLst>
+                <a:ext uri="{FF2B5EF4-FFF2-40B4-BE49-F238E27FC236}">
+                  <a16:creationId xmlns:a16="http://schemas.microsoft.com/office/drawing/2014/main" id="{1389EE93-8059-437E-8507-7557AD68FB1D}"/>
+                </a:ext>
+                <a:ext uri="{C183D7F6-B498-43B3-948B-1728B52AA6E4}">
+                  <adec:decorative xmlns:adec="http://schemas.microsoft.com/office/drawing/2017/decorative" val="1"/>
+                </a:ext>
+              </a:extLst>
+            </p:cNvPr>
+            <p:cNvSpPr>
+              <a:spLocks noEditPoints="1"/>
+            </p:cNvSpPr>
+            <p:nvPr>
+              <p:extLst>
+                <p:ext uri="{386F3935-93C4-4BCD-93E2-E3B085C9AB24}">
+                  <p16:designElem xmlns:p16="http://schemas.microsoft.com/office/powerpoint/2015/main" val="1"/>
+                </p:ext>
+              </p:extLst>
+            </p:nvPr>
+          </p:nvSpPr>
+          <p:spPr bwMode="auto">
+            <a:xfrm>
+              <a:off x="11631612" y="1539875"/>
+              <a:ext cx="188913" cy="190500"/>
+            </a:xfrm>
+            <a:custGeom>
+              <a:avLst/>
+              <a:gdLst/>
+              <a:ahLst/>
+              <a:cxnLst/>
+              <a:rect l="0" t="0" r="r" b="b"/>
+              <a:pathLst>
+                <a:path w="40" h="40">
+                  <a:moveTo>
+                    <a:pt x="20" y="40"/>
+                  </a:moveTo>
+                  <a:cubicBezTo>
+                    <a:pt x="9" y="40"/>
+                    <a:pt x="0" y="31"/>
+                    <a:pt x="0" y="20"/>
+                  </a:cubicBezTo>
+                  <a:cubicBezTo>
+                    <a:pt x="0" y="9"/>
+                    <a:pt x="9" y="0"/>
+                    <a:pt x="20" y="0"/>
+                  </a:cubicBezTo>
+                  <a:cubicBezTo>
+                    <a:pt x="31" y="0"/>
+                    <a:pt x="40" y="9"/>
+                    <a:pt x="40" y="20"/>
+                  </a:cubicBezTo>
+                  <a:cubicBezTo>
+                    <a:pt x="40" y="31"/>
+                    <a:pt x="31" y="40"/>
+                    <a:pt x="20" y="40"/>
+                  </a:cubicBezTo>
+                  <a:close/>
+                  <a:moveTo>
+                    <a:pt x="20" y="4"/>
+                  </a:moveTo>
+                  <a:cubicBezTo>
+                    <a:pt x="11" y="4"/>
+                    <a:pt x="4" y="11"/>
+                    <a:pt x="4" y="20"/>
+                  </a:cubicBezTo>
+                  <a:cubicBezTo>
+                    <a:pt x="4" y="29"/>
+                    <a:pt x="11" y="36"/>
+                    <a:pt x="20" y="36"/>
+                  </a:cubicBezTo>
+                  <a:cubicBezTo>
+                    <a:pt x="29" y="36"/>
+                    <a:pt x="36" y="29"/>
+                    <a:pt x="36" y="20"/>
+                  </a:cubicBezTo>
+                  <a:cubicBezTo>
+                    <a:pt x="36" y="11"/>
+                    <a:pt x="29" y="4"/>
+                    <a:pt x="20" y="4"/>
+                  </a:cubicBezTo>
+                  <a:close/>
+                </a:path>
+              </a:pathLst>
+            </a:custGeom>
+            <a:grpFill/>
+            <a:ln>
+              <a:noFill/>
+            </a:ln>
+            <a:extLst>
+              <a:ext uri="{91240B29-F687-4f45-9708-019B960494DF}">
+                <a14:hiddenLine xmlns:a14="http://schemas.microsoft.com/office/drawing/2010/main" xmlns:p14="http://schemas.microsoft.com/office/powerpoint/2010/main" xmlns:a16="http://schemas.microsoft.com/office/drawing/2014/main" xmlns="" w="9525">
+                  <a:solidFill>
+                    <a:srgbClr val="000000"/>
+                  </a:solidFill>
+                  <a:round/>
+                  <a:headEnd/>
+                  <a:tailEnd/>
+                </a14:hiddenLine>
+              </a:ext>
+            </a:extLst>
+          </p:spPr>
+        </p:sp>
+        <p:sp>
+          <p:nvSpPr>
+            <p:cNvPr id="45" name="Freeform 35">
+              <a:extLst>
+                <a:ext uri="{FF2B5EF4-FFF2-40B4-BE49-F238E27FC236}">
+                  <a16:creationId xmlns:a16="http://schemas.microsoft.com/office/drawing/2014/main" id="{377C05DC-75FF-4426-A34F-DBF0C7E7BEF4}"/>
+                </a:ext>
+                <a:ext uri="{C183D7F6-B498-43B3-948B-1728B52AA6E4}">
+                  <adec:decorative xmlns:adec="http://schemas.microsoft.com/office/drawing/2017/decorative" val="1"/>
+                </a:ext>
+              </a:extLst>
+            </p:cNvPr>
+            <p:cNvSpPr/>
+            <p:nvPr>
+              <p:extLst>
+                <p:ext uri="{386F3935-93C4-4BCD-93E2-E3B085C9AB24}">
+                  <p16:designElem xmlns:p16="http://schemas.microsoft.com/office/powerpoint/2015/main" val="1"/>
+                </p:ext>
+              </p:extLst>
+            </p:nvPr>
+          </p:nvSpPr>
+          <p:spPr bwMode="auto">
+            <a:xfrm>
+              <a:off x="11531600" y="5694363"/>
+              <a:ext cx="298450" cy="1154113"/>
+            </a:xfrm>
+            <a:custGeom>
+              <a:avLst/>
+              <a:gdLst/>
+              <a:ahLst/>
+              <a:cxnLst/>
+              <a:rect l="0" t="0" r="r" b="b"/>
+              <a:pathLst>
+                <a:path w="188" h="727">
+                  <a:moveTo>
+                    <a:pt x="15" y="727"/>
+                  </a:moveTo>
+                  <a:lnTo>
+                    <a:pt x="0" y="727"/>
+                  </a:lnTo>
+                  <a:lnTo>
+                    <a:pt x="0" y="407"/>
+                  </a:lnTo>
+                  <a:lnTo>
+                    <a:pt x="0" y="407"/>
+                  </a:lnTo>
+                  <a:lnTo>
+                    <a:pt x="176" y="0"/>
+                  </a:lnTo>
+                  <a:lnTo>
+                    <a:pt x="188" y="6"/>
+                  </a:lnTo>
+                  <a:lnTo>
+                    <a:pt x="15" y="410"/>
+                  </a:lnTo>
+                  <a:lnTo>
+                    <a:pt x="15" y="727"/>
+                  </a:lnTo>
+                  <a:close/>
+                </a:path>
+              </a:pathLst>
+            </a:custGeom>
+            <a:grpFill/>
+            <a:ln>
+              <a:noFill/>
+            </a:ln>
+            <a:extLst>
+              <a:ext uri="{91240B29-F687-4f45-9708-019B960494DF}">
+                <a14:hiddenLine xmlns:a14="http://schemas.microsoft.com/office/drawing/2010/main" xmlns:p14="http://schemas.microsoft.com/office/powerpoint/2010/main" xmlns:a16="http://schemas.microsoft.com/office/drawing/2014/main" xmlns="" w="9525">
+                  <a:solidFill>
+                    <a:srgbClr val="000000"/>
+                  </a:solidFill>
+                  <a:round/>
+                  <a:headEnd/>
+                  <a:tailEnd/>
+                </a14:hiddenLine>
+              </a:ext>
+            </a:extLst>
+          </p:spPr>
+        </p:sp>
+        <p:sp>
+          <p:nvSpPr>
+            <p:cNvPr id="46" name="Freeform 36">
+              <a:extLst>
+                <a:ext uri="{FF2B5EF4-FFF2-40B4-BE49-F238E27FC236}">
+                  <a16:creationId xmlns:a16="http://schemas.microsoft.com/office/drawing/2014/main" id="{03D385C8-866D-437D-91B1-2E3ECDD88E59}"/>
+                </a:ext>
+                <a:ext uri="{C183D7F6-B498-43B3-948B-1728B52AA6E4}">
+                  <adec:decorative xmlns:adec="http://schemas.microsoft.com/office/drawing/2017/decorative" val="1"/>
+                </a:ext>
+              </a:extLst>
+            </p:cNvPr>
+            <p:cNvSpPr>
+              <a:spLocks noEditPoints="1"/>
+            </p:cNvSpPr>
+            <p:nvPr>
+              <p:extLst>
+                <p:ext uri="{386F3935-93C4-4BCD-93E2-E3B085C9AB24}">
+                  <p16:designElem xmlns:p16="http://schemas.microsoft.com/office/powerpoint/2015/main" val="1"/>
+                </p:ext>
+              </p:extLst>
+            </p:nvPr>
+          </p:nvSpPr>
+          <p:spPr bwMode="auto">
+            <a:xfrm>
+              <a:off x="11772900" y="5551488"/>
+              <a:ext cx="157163" cy="155575"/>
+            </a:xfrm>
+            <a:custGeom>
+              <a:avLst/>
+              <a:gdLst/>
+              <a:ahLst/>
+              <a:cxnLst/>
+              <a:rect l="0" t="0" r="r" b="b"/>
+              <a:pathLst>
+                <a:path w="33" h="33">
+                  <a:moveTo>
+                    <a:pt x="17" y="33"/>
+                  </a:moveTo>
+                  <a:cubicBezTo>
+                    <a:pt x="8" y="33"/>
+                    <a:pt x="0" y="25"/>
+                    <a:pt x="0" y="16"/>
+                  </a:cubicBezTo>
+                  <a:cubicBezTo>
+                    <a:pt x="0" y="7"/>
+                    <a:pt x="8" y="0"/>
+                    <a:pt x="17" y="0"/>
+                  </a:cubicBezTo>
+                  <a:cubicBezTo>
+                    <a:pt x="26" y="0"/>
+                    <a:pt x="33" y="7"/>
+                    <a:pt x="33" y="16"/>
+                  </a:cubicBezTo>
+                  <a:cubicBezTo>
+                    <a:pt x="33" y="25"/>
+                    <a:pt x="26" y="33"/>
+                    <a:pt x="17" y="33"/>
+                  </a:cubicBezTo>
+                  <a:close/>
+                  <a:moveTo>
+                    <a:pt x="17" y="4"/>
+                  </a:moveTo>
+                  <a:cubicBezTo>
+                    <a:pt x="10" y="4"/>
+                    <a:pt x="4" y="9"/>
+                    <a:pt x="4" y="16"/>
+                  </a:cubicBezTo>
+                  <a:cubicBezTo>
+                    <a:pt x="4" y="23"/>
+                    <a:pt x="10" y="29"/>
+                    <a:pt x="17" y="29"/>
+                  </a:cubicBezTo>
+                  <a:cubicBezTo>
+                    <a:pt x="23" y="29"/>
+                    <a:pt x="29" y="23"/>
+                    <a:pt x="29" y="16"/>
+                  </a:cubicBezTo>
+                  <a:cubicBezTo>
+                    <a:pt x="29" y="9"/>
+                    <a:pt x="23" y="4"/>
+                    <a:pt x="17" y="4"/>
+                  </a:cubicBezTo>
+                  <a:close/>
+                </a:path>
+              </a:pathLst>
+            </a:custGeom>
+            <a:grpFill/>
+            <a:ln>
+              <a:noFill/>
+            </a:ln>
+            <a:extLst>
+              <a:ext uri="{91240B29-F687-4f45-9708-019B960494DF}">
+                <a14:hiddenLine xmlns:a14="http://schemas.microsoft.com/office/drawing/2010/main" xmlns:p14="http://schemas.microsoft.com/office/powerpoint/2010/main" xmlns:a16="http://schemas.microsoft.com/office/drawing/2014/main" xmlns="" w="9525">
+                  <a:solidFill>
+                    <a:srgbClr val="000000"/>
+                  </a:solidFill>
+                  <a:round/>
+                  <a:headEnd/>
+                  <a:tailEnd/>
+                </a14:hiddenLine>
+              </a:ext>
+            </a:extLst>
+          </p:spPr>
+        </p:sp>
+        <p:sp>
+          <p:nvSpPr>
+            <p:cNvPr id="47" name="Freeform 37">
+              <a:extLst>
+                <a:ext uri="{FF2B5EF4-FFF2-40B4-BE49-F238E27FC236}">
+                  <a16:creationId xmlns:a16="http://schemas.microsoft.com/office/drawing/2014/main" id="{3F649CBB-748F-4C79-A14F-C531C40B08BB}"/>
+                </a:ext>
+                <a:ext uri="{C183D7F6-B498-43B3-948B-1728B52AA6E4}">
+                  <adec:decorative xmlns:adec="http://schemas.microsoft.com/office/drawing/2017/decorative" val="1"/>
+                </a:ext>
+              </a:extLst>
+            </p:cNvPr>
+            <p:cNvSpPr/>
+            <p:nvPr>
+              <p:extLst>
+                <p:ext uri="{386F3935-93C4-4BCD-93E2-E3B085C9AB24}">
+                  <p16:designElem xmlns:p16="http://schemas.microsoft.com/office/powerpoint/2015/main" val="1"/>
+                </p:ext>
+              </p:extLst>
+            </p:nvPr>
+          </p:nvSpPr>
+          <p:spPr bwMode="auto">
+            <a:xfrm>
+              <a:off x="11710987" y="4763"/>
+              <a:ext cx="304800" cy="1544638"/>
+            </a:xfrm>
+            <a:custGeom>
+              <a:avLst/>
+              <a:gdLst/>
+              <a:ahLst/>
+              <a:cxnLst/>
+              <a:rect l="0" t="0" r="r" b="b"/>
+              <a:pathLst>
+                <a:path w="192" h="973">
+                  <a:moveTo>
+                    <a:pt x="15" y="973"/>
+                  </a:moveTo>
+                  <a:lnTo>
+                    <a:pt x="0" y="973"/>
+                  </a:lnTo>
+                  <a:lnTo>
+                    <a:pt x="0" y="790"/>
+                  </a:lnTo>
+                  <a:lnTo>
+                    <a:pt x="174" y="614"/>
+                  </a:lnTo>
+                  <a:lnTo>
+                    <a:pt x="174" y="0"/>
+                  </a:lnTo>
+                  <a:lnTo>
+                    <a:pt x="192" y="0"/>
+                  </a:lnTo>
+                  <a:lnTo>
+                    <a:pt x="192" y="620"/>
+                  </a:lnTo>
+                  <a:lnTo>
+                    <a:pt x="15" y="796"/>
+                  </a:lnTo>
+                  <a:lnTo>
+                    <a:pt x="15" y="973"/>
+                  </a:lnTo>
+                  <a:close/>
+                </a:path>
+              </a:pathLst>
+            </a:custGeom>
+            <a:grpFill/>
+            <a:ln>
+              <a:noFill/>
+            </a:ln>
+            <a:extLst>
+              <a:ext uri="{91240B29-F687-4f45-9708-019B960494DF}">
+                <a14:hiddenLine xmlns:a14="http://schemas.microsoft.com/office/drawing/2010/main" xmlns:p14="http://schemas.microsoft.com/office/powerpoint/2010/main" xmlns:a16="http://schemas.microsoft.com/office/drawing/2014/main" xmlns="" w="9525">
+                  <a:solidFill>
+                    <a:srgbClr val="000000"/>
+                  </a:solidFill>
+                  <a:round/>
+                  <a:headEnd/>
+                  <a:tailEnd/>
+                </a14:hiddenLine>
+              </a:ext>
+            </a:extLst>
+          </p:spPr>
+        </p:sp>
+        <p:sp>
+          <p:nvSpPr>
+            <p:cNvPr id="48" name="Freeform 38">
+              <a:extLst>
+                <a:ext uri="{FF2B5EF4-FFF2-40B4-BE49-F238E27FC236}">
+                  <a16:creationId xmlns:a16="http://schemas.microsoft.com/office/drawing/2014/main" id="{7F4622C0-84AF-41F1-9128-FE73CADD36F2}"/>
+                </a:ext>
+                <a:ext uri="{C183D7F6-B498-43B3-948B-1728B52AA6E4}">
+                  <adec:decorative xmlns:adec="http://schemas.microsoft.com/office/drawing/2017/decorative" val="1"/>
+                </a:ext>
+              </a:extLst>
+            </p:cNvPr>
+            <p:cNvSpPr>
+              <a:spLocks noEditPoints="1"/>
+            </p:cNvSpPr>
+            <p:nvPr>
+              <p:extLst>
+                <p:ext uri="{386F3935-93C4-4BCD-93E2-E3B085C9AB24}">
+                  <p16:designElem xmlns:p16="http://schemas.microsoft.com/office/powerpoint/2015/main" val="1"/>
+                </p:ext>
+              </p:extLst>
+            </p:nvPr>
+          </p:nvSpPr>
+          <p:spPr bwMode="auto">
+            <a:xfrm>
+              <a:off x="11636375" y="4867275"/>
+              <a:ext cx="188913" cy="188913"/>
+            </a:xfrm>
+            <a:custGeom>
+              <a:avLst/>
+              <a:gdLst/>
+              <a:ahLst/>
+              <a:cxnLst/>
+              <a:rect l="0" t="0" r="r" b="b"/>
+              <a:pathLst>
+                <a:path w="40" h="40">
+                  <a:moveTo>
+                    <a:pt x="20" y="40"/>
+                  </a:moveTo>
+                  <a:cubicBezTo>
+                    <a:pt x="9" y="40"/>
+                    <a:pt x="0" y="31"/>
+                    <a:pt x="0" y="20"/>
+                  </a:cubicBezTo>
+                  <a:cubicBezTo>
+                    <a:pt x="0" y="9"/>
+                    <a:pt x="9" y="0"/>
+                    <a:pt x="20" y="0"/>
+                  </a:cubicBezTo>
+                  <a:cubicBezTo>
+                    <a:pt x="31" y="0"/>
+                    <a:pt x="40" y="9"/>
+                    <a:pt x="40" y="20"/>
+                  </a:cubicBezTo>
+                  <a:cubicBezTo>
+                    <a:pt x="40" y="31"/>
+                    <a:pt x="31" y="40"/>
+                    <a:pt x="20" y="40"/>
+                  </a:cubicBezTo>
+                  <a:close/>
+                  <a:moveTo>
+                    <a:pt x="20" y="4"/>
+                  </a:moveTo>
+                  <a:cubicBezTo>
+                    <a:pt x="11" y="4"/>
+                    <a:pt x="4" y="11"/>
+                    <a:pt x="4" y="20"/>
+                  </a:cubicBezTo>
+                  <a:cubicBezTo>
+                    <a:pt x="4" y="29"/>
+                    <a:pt x="11" y="36"/>
+                    <a:pt x="20" y="36"/>
+                  </a:cubicBezTo>
+                  <a:cubicBezTo>
+                    <a:pt x="29" y="36"/>
+                    <a:pt x="36" y="29"/>
+                    <a:pt x="36" y="20"/>
+                  </a:cubicBezTo>
+                  <a:cubicBezTo>
+                    <a:pt x="36" y="11"/>
+                    <a:pt x="29" y="4"/>
+                    <a:pt x="20" y="4"/>
+                  </a:cubicBezTo>
+                  <a:close/>
+                </a:path>
+              </a:pathLst>
+            </a:custGeom>
+            <a:grpFill/>
+            <a:ln>
+              <a:noFill/>
+            </a:ln>
+            <a:extLst>
+              <a:ext uri="{91240B29-F687-4f45-9708-019B960494DF}">
+                <a14:hiddenLine xmlns:a14="http://schemas.microsoft.com/office/drawing/2010/main" xmlns:p14="http://schemas.microsoft.com/office/powerpoint/2010/main" xmlns:a16="http://schemas.microsoft.com/office/drawing/2014/main" xmlns="" w="9525">
+                  <a:solidFill>
+                    <a:srgbClr val="000000"/>
+                  </a:solidFill>
+                  <a:round/>
+                  <a:headEnd/>
+                  <a:tailEnd/>
+                </a14:hiddenLine>
+              </a:ext>
+            </a:extLst>
+          </p:spPr>
+        </p:sp>
+        <p:sp>
+          <p:nvSpPr>
+            <p:cNvPr id="49" name="Freeform 39">
+              <a:extLst>
+                <a:ext uri="{FF2B5EF4-FFF2-40B4-BE49-F238E27FC236}">
+                  <a16:creationId xmlns:a16="http://schemas.microsoft.com/office/drawing/2014/main" id="{CC6F29C1-A471-4CDE-8C21-E4B15C5EF47A}"/>
+                </a:ext>
+                <a:ext uri="{C183D7F6-B498-43B3-948B-1728B52AA6E4}">
+                  <adec:decorative xmlns:adec="http://schemas.microsoft.com/office/drawing/2017/decorative" val="1"/>
+                </a:ext>
+              </a:extLst>
+            </p:cNvPr>
+            <p:cNvSpPr/>
+            <p:nvPr>
+              <p:extLst>
+                <p:ext uri="{386F3935-93C4-4BCD-93E2-E3B085C9AB24}">
+                  <p16:designElem xmlns:p16="http://schemas.microsoft.com/office/powerpoint/2015/main" val="1"/>
+                </p:ext>
+              </p:extLst>
+            </p:nvPr>
+          </p:nvSpPr>
+          <p:spPr bwMode="auto">
+            <a:xfrm>
+              <a:off x="11441112" y="5046663"/>
+              <a:ext cx="307975" cy="1801813"/>
+            </a:xfrm>
+            <a:custGeom>
+              <a:avLst/>
+              <a:gdLst/>
+              <a:ahLst/>
+              <a:cxnLst/>
+              <a:rect l="0" t="0" r="r" b="b"/>
+              <a:pathLst>
+                <a:path w="194" h="1135">
+                  <a:moveTo>
+                    <a:pt x="18" y="1135"/>
+                  </a:moveTo>
+                  <a:lnTo>
+                    <a:pt x="0" y="1135"/>
+                  </a:lnTo>
+                  <a:lnTo>
+                    <a:pt x="0" y="354"/>
+                  </a:lnTo>
+                  <a:lnTo>
+                    <a:pt x="176" y="177"/>
+                  </a:lnTo>
+                  <a:lnTo>
+                    <a:pt x="176" y="0"/>
+                  </a:lnTo>
+                  <a:lnTo>
+                    <a:pt x="194" y="0"/>
+                  </a:lnTo>
+                  <a:lnTo>
+                    <a:pt x="194" y="183"/>
+                  </a:lnTo>
+                  <a:lnTo>
+                    <a:pt x="18" y="360"/>
+                  </a:lnTo>
+                  <a:lnTo>
+                    <a:pt x="18" y="1135"/>
+                  </a:lnTo>
+                  <a:close/>
+                </a:path>
+              </a:pathLst>
+            </a:custGeom>
+            <a:grpFill/>
+            <a:ln>
+              <a:noFill/>
+            </a:ln>
+            <a:extLst>
+              <a:ext uri="{91240B29-F687-4f45-9708-019B960494DF}">
+                <a14:hiddenLine xmlns:a14="http://schemas.microsoft.com/office/drawing/2010/main" xmlns:p14="http://schemas.microsoft.com/office/powerpoint/2010/main" xmlns:a16="http://schemas.microsoft.com/office/drawing/2014/main" xmlns="" w="9525">
+                  <a:solidFill>
+                    <a:srgbClr val="000000"/>
+                  </a:solidFill>
+                  <a:round/>
+                  <a:headEnd/>
+                  <a:tailEnd/>
+                </a14:hiddenLine>
+              </a:ext>
+            </a:extLst>
+          </p:spPr>
+        </p:sp>
+        <p:sp>
+          <p:nvSpPr>
+            <p:cNvPr id="50" name="Freeform 40">
+              <a:extLst>
+                <a:ext uri="{FF2B5EF4-FFF2-40B4-BE49-F238E27FC236}">
+                  <a16:creationId xmlns:a16="http://schemas.microsoft.com/office/drawing/2014/main" id="{67F5B7DA-86C7-4AE0-96B6-D7F5AA51E21C}"/>
+                </a:ext>
+                <a:ext uri="{C183D7F6-B498-43B3-948B-1728B52AA6E4}">
+                  <adec:decorative xmlns:adec="http://schemas.microsoft.com/office/drawing/2017/decorative" val="1"/>
+                </a:ext>
+              </a:extLst>
+            </p:cNvPr>
+            <p:cNvSpPr>
+              <a:spLocks noEditPoints="1"/>
+            </p:cNvSpPr>
+            <p:nvPr>
+              <p:extLst>
+                <p:ext uri="{386F3935-93C4-4BCD-93E2-E3B085C9AB24}">
+                  <p16:designElem xmlns:p16="http://schemas.microsoft.com/office/powerpoint/2015/main" val="1"/>
+                </p:ext>
+              </p:extLst>
+            </p:nvPr>
+          </p:nvSpPr>
+          <p:spPr bwMode="auto">
+            <a:xfrm>
+              <a:off x="11849100" y="6416675"/>
+              <a:ext cx="190500" cy="188913"/>
+            </a:xfrm>
+            <a:custGeom>
+              <a:avLst/>
+              <a:gdLst/>
+              <a:ahLst/>
+              <a:cxnLst/>
+              <a:rect l="0" t="0" r="r" b="b"/>
+              <a:pathLst>
+                <a:path w="40" h="40">
+                  <a:moveTo>
+                    <a:pt x="20" y="40"/>
+                  </a:moveTo>
+                  <a:cubicBezTo>
+                    <a:pt x="9" y="40"/>
+                    <a:pt x="0" y="31"/>
+                    <a:pt x="0" y="20"/>
+                  </a:cubicBezTo>
+                  <a:cubicBezTo>
+                    <a:pt x="0" y="9"/>
+                    <a:pt x="9" y="0"/>
+                    <a:pt x="20" y="0"/>
+                  </a:cubicBezTo>
+                  <a:cubicBezTo>
+                    <a:pt x="31" y="0"/>
+                    <a:pt x="40" y="9"/>
+                    <a:pt x="40" y="20"/>
+                  </a:cubicBezTo>
+                  <a:cubicBezTo>
+                    <a:pt x="40" y="31"/>
+                    <a:pt x="31" y="40"/>
+                    <a:pt x="20" y="40"/>
+                  </a:cubicBezTo>
+                  <a:close/>
+                  <a:moveTo>
+                    <a:pt x="20" y="4"/>
+                  </a:moveTo>
+                  <a:cubicBezTo>
+                    <a:pt x="12" y="4"/>
+                    <a:pt x="4" y="11"/>
+                    <a:pt x="4" y="20"/>
+                  </a:cubicBezTo>
+                  <a:cubicBezTo>
+                    <a:pt x="4" y="29"/>
+                    <a:pt x="12" y="36"/>
+                    <a:pt x="20" y="36"/>
+                  </a:cubicBezTo>
+                  <a:cubicBezTo>
+                    <a:pt x="29" y="36"/>
+                    <a:pt x="36" y="29"/>
+                    <a:pt x="36" y="20"/>
+                  </a:cubicBezTo>
+                  <a:cubicBezTo>
+                    <a:pt x="36" y="11"/>
+                    <a:pt x="29" y="4"/>
+                    <a:pt x="20" y="4"/>
+                  </a:cubicBezTo>
+                  <a:close/>
+                </a:path>
+              </a:pathLst>
+            </a:custGeom>
+            <a:grpFill/>
+            <a:ln>
+              <a:noFill/>
+            </a:ln>
+            <a:extLst>
+              <a:ext uri="{91240B29-F687-4f45-9708-019B960494DF}">
+                <a14:hiddenLine xmlns:a14="http://schemas.microsoft.com/office/drawing/2010/main" xmlns:p14="http://schemas.microsoft.com/office/powerpoint/2010/main" xmlns:a16="http://schemas.microsoft.com/office/drawing/2014/main" xmlns="" w="9525">
+                  <a:solidFill>
+                    <a:srgbClr val="000000"/>
+                  </a:solidFill>
+                  <a:round/>
+                  <a:headEnd/>
+                  <a:tailEnd/>
+                </a14:hiddenLine>
+              </a:ext>
+            </a:extLst>
+          </p:spPr>
+        </p:sp>
+        <p:sp>
+          <p:nvSpPr>
+            <p:cNvPr id="51" name="Rectangle 41">
+              <a:extLst>
+                <a:ext uri="{FF2B5EF4-FFF2-40B4-BE49-F238E27FC236}">
+                  <a16:creationId xmlns:a16="http://schemas.microsoft.com/office/drawing/2014/main" id="{0FA481E3-0439-484A-AC9B-19D58B98E49F}"/>
+                </a:ext>
+                <a:ext uri="{C183D7F6-B498-43B3-948B-1728B52AA6E4}">
+                  <adec:decorative xmlns:adec="http://schemas.microsoft.com/office/drawing/2017/decorative" val="1"/>
+                </a:ext>
+              </a:extLst>
+            </p:cNvPr>
+            <p:cNvSpPr>
+              <a:spLocks noChangeArrowheads="1"/>
+            </p:cNvSpPr>
+            <p:nvPr>
+              <p:extLst>
+                <p:ext uri="{386F3935-93C4-4BCD-93E2-E3B085C9AB24}">
+                  <p16:designElem xmlns:p16="http://schemas.microsoft.com/office/powerpoint/2015/main" val="1"/>
+                </p:ext>
+              </p:extLst>
+            </p:nvPr>
+          </p:nvSpPr>
+          <p:spPr bwMode="auto">
+            <a:xfrm>
+              <a:off x="11939587" y="6596063"/>
+              <a:ext cx="23813" cy="252413"/>
+            </a:xfrm>
+            <a:prstGeom prst="rect">
+              <a:avLst/>
+            </a:prstGeom>
+            <a:grpFill/>
+            <a:ln>
+              <a:noFill/>
+            </a:ln>
+            <a:extLst>
+              <a:ext uri="{91240B29-F687-4f45-9708-019B960494DF}">
+                <a14:hiddenLine xmlns:a14="http://schemas.microsoft.com/office/drawing/2010/main" xmlns:p14="http://schemas.microsoft.com/office/powerpoint/2010/main" xmlns:a16="http://schemas.microsoft.com/office/drawing/2014/main" xmlns="" w="9525">
+                  <a:solidFill>
+                    <a:srgbClr val="000000"/>
+                  </a:solidFill>
+                  <a:miter lim="800000"/>
+                  <a:headEnd/>
+                  <a:tailEnd/>
+                </a14:hiddenLine>
+              </a:ext>
+            </a:extLst>
+          </p:spPr>
+        </p:sp>
+      </p:grpSp>
     </p:spTree>
     <p:extLst>
       <p:ext uri="{BB962C8B-B14F-4D97-AF65-F5344CB8AC3E}">
-        <p14:creationId xmlns:p14="http://schemas.microsoft.com/office/powerpoint/2010/main" val="1620217874"/>
+        <p14:creationId xmlns:p14="http://schemas.microsoft.com/office/powerpoint/2010/main" val="3123019866"/>
       </p:ext>
     </p:extLst>
   </p:cSld>
   <p:clrMapOvr>
-    <a:masterClrMapping/>
+    <a:overrideClrMapping bg1="lt1" tx1="dk1" bg2="lt2" tx2="dk2" accent1="accent1" accent2="accent2" accent3="accent3" accent4="accent4" accent5="accent5" accent6="accent6" hlink="hlink" folHlink="folHlink"/>
   </p:clrMapOvr>
 </p:sld>
 </file>

</xml_diff>